<commit_message>
modified ppt for some point regarding signalr... added gang sign mp4
</commit_message>
<xml_diff>
--- a/Docs/2012 - Live360 Event Review (NEWER).pptx
+++ b/Docs/2012 - Live360 Event Review (NEWER).pptx
@@ -1454,7 +1454,7 @@
           </a:p>
           <a:p>
             <a:r>
-              <a:rPr lang="en-CA" smtClean="0"/>
+              <a:rPr lang="en-CA" dirty="0" smtClean="0"/>
               <a:t>http://haz.io/</a:t>
             </a:r>
           </a:p>
@@ -6436,18 +6436,53 @@
         </p:nvSpPr>
         <p:spPr/>
         <p:txBody>
-          <a:bodyPr/>
-          <a:lstStyle/>
-          <a:p>
-            <a:r>
-              <a:rPr lang="en-CA" dirty="0"/>
-              <a:t>“Any sufficiently advanced technology is indistinguishable from magic” – Arthur C. Clarke</a:t>
-            </a:r>
-          </a:p>
-          <a:p>
+          <a:bodyPr>
+            <a:normAutofit/>
+          </a:bodyPr>
+          <a:lstStyle/>
+          <a:p>
+            <a:r>
+              <a:rPr lang="en-CA" dirty="0"/>
+              <a:t>“Any sufficiently advanced technology is indistinguishable from magic” – Arthur C. </a:t>
+            </a:r>
             <a:r>
               <a:rPr lang="en-CA" dirty="0" smtClean="0"/>
-              <a:t>Demo 6</a:t>
+              <a:t>Clarke</a:t>
+            </a:r>
+          </a:p>
+          <a:p>
+            <a:r>
+              <a:rPr lang="en-CA" dirty="0" smtClean="0"/>
+              <a:t>An </a:t>
+            </a:r>
+            <a:r>
+              <a:rPr lang="en-CA" dirty="0"/>
+              <a:t>open source series of libraries that provide an abstraction around persistent HTTP connections</a:t>
+            </a:r>
+          </a:p>
+          <a:p>
+            <a:r>
+              <a:rPr lang="en-CA" dirty="0" smtClean="0"/>
+              <a:t>Makes </a:t>
+            </a:r>
+            <a:r>
+              <a:rPr lang="en-CA" dirty="0"/>
+              <a:t>real-time HTTP so easy it seems like </a:t>
+            </a:r>
+            <a:r>
+              <a:rPr lang="en-CA" dirty="0" smtClean="0"/>
+              <a:t>“magic”</a:t>
+            </a:r>
+            <a:endParaRPr lang="en-CA" dirty="0"/>
+          </a:p>
+          <a:p>
+            <a:r>
+              <a:rPr lang="en-CA" dirty="0" smtClean="0"/>
+              <a:t>Demo </a:t>
+            </a:r>
+            <a:r>
+              <a:rPr lang="en-CA" dirty="0" smtClean="0"/>
+              <a:t>6</a:t>
             </a:r>
             <a:endParaRPr lang="en-CA" dirty="0"/>
           </a:p>

</xml_diff>

<commit_message>
updates to powerpoint... accirdentally had web.config that don't need. added links to other azure website for my signalr demo
</commit_message>
<xml_diff>
--- a/Docs/2012 - Live360 Event Review (NEWER).pptx
+++ b/Docs/2012 - Live360 Event Review (NEWER).pptx
@@ -5856,12 +5856,24 @@
               <a:t>Email, </a:t>
             </a:r>
             <a:r>
-              <a:rPr lang="en-CA" dirty="0" err="1"/>
+              <a:rPr lang="en-CA" dirty="0" err="1" smtClean="0"/>
               <a:t>url</a:t>
             </a:r>
             <a:r>
-              <a:rPr lang="en-CA" dirty="0"/>
-              <a:t>, search, number, date, color, </a:t>
+              <a:rPr lang="en-CA" dirty="0" smtClean="0"/>
+              <a:t>, </a:t>
+            </a:r>
+            <a:r>
+              <a:rPr lang="en-CA" dirty="0"/>
+              <a:t>search, number, date, </a:t>
+            </a:r>
+            <a:r>
+              <a:rPr lang="en-CA" dirty="0" smtClean="0"/>
+              <a:t>time, color</a:t>
+            </a:r>
+            <a:r>
+              <a:rPr lang="en-CA" dirty="0"/>
+              <a:t>, </a:t>
             </a:r>
             <a:r>
               <a:rPr lang="en-CA" dirty="0" err="1"/>
@@ -6004,7 +6016,7 @@
         </p:spPr>
         <p:txBody>
           <a:bodyPr>
-            <a:normAutofit/>
+            <a:normAutofit lnSpcReduction="10000"/>
           </a:bodyPr>
           <a:lstStyle/>
           <a:p>
@@ -6101,6 +6113,13 @@
             <a:r>
               <a:rPr lang="en-CA" dirty="0" smtClean="0"/>
               <a:t>repository</a:t>
+            </a:r>
+          </a:p>
+          <a:p>
+            <a:pPr lvl="1"/>
+            <a:r>
+              <a:rPr lang="en-CA" dirty="0" smtClean="0"/>
+              <a:t>Create new site and download publish settings for deploying</a:t>
             </a:r>
             <a:endParaRPr lang="en-CA" dirty="0"/>
           </a:p>
@@ -6323,8 +6342,13 @@
           <a:p>
             <a:r>
               <a:rPr lang="en-CA" dirty="0" smtClean="0"/>
-              <a:t>Demo 5</a:t>
-            </a:r>
+              <a:t>Demo </a:t>
+            </a:r>
+            <a:r>
+              <a:rPr lang="en-CA" dirty="0" smtClean="0"/>
+              <a:t>6</a:t>
+            </a:r>
+            <a:endParaRPr lang="en-CA" dirty="0" smtClean="0"/>
           </a:p>
           <a:p>
             <a:pPr lvl="1"/>
@@ -6473,7 +6497,21 @@
               <a:rPr lang="en-CA" dirty="0" smtClean="0"/>
               <a:t>“magic”</a:t>
             </a:r>
-            <a:endParaRPr lang="en-CA" dirty="0"/>
+          </a:p>
+          <a:p>
+            <a:r>
+              <a:rPr lang="en-CA" dirty="0">
+                <a:hlinkClick r:id="rId3"/>
+              </a:rPr>
+              <a:t>http://</a:t>
+            </a:r>
+            <a:r>
+              <a:rPr lang="en-CA" dirty="0" smtClean="0">
+                <a:hlinkClick r:id="rId3"/>
+              </a:rPr>
+              <a:t>www.asp.net/signalr/</a:t>
+            </a:r>
+            <a:endParaRPr lang="en-CA" dirty="0" smtClean="0"/>
           </a:p>
           <a:p>
             <a:r>
@@ -6481,8 +6519,8 @@
               <a:t>Demo </a:t>
             </a:r>
             <a:r>
-              <a:rPr lang="en-CA" dirty="0" smtClean="0"/>
-              <a:t>6</a:t>
+              <a:rPr lang="en-CA" dirty="0"/>
+              <a:t>7</a:t>
             </a:r>
             <a:endParaRPr lang="en-CA" dirty="0"/>
           </a:p>
@@ -7629,9 +7667,12 @@
             </a:r>
             <a:r>
               <a:rPr lang="en-CA" dirty="0" smtClean="0"/>
-              <a:t>(“semantic web”)</a:t>
-            </a:r>
-            <a:endParaRPr lang="en-CA" dirty="0"/>
+              <a:t>(“semantic web</a:t>
+            </a:r>
+            <a:r>
+              <a:rPr lang="en-CA" dirty="0" smtClean="0"/>
+              <a:t>”)</a:t>
+            </a:r>
           </a:p>
         </p:txBody>
       </p:sp>

</xml_diff>

<commit_message>
updated powerpoint... added very simplistic multimedia demo
</commit_message>
<xml_diff>
--- a/Docs/2012 - Live360 Event Review (NEWER).pptx
+++ b/Docs/2012 - Live360 Event Review (NEWER).pptx
@@ -5,10 +5,10 @@
     <p:sldMasterId id="2147483887" r:id="rId1"/>
   </p:sldMasterIdLst>
   <p:notesMasterIdLst>
-    <p:notesMasterId r:id="rId17"/>
+    <p:notesMasterId r:id="rId18"/>
   </p:notesMasterIdLst>
   <p:handoutMasterIdLst>
-    <p:handoutMasterId r:id="rId18"/>
+    <p:handoutMasterId r:id="rId19"/>
   </p:handoutMasterIdLst>
   <p:sldIdLst>
     <p:sldId id="260" r:id="rId2"/>
@@ -22,10 +22,11 @@
     <p:sldId id="272" r:id="rId10"/>
     <p:sldId id="273" r:id="rId11"/>
     <p:sldId id="265" r:id="rId12"/>
-    <p:sldId id="266" r:id="rId13"/>
-    <p:sldId id="268" r:id="rId14"/>
-    <p:sldId id="269" r:id="rId15"/>
-    <p:sldId id="270" r:id="rId16"/>
+    <p:sldId id="274" r:id="rId13"/>
+    <p:sldId id="266" r:id="rId14"/>
+    <p:sldId id="268" r:id="rId15"/>
+    <p:sldId id="269" r:id="rId16"/>
+    <p:sldId id="270" r:id="rId17"/>
   </p:sldIdLst>
   <p:sldSz cx="9144000" cy="6858000" type="screen4x3"/>
   <p:notesSz cx="6858000" cy="9144000"/>
@@ -209,7 +210,7 @@
           <a:p>
             <a:fld id="{6D05735F-B05D-4640-A99E-EDFA21E90228}" type="datetimeFigureOut">
               <a:rPr lang="en-US" smtClean="0"/>
-              <a:t>3/3/2013</a:t>
+              <a:t>3/4/2013</a:t>
             </a:fld>
             <a:endParaRPr lang="en-US"/>
           </a:p>
@@ -375,7 +376,7 @@
           <a:p>
             <a:fld id="{EB5D2808-713F-1C4D-AF0B-AEC7B1F49BC4}" type="datetimeFigureOut">
               <a:rPr lang="en-US" smtClean="0"/>
-              <a:t>3/3/2013</a:t>
+              <a:t>3/4/2013</a:t>
             </a:fld>
             <a:endParaRPr lang="en-US"/>
           </a:p>
@@ -688,9 +689,55 @@
           <a:bodyPr/>
           <a:lstStyle/>
           <a:p>
+            <a:pPr marL="0" marR="0" indent="0" algn="l" defTabSz="457200" rtl="0" eaLnBrk="1" fontAlgn="auto" latinLnBrk="0" hangingPunct="1">
+              <a:lnSpc>
+                <a:spcPct val="100000"/>
+              </a:lnSpc>
+              <a:spcBef>
+                <a:spcPts val="0"/>
+              </a:spcBef>
+              <a:spcAft>
+                <a:spcPts val="0"/>
+              </a:spcAft>
+              <a:buClrTx/>
+              <a:buSzTx/>
+              <a:buFontTx/>
+              <a:buNone/>
+              <a:tabLst/>
+              <a:defRPr/>
+            </a:pPr>
             <a:r>
               <a:rPr lang="en-CA" dirty="0" smtClean="0"/>
-              <a:t>http://www.redmondevents.com/virtual/login.aspx?ReturnUrl=%2fvirtual%2fvslive%2f2012%2flive360%2fDefault.aspx</a:t>
+              <a:t>Was</a:t>
+            </a:r>
+            <a:r>
+              <a:rPr lang="en-CA" baseline="0" dirty="0" smtClean="0"/>
+              <a:t> allowed the opportunity of attending a conference in December called Live360. This presentation had its genesis from attending this.</a:t>
+            </a:r>
+            <a:endParaRPr lang="en-CA" dirty="0" smtClean="0"/>
+          </a:p>
+          <a:p>
+            <a:endParaRPr lang="en-CA" dirty="0" smtClean="0"/>
+          </a:p>
+          <a:p>
+            <a:r>
+              <a:rPr lang="en-CA" dirty="0" smtClean="0"/>
+              <a:t>You may access all of the mater</a:t>
+            </a:r>
+            <a:r>
+              <a:rPr lang="en-CA" baseline="0" dirty="0" smtClean="0"/>
+              <a:t>ial for the event by going to the following link</a:t>
+            </a:r>
+            <a:endParaRPr lang="en-CA" dirty="0" smtClean="0"/>
+          </a:p>
+          <a:p>
+            <a:r>
+              <a:rPr lang="en-CA" dirty="0" smtClean="0"/>
+              <a:t>http</a:t>
+            </a:r>
+            <a:r>
+              <a:rPr lang="en-CA" dirty="0" smtClean="0"/>
+              <a:t>://www.redmondevents.com/virtual/login.aspx?ReturnUrl=%2fvirtual%2fvslive%2f2012%2flive360%2fDefault.aspx</a:t>
             </a:r>
           </a:p>
           <a:p>
@@ -711,7 +758,7 @@
             <a:endParaRPr lang="en-CA" dirty="0" smtClean="0"/>
           </a:p>
           <a:p>
-            <a:endParaRPr lang="en-CA" dirty="0"/>
+            <a:endParaRPr lang="en-CA" dirty="0" smtClean="0"/>
           </a:p>
         </p:txBody>
       </p:sp>
@@ -1327,11 +1374,7 @@
             </a:r>
             <a:r>
               <a:rPr lang="en-CA" dirty="0" smtClean="0"/>
-              <a:t> </a:t>
-            </a:r>
-            <a:r>
-              <a:rPr lang="en-CA" dirty="0" smtClean="0"/>
-              <a:t>Google Chrome Frame can help with this: </a:t>
+              <a:t> Google Chrome Frame can help with this: </a:t>
             </a:r>
             <a:r>
               <a:rPr lang="en-US" dirty="0" smtClean="0">
@@ -1570,7 +1613,7 @@
           <a:p>
             <a:fld id="{4FCB2955-686B-EC42-828C-18431921459F}" type="slidenum">
               <a:rPr lang="en-US" smtClean="0"/>
-              <a:t>13</a:t>
+              <a:t>14</a:t>
             </a:fld>
             <a:endParaRPr lang="en-US"/>
           </a:p>
@@ -1654,7 +1697,7 @@
           <a:p>
             <a:fld id="{4FCB2955-686B-EC42-828C-18431921459F}" type="slidenum">
               <a:rPr lang="en-US" smtClean="0"/>
-              <a:t>14</a:t>
+              <a:t>15</a:t>
             </a:fld>
             <a:endParaRPr lang="en-US"/>
           </a:p>
@@ -1931,7 +1974,7 @@
           <a:p>
             <a:fld id="{EB6F4DCC-4F1E-F54C-AA63-5E9B8139A2C7}" type="datetime4">
               <a:rPr lang="en-CA" smtClean="0"/>
-              <a:t>March-3-13</a:t>
+              <a:t>March-4-13</a:t>
             </a:fld>
             <a:endParaRPr lang="en-US" dirty="0"/>
           </a:p>
@@ -2177,7 +2220,7 @@
           <a:p>
             <a:fld id="{E89AD498-328C-DE45-9033-626F46332D12}" type="datetime4">
               <a:rPr lang="en-CA" smtClean="0"/>
-              <a:t>March-3-13</a:t>
+              <a:t>March-4-13</a:t>
             </a:fld>
             <a:endParaRPr lang="en-US"/>
           </a:p>
@@ -2498,7 +2541,7 @@
           <a:p>
             <a:fld id="{205C405F-71DA-D945-AC37-528E00489EC0}" type="datetime4">
               <a:rPr lang="en-CA" smtClean="0"/>
-              <a:t>March-3-13</a:t>
+              <a:t>March-4-13</a:t>
             </a:fld>
             <a:endParaRPr lang="en-US"/>
           </a:p>
@@ -3030,7 +3073,7 @@
           <a:p>
             <a:fld id="{A706A332-CB54-F44D-AAB8-905B7A2134BC}" type="datetime4">
               <a:rPr lang="en-CA" smtClean="0"/>
-              <a:t>March-3-13</a:t>
+              <a:t>March-4-13</a:t>
             </a:fld>
             <a:endParaRPr lang="en-US" dirty="0"/>
           </a:p>
@@ -3407,7 +3450,7 @@
           <a:p>
             <a:fld id="{C8774548-0BB4-5443-9210-BF9E4921324F}" type="datetime4">
               <a:rPr lang="en-CA" smtClean="0"/>
-              <a:t>March-3-13</a:t>
+              <a:t>March-4-13</a:t>
             </a:fld>
             <a:endParaRPr lang="en-US"/>
           </a:p>
@@ -3784,7 +3827,7 @@
           <a:p>
             <a:fld id="{DA5AA9F5-8C84-A342-A63E-20B4B9965A72}" type="datetime4">
               <a:rPr lang="en-CA" smtClean="0"/>
-              <a:t>March-3-13</a:t>
+              <a:t>March-4-13</a:t>
             </a:fld>
             <a:endParaRPr lang="en-US"/>
           </a:p>
@@ -4191,7 +4234,7 @@
           <a:p>
             <a:fld id="{B75CC70B-AAA2-1A4B-980F-5795C4FC07F0}" type="datetime4">
               <a:rPr lang="en-CA" smtClean="0"/>
-              <a:t>March-3-13</a:t>
+              <a:t>March-4-13</a:t>
             </a:fld>
             <a:endParaRPr lang="en-US"/>
           </a:p>
@@ -4455,7 +4498,7 @@
           <a:p>
             <a:fld id="{634933C9-6163-F741-B0D7-A3D45CDF27BE}" type="datetime4">
               <a:rPr lang="en-CA" smtClean="0"/>
-              <a:t>March-3-13</a:t>
+              <a:t>March-4-13</a:t>
             </a:fld>
             <a:endParaRPr lang="en-US"/>
           </a:p>
@@ -4959,7 +5002,7 @@
           <a:p>
             <a:fld id="{952FD3B8-8B26-5944-8B2D-223A1203AFC1}" type="datetime4">
               <a:rPr lang="en-CA" smtClean="0"/>
-              <a:t>March-3-13</a:t>
+              <a:t>March-4-13</a:t>
             </a:fld>
             <a:endParaRPr lang="en-US" dirty="0" err="1"/>
           </a:p>
@@ -5507,7 +5550,9 @@
           <a:lstStyle/>
           <a:p>
             <a:r>
-              <a:rPr lang="en-US" dirty="0" smtClean="0"/>
+              <a:rPr lang="en-US" dirty="0" smtClean="0">
+                <a:hlinkClick r:id="rId3"/>
+              </a:rPr>
               <a:t>Live 360! Events</a:t>
             </a:r>
             <a:endParaRPr lang="en-US" dirty="0"/>
@@ -5630,10 +5675,15 @@
             <p:ph sz="quarter" idx="13"/>
           </p:nvPr>
         </p:nvSpPr>
-        <p:spPr/>
+        <p:spPr>
+          <a:xfrm>
+            <a:off x="979488" y="1630362"/>
+            <a:ext cx="6697663" cy="4606949"/>
+          </a:xfrm>
+        </p:spPr>
         <p:txBody>
           <a:bodyPr>
-            <a:normAutofit fontScale="85000" lnSpcReduction="20000"/>
+            <a:normAutofit/>
           </a:bodyPr>
           <a:lstStyle/>
           <a:p>
@@ -5824,8 +5874,13 @@
           <a:p>
             <a:r>
               <a:rPr lang="en-CA" dirty="0"/>
-              <a:t>HTML 5 Forms</a:t>
-            </a:r>
+              <a:t>HTML 5 </a:t>
+            </a:r>
+            <a:r>
+              <a:rPr lang="en-CA" dirty="0" smtClean="0"/>
+              <a:t>Form Enhancements</a:t>
+            </a:r>
+            <a:endParaRPr lang="en-CA" dirty="0"/>
           </a:p>
         </p:txBody>
       </p:sp>
@@ -5839,7 +5894,12 @@
             <p:ph sz="quarter" idx="13"/>
           </p:nvPr>
         </p:nvSpPr>
-        <p:spPr/>
+        <p:spPr>
+          <a:xfrm>
+            <a:off x="979488" y="1630362"/>
+            <a:ext cx="6697663" cy="4462933"/>
+          </a:xfrm>
+        </p:spPr>
         <p:txBody>
           <a:bodyPr/>
           <a:lstStyle/>
@@ -5932,6 +5992,13 @@
   <p:clrMapOvr>
     <a:masterClrMapping/>
   </p:clrMapOvr>
+  <p:timing>
+    <p:tnLst>
+      <p:par>
+        <p:cTn id="1" dur="indefinite" restart="never" nodeType="tmRoot"/>
+      </p:par>
+    </p:tnLst>
+  </p:timing>
 </p:sld>
 </file>
 
@@ -5993,8 +6060,17 @@
           <a:p>
             <a:r>
               <a:rPr lang="en-CA" dirty="0"/>
-              <a:t>Azure</a:t>
-            </a:r>
+              <a:t>HTML 5 </a:t>
+            </a:r>
+            <a:r>
+              <a:rPr lang="en-CA" dirty="0" err="1" smtClean="0"/>
+              <a:t>MultiMedia</a:t>
+            </a:r>
+            <a:r>
+              <a:rPr lang="en-CA" dirty="0" smtClean="0"/>
+              <a:t> Enhancements</a:t>
+            </a:r>
+            <a:endParaRPr lang="en-CA" dirty="0"/>
           </a:p>
         </p:txBody>
       </p:sp>
@@ -6011,120 +6087,34 @@
         <p:spPr>
           <a:xfrm>
             <a:off x="979488" y="1630362"/>
-            <a:ext cx="6697663" cy="4246909"/>
+            <a:ext cx="6697663" cy="4462933"/>
           </a:xfrm>
         </p:spPr>
         <p:txBody>
-          <a:bodyPr>
-            <a:normAutofit lnSpcReduction="10000"/>
-          </a:bodyPr>
-          <a:lstStyle/>
-          <a:p>
-            <a:r>
-              <a:rPr lang="en-CA" dirty="0"/>
-              <a:t>Sessions:</a:t>
-            </a:r>
+          <a:bodyPr/>
+          <a:lstStyle/>
+          <a:p>
+            <a:r>
+              <a:rPr lang="en-CA" dirty="0" smtClean="0"/>
+              <a:t>New “audio” and “video” tags</a:t>
+            </a:r>
+          </a:p>
+          <a:p>
+            <a:r>
+              <a:rPr lang="en-CA" dirty="0" smtClean="0"/>
+              <a:t>Demo </a:t>
+            </a:r>
+            <a:r>
+              <a:rPr lang="en-CA" dirty="0" smtClean="0"/>
+              <a:t>5</a:t>
+            </a:r>
+          </a:p>
+          <a:p>
+            <a:endParaRPr lang="en-CA" dirty="0" smtClean="0"/>
           </a:p>
           <a:p>
             <a:pPr lvl="1"/>
-            <a:r>
-              <a:rPr lang="en-CA" dirty="0"/>
-              <a:t>Most made reference to it / used it</a:t>
-            </a:r>
-          </a:p>
-          <a:p>
-            <a:r>
-              <a:rPr lang="en-CA" dirty="0"/>
-              <a:t>What is it?</a:t>
-            </a:r>
-          </a:p>
-          <a:p>
-            <a:pPr lvl="1"/>
-            <a:r>
-              <a:rPr lang="en-CA" dirty="0"/>
-              <a:t>cloud computing is really doing just-in-time provisioning and </a:t>
-            </a:r>
-            <a:r>
-              <a:rPr lang="en-CA" dirty="0" smtClean="0"/>
-              <a:t>scaling </a:t>
-            </a:r>
-            <a:r>
-              <a:rPr lang="en-CA" dirty="0"/>
-              <a:t>of services, software and solutions delivered as a service on a pool of hardware</a:t>
-            </a:r>
-          </a:p>
-          <a:p>
-            <a:pPr lvl="1"/>
-            <a:r>
-              <a:rPr lang="en-CA" dirty="0"/>
-              <a:t>On demand provisioning</a:t>
-            </a:r>
-          </a:p>
-          <a:p>
-            <a:pPr lvl="1"/>
-            <a:r>
-              <a:rPr lang="en-CA" dirty="0"/>
-              <a:t>scaling resources... example "tonight I need 10,000 nodes for an hour until batch is done“</a:t>
-            </a:r>
-          </a:p>
-          <a:p>
-            <a:pPr lvl="1"/>
-            <a:r>
-              <a:rPr lang="en-CA" dirty="0"/>
-              <a:t>abstraction over </a:t>
-            </a:r>
-            <a:r>
-              <a:rPr lang="en-CA" dirty="0" smtClean="0"/>
-              <a:t>resources</a:t>
-            </a:r>
-          </a:p>
-          <a:p>
-            <a:r>
-              <a:rPr lang="en-CA" dirty="0"/>
-              <a:t>Demo 5</a:t>
-            </a:r>
-          </a:p>
-          <a:p>
-            <a:pPr lvl="1"/>
-            <a:r>
-              <a:rPr lang="en-CA" dirty="0"/>
-              <a:t>Create a website using </a:t>
-            </a:r>
-            <a:r>
-              <a:rPr lang="en-CA" dirty="0" smtClean="0"/>
-              <a:t>Azure… show other options here</a:t>
-            </a:r>
-            <a:endParaRPr lang="en-CA" dirty="0"/>
-          </a:p>
-          <a:p>
-            <a:pPr lvl="1"/>
-            <a:r>
-              <a:rPr lang="en-CA" dirty="0"/>
-              <a:t>Link to my </a:t>
-            </a:r>
-            <a:r>
-              <a:rPr lang="en-CA" dirty="0" err="1"/>
-              <a:t>github</a:t>
-            </a:r>
-            <a:r>
-              <a:rPr lang="en-CA" dirty="0"/>
-              <a:t> </a:t>
-            </a:r>
-            <a:r>
-              <a:rPr lang="en-CA" dirty="0" smtClean="0"/>
-              <a:t>repository</a:t>
-            </a:r>
-          </a:p>
-          <a:p>
-            <a:pPr lvl="1"/>
-            <a:r>
-              <a:rPr lang="en-CA" dirty="0" smtClean="0"/>
-              <a:t>Create new site and download publish settings for deploying</a:t>
-            </a:r>
-            <a:endParaRPr lang="en-CA" dirty="0"/>
-          </a:p>
-          <a:p>
-            <a:endParaRPr lang="en-CA" dirty="0"/>
+            <a:endParaRPr lang="en-CA" dirty="0" smtClean="0"/>
           </a:p>
           <a:p>
             <a:endParaRPr lang="en-CA" dirty="0"/>
@@ -6134,13 +6124,20 @@
     </p:spTree>
     <p:extLst>
       <p:ext uri="{BB962C8B-B14F-4D97-AF65-F5344CB8AC3E}">
-        <p14:creationId xmlns:p14="http://schemas.microsoft.com/office/powerpoint/2010/main" val="1419882203"/>
+        <p14:creationId xmlns:p14="http://schemas.microsoft.com/office/powerpoint/2010/main" val="2796152035"/>
       </p:ext>
     </p:extLst>
   </p:cSld>
   <p:clrMapOvr>
     <a:masterClrMapping/>
   </p:clrMapOvr>
+  <p:timing>
+    <p:tnLst>
+      <p:par>
+        <p:cTn id="1" dur="indefinite" restart="never" nodeType="tmRoot"/>
+      </p:par>
+    </p:tnLst>
+  </p:timing>
 </p:sld>
 </file>
 
@@ -6202,7 +6199,7 @@
           <a:p>
             <a:r>
               <a:rPr lang="en-CA" dirty="0"/>
-              <a:t>Mobile</a:t>
+              <a:t>Azure</a:t>
             </a:r>
           </a:p>
         </p:txBody>
@@ -6220,29 +6217,17 @@
         <p:spPr>
           <a:xfrm>
             <a:off x="979488" y="1630362"/>
-            <a:ext cx="6697663" cy="4534941"/>
+            <a:ext cx="6697663" cy="4246909"/>
           </a:xfrm>
         </p:spPr>
         <p:txBody>
           <a:bodyPr>
-            <a:normAutofit fontScale="92500" lnSpcReduction="20000"/>
+            <a:normAutofit lnSpcReduction="10000"/>
           </a:bodyPr>
           <a:lstStyle/>
           <a:p>
             <a:r>
               <a:rPr lang="en-CA" dirty="0"/>
-              <a:t>Unfortunately not the conference to learn a lot of mobile</a:t>
-            </a:r>
-          </a:p>
-          <a:p>
-            <a:r>
-              <a:rPr lang="en-CA" dirty="0"/>
-              <a:t>Concentration on HTML5 including CSS3 for formatting with mobile in mind</a:t>
-            </a:r>
-          </a:p>
-          <a:p>
-            <a:r>
-              <a:rPr lang="en-CA" dirty="0"/>
               <a:t>Sessions:</a:t>
             </a:r>
           </a:p>
@@ -6250,119 +6235,109 @@
             <a:pPr lvl="1"/>
             <a:r>
               <a:rPr lang="en-CA" dirty="0"/>
-              <a:t>VSW8 – MVC4 and </a:t>
-            </a:r>
-            <a:r>
-              <a:rPr lang="en-CA" dirty="0" err="1"/>
-              <a:t>jQuery</a:t>
-            </a:r>
-            <a:r>
-              <a:rPr lang="en-CA" dirty="0"/>
-              <a:t> mobile</a:t>
+              <a:t>Most made reference to it / used it</a:t>
+            </a:r>
+          </a:p>
+          <a:p>
+            <a:r>
+              <a:rPr lang="en-CA" dirty="0"/>
+              <a:t>What is it?</a:t>
             </a:r>
           </a:p>
           <a:p>
             <a:pPr lvl="1"/>
             <a:r>
               <a:rPr lang="en-CA" dirty="0"/>
-              <a:t>VST8 – Windows Phone 8 enhancements </a:t>
+              <a:t>cloud computing is really doing just-in-time provisioning and </a:t>
             </a:r>
             <a:r>
               <a:rPr lang="en-CA" dirty="0" smtClean="0"/>
-              <a:t>(was a waste </a:t>
-            </a:r>
-            <a:r>
-              <a:rPr lang="en-CA" dirty="0"/>
-              <a:t>of </a:t>
+              <a:t>scaling </a:t>
+            </a:r>
+            <a:r>
+              <a:rPr lang="en-CA" dirty="0"/>
+              <a:t>of services, software and solutions delivered as a service on a pool of hardware</a:t>
+            </a:r>
+          </a:p>
+          <a:p>
+            <a:pPr lvl="1"/>
+            <a:r>
+              <a:rPr lang="en-CA" dirty="0"/>
+              <a:t>On demand provisioning</a:t>
+            </a:r>
+          </a:p>
+          <a:p>
+            <a:pPr lvl="1"/>
+            <a:r>
+              <a:rPr lang="en-CA" dirty="0"/>
+              <a:t>scaling resources... example "tonight I need 10,000 nodes for an hour until batch is done“</a:t>
+            </a:r>
+          </a:p>
+          <a:p>
+            <a:pPr lvl="1"/>
+            <a:r>
+              <a:rPr lang="en-CA" dirty="0"/>
+              <a:t>abstraction over </a:t>
             </a:r>
             <a:r>
               <a:rPr lang="en-CA" dirty="0" smtClean="0"/>
-              <a:t>time)</a:t>
-            </a:r>
-            <a:endParaRPr lang="en-CA" dirty="0"/>
-          </a:p>
-          <a:p>
-            <a:r>
-              <a:rPr lang="en-CA" dirty="0" smtClean="0"/>
-              <a:t>3 </a:t>
-            </a:r>
-            <a:r>
-              <a:rPr lang="en-CA" dirty="0" smtClean="0"/>
-              <a:t>good takeaways</a:t>
-            </a:r>
-          </a:p>
-          <a:p>
-            <a:pPr lvl="1"/>
-            <a:r>
-              <a:rPr lang="en-CA" dirty="0" smtClean="0"/>
-              <a:t>JSON for serialized data</a:t>
-            </a:r>
-          </a:p>
-          <a:p>
-            <a:pPr lvl="1"/>
-            <a:r>
-              <a:rPr lang="en-CA" dirty="0" smtClean="0"/>
-              <a:t>Opera </a:t>
-            </a:r>
-            <a:r>
-              <a:rPr lang="en-CA" dirty="0" smtClean="0"/>
-              <a:t>mobile </a:t>
-            </a:r>
-            <a:r>
-              <a:rPr lang="en-CA" dirty="0" smtClean="0"/>
-              <a:t>emulator</a:t>
-            </a:r>
-          </a:p>
-          <a:p>
-            <a:pPr lvl="1"/>
-            <a:r>
-              <a:rPr lang="en-CA" dirty="0" smtClean="0"/>
-              <a:t>Always </a:t>
-            </a:r>
-            <a:r>
-              <a:rPr lang="en-CA" dirty="0" smtClean="0"/>
-              <a:t>add the below to all web </a:t>
-            </a:r>
-            <a:r>
-              <a:rPr lang="en-CA" dirty="0" smtClean="0"/>
-              <a:t>pages:</a:t>
-            </a:r>
-          </a:p>
-          <a:p>
-            <a:pPr lvl="2"/>
-            <a:r>
-              <a:rPr lang="en-CA" dirty="0" smtClean="0"/>
-              <a:t>&lt;</a:t>
-            </a:r>
-            <a:r>
-              <a:rPr lang="en-CA" dirty="0"/>
-              <a:t>meta name="viewport" content="width=device-width, user-scalable=no"&gt;</a:t>
-            </a:r>
-          </a:p>
-          <a:p>
-            <a:r>
-              <a:rPr lang="en-CA" dirty="0" smtClean="0"/>
+              <a:t>resources</a:t>
+            </a:r>
+          </a:p>
+          <a:p>
+            <a:r>
+              <a:rPr lang="en-CA" dirty="0"/>
               <a:t>Demo </a:t>
             </a:r>
             <a:r>
               <a:rPr lang="en-CA" dirty="0" smtClean="0"/>
               <a:t>6</a:t>
             </a:r>
-            <a:endParaRPr lang="en-CA" dirty="0" smtClean="0"/>
+            <a:endParaRPr lang="en-CA" dirty="0"/>
           </a:p>
           <a:p>
             <a:pPr lvl="1"/>
             <a:r>
+              <a:rPr lang="en-CA" dirty="0"/>
+              <a:t>Create a website using </a:t>
+            </a:r>
+            <a:r>
               <a:rPr lang="en-CA" dirty="0" smtClean="0"/>
-              <a:t>Opera mobile emulator</a:t>
-            </a:r>
+              <a:t>Azure… show other options here</a:t>
+            </a:r>
+            <a:endParaRPr lang="en-CA" dirty="0"/>
           </a:p>
           <a:p>
             <a:pPr lvl="1"/>
             <a:r>
+              <a:rPr lang="en-CA" dirty="0"/>
+              <a:t>Link to my </a:t>
+            </a:r>
+            <a:r>
+              <a:rPr lang="en-CA" dirty="0" err="1"/>
+              <a:t>github</a:t>
+            </a:r>
+            <a:r>
+              <a:rPr lang="en-CA" dirty="0"/>
+              <a:t> </a:t>
+            </a:r>
+            <a:r>
               <a:rPr lang="en-CA" dirty="0" smtClean="0"/>
-              <a:t>Page with and without meta tag</a:t>
-            </a:r>
+              <a:t>repository</a:t>
+            </a:r>
+          </a:p>
+          <a:p>
+            <a:pPr lvl="1"/>
+            <a:r>
+              <a:rPr lang="en-CA" dirty="0" smtClean="0"/>
+              <a:t>Create new site and download publish settings for deploying</a:t>
+            </a:r>
+            <a:endParaRPr lang="en-CA" dirty="0"/>
+          </a:p>
+          <a:p>
+            <a:endParaRPr lang="en-CA" dirty="0"/>
+          </a:p>
+          <a:p>
             <a:endParaRPr lang="en-CA" dirty="0"/>
           </a:p>
         </p:txBody>
@@ -6370,13 +6345,20 @@
     </p:spTree>
     <p:extLst>
       <p:ext uri="{BB962C8B-B14F-4D97-AF65-F5344CB8AC3E}">
-        <p14:creationId xmlns:p14="http://schemas.microsoft.com/office/powerpoint/2010/main" val="3103964138"/>
+        <p14:creationId xmlns:p14="http://schemas.microsoft.com/office/powerpoint/2010/main" val="1419882203"/>
       </p:ext>
     </p:extLst>
   </p:cSld>
   <p:clrMapOvr>
     <a:masterClrMapping/>
   </p:clrMapOvr>
+  <p:timing>
+    <p:tnLst>
+      <p:par>
+        <p:cTn id="1" dur="indefinite" restart="never" nodeType="tmRoot"/>
+      </p:par>
+    </p:tnLst>
+  </p:timing>
 </p:sld>
 </file>
 
@@ -6438,80 +6420,165 @@
           <a:p>
             <a:r>
               <a:rPr lang="en-CA" dirty="0"/>
-              <a:t>Trends - </a:t>
-            </a:r>
-            <a:r>
-              <a:rPr lang="en-CA" dirty="0" err="1"/>
-              <a:t>SignalR</a:t>
+              <a:t>Mobile</a:t>
+            </a:r>
+          </a:p>
+        </p:txBody>
+      </p:sp>
+      <p:sp>
+        <p:nvSpPr>
+          <p:cNvPr id="4" name="Content Placeholder 3"/>
+          <p:cNvSpPr>
+            <a:spLocks noGrp="1"/>
+          </p:cNvSpPr>
+          <p:nvPr>
+            <p:ph sz="quarter" idx="13"/>
+          </p:nvPr>
+        </p:nvSpPr>
+        <p:spPr>
+          <a:xfrm>
+            <a:off x="979488" y="1630362"/>
+            <a:ext cx="6697663" cy="4534941"/>
+          </a:xfrm>
+        </p:spPr>
+        <p:txBody>
+          <a:bodyPr>
+            <a:normAutofit fontScale="92500" lnSpcReduction="20000"/>
+          </a:bodyPr>
+          <a:lstStyle/>
+          <a:p>
+            <a:r>
+              <a:rPr lang="en-CA" dirty="0"/>
+              <a:t>Unfortunately not the conference to learn a lot of mobile</a:t>
+            </a:r>
+          </a:p>
+          <a:p>
+            <a:r>
+              <a:rPr lang="en-CA" dirty="0"/>
+              <a:t>Concentration on HTML5 including CSS3 for formatting with mobile in mind</a:t>
+            </a:r>
+          </a:p>
+          <a:p>
+            <a:r>
+              <a:rPr lang="en-CA" dirty="0"/>
+              <a:t>Sessions:</a:t>
+            </a:r>
+          </a:p>
+          <a:p>
+            <a:pPr lvl="1"/>
+            <a:r>
+              <a:rPr lang="en-CA" dirty="0">
+                <a:hlinkClick r:id="rId2"/>
+              </a:rPr>
+              <a:t>VSW8 – MVC4 and </a:t>
+            </a:r>
+            <a:r>
+              <a:rPr lang="en-CA" dirty="0" err="1">
+                <a:hlinkClick r:id="rId2"/>
+              </a:rPr>
+              <a:t>jQuery</a:t>
+            </a:r>
+            <a:r>
+              <a:rPr lang="en-CA" dirty="0">
+                <a:hlinkClick r:id="rId2"/>
+              </a:rPr>
+              <a:t> mobile</a:t>
             </a:r>
             <a:endParaRPr lang="en-CA" dirty="0"/>
           </a:p>
-        </p:txBody>
-      </p:sp>
-      <p:sp>
-        <p:nvSpPr>
-          <p:cNvPr id="4" name="Content Placeholder 3"/>
-          <p:cNvSpPr>
-            <a:spLocks noGrp="1"/>
-          </p:cNvSpPr>
-          <p:nvPr>
-            <p:ph sz="quarter" idx="13"/>
-          </p:nvPr>
-        </p:nvSpPr>
-        <p:spPr/>
-        <p:txBody>
-          <a:bodyPr>
-            <a:normAutofit/>
-          </a:bodyPr>
-          <a:lstStyle/>
-          <a:p>
-            <a:r>
-              <a:rPr lang="en-CA" dirty="0"/>
-              <a:t>“Any sufficiently advanced technology is indistinguishable from magic” – Arthur C. </a:t>
-            </a:r>
-            <a:r>
-              <a:rPr lang="en-CA" dirty="0" smtClean="0"/>
-              <a:t>Clarke</a:t>
-            </a:r>
-          </a:p>
-          <a:p>
-            <a:r>
-              <a:rPr lang="en-CA" dirty="0" smtClean="0"/>
-              <a:t>An </a:t>
-            </a:r>
-            <a:r>
-              <a:rPr lang="en-CA" dirty="0"/>
-              <a:t>open source series of libraries that provide an abstraction around persistent HTTP connections</a:t>
-            </a:r>
-          </a:p>
-          <a:p>
-            <a:r>
-              <a:rPr lang="en-CA" dirty="0" smtClean="0"/>
-              <a:t>Makes </a:t>
-            </a:r>
-            <a:r>
-              <a:rPr lang="en-CA" dirty="0"/>
-              <a:t>real-time HTTP so easy it seems like </a:t>
-            </a:r>
-            <a:r>
-              <a:rPr lang="en-CA" dirty="0" smtClean="0"/>
-              <a:t>“magic”</a:t>
-            </a:r>
-          </a:p>
-          <a:p>
+          <a:p>
+            <a:pPr lvl="1"/>
             <a:r>
               <a:rPr lang="en-CA" dirty="0">
                 <a:hlinkClick r:id="rId3"/>
               </a:rPr>
-              <a:t>http://</a:t>
-            </a:r>
+              <a:t>VST8 – Windows Phone 8 enhancements</a:t>
+            </a:r>
+            <a:r>
+              <a:rPr lang="en-CA" dirty="0"/>
+              <a:t> </a:t>
+            </a:r>
+            <a:r>
+              <a:rPr lang="en-CA" dirty="0" smtClean="0"/>
+              <a:t>(was a waste </a:t>
+            </a:r>
+            <a:r>
+              <a:rPr lang="en-CA" dirty="0"/>
+              <a:t>of </a:t>
+            </a:r>
+            <a:r>
+              <a:rPr lang="en-CA" dirty="0" smtClean="0"/>
+              <a:t>time)</a:t>
+            </a:r>
+            <a:endParaRPr lang="en-CA" dirty="0"/>
+          </a:p>
+          <a:p>
+            <a:r>
+              <a:rPr lang="en-CA" dirty="0" smtClean="0"/>
+              <a:t>3 good takeaways</a:t>
+            </a:r>
+          </a:p>
+          <a:p>
+            <a:pPr lvl="1"/>
+            <a:r>
+              <a:rPr lang="en-CA" dirty="0" smtClean="0"/>
+              <a:t>JSON for serialized </a:t>
+            </a:r>
+            <a:r>
+              <a:rPr lang="en-CA" dirty="0" smtClean="0"/>
+              <a:t>data for smaller payload</a:t>
+            </a:r>
+            <a:endParaRPr lang="en-CA" dirty="0" smtClean="0"/>
+          </a:p>
+          <a:p>
+            <a:pPr lvl="1"/>
             <a:r>
               <a:rPr lang="en-CA" dirty="0" smtClean="0">
-                <a:hlinkClick r:id="rId3"/>
+                <a:hlinkClick r:id="rId4"/>
               </a:rPr>
-              <a:t>www.asp.net/signalr/</a:t>
+              <a:t>Opera mobile emulator</a:t>
             </a:r>
             <a:endParaRPr lang="en-CA" dirty="0" smtClean="0"/>
+          </a:p>
+          <a:p>
+            <a:pPr lvl="1"/>
+            <a:r>
+              <a:rPr lang="en-CA" dirty="0" smtClean="0"/>
+              <a:t>By default, add </a:t>
+            </a:r>
+            <a:r>
+              <a:rPr lang="en-CA" dirty="0" smtClean="0"/>
+              <a:t>the below </a:t>
+            </a:r>
+            <a:r>
+              <a:rPr lang="en-CA" dirty="0" smtClean="0"/>
+              <a:t>“</a:t>
+            </a:r>
+            <a:r>
+              <a:rPr lang="en-CA" dirty="0" smtClean="0">
+                <a:hlinkClick r:id="rId5"/>
+              </a:rPr>
+              <a:t>viewport</a:t>
+            </a:r>
+            <a:r>
+              <a:rPr lang="en-CA" dirty="0" smtClean="0"/>
+              <a:t>” to </a:t>
+            </a:r>
+            <a:r>
+              <a:rPr lang="en-CA" dirty="0" smtClean="0"/>
+              <a:t>all web pages:</a:t>
+            </a:r>
+          </a:p>
+          <a:p>
+            <a:pPr lvl="2"/>
+            <a:r>
+              <a:rPr lang="en-CA" dirty="0" smtClean="0"/>
+              <a:t>&lt;</a:t>
+            </a:r>
+            <a:r>
+              <a:rPr lang="en-CA" dirty="0"/>
+              <a:t>meta name="viewport" content="width=device-width, user-scalable=no"&gt;</a:t>
+            </a:r>
           </a:p>
           <a:p>
             <a:r>
@@ -6519,8 +6586,26 @@
               <a:t>Demo </a:t>
             </a:r>
             <a:r>
-              <a:rPr lang="en-CA" dirty="0"/>
+              <a:rPr lang="en-CA" dirty="0" smtClean="0"/>
               <a:t>7</a:t>
+            </a:r>
+            <a:endParaRPr lang="en-CA" dirty="0" smtClean="0"/>
+          </a:p>
+          <a:p>
+            <a:pPr lvl="1"/>
+            <a:r>
+              <a:rPr lang="en-CA" dirty="0" smtClean="0">
+                <a:hlinkClick r:id="rId6" action="ppaction://hlinkfile"/>
+              </a:rPr>
+              <a:t>Opera mobile emulator</a:t>
+            </a:r>
+            <a:endParaRPr lang="en-CA" dirty="0" smtClean="0"/>
+          </a:p>
+          <a:p>
+            <a:pPr lvl="1"/>
+            <a:r>
+              <a:rPr lang="en-CA" dirty="0" smtClean="0"/>
+              <a:t>Page with and without meta tag</a:t>
             </a:r>
             <a:endParaRPr lang="en-CA" dirty="0"/>
           </a:p>
@@ -6529,13 +6614,20 @@
     </p:spTree>
     <p:extLst>
       <p:ext uri="{BB962C8B-B14F-4D97-AF65-F5344CB8AC3E}">
-        <p14:creationId xmlns:p14="http://schemas.microsoft.com/office/powerpoint/2010/main" val="1976493137"/>
+        <p14:creationId xmlns:p14="http://schemas.microsoft.com/office/powerpoint/2010/main" val="3103964138"/>
       </p:ext>
     </p:extLst>
   </p:cSld>
   <p:clrMapOvr>
     <a:masterClrMapping/>
   </p:clrMapOvr>
+  <p:timing>
+    <p:tnLst>
+      <p:par>
+        <p:cTn id="1" dur="indefinite" restart="never" nodeType="tmRoot"/>
+      </p:par>
+    </p:tnLst>
+  </p:timing>
 </p:sld>
 </file>
 
@@ -6597,6 +6689,217 @@
           <a:p>
             <a:r>
               <a:rPr lang="en-CA" dirty="0"/>
+              <a:t>Trends - </a:t>
+            </a:r>
+            <a:r>
+              <a:rPr lang="en-CA" dirty="0" err="1"/>
+              <a:t>SignalR</a:t>
+            </a:r>
+            <a:endParaRPr lang="en-CA" dirty="0"/>
+          </a:p>
+        </p:txBody>
+      </p:sp>
+      <p:sp>
+        <p:nvSpPr>
+          <p:cNvPr id="4" name="Content Placeholder 3"/>
+          <p:cNvSpPr>
+            <a:spLocks noGrp="1"/>
+          </p:cNvSpPr>
+          <p:nvPr>
+            <p:ph sz="quarter" idx="13"/>
+          </p:nvPr>
+        </p:nvSpPr>
+        <p:spPr>
+          <a:xfrm>
+            <a:off x="979488" y="1630362"/>
+            <a:ext cx="6697663" cy="4462933"/>
+          </a:xfrm>
+        </p:spPr>
+        <p:txBody>
+          <a:bodyPr>
+            <a:normAutofit/>
+          </a:bodyPr>
+          <a:lstStyle/>
+          <a:p>
+            <a:r>
+              <a:rPr lang="en-CA" dirty="0"/>
+              <a:t>“Any sufficiently advanced technology is indistinguishable from magic” – Arthur C. </a:t>
+            </a:r>
+            <a:r>
+              <a:rPr lang="en-CA" dirty="0" smtClean="0"/>
+              <a:t>Clarke</a:t>
+            </a:r>
+          </a:p>
+          <a:p>
+            <a:r>
+              <a:rPr lang="en-CA" dirty="0" smtClean="0"/>
+              <a:t>An </a:t>
+            </a:r>
+            <a:r>
+              <a:rPr lang="en-CA" dirty="0"/>
+              <a:t>open source series of libraries that provide an abstraction around persistent HTTP connections</a:t>
+            </a:r>
+          </a:p>
+          <a:p>
+            <a:r>
+              <a:rPr lang="en-CA" dirty="0" smtClean="0"/>
+              <a:t>Makes </a:t>
+            </a:r>
+            <a:r>
+              <a:rPr lang="en-CA" dirty="0"/>
+              <a:t>real-time HTTP so easy it seems like </a:t>
+            </a:r>
+            <a:r>
+              <a:rPr lang="en-CA" dirty="0" smtClean="0"/>
+              <a:t>“magic”</a:t>
+            </a:r>
+          </a:p>
+          <a:p>
+            <a:r>
+              <a:rPr lang="en-CA" dirty="0">
+                <a:hlinkClick r:id="rId3"/>
+              </a:rPr>
+              <a:t>http://</a:t>
+            </a:r>
+            <a:r>
+              <a:rPr lang="en-CA" dirty="0" smtClean="0">
+                <a:hlinkClick r:id="rId3"/>
+              </a:rPr>
+              <a:t>www.asp.net/signalr/</a:t>
+            </a:r>
+            <a:endParaRPr lang="en-CA" dirty="0" smtClean="0"/>
+          </a:p>
+          <a:p>
+            <a:r>
+              <a:rPr lang="en-CA" dirty="0" smtClean="0"/>
+              <a:t>Demo </a:t>
+            </a:r>
+            <a:r>
+              <a:rPr lang="en-CA" dirty="0" smtClean="0"/>
+              <a:t>8</a:t>
+            </a:r>
+          </a:p>
+          <a:p>
+            <a:pPr lvl="1"/>
+            <a:r>
+              <a:rPr lang="en-CA" dirty="0" smtClean="0">
+                <a:hlinkClick r:id="rId4"/>
+              </a:rPr>
+              <a:t>Start up my demo site on Azure</a:t>
+            </a:r>
+            <a:endParaRPr lang="en-CA" dirty="0" smtClean="0"/>
+          </a:p>
+          <a:p>
+            <a:pPr lvl="1"/>
+            <a:r>
+              <a:rPr lang="en-CA" dirty="0" smtClean="0"/>
+              <a:t>2 different demos here:</a:t>
+            </a:r>
+          </a:p>
+          <a:p>
+            <a:pPr lvl="2"/>
+            <a:r>
+              <a:rPr lang="en-CA" dirty="0" err="1" smtClean="0">
+                <a:hlinkClick r:id="rId5"/>
+              </a:rPr>
+              <a:t>HitCounter</a:t>
+            </a:r>
+            <a:endParaRPr lang="en-CA" dirty="0" smtClean="0"/>
+          </a:p>
+          <a:p>
+            <a:pPr lvl="2"/>
+            <a:r>
+              <a:rPr lang="en-CA" dirty="0" smtClean="0">
+                <a:hlinkClick r:id="rId6"/>
+              </a:rPr>
+              <a:t>Chat</a:t>
+            </a:r>
+            <a:endParaRPr lang="en-CA" dirty="0" smtClean="0"/>
+          </a:p>
+          <a:p>
+            <a:pPr lvl="1"/>
+            <a:endParaRPr lang="en-CA" dirty="0"/>
+          </a:p>
+        </p:txBody>
+      </p:sp>
+    </p:spTree>
+    <p:extLst>
+      <p:ext uri="{BB962C8B-B14F-4D97-AF65-F5344CB8AC3E}">
+        <p14:creationId xmlns:p14="http://schemas.microsoft.com/office/powerpoint/2010/main" val="1976493137"/>
+      </p:ext>
+    </p:extLst>
+  </p:cSld>
+  <p:clrMapOvr>
+    <a:masterClrMapping/>
+  </p:clrMapOvr>
+  <p:timing>
+    <p:tnLst>
+      <p:par>
+        <p:cTn id="1" dur="indefinite" restart="never" nodeType="tmRoot"/>
+      </p:par>
+    </p:tnLst>
+  </p:timing>
+</p:sld>
+</file>
+
+<file path=ppt/slides/slide16.xml><?xml version="1.0" encoding="utf-8"?>
+<p:sld xmlns:a="http://schemas.openxmlformats.org/drawingml/2006/main" xmlns:r="http://schemas.openxmlformats.org/officeDocument/2006/relationships" xmlns:p="http://schemas.openxmlformats.org/presentationml/2006/main">
+  <p:cSld>
+    <p:spTree>
+      <p:nvGrpSpPr>
+        <p:cNvPr id="1" name=""/>
+        <p:cNvGrpSpPr/>
+        <p:nvPr/>
+      </p:nvGrpSpPr>
+      <p:grpSpPr>
+        <a:xfrm>
+          <a:off x="0" y="0"/>
+          <a:ext cx="0" cy="0"/>
+          <a:chOff x="0" y="0"/>
+          <a:chExt cx="0" cy="0"/>
+        </a:xfrm>
+      </p:grpSpPr>
+      <p:sp>
+        <p:nvSpPr>
+          <p:cNvPr id="2" name="Slide Number Placeholder 1"/>
+          <p:cNvSpPr>
+            <a:spLocks noGrp="1"/>
+          </p:cNvSpPr>
+          <p:nvPr>
+            <p:ph type="sldNum" sz="quarter" idx="12"/>
+          </p:nvPr>
+        </p:nvSpPr>
+        <p:spPr/>
+        <p:txBody>
+          <a:bodyPr/>
+          <a:lstStyle/>
+          <a:p>
+            <a:fld id="{1D72EBF8-7CF5-44B7-B2BF-E22DE4D0703D}" type="slidenum">
+              <a:rPr lang="en-US" smtClean="0"/>
+              <a:pPr/>
+              <a:t>15</a:t>
+            </a:fld>
+            <a:endParaRPr lang="en-US"/>
+          </a:p>
+        </p:txBody>
+      </p:sp>
+      <p:sp>
+        <p:nvSpPr>
+          <p:cNvPr id="3" name="Title 2"/>
+          <p:cNvSpPr>
+            <a:spLocks noGrp="1"/>
+          </p:cNvSpPr>
+          <p:nvPr>
+            <p:ph type="title"/>
+          </p:nvPr>
+        </p:nvSpPr>
+        <p:spPr/>
+        <p:txBody>
+          <a:bodyPr/>
+          <a:lstStyle/>
+          <a:p>
+            <a:r>
+              <a:rPr lang="en-CA" dirty="0"/>
               <a:t>Other observations</a:t>
             </a:r>
           </a:p>
@@ -6629,7 +6932,6 @@
               <a:rPr lang="en-CA" dirty="0" smtClean="0"/>
               <a:t>Visual Studio add-in to import in external resources easily</a:t>
             </a:r>
-            <a:endParaRPr lang="en-CA" dirty="0" smtClean="0"/>
           </a:p>
           <a:p>
             <a:r>
@@ -6697,6 +6999,13 @@
   <p:clrMapOvr>
     <a:masterClrMapping/>
   </p:clrMapOvr>
+  <p:timing>
+    <p:tnLst>
+      <p:par>
+        <p:cTn id="1" dur="indefinite" restart="never" nodeType="tmRoot"/>
+      </p:par>
+    </p:tnLst>
+  </p:timing>
 </p:sld>
 </file>
 
@@ -6768,7 +7077,17 @@
             </a:r>
             <a:r>
               <a:rPr lang="en-CA" dirty="0"/>
-              <a:t>, Visual Studio Live annual event in Orlando</a:t>
+              <a:t>, </a:t>
+            </a:r>
+            <a:r>
+              <a:rPr lang="en-CA" dirty="0">
+                <a:hlinkClick r:id="rId2"/>
+              </a:rPr>
+              <a:t>Visual Studio Live</a:t>
+            </a:r>
+            <a:r>
+              <a:rPr lang="en-CA" dirty="0"/>
+              <a:t> annual event in Orlando</a:t>
             </a:r>
           </a:p>
           <a:p>
@@ -6816,8 +7135,13 @@
           <a:p>
             <a:r>
               <a:rPr lang="en-CA" dirty="0"/>
-              <a:t>Often there were 16 sessions happening at once</a:t>
-            </a:r>
+              <a:t>Often there were 16 sessions happening at </a:t>
+            </a:r>
+            <a:r>
+              <a:rPr lang="en-CA" dirty="0" smtClean="0"/>
+              <a:t>once!</a:t>
+            </a:r>
+            <a:endParaRPr lang="en-CA" dirty="0"/>
           </a:p>
           <a:p>
             <a:r>
@@ -7088,10 +7412,15 @@
             <p:ph sz="quarter" idx="13"/>
           </p:nvPr>
         </p:nvSpPr>
-        <p:spPr/>
+        <p:spPr>
+          <a:xfrm>
+            <a:off x="979488" y="1630362"/>
+            <a:ext cx="6697663" cy="4390925"/>
+          </a:xfrm>
+        </p:spPr>
         <p:txBody>
           <a:bodyPr>
-            <a:normAutofit fontScale="92500" lnSpcReduction="10000"/>
+            <a:normAutofit lnSpcReduction="10000"/>
           </a:bodyPr>
           <a:lstStyle/>
           <a:p>
@@ -7103,23 +7432,32 @@
           <a:p>
             <a:pPr lvl="1"/>
             <a:r>
-              <a:rPr lang="en-CA" dirty="0"/>
+              <a:rPr lang="en-CA" dirty="0">
+                <a:hlinkClick r:id="rId3"/>
+              </a:rPr>
               <a:t>CVM3 – Workshop HTML5 – Cloud: Reach Everyone, Everywhere</a:t>
             </a:r>
+            <a:endParaRPr lang="en-CA" dirty="0"/>
           </a:p>
           <a:p>
             <a:pPr lvl="1"/>
             <a:r>
-              <a:rPr lang="en-CA" dirty="0"/>
+              <a:rPr lang="en-CA" dirty="0">
+                <a:hlinkClick r:id="rId4"/>
+              </a:rPr>
               <a:t>VSW9 – HTML5 Forms</a:t>
             </a:r>
+            <a:endParaRPr lang="en-CA" dirty="0"/>
           </a:p>
           <a:p>
             <a:pPr lvl="1"/>
             <a:r>
-              <a:rPr lang="en-CA" dirty="0"/>
+              <a:rPr lang="en-CA" dirty="0">
+                <a:hlinkClick r:id="rId5"/>
+              </a:rPr>
               <a:t>VSW13 – HTML5 Everywhere</a:t>
             </a:r>
+            <a:endParaRPr lang="en-CA" dirty="0"/>
           </a:p>
           <a:p>
             <a:r>
@@ -7158,11 +7496,29 @@
             </a:r>
             <a:r>
               <a:rPr lang="en-CA" dirty="0" smtClean="0"/>
-              <a:t>. </a:t>
-            </a:r>
-            <a:r>
-              <a:rPr lang="en-CA" dirty="0"/>
-              <a:t>Gave W3C permission to publish HTML 5… so really are 2 “specs” out there</a:t>
+              <a:t>.</a:t>
+            </a:r>
+          </a:p>
+          <a:p>
+            <a:r>
+              <a:rPr lang="en-CA" dirty="0" smtClean="0"/>
+              <a:t>W3C’s XHTML 2 ultimately died on July 2, 2009</a:t>
+            </a:r>
+          </a:p>
+          <a:p>
+            <a:r>
+              <a:rPr lang="en-CA" dirty="0" smtClean="0"/>
+              <a:t>WHATWG survived</a:t>
+            </a:r>
+          </a:p>
+          <a:p>
+            <a:r>
+              <a:rPr lang="en-CA" dirty="0" smtClean="0"/>
+              <a:t>WHATWG gave </a:t>
+            </a:r>
+            <a:r>
+              <a:rPr lang="en-CA" dirty="0"/>
+              <a:t>W3C permission to publish HTML 5… so really are 2 “specs” out there</a:t>
             </a:r>
           </a:p>
           <a:p>
@@ -7271,7 +7627,7 @@
         </p:spPr>
         <p:txBody>
           <a:bodyPr>
-            <a:normAutofit fontScale="92500" lnSpcReduction="20000"/>
+            <a:normAutofit fontScale="92500"/>
           </a:bodyPr>
           <a:lstStyle/>
           <a:p>
@@ -7306,10 +7662,14 @@
           <a:p>
             <a:r>
               <a:rPr lang="en-CA" dirty="0"/>
-              <a:t>Logo / marketing material</a:t>
-            </a:r>
-            <a:r>
-              <a:rPr lang="en-CA" baseline="30000" dirty="0"/>
+              <a:t>Logo / marketing </a:t>
+            </a:r>
+            <a:r>
+              <a:rPr lang="en-CA" dirty="0" smtClean="0"/>
+              <a:t>material, HTML5 “Gang Sign”</a:t>
+            </a:r>
+            <a:r>
+              <a:rPr lang="en-CA" baseline="30000" dirty="0" smtClean="0"/>
               <a:t>2 </a:t>
             </a:r>
             <a:endParaRPr lang="en-CA" dirty="0"/>
@@ -7339,12 +7699,25 @@
             <a:pPr lvl="1"/>
             <a:r>
               <a:rPr lang="en-CA" dirty="0"/>
-              <a:t>IE goal is CR and up</a:t>
-            </a:r>
-            <a:r>
-              <a:rPr lang="en-CA" baseline="30000" dirty="0"/>
+              <a:t>IE goal is CR and </a:t>
+            </a:r>
+            <a:r>
+              <a:rPr lang="en-CA" dirty="0" smtClean="0"/>
+              <a:t>up</a:t>
+            </a:r>
+            <a:r>
+              <a:rPr lang="en-CA" baseline="30000" dirty="0" smtClean="0"/>
               <a:t>3</a:t>
             </a:r>
+            <a:r>
+              <a:rPr lang="en-CA" dirty="0"/>
+              <a:t> </a:t>
+            </a:r>
+            <a:r>
+              <a:rPr lang="en-CA" dirty="0" smtClean="0"/>
+              <a:t>… as a result, they “score” much lower</a:t>
+            </a:r>
+            <a:endParaRPr lang="en-CA" baseline="30000" dirty="0"/>
           </a:p>
           <a:p>
             <a:pPr lvl="1"/>
@@ -7372,44 +7745,32 @@
               <a:rPr lang="en-CA" dirty="0">
                 <a:sym typeface="Wingdings" pitchFamily="2" charset="2"/>
               </a:rPr>
-              <a:t>What does “recommendation” really mean? 2 independent browsers must implement spec 100%... That’s it. Again, it’s the browsers people that are creating it and have to agree together</a:t>
-            </a:r>
-            <a:endParaRPr lang="en-CA" dirty="0"/>
-          </a:p>
-          <a:p>
-            <a:pPr lvl="1"/>
-            <a:r>
-              <a:rPr lang="en-CA" dirty="0"/>
-              <a:t>Current main browsers are: IE, Chrome, Firefox, Safari and </a:t>
-            </a:r>
-            <a:r>
-              <a:rPr lang="en-CA" dirty="0" smtClean="0"/>
-              <a:t>Opera</a:t>
-            </a:r>
-          </a:p>
-          <a:p>
-            <a:pPr lvl="1"/>
+              <a:t>What does “recommendation” really mean? 2 independent browsers must implement spec 100%... That’s it. Again, it’s the </a:t>
+            </a:r>
             <a:r>
               <a:rPr lang="en-CA" dirty="0" smtClean="0">
                 <a:sym typeface="Wingdings" pitchFamily="2" charset="2"/>
               </a:rPr>
-              <a:t>As of this presentation, “Best” browser for HTML 5 is a browser called “</a:t>
-            </a:r>
-            <a:r>
-              <a:rPr lang="en-CA" dirty="0" err="1" smtClean="0">
+              <a:t>browser groups that </a:t>
+            </a:r>
+            <a:r>
+              <a:rPr lang="en-CA" dirty="0">
                 <a:sym typeface="Wingdings" pitchFamily="2" charset="2"/>
               </a:rPr>
-              <a:t>Maxthon</a:t>
-            </a:r>
-            <a:r>
-              <a:rPr lang="en-CA" dirty="0" smtClean="0">
-                <a:sym typeface="Wingdings" pitchFamily="2" charset="2"/>
-              </a:rPr>
-              <a:t>”</a:t>
-            </a:r>
-            <a:endParaRPr lang="en-CA" dirty="0">
-              <a:sym typeface="Wingdings" pitchFamily="2" charset="2"/>
-            </a:endParaRPr>
+              <a:t>are creating it and have to agree together</a:t>
+            </a:r>
+            <a:endParaRPr lang="en-CA" dirty="0"/>
+          </a:p>
+          <a:p>
+            <a:pPr lvl="1"/>
+            <a:r>
+              <a:rPr lang="en-CA" dirty="0"/>
+              <a:t>Current main browsers are: IE, Chrome, Firefox, Safari and </a:t>
+            </a:r>
+            <a:r>
+              <a:rPr lang="en-CA" dirty="0" smtClean="0"/>
+              <a:t>Opera</a:t>
+            </a:r>
           </a:p>
           <a:p>
             <a:endParaRPr lang="en-CA" dirty="0"/>
@@ -7428,7 +7789,11 @@
             <a:videoFile r:link="rId2"/>
             <p:extLst>
               <p:ext uri="{DAA4B4D4-6D71-4841-9C94-3DE7FCFB9230}">
-                <p14:media xmlns:p14="http://schemas.microsoft.com/office/powerpoint/2010/main" r:embed="rId1"/>
+                <p14:media xmlns:p14="http://schemas.microsoft.com/office/powerpoint/2010/main" r:embed="rId1">
+                  <p14:bmkLst>
+                    <p14:bmk name="Bookmark 1" time="0"/>
+                  </p14:bmkLst>
+                </p14:media>
               </p:ext>
             </p:extLst>
           </p:nvPr>
@@ -7441,7 +7806,7 @@
         </p:blipFill>
         <p:spPr>
           <a:xfrm>
-            <a:off x="4513793" y="2132856"/>
+            <a:off x="6786296" y="2420888"/>
             <a:ext cx="831272" cy="457200"/>
           </a:xfrm>
           <a:prstGeom prst="rect">
@@ -7667,11 +8032,7 @@
             </a:r>
             <a:r>
               <a:rPr lang="en-CA" dirty="0" smtClean="0"/>
-              <a:t>(“semantic web</a:t>
-            </a:r>
-            <a:r>
-              <a:rPr lang="en-CA" dirty="0" smtClean="0"/>
-              <a:t>”)</a:t>
+              <a:t>(“semantic web”)</a:t>
             </a:r>
           </a:p>
         </p:txBody>

</xml_diff>

<commit_message>
update demo notes and ppt and created PDF versions
</commit_message>
<xml_diff>
--- a/Docs/2012 - Live360 Event Review (NEWER).pptx
+++ b/Docs/2012 - Live360 Event Review (NEWER).pptx
@@ -5,10 +5,10 @@
     <p:sldMasterId id="2147483887" r:id="rId1"/>
   </p:sldMasterIdLst>
   <p:notesMasterIdLst>
-    <p:notesMasterId r:id="rId18"/>
+    <p:notesMasterId r:id="rId20"/>
   </p:notesMasterIdLst>
   <p:handoutMasterIdLst>
-    <p:handoutMasterId r:id="rId19"/>
+    <p:handoutMasterId r:id="rId21"/>
   </p:handoutMasterIdLst>
   <p:sldIdLst>
     <p:sldId id="260" r:id="rId2"/>
@@ -27,6 +27,8 @@
     <p:sldId id="268" r:id="rId15"/>
     <p:sldId id="269" r:id="rId16"/>
     <p:sldId id="270" r:id="rId17"/>
+    <p:sldId id="275" r:id="rId18"/>
+    <p:sldId id="276" r:id="rId19"/>
   </p:sldIdLst>
   <p:sldSz cx="9144000" cy="6858000" type="screen4x3"/>
   <p:notesSz cx="6858000" cy="9144000"/>
@@ -733,11 +735,7 @@
           <a:p>
             <a:r>
               <a:rPr lang="en-CA" dirty="0" smtClean="0"/>
-              <a:t>http</a:t>
-            </a:r>
-            <a:r>
-              <a:rPr lang="en-CA" dirty="0" smtClean="0"/>
-              <a:t>://www.redmondevents.com/virtual/login.aspx?ReturnUrl=%2fvirtual%2fvslive%2f2012%2flive360%2fDefault.aspx</a:t>
+              <a:t>http://www.redmondevents.com/virtual/login.aspx?ReturnUrl=%2fvirtual%2fvslive%2f2012%2flive360%2fDefault.aspx</a:t>
             </a:r>
           </a:p>
           <a:p>
@@ -1028,47 +1026,7 @@
             </a:pPr>
             <a:r>
               <a:rPr lang="en-CA" baseline="30000" dirty="0" smtClean="0"/>
-              <a:t>1</a:t>
-            </a:r>
-            <a:r>
-              <a:rPr lang="en-CA" dirty="0" smtClean="0"/>
-              <a:t> http://www.wired.com/business/2010/01/googles-dont-be-evil-mantra-is-bullshit-adobe-is-lazy-apples-steve-jobs/ …one of many, many URLs about this</a:t>
-            </a:r>
-            <a:endParaRPr lang="en-CA" baseline="0" dirty="0" smtClean="0"/>
-          </a:p>
-          <a:p>
-            <a:pPr marL="171450" indent="-171450">
-              <a:buFont typeface="Arial" charset="0"/>
-              <a:buChar char="•"/>
-            </a:pPr>
-            <a:r>
-              <a:rPr lang="en-CA" baseline="30000" dirty="0" smtClean="0"/>
-              <a:t>2</a:t>
-            </a:r>
-            <a:r>
-              <a:rPr lang="en-CA" baseline="0" dirty="0" smtClean="0"/>
-              <a:t> </a:t>
-            </a:r>
-            <a:r>
-              <a:rPr lang="en-CA" sz="1200" kern="1200" dirty="0" smtClean="0">
-                <a:solidFill>
-                  <a:schemeClr val="tx1"/>
-                </a:solidFill>
-                <a:latin typeface="+mn-lt"/>
-                <a:ea typeface="+mn-ea"/>
-                <a:cs typeface="+mn-cs"/>
-              </a:rPr>
-              <a:t>http://www.w3.org/html/logo/ </a:t>
-            </a:r>
-          </a:p>
-          <a:p>
-            <a:pPr marL="171450" indent="-171450">
-              <a:buFont typeface="Arial" charset="0"/>
-              <a:buChar char="•"/>
-            </a:pPr>
-            <a:r>
-              <a:rPr lang="en-CA" baseline="30000" dirty="0" smtClean="0"/>
-              <a:t>3 </a:t>
+              <a:t>1 </a:t>
             </a:r>
             <a:r>
               <a:rPr lang="en-CA" sz="1200" kern="1200" dirty="0" smtClean="0">
@@ -1374,20 +1332,15 @@
             </a:r>
             <a:r>
               <a:rPr lang="en-CA" dirty="0" smtClean="0"/>
-              <a:t> Google Chrome Frame can help with this: </a:t>
-            </a:r>
-            <a:r>
-              <a:rPr lang="en-US" dirty="0" smtClean="0">
-                <a:hlinkClick r:id="rId3"/>
-              </a:rPr>
-              <a:t>http://code.google.com/chrome/chromeframe/</a:t>
-            </a:r>
-            <a:endParaRPr lang="en-US" dirty="0" smtClean="0"/>
-          </a:p>
-          <a:p>
+              <a:t> </a:t>
+            </a:r>
             <a:r>
               <a:rPr lang="en-US" dirty="0" smtClean="0"/>
-              <a:t>Let's you use Chrome browser engine in IE 6/7/8/9</a:t>
+              <a:t>Chrome </a:t>
+            </a:r>
+            <a:r>
+              <a:rPr lang="en-US" dirty="0" smtClean="0"/>
+              <a:t>browser engine in IE 6/7/8/9</a:t>
             </a:r>
           </a:p>
           <a:p>
@@ -1450,43 +1403,43 @@
             </a:r>
             <a:r>
               <a:rPr lang="en-US" dirty="0" smtClean="0">
+                <a:hlinkClick r:id="rId3"/>
+              </a:rPr>
+              <a:t>http://remysharp.com/2010/10/08/what-is-a-polyfill/</a:t>
+            </a:r>
+            <a:r>
+              <a:rPr lang="en-US" dirty="0" smtClean="0"/>
+              <a:t> </a:t>
+            </a:r>
+            <a:r>
+              <a:rPr lang="en-US" dirty="0" smtClean="0">
                 <a:hlinkClick r:id="rId4"/>
               </a:rPr>
-              <a:t>http://remysharp.com/2010/10/08/what-is-a-polyfill/</a:t>
-            </a:r>
-            <a:r>
-              <a:rPr lang="en-US" dirty="0" smtClean="0"/>
-              <a:t> </a:t>
+              <a:t>https://github.com/Modernizr/Modernizr/wiki/HTML5-Cross-browser-Polyfills</a:t>
+            </a:r>
+            <a:endParaRPr lang="en-US" dirty="0" smtClean="0"/>
+          </a:p>
+          <a:p>
+            <a:endParaRPr lang="en-CA" dirty="0" smtClean="0"/>
+          </a:p>
+          <a:p>
+            <a:r>
+              <a:rPr lang="en-CA" baseline="30000" dirty="0" smtClean="0"/>
+              <a:t>3 </a:t>
             </a:r>
             <a:r>
               <a:rPr lang="en-US" dirty="0" smtClean="0">
                 <a:hlinkClick r:id="rId5"/>
               </a:rPr>
-              <a:t>https://github.com/Modernizr/Modernizr/wiki/HTML5-Cross-browser-Polyfills</a:t>
-            </a:r>
-            <a:endParaRPr lang="en-US" dirty="0" smtClean="0"/>
-          </a:p>
-          <a:p>
-            <a:endParaRPr lang="en-CA" dirty="0" smtClean="0"/>
-          </a:p>
-          <a:p>
-            <a:r>
-              <a:rPr lang="en-CA" baseline="30000" dirty="0" smtClean="0"/>
-              <a:t>3 </a:t>
+              <a:t>http://www.modernizr.com</a:t>
+            </a:r>
+            <a:r>
+              <a:rPr lang="en-US" dirty="0" smtClean="0"/>
+              <a:t> </a:t>
             </a:r>
             <a:r>
               <a:rPr lang="en-US" dirty="0" smtClean="0">
                 <a:hlinkClick r:id="rId6"/>
-              </a:rPr>
-              <a:t>http://www.modernizr.com</a:t>
-            </a:r>
-            <a:r>
-              <a:rPr lang="en-US" dirty="0" smtClean="0"/>
-              <a:t> </a:t>
-            </a:r>
-            <a:r>
-              <a:rPr lang="en-US" dirty="0" smtClean="0">
-                <a:hlinkClick r:id="rId7"/>
               </a:rPr>
               <a:t>http://www.alistapart.com/articles/taking-advantage-of-html5-and-css3-with-modernizr/</a:t>
             </a:r>
@@ -1585,12 +1538,6 @@
         <p:txBody>
           <a:bodyPr/>
           <a:lstStyle/>
-          <a:p>
-            <a:r>
-              <a:rPr lang="en-CA" dirty="0" smtClean="0"/>
-              <a:t>http://www.asp.net/signalr</a:t>
-            </a:r>
-          </a:p>
           <a:p>
             <a:endParaRPr lang="en-CA" dirty="0"/>
           </a:p>
@@ -5576,9 +5523,39 @@
           <a:p>
             <a:r>
               <a:rPr lang="en-US" dirty="0" smtClean="0"/>
-              <a:t>Conference Review	</a:t>
-            </a:r>
+              <a:t>Conference </a:t>
+            </a:r>
+            <a:r>
+              <a:rPr lang="en-US" dirty="0" smtClean="0"/>
+              <a:t>Review </a:t>
+            </a:r>
+          </a:p>
+          <a:p>
             <a:endParaRPr lang="en-US" dirty="0"/>
+          </a:p>
+          <a:p>
+            <a:r>
+              <a:rPr lang="en-US" sz="1200" dirty="0" smtClean="0"/>
+              <a:t>Presented by Darek </a:t>
+            </a:r>
+            <a:r>
+              <a:rPr lang="en-US" sz="1200" dirty="0" err="1" smtClean="0"/>
+              <a:t>Tomy</a:t>
+            </a:r>
+            <a:r>
+              <a:rPr lang="en-US" sz="1200" dirty="0" err="1" smtClean="0"/>
+              <a:t>n</a:t>
+            </a:r>
+            <a:endParaRPr lang="en-US" sz="1200" dirty="0" smtClean="0"/>
+          </a:p>
+          <a:p>
+            <a:r>
+              <a:rPr lang="en-US" sz="1200" dirty="0" smtClean="0">
+                <a:hlinkClick r:id="rId4"/>
+              </a:rPr>
+              <a:t>Darek.Tomyn@solvera.ca</a:t>
+            </a:r>
+            <a:endParaRPr lang="en-US" sz="1200" dirty="0" smtClean="0"/>
           </a:p>
         </p:txBody>
       </p:sp>
@@ -5683,14 +5660,37 @@
         </p:spPr>
         <p:txBody>
           <a:bodyPr>
-            <a:normAutofit/>
+            <a:normAutofit fontScale="92500" lnSpcReduction="20000"/>
           </a:bodyPr>
           <a:lstStyle/>
           <a:p>
             <a:r>
+              <a:rPr lang="en-CA" dirty="0" smtClean="0"/>
+              <a:t>Before get much further though… how is browser support?</a:t>
+            </a:r>
+          </a:p>
+          <a:p>
+            <a:r>
+              <a:rPr lang="en-CA" dirty="0" smtClean="0">
+                <a:hlinkClick r:id="rId3"/>
+              </a:rPr>
+              <a:t>Html5test.com</a:t>
+            </a:r>
+            <a:r>
               <a:rPr lang="en-CA" dirty="0"/>
-              <a:t>Html5test.com, canIuse.com</a:t>
-            </a:r>
+              <a:t>, </a:t>
+            </a:r>
+            <a:r>
+              <a:rPr lang="en-CA" dirty="0" smtClean="0">
+                <a:hlinkClick r:id="rId4"/>
+              </a:rPr>
+              <a:t>canIuse.com</a:t>
+            </a:r>
+            <a:r>
+              <a:rPr lang="en-CA" dirty="0" smtClean="0"/>
+              <a:t>, and lots of others</a:t>
+            </a:r>
+            <a:endParaRPr lang="en-CA" dirty="0"/>
           </a:p>
           <a:p>
             <a:r>
@@ -5709,7 +5709,17 @@
           <a:p>
             <a:r>
               <a:rPr lang="en-CA" dirty="0" smtClean="0"/>
-              <a:t>WHAT ABOUT IE? One option is Google Chrome Frame for &lt;=8</a:t>
+              <a:t>WHAT ABOUT IE? One option is </a:t>
+            </a:r>
+            <a:r>
+              <a:rPr lang="en-CA" dirty="0" smtClean="0">
+                <a:hlinkClick r:id="rId5"/>
+              </a:rPr>
+              <a:t>Google Chrome Frame</a:t>
+            </a:r>
+            <a:r>
+              <a:rPr lang="en-CA" dirty="0" smtClean="0"/>
+              <a:t> for &lt;=8</a:t>
             </a:r>
             <a:r>
               <a:rPr lang="en-CA" baseline="30000" dirty="0"/>
@@ -5790,9 +5800,28 @@
           <a:p>
             <a:r>
               <a:rPr lang="en-CA" dirty="0" smtClean="0"/>
-              <a:t>DEMO 1 - 3</a:t>
-            </a:r>
-            <a:endParaRPr lang="en-CA" dirty="0"/>
+              <a:t>DEMO 1 </a:t>
+            </a:r>
+            <a:r>
+              <a:rPr lang="en-CA" dirty="0" smtClean="0"/>
+              <a:t>– 3</a:t>
+            </a:r>
+          </a:p>
+          <a:p>
+            <a:pPr lvl="1"/>
+            <a:r>
+              <a:rPr lang="en-CA" dirty="0">
+                <a:hlinkClick r:id="rId6"/>
+              </a:rPr>
+              <a:t>http://</a:t>
+            </a:r>
+            <a:r>
+              <a:rPr lang="en-CA" dirty="0" smtClean="0">
+                <a:hlinkClick r:id="rId6"/>
+              </a:rPr>
+              <a:t>html5demo1.azurewebsites.net/Index.html</a:t>
+            </a:r>
+            <a:endParaRPr lang="en-CA" dirty="0" smtClean="0"/>
           </a:p>
         </p:txBody>
       </p:sp>
@@ -5974,8 +6003,32 @@
           <a:p>
             <a:r>
               <a:rPr lang="en-CA" dirty="0" smtClean="0"/>
-              <a:t>Demo 4</a:t>
-            </a:r>
+              <a:t>Demo </a:t>
+            </a:r>
+            <a:r>
+              <a:rPr lang="en-CA" dirty="0" smtClean="0"/>
+              <a:t>4</a:t>
+            </a:r>
+          </a:p>
+          <a:p>
+            <a:pPr lvl="1"/>
+            <a:r>
+              <a:rPr lang="en-CA" dirty="0">
+                <a:hlinkClick r:id="rId2"/>
+              </a:rPr>
+              <a:t>http://</a:t>
+            </a:r>
+            <a:r>
+              <a:rPr lang="en-CA" dirty="0" smtClean="0">
+                <a:hlinkClick r:id="rId2"/>
+              </a:rPr>
+              <a:t>html5demo1.azurewebsites.net/Demo04-NewInputTypes.html</a:t>
+            </a:r>
+            <a:endParaRPr lang="en-CA" dirty="0" smtClean="0"/>
+          </a:p>
+          <a:p>
+            <a:pPr lvl="1"/>
+            <a:endParaRPr lang="en-CA" dirty="0" smtClean="0"/>
           </a:p>
           <a:p>
             <a:endParaRPr lang="en-CA" dirty="0"/>
@@ -6110,6 +6163,26 @@
             </a:r>
           </a:p>
           <a:p>
+            <a:pPr lvl="1"/>
+            <a:r>
+              <a:rPr lang="en-CA" dirty="0">
+                <a:hlinkClick r:id="rId2"/>
+              </a:rPr>
+              <a:t>http://</a:t>
+            </a:r>
+            <a:r>
+              <a:rPr lang="en-CA" dirty="0" smtClean="0">
+                <a:hlinkClick r:id="rId2"/>
+              </a:rPr>
+              <a:t>html5demo1.azurewebsites.net/Demo05-Multimedia.html</a:t>
+            </a:r>
+            <a:endParaRPr lang="en-CA" dirty="0" smtClean="0"/>
+          </a:p>
+          <a:p>
+            <a:pPr lvl="1"/>
+            <a:endParaRPr lang="en-CA" dirty="0" smtClean="0"/>
+          </a:p>
+          <a:p>
             <a:endParaRPr lang="en-CA" dirty="0" smtClean="0"/>
           </a:p>
           <a:p>
@@ -6222,21 +6295,27 @@
         </p:spPr>
         <p:txBody>
           <a:bodyPr>
-            <a:normAutofit lnSpcReduction="10000"/>
+            <a:normAutofit fontScale="92500" lnSpcReduction="20000"/>
           </a:bodyPr>
           <a:lstStyle/>
           <a:p>
             <a:r>
+              <a:rPr lang="en-CA" dirty="0" smtClean="0"/>
+              <a:t>Sessions I attended:</a:t>
+            </a:r>
+            <a:endParaRPr lang="en-CA" dirty="0"/>
+          </a:p>
+          <a:p>
+            <a:pPr lvl="1"/>
+            <a:r>
               <a:rPr lang="en-CA" dirty="0"/>
-              <a:t>Sessions:</a:t>
-            </a:r>
-          </a:p>
-          <a:p>
-            <a:pPr lvl="1"/>
-            <a:r>
-              <a:rPr lang="en-CA" dirty="0"/>
-              <a:t>Most made reference to it / used it</a:t>
-            </a:r>
+              <a:t>Most made reference to it / used </a:t>
+            </a:r>
+            <a:r>
+              <a:rPr lang="en-CA" dirty="0" smtClean="0"/>
+              <a:t>it</a:t>
+            </a:r>
+            <a:endParaRPr lang="en-CA" dirty="0"/>
           </a:p>
           <a:p>
             <a:r>
@@ -6270,8 +6349,21 @@
             <a:pPr lvl="1"/>
             <a:r>
               <a:rPr lang="en-CA" dirty="0"/>
-              <a:t>scaling resources... example "tonight I need 10,000 nodes for an hour until batch is done“</a:t>
-            </a:r>
+              <a:t>scaling resources... example </a:t>
+            </a:r>
+            <a:r>
+              <a:rPr lang="en-CA" dirty="0" smtClean="0"/>
+              <a:t>“tonight </a:t>
+            </a:r>
+            <a:r>
+              <a:rPr lang="en-CA" dirty="0"/>
+              <a:t>I need 10,000 nodes for an hour until batch is </a:t>
+            </a:r>
+            <a:r>
+              <a:rPr lang="en-CA" dirty="0" smtClean="0"/>
+              <a:t>done”</a:t>
+            </a:r>
+            <a:endParaRPr lang="en-CA" dirty="0"/>
           </a:p>
           <a:p>
             <a:pPr lvl="1"/>
@@ -6303,15 +6395,38 @@
             </a:r>
             <a:r>
               <a:rPr lang="en-CA" dirty="0" smtClean="0"/>
-              <a:t>Azure… show other options here</a:t>
-            </a:r>
-            <a:endParaRPr lang="en-CA" dirty="0"/>
+              <a:t>Azure… show other options </a:t>
+            </a:r>
+            <a:r>
+              <a:rPr lang="en-CA" dirty="0" smtClean="0"/>
+              <a:t>here</a:t>
+            </a:r>
+          </a:p>
+          <a:p>
+            <a:pPr lvl="2"/>
+            <a:r>
+              <a:rPr lang="en-CA" dirty="0">
+                <a:hlinkClick r:id="rId2"/>
+              </a:rPr>
+              <a:t>https://</a:t>
+            </a:r>
+            <a:r>
+              <a:rPr lang="en-CA" dirty="0" smtClean="0">
+                <a:hlinkClick r:id="rId2"/>
+              </a:rPr>
+              <a:t>manage.windowsazure.com</a:t>
+            </a:r>
+            <a:endParaRPr lang="en-CA" dirty="0" smtClean="0"/>
           </a:p>
           <a:p>
             <a:pPr lvl="1"/>
             <a:r>
+              <a:rPr lang="en-CA" dirty="0" smtClean="0"/>
+              <a:t>Link </a:t>
+            </a:r>
+            <a:r>
               <a:rPr lang="en-CA" dirty="0"/>
-              <a:t>Link to my </a:t>
+              <a:t>to my </a:t>
             </a:r>
             <a:r>
               <a:rPr lang="en-CA" dirty="0" err="1"/>
@@ -6330,7 +6445,11 @@
             <a:pPr lvl="1"/>
             <a:r>
               <a:rPr lang="en-CA" dirty="0" smtClean="0"/>
-              <a:t>Create new site and download publish settings for deploying</a:t>
+              <a:t>Create new site and download publish settings for </a:t>
+            </a:r>
+            <a:r>
+              <a:rPr lang="en-CA" dirty="0" smtClean="0"/>
+              <a:t>deploying in Visual Studio</a:t>
             </a:r>
             <a:endParaRPr lang="en-CA" dirty="0"/>
           </a:p>
@@ -6448,21 +6567,10 @@
           <a:lstStyle/>
           <a:p>
             <a:r>
-              <a:rPr lang="en-CA" dirty="0"/>
-              <a:t>Unfortunately not the conference to learn a lot of mobile</a:t>
-            </a:r>
-          </a:p>
-          <a:p>
-            <a:r>
-              <a:rPr lang="en-CA" dirty="0"/>
-              <a:t>Concentration on HTML5 including CSS3 for formatting with mobile in mind</a:t>
-            </a:r>
-          </a:p>
-          <a:p>
-            <a:r>
-              <a:rPr lang="en-CA" dirty="0"/>
-              <a:t>Sessions:</a:t>
-            </a:r>
+              <a:rPr lang="en-CA" dirty="0" smtClean="0"/>
+              <a:t>Sessions I attended:</a:t>
+            </a:r>
+            <a:endParaRPr lang="en-CA" dirty="0"/>
           </a:p>
           <a:p>
             <a:pPr lvl="1"/>
@@ -6496,39 +6604,41 @@
             </a:r>
             <a:r>
               <a:rPr lang="en-CA" dirty="0"/>
-              <a:t> </a:t>
-            </a:r>
-            <a:r>
-              <a:rPr lang="en-CA" dirty="0" smtClean="0"/>
-              <a:t>(was a waste </a:t>
+              <a:t> (was a waste of time)</a:t>
+            </a:r>
+          </a:p>
+          <a:p>
+            <a:r>
+              <a:rPr lang="en-CA" dirty="0" smtClean="0"/>
+              <a:t>Unfortunately </a:t>
             </a:r>
             <a:r>
               <a:rPr lang="en-CA" dirty="0"/>
-              <a:t>of </a:t>
-            </a:r>
-            <a:r>
-              <a:rPr lang="en-CA" dirty="0" smtClean="0"/>
-              <a:t>time)</a:t>
-            </a:r>
-            <a:endParaRPr lang="en-CA" dirty="0"/>
-          </a:p>
-          <a:p>
-            <a:r>
-              <a:rPr lang="en-CA" dirty="0" smtClean="0"/>
-              <a:t>3 good takeaways</a:t>
+              <a:t>not the conference to learn a lot of mobile</a:t>
+            </a:r>
+          </a:p>
+          <a:p>
+            <a:r>
+              <a:rPr lang="en-CA" dirty="0"/>
+              <a:t>Concentration on HTML5 including CSS3 for formatting with mobile in mind</a:t>
+            </a:r>
+          </a:p>
+          <a:p>
+            <a:r>
+              <a:rPr lang="en-CA" dirty="0" smtClean="0"/>
+              <a:t>3 </a:t>
+            </a:r>
+            <a:r>
+              <a:rPr lang="en-CA" dirty="0" smtClean="0"/>
+              <a:t>good takeaways</a:t>
             </a:r>
           </a:p>
           <a:p>
             <a:pPr lvl="1"/>
             <a:r>
               <a:rPr lang="en-CA" dirty="0" smtClean="0"/>
-              <a:t>JSON for serialized </a:t>
-            </a:r>
-            <a:r>
-              <a:rPr lang="en-CA" dirty="0" smtClean="0"/>
-              <a:t>data for smaller payload</a:t>
-            </a:r>
-            <a:endParaRPr lang="en-CA" dirty="0" smtClean="0"/>
+              <a:t>JSON for serialized data for smaller payload</a:t>
+            </a:r>
           </a:p>
           <a:p>
             <a:pPr lvl="1"/>
@@ -6544,15 +6654,7 @@
             <a:pPr lvl="1"/>
             <a:r>
               <a:rPr lang="en-CA" dirty="0" smtClean="0"/>
-              <a:t>By default, add </a:t>
-            </a:r>
-            <a:r>
-              <a:rPr lang="en-CA" dirty="0" smtClean="0"/>
-              <a:t>the below </a:t>
-            </a:r>
-            <a:r>
-              <a:rPr lang="en-CA" dirty="0" smtClean="0"/>
-              <a:t>“</a:t>
+              <a:t>By default, add the below “</a:t>
             </a:r>
             <a:r>
               <a:rPr lang="en-CA" dirty="0" smtClean="0">
@@ -6562,11 +6664,7 @@
             </a:r>
             <a:r>
               <a:rPr lang="en-CA" dirty="0" smtClean="0"/>
-              <a:t>” to </a:t>
-            </a:r>
-            <a:r>
-              <a:rPr lang="en-CA" dirty="0" smtClean="0"/>
-              <a:t>all web pages:</a:t>
+              <a:t>” to all web pages:</a:t>
             </a:r>
           </a:p>
           <a:p>
@@ -6583,13 +6681,8 @@
           <a:p>
             <a:r>
               <a:rPr lang="en-CA" dirty="0" smtClean="0"/>
-              <a:t>Demo </a:t>
-            </a:r>
-            <a:r>
-              <a:rPr lang="en-CA" dirty="0" smtClean="0"/>
-              <a:t>7</a:t>
-            </a:r>
-            <a:endParaRPr lang="en-CA" dirty="0" smtClean="0"/>
+              <a:t>Demo 7</a:t>
+            </a:r>
           </a:p>
           <a:p>
             <a:pPr lvl="1"/>
@@ -6717,91 +6810,151 @@
         </p:spPr>
         <p:txBody>
           <a:bodyPr>
-            <a:normAutofit/>
+            <a:normAutofit fontScale="92500" lnSpcReduction="20000"/>
           </a:bodyPr>
           <a:lstStyle/>
           <a:p>
             <a:r>
-              <a:rPr lang="en-CA" dirty="0"/>
-              <a:t>“Any sufficiently advanced technology is indistinguishable from magic” – Arthur C. </a:t>
-            </a:r>
-            <a:r>
-              <a:rPr lang="en-CA" dirty="0" smtClean="0"/>
-              <a:t>Clarke</a:t>
-            </a:r>
-          </a:p>
-          <a:p>
-            <a:r>
-              <a:rPr lang="en-CA" dirty="0" smtClean="0"/>
-              <a:t>An </a:t>
-            </a:r>
-            <a:r>
-              <a:rPr lang="en-CA" dirty="0"/>
-              <a:t>open source series of libraries that provide an abstraction around persistent HTTP connections</a:t>
-            </a:r>
-          </a:p>
-          <a:p>
-            <a:r>
-              <a:rPr lang="en-CA" dirty="0" smtClean="0"/>
-              <a:t>Makes </a:t>
-            </a:r>
-            <a:r>
-              <a:rPr lang="en-CA" dirty="0"/>
-              <a:t>real-time HTTP so easy it seems like </a:t>
-            </a:r>
-            <a:r>
-              <a:rPr lang="en-CA" dirty="0" smtClean="0"/>
-              <a:t>“magic”</a:t>
-            </a:r>
-          </a:p>
-          <a:p>
-            <a:r>
-              <a:rPr lang="en-CA" dirty="0">
-                <a:hlinkClick r:id="rId3"/>
-              </a:rPr>
-              <a:t>http://</a:t>
-            </a:r>
+              <a:rPr lang="en-CA" dirty="0" smtClean="0"/>
+              <a:t>Sessions I attended:</a:t>
+            </a:r>
+          </a:p>
+          <a:p>
+            <a:pPr lvl="1"/>
             <a:r>
               <a:rPr lang="en-CA" dirty="0" smtClean="0">
                 <a:hlinkClick r:id="rId3"/>
               </a:rPr>
-              <a:t>www.asp.net/signalr/</a:t>
+              <a:t>CVTH05 – Real-Time Communications with </a:t>
+            </a:r>
+            <a:r>
+              <a:rPr lang="en-CA" dirty="0" err="1" smtClean="0">
+                <a:hlinkClick r:id="rId3"/>
+              </a:rPr>
+              <a:t>SignalR</a:t>
+            </a:r>
+            <a:r>
+              <a:rPr lang="en-CA" dirty="0" smtClean="0">
+                <a:hlinkClick r:id="rId3"/>
+              </a:rPr>
+              <a:t> And Windows Azure</a:t>
             </a:r>
             <a:endParaRPr lang="en-CA" dirty="0" smtClean="0"/>
           </a:p>
           <a:p>
             <a:r>
               <a:rPr lang="en-CA" dirty="0" smtClean="0"/>
-              <a:t>Demo </a:t>
-            </a:r>
-            <a:r>
-              <a:rPr lang="en-CA" dirty="0" smtClean="0"/>
-              <a:t>8</a:t>
+              <a:t>“</a:t>
+            </a:r>
+            <a:r>
+              <a:rPr lang="en-CA" dirty="0"/>
+              <a:t>Any sufficiently advanced technology is indistinguishable from magic” – Arthur C. </a:t>
+            </a:r>
+            <a:r>
+              <a:rPr lang="en-CA" dirty="0" smtClean="0"/>
+              <a:t>Clarke</a:t>
+            </a:r>
+          </a:p>
+          <a:p>
+            <a:r>
+              <a:rPr lang="en-CA" dirty="0" smtClean="0"/>
+              <a:t>An </a:t>
+            </a:r>
+            <a:r>
+              <a:rPr lang="en-CA" dirty="0"/>
+              <a:t>open source series of libraries that provide an abstraction around persistent HTTP connections</a:t>
+            </a:r>
+          </a:p>
+          <a:p>
+            <a:r>
+              <a:rPr lang="en-CA" dirty="0" smtClean="0"/>
+              <a:t>Makes </a:t>
+            </a:r>
+            <a:r>
+              <a:rPr lang="en-CA" dirty="0"/>
+              <a:t>real-time HTTP so easy it seems like </a:t>
+            </a:r>
+            <a:r>
+              <a:rPr lang="en-CA" dirty="0" smtClean="0"/>
+              <a:t>“magic</a:t>
+            </a:r>
+            <a:r>
+              <a:rPr lang="en-CA" dirty="0" smtClean="0"/>
+              <a:t>”</a:t>
             </a:r>
           </a:p>
           <a:p>
             <a:pPr lvl="1"/>
+            <a:r>
+              <a:rPr lang="en-CA" dirty="0" smtClean="0"/>
+              <a:t>Uses HTML 5 </a:t>
+            </a:r>
+            <a:r>
+              <a:rPr lang="en-CA" dirty="0" err="1" smtClean="0"/>
+              <a:t>WebSockets</a:t>
+            </a:r>
+            <a:r>
+              <a:rPr lang="en-CA" dirty="0" smtClean="0"/>
+              <a:t> if available then does fallbacks</a:t>
+            </a:r>
+            <a:endParaRPr lang="en-CA" dirty="0" smtClean="0"/>
+          </a:p>
+          <a:p>
+            <a:r>
+              <a:rPr lang="en-CA" dirty="0">
+                <a:hlinkClick r:id="rId4"/>
+              </a:rPr>
+              <a:t>http://</a:t>
+            </a:r>
             <a:r>
               <a:rPr lang="en-CA" dirty="0" smtClean="0">
                 <a:hlinkClick r:id="rId4"/>
               </a:rPr>
-              <a:t>Start up my demo site on Azure</a:t>
+              <a:t>www.asp.net/signalr/</a:t>
             </a:r>
             <a:endParaRPr lang="en-CA" dirty="0" smtClean="0"/>
           </a:p>
           <a:p>
+            <a:r>
+              <a:rPr lang="en-CA" dirty="0" smtClean="0"/>
+              <a:t>Demo 8</a:t>
+            </a:r>
+          </a:p>
+          <a:p>
             <a:pPr lvl="1"/>
             <a:r>
-              <a:rPr lang="en-CA" dirty="0" smtClean="0"/>
-              <a:t>2 different demos here:</a:t>
-            </a:r>
-          </a:p>
-          <a:p>
-            <a:pPr lvl="2"/>
-            <a:r>
-              <a:rPr lang="en-CA" dirty="0" err="1" smtClean="0">
+              <a:rPr lang="en-CA" dirty="0" smtClean="0">
                 <a:hlinkClick r:id="rId5"/>
               </a:rPr>
+              <a:t>Start up </a:t>
+            </a:r>
+            <a:r>
+              <a:rPr lang="en-CA" dirty="0" smtClean="0">
+                <a:hlinkClick r:id="rId5"/>
+              </a:rPr>
+              <a:t>demo </a:t>
+            </a:r>
+            <a:r>
+              <a:rPr lang="en-CA" dirty="0" smtClean="0">
+                <a:hlinkClick r:id="rId5"/>
+              </a:rPr>
+              <a:t>site on Azure</a:t>
+            </a:r>
+            <a:endParaRPr lang="en-CA" dirty="0" smtClean="0"/>
+          </a:p>
+          <a:p>
+            <a:pPr lvl="1"/>
+            <a:r>
+              <a:rPr lang="en-CA" dirty="0" smtClean="0"/>
+              <a:t>2 different demos here:</a:t>
+            </a:r>
+          </a:p>
+          <a:p>
+            <a:pPr lvl="2"/>
+            <a:r>
+              <a:rPr lang="en-CA" dirty="0" err="1" smtClean="0">
+                <a:hlinkClick r:id="rId6"/>
+              </a:rPr>
               <a:t>HitCounter</a:t>
             </a:r>
             <a:endParaRPr lang="en-CA" dirty="0" smtClean="0"/>
@@ -6810,7 +6963,7 @@
             <a:pPr lvl="2"/>
             <a:r>
               <a:rPr lang="en-CA" dirty="0" smtClean="0">
-                <a:hlinkClick r:id="rId6"/>
+                <a:hlinkClick r:id="rId7"/>
               </a:rPr>
               <a:t>Chat</a:t>
             </a:r>
@@ -6921,7 +7074,9 @@
           <a:lstStyle/>
           <a:p>
             <a:r>
-              <a:rPr lang="en-CA" dirty="0" err="1" smtClean="0"/>
+              <a:rPr lang="en-CA" dirty="0" err="1" smtClean="0">
+                <a:hlinkClick r:id="rId3"/>
+              </a:rPr>
               <a:t>Nuget</a:t>
             </a:r>
             <a:endParaRPr lang="en-CA" dirty="0" smtClean="0"/>
@@ -6935,52 +7090,80 @@
           </a:p>
           <a:p>
             <a:r>
-              <a:rPr lang="en-CA" dirty="0" smtClean="0"/>
+              <a:rPr lang="en-CA" dirty="0" smtClean="0">
+                <a:hlinkClick r:id="rId4"/>
+              </a:rPr>
               <a:t>Git</a:t>
             </a:r>
+            <a:endParaRPr lang="en-CA" dirty="0" smtClean="0"/>
           </a:p>
           <a:p>
             <a:pPr lvl="1"/>
             <a:r>
-              <a:rPr lang="en-CA" dirty="0" err="1" smtClean="0"/>
+              <a:rPr lang="en-CA" dirty="0" err="1" smtClean="0">
+                <a:hlinkClick r:id="rId5"/>
+              </a:rPr>
               <a:t>Cvs</a:t>
             </a:r>
             <a:r>
-              <a:rPr lang="en-CA" dirty="0" smtClean="0"/>
+              <a:rPr lang="en-CA" dirty="0" smtClean="0">
+                <a:hlinkClick r:id="rId5"/>
+              </a:rPr>
               <a:t> -&gt; </a:t>
             </a:r>
             <a:r>
-              <a:rPr lang="en-CA" dirty="0" err="1" smtClean="0"/>
+              <a:rPr lang="en-CA" dirty="0" err="1" smtClean="0">
+                <a:hlinkClick r:id="rId5"/>
+              </a:rPr>
               <a:t>svn</a:t>
             </a:r>
             <a:r>
-              <a:rPr lang="en-CA" dirty="0" smtClean="0"/>
+              <a:rPr lang="en-CA" dirty="0" smtClean="0">
+                <a:hlinkClick r:id="rId5"/>
+              </a:rPr>
               <a:t> -&gt; git</a:t>
             </a:r>
             <a:endParaRPr lang="en-CA" dirty="0"/>
           </a:p>
           <a:p>
             <a:r>
-              <a:rPr lang="en-CA" dirty="0" smtClean="0"/>
+              <a:rPr lang="en-CA" dirty="0" smtClean="0">
+                <a:hlinkClick r:id="rId6"/>
+              </a:rPr>
               <a:t>Bit.ly</a:t>
             </a:r>
+            <a:endParaRPr lang="en-CA" dirty="0" smtClean="0"/>
           </a:p>
           <a:p>
             <a:pPr lvl="1"/>
             <a:r>
               <a:rPr lang="en-CA" dirty="0" smtClean="0"/>
-              <a:t>Less and less people using tinyurl.com</a:t>
+              <a:t>Less </a:t>
+            </a:r>
+            <a:r>
+              <a:rPr lang="en-CA" dirty="0" smtClean="0"/>
+              <a:t>and less people using tinyurl.com</a:t>
             </a:r>
             <a:endParaRPr lang="en-CA" dirty="0"/>
           </a:p>
           <a:p>
             <a:r>
               <a:rPr lang="en-CA" dirty="0"/>
-              <a:t>“Big data” still in </a:t>
-            </a:r>
-            <a:r>
-              <a:rPr lang="en-CA" dirty="0" smtClean="0"/>
-              <a:t>infancy</a:t>
+              <a:t>“</a:t>
+            </a:r>
+            <a:r>
+              <a:rPr lang="en-CA" dirty="0">
+                <a:hlinkClick r:id="rId7"/>
+              </a:rPr>
+              <a:t>Big data</a:t>
+            </a:r>
+            <a:r>
+              <a:rPr lang="en-CA" dirty="0"/>
+              <a:t>” still in </a:t>
+            </a:r>
+            <a:r>
+              <a:rPr lang="en-CA" dirty="0" smtClean="0"/>
+              <a:t>infancy (IMO)</a:t>
             </a:r>
             <a:endParaRPr lang="en-CA" dirty="0"/>
           </a:p>
@@ -7009,6 +7192,347 @@
 </p:sld>
 </file>
 
+<file path=ppt/slides/slide17.xml><?xml version="1.0" encoding="utf-8"?>
+<p:sld xmlns:a="http://schemas.openxmlformats.org/drawingml/2006/main" xmlns:r="http://schemas.openxmlformats.org/officeDocument/2006/relationships" xmlns:p="http://schemas.openxmlformats.org/presentationml/2006/main">
+  <p:cSld>
+    <p:spTree>
+      <p:nvGrpSpPr>
+        <p:cNvPr id="1" name=""/>
+        <p:cNvGrpSpPr/>
+        <p:nvPr/>
+      </p:nvGrpSpPr>
+      <p:grpSpPr>
+        <a:xfrm>
+          <a:off x="0" y="0"/>
+          <a:ext cx="0" cy="0"/>
+          <a:chOff x="0" y="0"/>
+          <a:chExt cx="0" cy="0"/>
+        </a:xfrm>
+      </p:grpSpPr>
+      <p:sp>
+        <p:nvSpPr>
+          <p:cNvPr id="2" name="Slide Number Placeholder 1"/>
+          <p:cNvSpPr>
+            <a:spLocks noGrp="1"/>
+          </p:cNvSpPr>
+          <p:nvPr>
+            <p:ph type="sldNum" sz="quarter" idx="12"/>
+          </p:nvPr>
+        </p:nvSpPr>
+        <p:spPr/>
+        <p:txBody>
+          <a:bodyPr/>
+          <a:lstStyle/>
+          <a:p>
+            <a:fld id="{1D72EBF8-7CF5-44B7-B2BF-E22DE4D0703D}" type="slidenum">
+              <a:rPr lang="en-US" smtClean="0"/>
+              <a:pPr/>
+              <a:t>16</a:t>
+            </a:fld>
+            <a:endParaRPr lang="en-US"/>
+          </a:p>
+        </p:txBody>
+      </p:sp>
+      <p:sp>
+        <p:nvSpPr>
+          <p:cNvPr id="3" name="Title 2"/>
+          <p:cNvSpPr>
+            <a:spLocks noGrp="1"/>
+          </p:cNvSpPr>
+          <p:nvPr>
+            <p:ph type="title"/>
+          </p:nvPr>
+        </p:nvSpPr>
+        <p:spPr/>
+        <p:txBody>
+          <a:bodyPr>
+            <a:normAutofit fontScale="90000"/>
+          </a:bodyPr>
+          <a:lstStyle/>
+          <a:p>
+            <a:r>
+              <a:rPr lang="en-CA" dirty="0" smtClean="0"/>
+              <a:t>Missing from presentation / not enough time</a:t>
+            </a:r>
+            <a:endParaRPr lang="en-CA" dirty="0"/>
+          </a:p>
+        </p:txBody>
+      </p:sp>
+      <p:sp>
+        <p:nvSpPr>
+          <p:cNvPr id="4" name="Content Placeholder 3"/>
+          <p:cNvSpPr>
+            <a:spLocks noGrp="1"/>
+          </p:cNvSpPr>
+          <p:nvPr>
+            <p:ph sz="quarter" idx="13"/>
+          </p:nvPr>
+        </p:nvSpPr>
+        <p:spPr/>
+        <p:txBody>
+          <a:bodyPr>
+            <a:normAutofit fontScale="92500" lnSpcReduction="10000"/>
+          </a:bodyPr>
+          <a:lstStyle/>
+          <a:p>
+            <a:r>
+              <a:rPr lang="en-CA" dirty="0" smtClean="0"/>
+              <a:t>CSS 3</a:t>
+            </a:r>
+          </a:p>
+          <a:p>
+            <a:r>
+              <a:rPr lang="en-CA" dirty="0" smtClean="0"/>
+              <a:t>“Big Data”</a:t>
+            </a:r>
+          </a:p>
+          <a:p>
+            <a:r>
+              <a:rPr lang="en-CA" dirty="0" err="1" smtClean="0"/>
+              <a:t>Modernizr</a:t>
+            </a:r>
+            <a:r>
+              <a:rPr lang="en-CA" dirty="0" smtClean="0"/>
+              <a:t>… only mentioned it, didn’t really show it</a:t>
+            </a:r>
+          </a:p>
+          <a:p>
+            <a:r>
+              <a:rPr lang="en-CA" dirty="0" smtClean="0"/>
+              <a:t>Other HTML 5 features</a:t>
+            </a:r>
+          </a:p>
+          <a:p>
+            <a:pPr lvl="1"/>
+            <a:r>
+              <a:rPr lang="en-CA" dirty="0" smtClean="0"/>
+              <a:t>Storage</a:t>
+            </a:r>
+          </a:p>
+          <a:p>
+            <a:pPr lvl="1"/>
+            <a:r>
+              <a:rPr lang="en-CA" dirty="0" smtClean="0"/>
+              <a:t>Offline</a:t>
+            </a:r>
+          </a:p>
+          <a:p>
+            <a:pPr lvl="1"/>
+            <a:r>
+              <a:rPr lang="en-CA" dirty="0" err="1" smtClean="0"/>
+              <a:t>Geolocation</a:t>
+            </a:r>
+            <a:endParaRPr lang="en-CA" dirty="0" smtClean="0"/>
+          </a:p>
+          <a:p>
+            <a:pPr lvl="1"/>
+            <a:r>
+              <a:rPr lang="en-CA" dirty="0" smtClean="0"/>
+              <a:t>Canvas</a:t>
+            </a:r>
+          </a:p>
+          <a:p>
+            <a:pPr lvl="1"/>
+            <a:r>
+              <a:rPr lang="en-CA" dirty="0" smtClean="0"/>
+              <a:t>SVG</a:t>
+            </a:r>
+          </a:p>
+          <a:p>
+            <a:pPr lvl="1"/>
+            <a:r>
+              <a:rPr lang="en-CA" dirty="0" err="1" smtClean="0"/>
+              <a:t>etc</a:t>
+            </a:r>
+            <a:endParaRPr lang="en-CA" dirty="0"/>
+          </a:p>
+        </p:txBody>
+      </p:sp>
+    </p:spTree>
+    <p:extLst>
+      <p:ext uri="{BB962C8B-B14F-4D97-AF65-F5344CB8AC3E}">
+        <p14:creationId xmlns:p14="http://schemas.microsoft.com/office/powerpoint/2010/main" val="4134665322"/>
+      </p:ext>
+    </p:extLst>
+  </p:cSld>
+  <p:clrMapOvr>
+    <a:masterClrMapping/>
+  </p:clrMapOvr>
+</p:sld>
+</file>
+
+<file path=ppt/slides/slide18.xml><?xml version="1.0" encoding="utf-8"?>
+<p:sld xmlns:a="http://schemas.openxmlformats.org/drawingml/2006/main" xmlns:r="http://schemas.openxmlformats.org/officeDocument/2006/relationships" xmlns:p="http://schemas.openxmlformats.org/presentationml/2006/main">
+  <p:cSld>
+    <p:spTree>
+      <p:nvGrpSpPr>
+        <p:cNvPr id="1" name=""/>
+        <p:cNvGrpSpPr/>
+        <p:nvPr/>
+      </p:nvGrpSpPr>
+      <p:grpSpPr>
+        <a:xfrm>
+          <a:off x="0" y="0"/>
+          <a:ext cx="0" cy="0"/>
+          <a:chOff x="0" y="0"/>
+          <a:chExt cx="0" cy="0"/>
+        </a:xfrm>
+      </p:grpSpPr>
+      <p:sp>
+        <p:nvSpPr>
+          <p:cNvPr id="2" name="Slide Number Placeholder 1"/>
+          <p:cNvSpPr>
+            <a:spLocks noGrp="1"/>
+          </p:cNvSpPr>
+          <p:nvPr>
+            <p:ph type="sldNum" sz="quarter" idx="12"/>
+          </p:nvPr>
+        </p:nvSpPr>
+        <p:spPr/>
+        <p:txBody>
+          <a:bodyPr/>
+          <a:lstStyle/>
+          <a:p>
+            <a:fld id="{1D72EBF8-7CF5-44B7-B2BF-E22DE4D0703D}" type="slidenum">
+              <a:rPr lang="en-US" smtClean="0"/>
+              <a:pPr/>
+              <a:t>17</a:t>
+            </a:fld>
+            <a:endParaRPr lang="en-US"/>
+          </a:p>
+        </p:txBody>
+      </p:sp>
+      <p:sp>
+        <p:nvSpPr>
+          <p:cNvPr id="3" name="Title 2"/>
+          <p:cNvSpPr>
+            <a:spLocks noGrp="1"/>
+          </p:cNvSpPr>
+          <p:nvPr>
+            <p:ph type="title"/>
+          </p:nvPr>
+        </p:nvSpPr>
+        <p:spPr/>
+        <p:txBody>
+          <a:bodyPr>
+            <a:normAutofit/>
+          </a:bodyPr>
+          <a:lstStyle/>
+          <a:p>
+            <a:r>
+              <a:rPr lang="en-CA" dirty="0" smtClean="0"/>
+              <a:t>Overall Opinion of Conference</a:t>
+            </a:r>
+            <a:endParaRPr lang="en-CA" dirty="0"/>
+          </a:p>
+        </p:txBody>
+      </p:sp>
+      <p:sp>
+        <p:nvSpPr>
+          <p:cNvPr id="4" name="Content Placeholder 3"/>
+          <p:cNvSpPr>
+            <a:spLocks noGrp="1"/>
+          </p:cNvSpPr>
+          <p:nvPr>
+            <p:ph sz="quarter" idx="13"/>
+          </p:nvPr>
+        </p:nvSpPr>
+        <p:spPr>
+          <a:xfrm>
+            <a:off x="979488" y="1630362"/>
+            <a:ext cx="6697663" cy="4390925"/>
+          </a:xfrm>
+        </p:spPr>
+        <p:txBody>
+          <a:bodyPr/>
+          <a:lstStyle/>
+          <a:p>
+            <a:r>
+              <a:rPr lang="en-CA" dirty="0" smtClean="0"/>
+              <a:t>While there… </a:t>
+            </a:r>
+          </a:p>
+          <a:p>
+            <a:pPr lvl="1"/>
+            <a:r>
+              <a:rPr lang="en-CA" dirty="0"/>
+              <a:t>W</a:t>
+            </a:r>
+            <a:r>
+              <a:rPr lang="en-CA" dirty="0" smtClean="0"/>
+              <a:t>anted more… more HTML 5, more mobile</a:t>
+            </a:r>
+          </a:p>
+          <a:p>
+            <a:pPr lvl="1"/>
+            <a:r>
+              <a:rPr lang="en-CA" dirty="0" smtClean="0"/>
+              <a:t>Logistics… felt could have been better</a:t>
+            </a:r>
+          </a:p>
+          <a:p>
+            <a:pPr lvl="1"/>
+            <a:r>
+              <a:rPr lang="en-CA" dirty="0" err="1" smtClean="0"/>
+              <a:t>Accomodations</a:t>
+            </a:r>
+            <a:r>
+              <a:rPr lang="en-CA" dirty="0" smtClean="0"/>
+              <a:t>… beautiful, close to Universal Studios</a:t>
+            </a:r>
+          </a:p>
+          <a:p>
+            <a:pPr lvl="1"/>
+            <a:r>
+              <a:rPr lang="en-CA" dirty="0" smtClean="0"/>
+              <a:t>Not a “swag” conference</a:t>
+            </a:r>
+          </a:p>
+          <a:p>
+            <a:r>
+              <a:rPr lang="en-CA" dirty="0" smtClean="0"/>
+              <a:t>Looking back…</a:t>
+            </a:r>
+          </a:p>
+          <a:p>
+            <a:pPr lvl="1"/>
+            <a:r>
+              <a:rPr lang="en-CA" dirty="0" smtClean="0"/>
+              <a:t>I am surprised at how much I did actually learn… or at least spark an interest in</a:t>
+            </a:r>
+          </a:p>
+          <a:p>
+            <a:pPr lvl="1"/>
+            <a:r>
+              <a:rPr lang="en-CA" dirty="0" smtClean="0"/>
+              <a:t>Would recommend in the future</a:t>
+            </a:r>
+          </a:p>
+          <a:p>
+            <a:pPr lvl="1"/>
+            <a:r>
+              <a:rPr lang="en-CA" dirty="0" smtClean="0"/>
+              <a:t>Ability to jump from session to session because of so many running concurrently was a big benefit</a:t>
+            </a:r>
+          </a:p>
+          <a:p>
+            <a:endParaRPr lang="en-CA" dirty="0"/>
+          </a:p>
+        </p:txBody>
+      </p:sp>
+    </p:spTree>
+    <p:extLst>
+      <p:ext uri="{BB962C8B-B14F-4D97-AF65-F5344CB8AC3E}">
+        <p14:creationId xmlns:p14="http://schemas.microsoft.com/office/powerpoint/2010/main" val="1805342507"/>
+      </p:ext>
+    </p:extLst>
+  </p:cSld>
+  <p:clrMapOvr>
+    <a:masterClrMapping/>
+  </p:clrMapOvr>
+</p:sld>
+</file>
+
 <file path=ppt/slides/slide2.xml><?xml version="1.0" encoding="utf-8"?>
 <p:sld xmlns:a="http://schemas.openxmlformats.org/drawingml/2006/main" xmlns:r="http://schemas.openxmlformats.org/officeDocument/2006/relationships" xmlns:p="http://schemas.openxmlformats.org/presentationml/2006/main">
   <p:cSld>
@@ -7101,36 +7625,61 @@
             </a:r>
             <a:r>
               <a:rPr lang="en-CA" dirty="0"/>
-              <a:t> time combined 4 events into 1: </a:t>
-            </a:r>
+              <a:t> time </a:t>
+            </a:r>
+            <a:r>
+              <a:rPr lang="en-CA" dirty="0" smtClean="0"/>
+              <a:t>“combined </a:t>
+            </a:r>
+            <a:r>
+              <a:rPr lang="en-CA" dirty="0"/>
+              <a:t>4 events into </a:t>
+            </a:r>
+            <a:r>
+              <a:rPr lang="en-CA" dirty="0" smtClean="0"/>
+              <a:t>1”: </a:t>
+            </a:r>
+            <a:endParaRPr lang="en-CA" dirty="0"/>
           </a:p>
           <a:p>
             <a:pPr lvl="1"/>
             <a:r>
-              <a:rPr lang="en-CA" dirty="0"/>
+              <a:rPr lang="en-CA" dirty="0">
+                <a:hlinkClick r:id="rId3"/>
+              </a:rPr>
               <a:t>Visual Studio</a:t>
             </a:r>
+            <a:endParaRPr lang="en-CA" dirty="0"/>
           </a:p>
           <a:p>
             <a:pPr lvl="1"/>
             <a:r>
-              <a:rPr lang="en-CA" dirty="0"/>
+              <a:rPr lang="en-CA" dirty="0">
+                <a:hlinkClick r:id="rId4"/>
+              </a:rPr>
               <a:t>SharePoint</a:t>
             </a:r>
+            <a:endParaRPr lang="en-CA" dirty="0"/>
           </a:p>
           <a:p>
             <a:pPr lvl="1"/>
             <a:r>
-              <a:rPr lang="en-CA" dirty="0"/>
+              <a:rPr lang="en-CA" dirty="0">
+                <a:hlinkClick r:id="rId5"/>
+              </a:rPr>
               <a:t>SQL Server </a:t>
             </a:r>
+            <a:endParaRPr lang="en-CA" dirty="0"/>
           </a:p>
           <a:p>
             <a:pPr lvl="1"/>
             <a:r>
-              <a:rPr lang="en-CA" dirty="0"/>
+              <a:rPr lang="en-CA" dirty="0" smtClean="0">
+                <a:hlinkClick r:id="rId6"/>
+              </a:rPr>
               <a:t>Cloud &amp; Virtualization </a:t>
             </a:r>
+            <a:endParaRPr lang="en-CA" dirty="0"/>
           </a:p>
           <a:p>
             <a:r>
@@ -7487,7 +8036,9 @@
               <a:t>W3C wanted XHTML 2, browser groups wanted HTML 5… so they created </a:t>
             </a:r>
             <a:r>
-              <a:rPr lang="en-CA" dirty="0" smtClean="0"/>
+              <a:rPr lang="en-CA" dirty="0" smtClean="0">
+                <a:hlinkClick r:id="rId6"/>
+              </a:rPr>
               <a:t>WHATWG</a:t>
             </a:r>
             <a:r>
@@ -7640,33 +8191,74 @@
             <a:pPr lvl="1"/>
             <a:r>
               <a:rPr lang="en-CA" dirty="0"/>
-              <a:t>“The world is moving to HTML 5” – Steve Jobs</a:t>
-            </a:r>
-            <a:r>
-              <a:rPr lang="en-CA" baseline="30000" dirty="0"/>
-              <a:t>1</a:t>
+              <a:t>“</a:t>
+            </a:r>
+            <a:r>
+              <a:rPr lang="en-CA" dirty="0">
+                <a:hlinkClick r:id="rId3"/>
+              </a:rPr>
+              <a:t>The world is moving to HTML 5</a:t>
+            </a:r>
+            <a:r>
+              <a:rPr lang="en-CA" dirty="0"/>
+              <a:t>” – Steve </a:t>
+            </a:r>
+            <a:r>
+              <a:rPr lang="en-CA" dirty="0" smtClean="0"/>
+              <a:t>Jobs</a:t>
             </a:r>
             <a:endParaRPr lang="en-CA" dirty="0"/>
           </a:p>
           <a:p>
             <a:pPr lvl="1"/>
             <a:r>
-              <a:rPr lang="en-CA" dirty="0" err="1"/>
+              <a:rPr lang="en-CA" dirty="0" err="1">
+                <a:hlinkClick r:id="rId4"/>
+              </a:rPr>
               <a:t>iDevices</a:t>
             </a:r>
             <a:r>
-              <a:rPr lang="en-CA" dirty="0"/>
-              <a:t> no support for Flash</a:t>
-            </a:r>
-          </a:p>
-          <a:p>
-            <a:r>
-              <a:rPr lang="en-CA" dirty="0"/>
-              <a:t>Logo / marketing </a:t>
-            </a:r>
-            <a:r>
-              <a:rPr lang="en-CA" dirty="0" smtClean="0"/>
-              <a:t>material, HTML5 “Gang Sign”</a:t>
+              <a:rPr lang="en-CA" dirty="0">
+                <a:hlinkClick r:id="rId4"/>
+              </a:rPr>
+              <a:t> </a:t>
+            </a:r>
+            <a:r>
+              <a:rPr lang="en-CA" dirty="0" smtClean="0">
+                <a:hlinkClick r:id="rId4"/>
+              </a:rPr>
+              <a:t>have no </a:t>
+            </a:r>
+            <a:r>
+              <a:rPr lang="en-CA" dirty="0">
+                <a:hlinkClick r:id="rId4"/>
+              </a:rPr>
+              <a:t>support for Flash</a:t>
+            </a:r>
+            <a:endParaRPr lang="en-CA" dirty="0"/>
+          </a:p>
+          <a:p>
+            <a:r>
+              <a:rPr lang="en-CA" dirty="0" smtClean="0">
+                <a:hlinkClick r:id="rId5"/>
+              </a:rPr>
+              <a:t>Logo</a:t>
+            </a:r>
+            <a:r>
+              <a:rPr lang="en-CA" dirty="0" smtClean="0"/>
+              <a:t> / </a:t>
+            </a:r>
+            <a:r>
+              <a:rPr lang="en-CA" dirty="0">
+                <a:hlinkClick r:id="rId6"/>
+              </a:rPr>
+              <a:t>marketing </a:t>
+            </a:r>
+            <a:r>
+              <a:rPr lang="en-CA" dirty="0" smtClean="0">
+                <a:hlinkClick r:id="rId6"/>
+              </a:rPr>
+              <a:t>material</a:t>
             </a:r>
             <a:r>
               <a:rPr lang="en-CA" baseline="30000" dirty="0" smtClean="0"/>
@@ -7707,10 +8299,10 @@
             </a:r>
             <a:r>
               <a:rPr lang="en-CA" baseline="30000" dirty="0" smtClean="0"/>
-              <a:t>3</a:t>
-            </a:r>
-            <a:r>
-              <a:rPr lang="en-CA" dirty="0"/>
+              <a:t>1</a:t>
+            </a:r>
+            <a:r>
+              <a:rPr lang="en-CA" dirty="0" smtClean="0"/>
               <a:t> </a:t>
             </a:r>
             <a:r>
@@ -7777,43 +8369,6 @@
           </a:p>
         </p:txBody>
       </p:sp>
-      <p:pic>
-        <p:nvPicPr>
-          <p:cNvPr id="5" name="html5-gang.mp4">
-            <a:hlinkClick r:id="" action="ppaction://media"/>
-          </p:cNvPr>
-          <p:cNvPicPr>
-            <a:picLocks noChangeAspect="1"/>
-          </p:cNvPicPr>
-          <p:nvPr>
-            <a:videoFile r:link="rId2"/>
-            <p:extLst>
-              <p:ext uri="{DAA4B4D4-6D71-4841-9C94-3DE7FCFB9230}">
-                <p14:media xmlns:p14="http://schemas.microsoft.com/office/powerpoint/2010/main" r:embed="rId1">
-                  <p14:bmkLst>
-                    <p14:bmk name="Bookmark 1" time="0"/>
-                  </p14:bmkLst>
-                </p14:media>
-              </p:ext>
-            </p:extLst>
-          </p:nvPr>
-        </p:nvPicPr>
-        <p:blipFill>
-          <a:blip r:embed="rId5"/>
-          <a:stretch>
-            <a:fillRect/>
-          </a:stretch>
-        </p:blipFill>
-        <p:spPr>
-          <a:xfrm>
-            <a:off x="6786296" y="2420888"/>
-            <a:ext cx="831272" cy="457200"/>
-          </a:xfrm>
-          <a:prstGeom prst="rect">
-            <a:avLst/>
-          </a:prstGeom>
-        </p:spPr>
-      </p:pic>
     </p:spTree>
     <p:extLst>
       <p:ext uri="{BB962C8B-B14F-4D97-AF65-F5344CB8AC3E}">
@@ -7827,80 +8382,7 @@
   <p:timing>
     <p:tnLst>
       <p:par>
-        <p:cTn id="1" dur="indefinite" restart="never" nodeType="tmRoot">
-          <p:childTnLst>
-            <p:seq concurrent="1" nextAc="seek">
-              <p:cTn id="2" restart="whenNotActive" fill="hold" evtFilter="cancelBubble" nodeType="interactiveSeq">
-                <p:stCondLst>
-                  <p:cond evt="onClick" delay="0">
-                    <p:tgtEl>
-                      <p:spTgt spid="5"/>
-                    </p:tgtEl>
-                  </p:cond>
-                </p:stCondLst>
-                <p:endSync evt="end" delay="0">
-                  <p:rtn val="all"/>
-                </p:endSync>
-                <p:childTnLst>
-                  <p:par>
-                    <p:cTn id="3" fill="hold">
-                      <p:stCondLst>
-                        <p:cond delay="0"/>
-                      </p:stCondLst>
-                      <p:childTnLst>
-                        <p:par>
-                          <p:cTn id="4" fill="hold">
-                            <p:stCondLst>
-                              <p:cond delay="0"/>
-                            </p:stCondLst>
-                            <p:childTnLst>
-                              <p:par>
-                                <p:cTn id="5" presetID="2" presetClass="mediacall" presetSubtype="0" fill="hold" nodeType="clickEffect">
-                                  <p:stCondLst>
-                                    <p:cond delay="0"/>
-                                  </p:stCondLst>
-                                  <p:childTnLst>
-                                    <p:cmd type="call" cmd="togglePause">
-                                      <p:cBhvr>
-                                        <p:cTn id="6" dur="1" fill="hold"/>
-                                        <p:tgtEl>
-                                          <p:spTgt spid="5"/>
-                                        </p:tgtEl>
-                                      </p:cBhvr>
-                                    </p:cmd>
-                                  </p:childTnLst>
-                                </p:cTn>
-                              </p:par>
-                            </p:childTnLst>
-                          </p:cTn>
-                        </p:par>
-                      </p:childTnLst>
-                    </p:cTn>
-                  </p:par>
-                </p:childTnLst>
-              </p:cTn>
-              <p:nextCondLst>
-                <p:cond evt="onClick" delay="0">
-                  <p:tgtEl>
-                    <p:spTgt spid="5"/>
-                  </p:tgtEl>
-                </p:cond>
-              </p:nextCondLst>
-            </p:seq>
-            <p:video fullScrn="1">
-              <p:cMediaNode vol="80000">
-                <p:cTn id="7" fill="remove" display="0">
-                  <p:stCondLst>
-                    <p:cond delay="indefinite"/>
-                  </p:stCondLst>
-                </p:cTn>
-                <p:tgtEl>
-                  <p:spTgt spid="5"/>
-                </p:tgtEl>
-              </p:cMediaNode>
-            </p:video>
-          </p:childTnLst>
-        </p:cTn>
+        <p:cTn id="1" dur="indefinite" restart="never" nodeType="tmRoot"/>
       </p:par>
     </p:tnLst>
   </p:timing>
@@ -7980,63 +8462,82 @@
             <p:ph sz="quarter" idx="13"/>
           </p:nvPr>
         </p:nvSpPr>
-        <p:spPr/>
+        <p:spPr>
+          <a:xfrm>
+            <a:off x="979488" y="1630363"/>
+            <a:ext cx="6697663" cy="430485"/>
+          </a:xfrm>
+        </p:spPr>
         <p:txBody>
           <a:bodyPr/>
           <a:lstStyle/>
           <a:p>
             <a:r>
               <a:rPr lang="en-CA" dirty="0"/>
-              <a:t>What is it? HTML + CSS3 + JavaScript APIs</a:t>
-            </a:r>
-          </a:p>
-          <a:p>
-            <a:pPr lvl="1"/>
-            <a:r>
-              <a:rPr lang="en-CA" dirty="0"/>
-              <a:t>CSS3 is an independent spec</a:t>
-            </a:r>
-          </a:p>
-          <a:p>
-            <a:r>
-              <a:rPr lang="en-CA" dirty="0"/>
-              <a:t>Structural improvements:</a:t>
-            </a:r>
-          </a:p>
-          <a:p>
-            <a:pPr lvl="1"/>
-            <a:r>
-              <a:rPr lang="en-CA" dirty="0"/>
-              <a:t>More descriptive markup</a:t>
-            </a:r>
-          </a:p>
-          <a:p>
-            <a:pPr lvl="1"/>
-            <a:r>
-              <a:rPr lang="en-CA" dirty="0"/>
-              <a:t>New elements: header, footer, </a:t>
-            </a:r>
-            <a:r>
-              <a:rPr lang="en-CA" dirty="0" err="1"/>
-              <a:t>nav</a:t>
-            </a:r>
-            <a:r>
-              <a:rPr lang="en-CA" dirty="0"/>
-              <a:t>, section, article, aside</a:t>
-            </a:r>
-          </a:p>
-          <a:p>
-            <a:r>
-              <a:rPr lang="en-CA" dirty="0"/>
-              <a:t>Think of HTML as having NOTHING to do with styling but instead defining what content is trying to explain </a:t>
-            </a:r>
-            <a:r>
-              <a:rPr lang="en-CA" dirty="0" smtClean="0"/>
-              <a:t>(“semantic web”)</a:t>
-            </a:r>
-          </a:p>
-        </p:txBody>
-      </p:sp>
+              <a:t>What is it? HTML + CSS3 + JavaScript </a:t>
+            </a:r>
+            <a:r>
+              <a:rPr lang="en-CA" dirty="0" smtClean="0"/>
+              <a:t>APIs</a:t>
+            </a:r>
+            <a:endParaRPr lang="en-CA" dirty="0"/>
+          </a:p>
+        </p:txBody>
+      </p:sp>
+      <p:pic>
+        <p:nvPicPr>
+          <p:cNvPr id="1027" name="Picture 3"/>
+          <p:cNvPicPr>
+            <a:picLocks noChangeAspect="1" noChangeArrowheads="1"/>
+          </p:cNvPicPr>
+          <p:nvPr/>
+        </p:nvPicPr>
+        <p:blipFill>
+          <a:blip r:embed="rId2" cstate="email">
+            <a:extLst>
+              <a:ext uri="{28A0092B-C50C-407E-A947-70E740481C1C}">
+                <a14:useLocalDpi xmlns:a14="http://schemas.microsoft.com/office/drawing/2010/main" val="0"/>
+              </a:ext>
+            </a:extLst>
+          </a:blip>
+          <a:srcRect/>
+          <a:stretch>
+            <a:fillRect/>
+          </a:stretch>
+        </p:blipFill>
+        <p:spPr bwMode="auto">
+          <a:xfrm>
+            <a:off x="979488" y="2204864"/>
+            <a:ext cx="7679823" cy="3600400"/>
+          </a:xfrm>
+          <a:prstGeom prst="rect">
+            <a:avLst/>
+          </a:prstGeom>
+          <a:noFill/>
+          <a:ln>
+            <a:noFill/>
+          </a:ln>
+          <a:extLst>
+            <a:ext uri="{909E8E84-426E-40DD-AFC4-6F175D3DCCD1}">
+              <a14:hiddenFill xmlns:a14="http://schemas.microsoft.com/office/drawing/2010/main">
+                <a:solidFill>
+                  <a:schemeClr val="accent1"/>
+                </a:solidFill>
+              </a14:hiddenFill>
+            </a:ext>
+            <a:ext uri="{91240B29-F687-4F45-9708-019B960494DF}">
+              <a14:hiddenLine xmlns:a14="http://schemas.microsoft.com/office/drawing/2010/main" w="9525">
+                <a:solidFill>
+                  <a:schemeClr val="tx1"/>
+                </a:solidFill>
+                <a:miter lim="800000"/>
+                <a:headEnd/>
+                <a:tailEnd/>
+              </a14:hiddenLine>
+            </a:ext>
+          </a:extLst>
+        </p:spPr>
+      </p:pic>
     </p:spTree>
     <p:extLst>
       <p:ext uri="{BB962C8B-B14F-4D97-AF65-F5344CB8AC3E}">
@@ -8135,7 +8636,12 @@
             <p:ph sz="quarter" idx="13"/>
           </p:nvPr>
         </p:nvSpPr>
-        <p:spPr/>
+        <p:spPr>
+          <a:xfrm>
+            <a:off x="979488" y="1630362"/>
+            <a:ext cx="6697663" cy="4318917"/>
+          </a:xfrm>
+        </p:spPr>
         <p:txBody>
           <a:bodyPr>
             <a:normAutofit/>
@@ -8176,8 +8682,38 @@
             </a:r>
             <a:r>
               <a:rPr lang="en-CA" dirty="0"/>
-              <a:t>type attribute is no longer required on &lt;style&gt; and &lt;script&gt; tags</a:t>
-            </a:r>
+              <a:t>type attribute is no longer required on &lt;style&gt; and &lt;script&gt; </a:t>
+            </a:r>
+            <a:r>
+              <a:rPr lang="en-CA" dirty="0" smtClean="0"/>
+              <a:t>tags</a:t>
+            </a:r>
+          </a:p>
+          <a:p>
+            <a:r>
+              <a:rPr lang="en-CA" dirty="0" smtClean="0"/>
+              <a:t>Elements that are by nature self-closing now do not need “/”</a:t>
+            </a:r>
+          </a:p>
+          <a:p>
+            <a:pPr lvl="1"/>
+            <a:r>
+              <a:rPr lang="en-CA" dirty="0" err="1"/>
+              <a:t>i</a:t>
+            </a:r>
+            <a:r>
+              <a:rPr lang="en-CA" dirty="0" err="1" smtClean="0"/>
+              <a:t>mg</a:t>
+            </a:r>
+            <a:endParaRPr lang="en-CA" dirty="0" smtClean="0"/>
+          </a:p>
+          <a:p>
+            <a:pPr lvl="1"/>
+            <a:r>
+              <a:rPr lang="en-CA" dirty="0" err="1" smtClean="0"/>
+              <a:t>br</a:t>
+            </a:r>
+            <a:endParaRPr lang="en-CA" dirty="0"/>
           </a:p>
           <a:p>
             <a:endParaRPr lang="en-CA" dirty="0"/>

</xml_diff>

<commit_message>
updated multmedia page... removed JavaScript. Updated ppt and notes. Added link to both on Index.html
</commit_message>
<xml_diff>
--- a/Docs/2012 - Live360 Event Review (NEWER).pptx
+++ b/Docs/2012 - Live360 Event Review (NEWER).pptx
@@ -1336,11 +1336,7 @@
             </a:r>
             <a:r>
               <a:rPr lang="en-US" dirty="0" smtClean="0"/>
-              <a:t>Chrome </a:t>
-            </a:r>
-            <a:r>
-              <a:rPr lang="en-US" dirty="0" smtClean="0"/>
-              <a:t>browser engine in IE 6/7/8/9</a:t>
+              <a:t>Chrome browser engine in IE 6/7/8/9</a:t>
             </a:r>
           </a:p>
           <a:p>
@@ -5523,11 +5519,7 @@
           <a:p>
             <a:r>
               <a:rPr lang="en-US" dirty="0" smtClean="0"/>
-              <a:t>Conference </a:t>
-            </a:r>
-            <a:r>
-              <a:rPr lang="en-US" dirty="0" smtClean="0"/>
-              <a:t>Review </a:t>
+              <a:t>Conference Review </a:t>
             </a:r>
           </a:p>
           <a:p>
@@ -5540,11 +5532,7 @@
             </a:r>
             <a:r>
               <a:rPr lang="en-US" sz="1200" dirty="0" err="1" smtClean="0"/>
-              <a:t>Tomy</a:t>
-            </a:r>
-            <a:r>
-              <a:rPr lang="en-US" sz="1200" dirty="0" err="1" smtClean="0"/>
-              <a:t>n</a:t>
+              <a:t>Tomyn</a:t>
             </a:r>
             <a:endParaRPr lang="en-US" sz="1200" dirty="0" smtClean="0"/>
           </a:p>
@@ -5800,11 +5788,7 @@
           <a:p>
             <a:r>
               <a:rPr lang="en-CA" dirty="0" smtClean="0"/>
-              <a:t>DEMO 1 </a:t>
-            </a:r>
-            <a:r>
-              <a:rPr lang="en-CA" dirty="0" smtClean="0"/>
-              <a:t>– 3</a:t>
+              <a:t>DEMO 1 – 3</a:t>
             </a:r>
           </a:p>
           <a:p>
@@ -6003,11 +5987,7 @@
           <a:p>
             <a:r>
               <a:rPr lang="en-CA" dirty="0" smtClean="0"/>
-              <a:t>Demo </a:t>
-            </a:r>
-            <a:r>
-              <a:rPr lang="en-CA" dirty="0" smtClean="0"/>
-              <a:t>4</a:t>
+              <a:t>Demo 4</a:t>
             </a:r>
           </a:p>
           <a:p>
@@ -6155,11 +6135,7 @@
           <a:p>
             <a:r>
               <a:rPr lang="en-CA" dirty="0" smtClean="0"/>
-              <a:t>Demo </a:t>
-            </a:r>
-            <a:r>
-              <a:rPr lang="en-CA" dirty="0" smtClean="0"/>
-              <a:t>5</a:t>
+              <a:t>Demo 5</a:t>
             </a:r>
           </a:p>
           <a:p>
@@ -6395,11 +6371,7 @@
             </a:r>
             <a:r>
               <a:rPr lang="en-CA" dirty="0" smtClean="0"/>
-              <a:t>Azure… show other options </a:t>
-            </a:r>
-            <a:r>
-              <a:rPr lang="en-CA" dirty="0" smtClean="0"/>
-              <a:t>here</a:t>
+              <a:t>Azure… show other options here</a:t>
             </a:r>
           </a:p>
           <a:p>
@@ -6445,11 +6417,7 @@
             <a:pPr lvl="1"/>
             <a:r>
               <a:rPr lang="en-CA" dirty="0" smtClean="0"/>
-              <a:t>Create new site and download publish settings for </a:t>
-            </a:r>
-            <a:r>
-              <a:rPr lang="en-CA" dirty="0" smtClean="0"/>
-              <a:t>deploying in Visual Studio</a:t>
+              <a:t>Create new site and download publish settings for deploying in Visual Studio</a:t>
             </a:r>
             <a:endParaRPr lang="en-CA" dirty="0"/>
           </a:p>
@@ -6626,11 +6594,7 @@
           <a:p>
             <a:r>
               <a:rPr lang="en-CA" dirty="0" smtClean="0"/>
-              <a:t>3 </a:t>
-            </a:r>
-            <a:r>
-              <a:rPr lang="en-CA" dirty="0" smtClean="0"/>
-              <a:t>good takeaways</a:t>
+              <a:t>3 good takeaways</a:t>
             </a:r>
           </a:p>
           <a:p>
@@ -6876,11 +6840,7 @@
             </a:r>
             <a:r>
               <a:rPr lang="en-CA" dirty="0" smtClean="0"/>
-              <a:t>“magic</a:t>
-            </a:r>
-            <a:r>
-              <a:rPr lang="en-CA" dirty="0" smtClean="0"/>
-              <a:t>”</a:t>
+              <a:t>“magic”</a:t>
             </a:r>
           </a:p>
           <a:p>
@@ -6897,7 +6857,6 @@
               <a:rPr lang="en-CA" dirty="0" smtClean="0"/>
               <a:t> if available then does fallbacks</a:t>
             </a:r>
-            <a:endParaRPr lang="en-CA" dirty="0" smtClean="0"/>
           </a:p>
           <a:p>
             <a:r>
@@ -6926,19 +6885,7 @@
               <a:rPr lang="en-CA" dirty="0" smtClean="0">
                 <a:hlinkClick r:id="rId5"/>
               </a:rPr>
-              <a:t>Start up </a:t>
-            </a:r>
-            <a:r>
-              <a:rPr lang="en-CA" dirty="0" smtClean="0">
-                <a:hlinkClick r:id="rId5"/>
-              </a:rPr>
-              <a:t>demo </a:t>
-            </a:r>
-            <a:r>
-              <a:rPr lang="en-CA" dirty="0" smtClean="0">
-                <a:hlinkClick r:id="rId5"/>
-              </a:rPr>
-              <a:t>site on Azure</a:t>
+              <a:t>Start up demo site on Azure</a:t>
             </a:r>
             <a:endParaRPr lang="en-CA" dirty="0" smtClean="0"/>
           </a:p>
@@ -7138,11 +7085,7 @@
             <a:pPr lvl="1"/>
             <a:r>
               <a:rPr lang="en-CA" dirty="0" smtClean="0"/>
-              <a:t>Less </a:t>
-            </a:r>
-            <a:r>
-              <a:rPr lang="en-CA" dirty="0" smtClean="0"/>
-              <a:t>and less people using tinyurl.com</a:t>
+              <a:t>Less and less people using tinyurl.com</a:t>
             </a:r>
             <a:endParaRPr lang="en-CA" dirty="0"/>
           </a:p>
@@ -7268,17 +7211,37 @@
             <p:ph sz="quarter" idx="13"/>
           </p:nvPr>
         </p:nvSpPr>
-        <p:spPr/>
+        <p:spPr>
+          <a:xfrm>
+            <a:off x="979488" y="1630362"/>
+            <a:ext cx="6697663" cy="4534941"/>
+          </a:xfrm>
+        </p:spPr>
         <p:txBody>
           <a:bodyPr>
-            <a:normAutofit fontScale="92500" lnSpcReduction="10000"/>
+            <a:normAutofit lnSpcReduction="10000"/>
           </a:bodyPr>
           <a:lstStyle/>
           <a:p>
             <a:r>
               <a:rPr lang="en-CA" dirty="0" smtClean="0"/>
-              <a:t>CSS 3</a:t>
-            </a:r>
+              <a:t>Azure… just touched on it</a:t>
+            </a:r>
+          </a:p>
+          <a:p>
+            <a:r>
+              <a:rPr lang="en-CA" dirty="0" smtClean="0"/>
+              <a:t>CSS 3... </a:t>
+            </a:r>
+            <a:r>
+              <a:rPr lang="en-CA" dirty="0" smtClean="0"/>
+              <a:t>For example: m</a:t>
+            </a:r>
+            <a:r>
+              <a:rPr lang="en-CA" dirty="0" smtClean="0"/>
+              <a:t>edia queries</a:t>
+            </a:r>
+            <a:endParaRPr lang="en-CA" dirty="0" smtClean="0"/>
           </a:p>
           <a:p>
             <a:r>
@@ -7306,6 +7269,28 @@
             <a:pPr lvl="1"/>
             <a:r>
               <a:rPr lang="en-CA" dirty="0" smtClean="0"/>
+              <a:t>More </a:t>
+            </a:r>
+            <a:r>
+              <a:rPr lang="en-CA" dirty="0" err="1" smtClean="0"/>
+              <a:t>MultiMedia</a:t>
+            </a:r>
+            <a:r>
+              <a:rPr lang="en-CA" dirty="0" smtClean="0"/>
+              <a:t> capabilities (i.e. Video and Audio)</a:t>
+            </a:r>
+          </a:p>
+          <a:p>
+            <a:pPr lvl="2"/>
+            <a:r>
+              <a:rPr lang="en-CA" dirty="0" smtClean="0"/>
+              <a:t>Ex. Closed captioning</a:t>
+            </a:r>
+          </a:p>
+          <a:p>
+            <a:pPr lvl="1"/>
+            <a:r>
+              <a:rPr lang="en-CA" dirty="0" smtClean="0"/>
               <a:t>Storage</a:t>
             </a:r>
           </a:p>
@@ -7341,7 +7326,9 @@
           <a:p>
             <a:pPr lvl="1"/>
             <a:r>
-              <a:rPr lang="en-CA" dirty="0" err="1" smtClean="0"/>
+              <a:rPr lang="en-CA" dirty="0" err="1" smtClean="0">
+                <a:hlinkClick r:id="rId2"/>
+              </a:rPr>
               <a:t>etc</a:t>
             </a:r>
             <a:endParaRPr lang="en-CA" dirty="0"/>
@@ -8303,11 +8290,7 @@
             </a:r>
             <a:r>
               <a:rPr lang="en-CA" dirty="0" smtClean="0"/>
-              <a:t> </a:t>
-            </a:r>
-            <a:r>
-              <a:rPr lang="en-CA" dirty="0" smtClean="0"/>
-              <a:t>… as a result, they “score” much lower</a:t>
+              <a:t> … as a result, they “score” much lower</a:t>
             </a:r>
             <a:endParaRPr lang="en-CA" baseline="30000" dirty="0"/>
           </a:p>

</xml_diff>

<commit_message>
added bit.ly link to title page
</commit_message>
<xml_diff>
--- a/Docs/2012 - Live360 Event Review (NEWER).pptx
+++ b/Docs/2012 - Live360 Event Review (NEWER).pptx
@@ -5514,7 +5514,9 @@
         </p:nvSpPr>
         <p:spPr/>
         <p:txBody>
-          <a:bodyPr/>
+          <a:bodyPr>
+            <a:normAutofit fontScale="70000" lnSpcReduction="20000"/>
+          </a:bodyPr>
           <a:lstStyle/>
           <a:p>
             <a:r>
@@ -5523,6 +5525,59 @@
             </a:r>
           </a:p>
           <a:p>
+            <a:endParaRPr lang="en-US" dirty="0" smtClean="0"/>
+          </a:p>
+          <a:p>
+            <a:r>
+              <a:rPr lang="en-US" dirty="0"/>
+              <a:t>Follow along at: </a:t>
+            </a:r>
+            <a:endParaRPr lang="en-US" dirty="0" smtClean="0"/>
+          </a:p>
+          <a:p>
+            <a:r>
+              <a:rPr lang="en-US" smtClean="0">
+                <a:hlinkClick r:id="rId4"/>
+              </a:rPr>
+              <a:t>http</a:t>
+            </a:r>
+            <a:r>
+              <a:rPr lang="en-US">
+                <a:hlinkClick r:id="rId4"/>
+              </a:rPr>
+              <a:t>://</a:t>
+            </a:r>
+            <a:r>
+              <a:rPr lang="en-US" smtClean="0">
+                <a:hlinkClick r:id="rId4"/>
+              </a:rPr>
+              <a:t>bit.ly/15u1FQ8</a:t>
+            </a:r>
+            <a:r>
+              <a:rPr lang="en-US"/>
+              <a:t> or </a:t>
+            </a:r>
+            <a:r>
+              <a:rPr lang="en-US">
+                <a:hlinkClick r:id="rId5"/>
+              </a:rPr>
+              <a:t>http://</a:t>
+            </a:r>
+            <a:r>
+              <a:rPr lang="en-US">
+                <a:hlinkClick r:id="rId5"/>
+              </a:rPr>
+              <a:t>html5demo1.azurewebsites.net</a:t>
+            </a:r>
+            <a:r>
+              <a:rPr lang="en-US" smtClean="0">
+                <a:hlinkClick r:id="rId5"/>
+              </a:rPr>
+              <a:t>/</a:t>
+            </a:r>
+            <a:endParaRPr lang="en-US" smtClean="0"/>
+          </a:p>
+          <a:p>
             <a:endParaRPr lang="en-US" dirty="0"/>
           </a:p>
           <a:p>
@@ -5539,7 +5594,7 @@
           <a:p>
             <a:r>
               <a:rPr lang="en-US" sz="1200" dirty="0" smtClean="0">
-                <a:hlinkClick r:id="rId4"/>
+                <a:hlinkClick r:id="rId6"/>
               </a:rPr>
               <a:t>Darek.Tomyn@solvera.ca</a:t>
             </a:r>
@@ -7231,17 +7286,8 @@
           <a:p>
             <a:r>
               <a:rPr lang="en-CA" dirty="0" smtClean="0"/>
-              <a:t>CSS 3... </a:t>
-            </a:r>
-            <a:r>
-              <a:rPr lang="en-CA" dirty="0" smtClean="0"/>
-              <a:t>For example: m</a:t>
-            </a:r>
-            <a:r>
-              <a:rPr lang="en-CA" dirty="0" smtClean="0"/>
-              <a:t>edia queries</a:t>
-            </a:r>
-            <a:endParaRPr lang="en-CA" dirty="0" smtClean="0"/>
+              <a:t>CSS 3... For example: media queries</a:t>
+            </a:r>
           </a:p>
           <a:p>
             <a:r>

</xml_diff>

<commit_message>
added what I learn overall visual to ppt
</commit_message>
<xml_diff>
--- a/Docs/2012 - Live360 Event Review (NEWER).pptx
+++ b/Docs/2012 - Live360 Event Review (NEWER).pptx
@@ -5,30 +5,31 @@
     <p:sldMasterId id="2147483887" r:id="rId1"/>
   </p:sldMasterIdLst>
   <p:notesMasterIdLst>
-    <p:notesMasterId r:id="rId20"/>
+    <p:notesMasterId r:id="rId21"/>
   </p:notesMasterIdLst>
   <p:handoutMasterIdLst>
-    <p:handoutMasterId r:id="rId21"/>
+    <p:handoutMasterId r:id="rId22"/>
   </p:handoutMasterIdLst>
   <p:sldIdLst>
     <p:sldId id="260" r:id="rId2"/>
     <p:sldId id="259" r:id="rId3"/>
     <p:sldId id="257" r:id="rId4"/>
-    <p:sldId id="261" r:id="rId5"/>
-    <p:sldId id="262" r:id="rId6"/>
-    <p:sldId id="263" r:id="rId7"/>
-    <p:sldId id="264" r:id="rId8"/>
-    <p:sldId id="271" r:id="rId9"/>
-    <p:sldId id="272" r:id="rId10"/>
-    <p:sldId id="273" r:id="rId11"/>
-    <p:sldId id="265" r:id="rId12"/>
-    <p:sldId id="274" r:id="rId13"/>
-    <p:sldId id="266" r:id="rId14"/>
-    <p:sldId id="268" r:id="rId15"/>
-    <p:sldId id="269" r:id="rId16"/>
-    <p:sldId id="270" r:id="rId17"/>
-    <p:sldId id="275" r:id="rId18"/>
-    <p:sldId id="276" r:id="rId19"/>
+    <p:sldId id="277" r:id="rId5"/>
+    <p:sldId id="261" r:id="rId6"/>
+    <p:sldId id="262" r:id="rId7"/>
+    <p:sldId id="263" r:id="rId8"/>
+    <p:sldId id="264" r:id="rId9"/>
+    <p:sldId id="271" r:id="rId10"/>
+    <p:sldId id="272" r:id="rId11"/>
+    <p:sldId id="273" r:id="rId12"/>
+    <p:sldId id="265" r:id="rId13"/>
+    <p:sldId id="274" r:id="rId14"/>
+    <p:sldId id="266" r:id="rId15"/>
+    <p:sldId id="268" r:id="rId16"/>
+    <p:sldId id="269" r:id="rId17"/>
+    <p:sldId id="270" r:id="rId18"/>
+    <p:sldId id="275" r:id="rId19"/>
+    <p:sldId id="276" r:id="rId20"/>
   </p:sldIdLst>
   <p:sldSz cx="9144000" cy="6858000" type="screen4x3"/>
   <p:notesSz cx="6858000" cy="9144000"/>
@@ -212,7 +213,7 @@
           <a:p>
             <a:fld id="{6D05735F-B05D-4640-A99E-EDFA21E90228}" type="datetimeFigureOut">
               <a:rPr lang="en-US" smtClean="0"/>
-              <a:t>3/4/2013</a:t>
+              <a:t>3/6/2013</a:t>
             </a:fld>
             <a:endParaRPr lang="en-US"/>
           </a:p>
@@ -378,7 +379,7 @@
           <a:p>
             <a:fld id="{EB5D2808-713F-1C4D-AF0B-AEC7B1F49BC4}" type="datetimeFigureOut">
               <a:rPr lang="en-US" smtClean="0"/>
-              <a:t>3/4/2013</a:t>
+              <a:t>3/6/2013</a:t>
             </a:fld>
             <a:endParaRPr lang="en-US"/>
           </a:p>
@@ -957,7 +958,7 @@
           <a:p>
             <a:fld id="{4FCB2955-686B-EC42-828C-18431921459F}" type="slidenum">
               <a:rPr lang="en-US" smtClean="0"/>
-              <a:t>3</a:t>
+              <a:t>4</a:t>
             </a:fld>
             <a:endParaRPr lang="en-US"/>
           </a:p>
@@ -1095,7 +1096,7 @@
           <a:p>
             <a:fld id="{4FCB2955-686B-EC42-828C-18431921459F}" type="slidenum">
               <a:rPr lang="en-US" smtClean="0"/>
-              <a:t>4</a:t>
+              <a:t>5</a:t>
             </a:fld>
             <a:endParaRPr lang="en-US"/>
           </a:p>
@@ -1179,7 +1180,7 @@
           <a:p>
             <a:fld id="{4FCB2955-686B-EC42-828C-18431921459F}" type="slidenum">
               <a:rPr lang="en-US" smtClean="0"/>
-              <a:t>6</a:t>
+              <a:t>7</a:t>
             </a:fld>
             <a:endParaRPr lang="en-US"/>
           </a:p>
@@ -1263,7 +1264,7 @@
           <a:p>
             <a:fld id="{4FCB2955-686B-EC42-828C-18431921459F}" type="slidenum">
               <a:rPr lang="en-US" smtClean="0"/>
-              <a:t>8</a:t>
+              <a:t>9</a:t>
             </a:fld>
             <a:endParaRPr lang="en-US"/>
           </a:p>
@@ -1472,7 +1473,7 @@
           <a:p>
             <a:fld id="{4FCB2955-686B-EC42-828C-18431921459F}" type="slidenum">
               <a:rPr lang="en-US" smtClean="0"/>
-              <a:t>9</a:t>
+              <a:t>10</a:t>
             </a:fld>
             <a:endParaRPr lang="en-US"/>
           </a:p>
@@ -1556,7 +1557,7 @@
           <a:p>
             <a:fld id="{4FCB2955-686B-EC42-828C-18431921459F}" type="slidenum">
               <a:rPr lang="en-US" smtClean="0"/>
-              <a:t>14</a:t>
+              <a:t>15</a:t>
             </a:fld>
             <a:endParaRPr lang="en-US"/>
           </a:p>
@@ -1640,7 +1641,7 @@
           <a:p>
             <a:fld id="{4FCB2955-686B-EC42-828C-18431921459F}" type="slidenum">
               <a:rPr lang="en-US" smtClean="0"/>
-              <a:t>15</a:t>
+              <a:t>16</a:t>
             </a:fld>
             <a:endParaRPr lang="en-US"/>
           </a:p>
@@ -1917,7 +1918,7 @@
           <a:p>
             <a:fld id="{EB6F4DCC-4F1E-F54C-AA63-5E9B8139A2C7}" type="datetime4">
               <a:rPr lang="en-CA" smtClean="0"/>
-              <a:t>March-4-13</a:t>
+              <a:t>March-6-13</a:t>
             </a:fld>
             <a:endParaRPr lang="en-US" dirty="0"/>
           </a:p>
@@ -2163,7 +2164,7 @@
           <a:p>
             <a:fld id="{E89AD498-328C-DE45-9033-626F46332D12}" type="datetime4">
               <a:rPr lang="en-CA" smtClean="0"/>
-              <a:t>March-4-13</a:t>
+              <a:t>March-6-13</a:t>
             </a:fld>
             <a:endParaRPr lang="en-US"/>
           </a:p>
@@ -2484,7 +2485,7 @@
           <a:p>
             <a:fld id="{205C405F-71DA-D945-AC37-528E00489EC0}" type="datetime4">
               <a:rPr lang="en-CA" smtClean="0"/>
-              <a:t>March-4-13</a:t>
+              <a:t>March-6-13</a:t>
             </a:fld>
             <a:endParaRPr lang="en-US"/>
           </a:p>
@@ -3016,7 +3017,7 @@
           <a:p>
             <a:fld id="{A706A332-CB54-F44D-AAB8-905B7A2134BC}" type="datetime4">
               <a:rPr lang="en-CA" smtClean="0"/>
-              <a:t>March-4-13</a:t>
+              <a:t>March-6-13</a:t>
             </a:fld>
             <a:endParaRPr lang="en-US" dirty="0"/>
           </a:p>
@@ -3393,7 +3394,7 @@
           <a:p>
             <a:fld id="{C8774548-0BB4-5443-9210-BF9E4921324F}" type="datetime4">
               <a:rPr lang="en-CA" smtClean="0"/>
-              <a:t>March-4-13</a:t>
+              <a:t>March-6-13</a:t>
             </a:fld>
             <a:endParaRPr lang="en-US"/>
           </a:p>
@@ -3770,7 +3771,7 @@
           <a:p>
             <a:fld id="{DA5AA9F5-8C84-A342-A63E-20B4B9965A72}" type="datetime4">
               <a:rPr lang="en-CA" smtClean="0"/>
-              <a:t>March-4-13</a:t>
+              <a:t>March-6-13</a:t>
             </a:fld>
             <a:endParaRPr lang="en-US"/>
           </a:p>
@@ -4177,7 +4178,7 @@
           <a:p>
             <a:fld id="{B75CC70B-AAA2-1A4B-980F-5795C4FC07F0}" type="datetime4">
               <a:rPr lang="en-CA" smtClean="0"/>
-              <a:t>March-4-13</a:t>
+              <a:t>March-6-13</a:t>
             </a:fld>
             <a:endParaRPr lang="en-US"/>
           </a:p>
@@ -4441,7 +4442,7 @@
           <a:p>
             <a:fld id="{634933C9-6163-F741-B0D7-A3D45CDF27BE}" type="datetime4">
               <a:rPr lang="en-CA" smtClean="0"/>
-              <a:t>March-4-13</a:t>
+              <a:t>March-6-13</a:t>
             </a:fld>
             <a:endParaRPr lang="en-US"/>
           </a:p>
@@ -4945,7 +4946,7 @@
           <a:p>
             <a:fld id="{952FD3B8-8B26-5944-8B2D-223A1203AFC1}" type="datetime4">
               <a:rPr lang="en-CA" smtClean="0"/>
-              <a:t>March-4-13</a:t>
+              <a:t>March-6-13</a:t>
             </a:fld>
             <a:endParaRPr lang="en-US" dirty="0" err="1"/>
           </a:p>
@@ -5561,13 +5562,7 @@
               <a:rPr lang="en-US">
                 <a:hlinkClick r:id="rId5"/>
               </a:rPr>
-              <a:t>http://</a:t>
-            </a:r>
-            <a:r>
-              <a:rPr lang="en-US">
-                <a:hlinkClick r:id="rId5"/>
-              </a:rPr>
-              <a:t>html5demo1.azurewebsites.net</a:t>
+              <a:t>http://html5demo1.azurewebsites.net</a:t>
             </a:r>
             <a:r>
               <a:rPr lang="en-US" smtClean="0">
@@ -5680,194 +5675,74 @@
           <a:p>
             <a:r>
               <a:rPr lang="en-CA" dirty="0"/>
-              <a:t>HTML 5 - Browser Support</a:t>
-            </a:r>
-          </a:p>
-        </p:txBody>
-      </p:sp>
-      <p:sp>
-        <p:nvSpPr>
-          <p:cNvPr id="4" name="Content Placeholder 3"/>
-          <p:cNvSpPr>
-            <a:spLocks noGrp="1"/>
-          </p:cNvSpPr>
-          <p:nvPr>
-            <p:ph sz="quarter" idx="13"/>
-          </p:nvPr>
-        </p:nvSpPr>
-        <p:spPr>
+              <a:t>HTML 5 </a:t>
+            </a:r>
+            <a:r>
+              <a:rPr lang="en-CA" dirty="0" smtClean="0"/>
+              <a:t>– New Tags</a:t>
+            </a:r>
+            <a:endParaRPr lang="en-CA" dirty="0"/>
+          </a:p>
+        </p:txBody>
+      </p:sp>
+      <p:pic>
+        <p:nvPicPr>
+          <p:cNvPr id="1027" name="Picture 3"/>
+          <p:cNvPicPr>
+            <a:picLocks noChangeAspect="1" noChangeArrowheads="1"/>
+          </p:cNvPicPr>
+          <p:nvPr/>
+        </p:nvPicPr>
+        <p:blipFill>
+          <a:blip r:embed="rId3" cstate="email">
+            <a:extLst>
+              <a:ext uri="{28A0092B-C50C-407E-A947-70E740481C1C}">
+                <a14:useLocalDpi xmlns:a14="http://schemas.microsoft.com/office/drawing/2010/main" val="0"/>
+              </a:ext>
+            </a:extLst>
+          </a:blip>
+          <a:srcRect/>
+          <a:stretch>
+            <a:fillRect/>
+          </a:stretch>
+        </p:blipFill>
+        <p:spPr bwMode="auto">
           <a:xfrm>
-            <a:off x="979488" y="1630362"/>
-            <a:ext cx="6697663" cy="4606949"/>
+            <a:off x="2267744" y="1556575"/>
+            <a:ext cx="5480844" cy="4453699"/>
           </a:xfrm>
+          <a:prstGeom prst="rect">
+            <a:avLst/>
+          </a:prstGeom>
+          <a:noFill/>
+          <a:ln>
+            <a:noFill/>
+          </a:ln>
+          <a:extLst>
+            <a:ext uri="{909E8E84-426E-40DD-AFC4-6F175D3DCCD1}">
+              <a14:hiddenFill xmlns:a14="http://schemas.microsoft.com/office/drawing/2010/main">
+                <a:solidFill>
+                  <a:schemeClr val="accent1"/>
+                </a:solidFill>
+              </a14:hiddenFill>
+            </a:ext>
+            <a:ext uri="{91240B29-F687-4F45-9708-019B960494DF}">
+              <a14:hiddenLine xmlns:a14="http://schemas.microsoft.com/office/drawing/2010/main" w="9525">
+                <a:solidFill>
+                  <a:schemeClr val="tx1"/>
+                </a:solidFill>
+                <a:miter lim="800000"/>
+                <a:headEnd/>
+                <a:tailEnd/>
+              </a14:hiddenLine>
+            </a:ext>
+          </a:extLst>
         </p:spPr>
-        <p:txBody>
-          <a:bodyPr>
-            <a:normAutofit fontScale="92500" lnSpcReduction="20000"/>
-          </a:bodyPr>
-          <a:lstStyle/>
-          <a:p>
-            <a:r>
-              <a:rPr lang="en-CA" dirty="0" smtClean="0"/>
-              <a:t>Before get much further though… how is browser support?</a:t>
-            </a:r>
-          </a:p>
-          <a:p>
-            <a:r>
-              <a:rPr lang="en-CA" dirty="0" smtClean="0">
-                <a:hlinkClick r:id="rId3"/>
-              </a:rPr>
-              <a:t>Html5test.com</a:t>
-            </a:r>
-            <a:r>
-              <a:rPr lang="en-CA" dirty="0"/>
-              <a:t>, </a:t>
-            </a:r>
-            <a:r>
-              <a:rPr lang="en-CA" dirty="0" smtClean="0">
-                <a:hlinkClick r:id="rId4"/>
-              </a:rPr>
-              <a:t>canIuse.com</a:t>
-            </a:r>
-            <a:r>
-              <a:rPr lang="en-CA" dirty="0" smtClean="0"/>
-              <a:t>, and lots of others</a:t>
-            </a:r>
-            <a:endParaRPr lang="en-CA" dirty="0"/>
-          </a:p>
-          <a:p>
-            <a:r>
-              <a:rPr lang="en-CA" dirty="0" smtClean="0"/>
-              <a:t>Don’t </a:t>
-            </a:r>
-            <a:r>
-              <a:rPr lang="en-CA" dirty="0"/>
-              <a:t>sniff browsers… test for </a:t>
-            </a:r>
-            <a:r>
-              <a:rPr lang="en-CA" dirty="0" smtClean="0"/>
-              <a:t>features</a:t>
-            </a:r>
-          </a:p>
-          <a:p>
-            <a:r>
-              <a:rPr lang="en-CA" dirty="0" smtClean="0"/>
-              <a:t>WHAT ABOUT IE? One option is </a:t>
-            </a:r>
-            <a:r>
-              <a:rPr lang="en-CA" dirty="0" smtClean="0">
-                <a:hlinkClick r:id="rId5"/>
-              </a:rPr>
-              <a:t>Google Chrome Frame</a:t>
-            </a:r>
-            <a:r>
-              <a:rPr lang="en-CA" dirty="0" smtClean="0"/>
-              <a:t> for &lt;=8</a:t>
-            </a:r>
-            <a:r>
-              <a:rPr lang="en-CA" baseline="30000" dirty="0"/>
-              <a:t>1</a:t>
-            </a:r>
-            <a:endParaRPr lang="en-CA" dirty="0" smtClean="0"/>
-          </a:p>
-          <a:p>
-            <a:r>
-              <a:rPr lang="en-CA" dirty="0" smtClean="0"/>
-              <a:t>Adoption </a:t>
-            </a:r>
-            <a:r>
-              <a:rPr lang="en-CA" dirty="0"/>
-              <a:t>strategies: lowest common </a:t>
-            </a:r>
-            <a:r>
-              <a:rPr lang="en-CA" dirty="0" smtClean="0"/>
-              <a:t>denominator, </a:t>
-            </a:r>
-            <a:r>
-              <a:rPr lang="en-CA" dirty="0" err="1"/>
-              <a:t>polyfill</a:t>
-            </a:r>
-            <a:r>
-              <a:rPr lang="en-CA" dirty="0"/>
-              <a:t> enriched</a:t>
-            </a:r>
-          </a:p>
-          <a:p>
-            <a:r>
-              <a:rPr lang="en-CA" dirty="0"/>
-              <a:t>What is a “Polyfill”?</a:t>
-            </a:r>
-            <a:r>
-              <a:rPr lang="en-CA" baseline="30000" dirty="0"/>
-              <a:t>2</a:t>
-            </a:r>
-            <a:endParaRPr lang="en-CA" dirty="0"/>
-          </a:p>
-          <a:p>
-            <a:pPr lvl="1"/>
-            <a:r>
-              <a:rPr lang="en-CA" dirty="0"/>
-              <a:t>JavaScript that implants HTML5 functionality in a browser that does not offer native support</a:t>
-            </a:r>
-          </a:p>
-          <a:p>
-            <a:r>
-              <a:rPr lang="en-CA" dirty="0"/>
-              <a:t>Modernizr</a:t>
-            </a:r>
-            <a:r>
-              <a:rPr lang="en-CA" baseline="30000" dirty="0"/>
-              <a:t>3</a:t>
-            </a:r>
-            <a:endParaRPr lang="en-CA" dirty="0"/>
-          </a:p>
-          <a:p>
-            <a:pPr lvl="1"/>
-            <a:r>
-              <a:rPr lang="en-CA" dirty="0"/>
-              <a:t>Small JavaScript library that aids backwards compatibility with </a:t>
-            </a:r>
-            <a:r>
-              <a:rPr lang="en-CA" dirty="0" err="1"/>
-              <a:t>polyfills</a:t>
-            </a:r>
-            <a:r>
-              <a:rPr lang="en-CA" dirty="0"/>
-              <a:t> for HTML5 &amp; CSS3 </a:t>
-            </a:r>
-            <a:r>
-              <a:rPr lang="en-CA" dirty="0" smtClean="0"/>
-              <a:t>features</a:t>
-            </a:r>
-          </a:p>
-          <a:p>
-            <a:r>
-              <a:rPr lang="en-CA" dirty="0" smtClean="0"/>
-              <a:t>DEMO 1 – 3</a:t>
-            </a:r>
-          </a:p>
-          <a:p>
-            <a:pPr lvl="1"/>
-            <a:r>
-              <a:rPr lang="en-CA" dirty="0">
-                <a:hlinkClick r:id="rId6"/>
-              </a:rPr>
-              <a:t>http://</a:t>
-            </a:r>
-            <a:r>
-              <a:rPr lang="en-CA" dirty="0" smtClean="0">
-                <a:hlinkClick r:id="rId6"/>
-              </a:rPr>
-              <a:t>html5demo1.azurewebsites.net/Index.html</a:t>
-            </a:r>
-            <a:endParaRPr lang="en-CA" dirty="0" smtClean="0"/>
-          </a:p>
-        </p:txBody>
-      </p:sp>
+      </p:pic>
     </p:spTree>
     <p:extLst>
       <p:ext uri="{BB962C8B-B14F-4D97-AF65-F5344CB8AC3E}">
-        <p14:creationId xmlns:p14="http://schemas.microsoft.com/office/powerpoint/2010/main" val="932334811"/>
+        <p14:creationId xmlns:p14="http://schemas.microsoft.com/office/powerpoint/2010/main" val="270904078"/>
       </p:ext>
     </p:extLst>
   </p:cSld>
@@ -5942,13 +5817,8 @@
           <a:p>
             <a:r>
               <a:rPr lang="en-CA" dirty="0"/>
-              <a:t>HTML 5 </a:t>
-            </a:r>
-            <a:r>
-              <a:rPr lang="en-CA" dirty="0" smtClean="0"/>
-              <a:t>Form Enhancements</a:t>
-            </a:r>
-            <a:endParaRPr lang="en-CA" dirty="0"/>
+              <a:t>HTML 5 - Browser Support</a:t>
+            </a:r>
           </a:p>
         </p:txBody>
       </p:sp>
@@ -5965,115 +5835,176 @@
         <p:spPr>
           <a:xfrm>
             <a:off x="979488" y="1630362"/>
-            <a:ext cx="6697663" cy="4462933"/>
+            <a:ext cx="6697663" cy="4606949"/>
           </a:xfrm>
         </p:spPr>
         <p:txBody>
-          <a:bodyPr/>
-          <a:lstStyle/>
-          <a:p>
-            <a:r>
-              <a:rPr lang="en-CA" dirty="0"/>
-              <a:t>&lt;input type=</a:t>
-            </a:r>
-          </a:p>
-          <a:p>
-            <a:pPr lvl="1"/>
-            <a:r>
-              <a:rPr lang="en-CA" dirty="0"/>
-              <a:t>Email, </a:t>
-            </a:r>
-            <a:r>
-              <a:rPr lang="en-CA" dirty="0" err="1" smtClean="0"/>
-              <a:t>url</a:t>
-            </a:r>
-            <a:r>
-              <a:rPr lang="en-CA" dirty="0" smtClean="0"/>
-              <a:t>, </a:t>
-            </a:r>
-            <a:r>
-              <a:rPr lang="en-CA" dirty="0"/>
-              <a:t>search, number, date, </a:t>
-            </a:r>
-            <a:r>
-              <a:rPr lang="en-CA" dirty="0" smtClean="0"/>
-              <a:t>time, color</a:t>
+          <a:bodyPr>
+            <a:normAutofit fontScale="92500" lnSpcReduction="20000"/>
+          </a:bodyPr>
+          <a:lstStyle/>
+          <a:p>
+            <a:r>
+              <a:rPr lang="en-CA" dirty="0" smtClean="0"/>
+              <a:t>Before get much further though… how is browser support?</a:t>
+            </a:r>
+          </a:p>
+          <a:p>
+            <a:r>
+              <a:rPr lang="en-CA" dirty="0" smtClean="0">
+                <a:hlinkClick r:id="rId3"/>
+              </a:rPr>
+              <a:t>Html5test.com</a:t>
             </a:r>
             <a:r>
               <a:rPr lang="en-CA" dirty="0"/>
               <a:t>, </a:t>
             </a:r>
             <a:r>
+              <a:rPr lang="en-CA" dirty="0" smtClean="0">
+                <a:hlinkClick r:id="rId4"/>
+              </a:rPr>
+              <a:t>canIuse.com</a:t>
+            </a:r>
+            <a:r>
+              <a:rPr lang="en-CA" dirty="0" smtClean="0"/>
+              <a:t>, and lots of others</a:t>
+            </a:r>
+            <a:endParaRPr lang="en-CA" dirty="0"/>
+          </a:p>
+          <a:p>
+            <a:r>
+              <a:rPr lang="en-CA" dirty="0" smtClean="0"/>
+              <a:t>Don’t </a:t>
+            </a:r>
+            <a:r>
+              <a:rPr lang="en-CA" dirty="0"/>
+              <a:t>sniff browsers… test for </a:t>
+            </a:r>
+            <a:r>
+              <a:rPr lang="en-CA" dirty="0" smtClean="0"/>
+              <a:t>features</a:t>
+            </a:r>
+          </a:p>
+          <a:p>
+            <a:r>
+              <a:rPr lang="en-CA" dirty="0" smtClean="0"/>
+              <a:t>WHAT ABOUT IE? One option is </a:t>
+            </a:r>
+            <a:r>
+              <a:rPr lang="en-CA" dirty="0" smtClean="0">
+                <a:hlinkClick r:id="rId5"/>
+              </a:rPr>
+              <a:t>Google Chrome Frame</a:t>
+            </a:r>
+            <a:r>
+              <a:rPr lang="en-CA" dirty="0" smtClean="0"/>
+              <a:t> for &lt;=8</a:t>
+            </a:r>
+            <a:r>
+              <a:rPr lang="en-CA" baseline="30000" dirty="0"/>
+              <a:t>1</a:t>
+            </a:r>
+            <a:endParaRPr lang="en-CA" dirty="0" smtClean="0"/>
+          </a:p>
+          <a:p>
+            <a:r>
+              <a:rPr lang="en-CA" dirty="0" smtClean="0"/>
+              <a:t>Adoption </a:t>
+            </a:r>
+            <a:r>
+              <a:rPr lang="en-CA" dirty="0"/>
+              <a:t>strategies: lowest common </a:t>
+            </a:r>
+            <a:r>
+              <a:rPr lang="en-CA" dirty="0" smtClean="0"/>
+              <a:t>denominator, </a:t>
+            </a:r>
+            <a:r>
               <a:rPr lang="en-CA" dirty="0" err="1"/>
-              <a:t>etc</a:t>
+              <a:t>polyfill</a:t>
+            </a:r>
+            <a:r>
+              <a:rPr lang="en-CA" dirty="0"/>
+              <a:t> enriched</a:t>
+            </a:r>
+          </a:p>
+          <a:p>
+            <a:r>
+              <a:rPr lang="en-CA" dirty="0"/>
+              <a:t>What is a “Polyfill”?</a:t>
+            </a:r>
+            <a:r>
+              <a:rPr lang="en-CA" baseline="30000" dirty="0"/>
+              <a:t>2</a:t>
             </a:r>
             <a:endParaRPr lang="en-CA" dirty="0"/>
           </a:p>
           <a:p>
+            <a:pPr lvl="1"/>
             <a:r>
               <a:rPr lang="en-CA" dirty="0"/>
-              <a:t>New attributes</a:t>
-            </a:r>
+              <a:t>JavaScript that implants HTML5 functionality in a browser that does not offer native support</a:t>
+            </a:r>
+          </a:p>
+          <a:p>
+            <a:r>
+              <a:rPr lang="en-CA" dirty="0"/>
+              <a:t>Modernizr</a:t>
+            </a:r>
+            <a:r>
+              <a:rPr lang="en-CA" baseline="30000" dirty="0"/>
+              <a:t>3</a:t>
+            </a:r>
+            <a:endParaRPr lang="en-CA" dirty="0"/>
           </a:p>
           <a:p>
             <a:pPr lvl="1"/>
             <a:r>
               <a:rPr lang="en-CA" dirty="0"/>
-              <a:t>Placeholder, autofocus</a:t>
-            </a:r>
-          </a:p>
-          <a:p>
-            <a:r>
-              <a:rPr lang="en-CA" dirty="0" err="1" smtClean="0"/>
-              <a:t>Contenteditable</a:t>
-            </a:r>
-            <a:endParaRPr lang="en-CA" dirty="0" smtClean="0"/>
-          </a:p>
-          <a:p>
-            <a:r>
-              <a:rPr lang="en-CA" dirty="0" smtClean="0"/>
-              <a:t>Remember sites mentioned previously: </a:t>
+              <a:t>Small JavaScript library that aids backwards compatibility with </a:t>
+            </a:r>
+            <a:r>
+              <a:rPr lang="en-CA" dirty="0" err="1"/>
+              <a:t>polyfills</a:t>
             </a:r>
             <a:r>
               <a:rPr lang="en-CA" dirty="0"/>
-              <a:t>Html5test.com, canIuse.com</a:t>
-            </a:r>
-          </a:p>
-          <a:p>
-            <a:r>
-              <a:rPr lang="en-CA" dirty="0" smtClean="0"/>
-              <a:t>Demo 4</a:t>
+              <a:t> for HTML5 &amp; CSS3 </a:t>
+            </a:r>
+            <a:r>
+              <a:rPr lang="en-CA" dirty="0" smtClean="0"/>
+              <a:t>features</a:t>
+            </a:r>
+          </a:p>
+          <a:p>
+            <a:r>
+              <a:rPr lang="en-CA" dirty="0" smtClean="0"/>
+              <a:t>DEMO 1 – 3</a:t>
             </a:r>
           </a:p>
           <a:p>
             <a:pPr lvl="1"/>
             <a:r>
               <a:rPr lang="en-CA" dirty="0">
-                <a:hlinkClick r:id="rId2"/>
+                <a:hlinkClick r:id="rId6"/>
               </a:rPr>
               <a:t>http://</a:t>
             </a:r>
             <a:r>
               <a:rPr lang="en-CA" dirty="0" smtClean="0">
-                <a:hlinkClick r:id="rId2"/>
+                <a:hlinkClick r:id="rId6"/>
               </a:rPr>
-              <a:t>html5demo1.azurewebsites.net/Demo04-NewInputTypes.html</a:t>
+              <a:t>html5demo1.azurewebsites.net/Index.html</a:t>
             </a:r>
             <a:endParaRPr lang="en-CA" dirty="0" smtClean="0"/>
-          </a:p>
-          <a:p>
-            <a:pPr lvl="1"/>
-            <a:endParaRPr lang="en-CA" dirty="0" smtClean="0"/>
-          </a:p>
-          <a:p>
-            <a:endParaRPr lang="en-CA" dirty="0"/>
           </a:p>
         </p:txBody>
       </p:sp>
     </p:spTree>
     <p:extLst>
       <p:ext uri="{BB962C8B-B14F-4D97-AF65-F5344CB8AC3E}">
-        <p14:creationId xmlns:p14="http://schemas.microsoft.com/office/powerpoint/2010/main" val="2257765608"/>
+        <p14:creationId xmlns:p14="http://schemas.microsoft.com/office/powerpoint/2010/main" val="932334811"/>
       </p:ext>
     </p:extLst>
   </p:cSld>
@@ -6151,12 +6082,8 @@
               <a:t>HTML 5 </a:t>
             </a:r>
             <a:r>
-              <a:rPr lang="en-CA" dirty="0" err="1" smtClean="0"/>
-              <a:t>MultiMedia</a:t>
-            </a:r>
-            <a:r>
-              <a:rPr lang="en-CA" dirty="0" smtClean="0"/>
-              <a:t> Enhancements</a:t>
+              <a:rPr lang="en-CA" dirty="0" smtClean="0"/>
+              <a:t>Form Enhancements</a:t>
             </a:r>
             <a:endParaRPr lang="en-CA" dirty="0"/>
           </a:p>
@@ -6183,14 +6110,76 @@
           <a:lstStyle/>
           <a:p>
             <a:r>
-              <a:rPr lang="en-CA" dirty="0" smtClean="0"/>
-              <a:t>New “audio” and “video” tags</a:t>
-            </a:r>
-          </a:p>
-          <a:p>
-            <a:r>
-              <a:rPr lang="en-CA" dirty="0" smtClean="0"/>
-              <a:t>Demo 5</a:t>
+              <a:rPr lang="en-CA" dirty="0"/>
+              <a:t>&lt;input type=</a:t>
+            </a:r>
+          </a:p>
+          <a:p>
+            <a:pPr lvl="1"/>
+            <a:r>
+              <a:rPr lang="en-CA" dirty="0"/>
+              <a:t>Email, </a:t>
+            </a:r>
+            <a:r>
+              <a:rPr lang="en-CA" dirty="0" err="1" smtClean="0"/>
+              <a:t>url</a:t>
+            </a:r>
+            <a:r>
+              <a:rPr lang="en-CA" dirty="0" smtClean="0"/>
+              <a:t>, </a:t>
+            </a:r>
+            <a:r>
+              <a:rPr lang="en-CA" dirty="0"/>
+              <a:t>search, number, date, </a:t>
+            </a:r>
+            <a:r>
+              <a:rPr lang="en-CA" dirty="0" smtClean="0"/>
+              <a:t>time, color</a:t>
+            </a:r>
+            <a:r>
+              <a:rPr lang="en-CA" dirty="0"/>
+              <a:t>, </a:t>
+            </a:r>
+            <a:r>
+              <a:rPr lang="en-CA" dirty="0" err="1"/>
+              <a:t>etc</a:t>
+            </a:r>
+            <a:endParaRPr lang="en-CA" dirty="0"/>
+          </a:p>
+          <a:p>
+            <a:r>
+              <a:rPr lang="en-CA" dirty="0"/>
+              <a:t>New attributes</a:t>
+            </a:r>
+          </a:p>
+          <a:p>
+            <a:pPr lvl="1"/>
+            <a:r>
+              <a:rPr lang="en-CA" dirty="0"/>
+              <a:t>Placeholder, autofocus</a:t>
+            </a:r>
+          </a:p>
+          <a:p>
+            <a:r>
+              <a:rPr lang="en-CA" dirty="0" err="1" smtClean="0"/>
+              <a:t>Contenteditable</a:t>
+            </a:r>
+            <a:endParaRPr lang="en-CA" dirty="0" smtClean="0"/>
+          </a:p>
+          <a:p>
+            <a:r>
+              <a:rPr lang="en-CA" dirty="0" smtClean="0"/>
+              <a:t>Remember sites mentioned previously: </a:t>
+            </a:r>
+            <a:r>
+              <a:rPr lang="en-CA" dirty="0"/>
+              <a:t>Html5test.com, canIuse.com</a:t>
+            </a:r>
+          </a:p>
+          <a:p>
+            <a:r>
+              <a:rPr lang="en-CA" dirty="0" smtClean="0"/>
+              <a:t>Demo 4</a:t>
             </a:r>
           </a:p>
           <a:p>
@@ -6205,15 +6194,8 @@
               <a:rPr lang="en-CA" dirty="0" smtClean="0">
                 <a:hlinkClick r:id="rId2"/>
               </a:rPr>
-              <a:t>html5demo1.azurewebsites.net/Demo05-Multimedia.html</a:t>
-            </a:r>
-            <a:endParaRPr lang="en-CA" dirty="0" smtClean="0"/>
-          </a:p>
-          <a:p>
-            <a:pPr lvl="1"/>
-            <a:endParaRPr lang="en-CA" dirty="0" smtClean="0"/>
-          </a:p>
-          <a:p>
+              <a:t>html5demo1.azurewebsites.net/Demo04-NewInputTypes.html</a:t>
+            </a:r>
             <a:endParaRPr lang="en-CA" dirty="0" smtClean="0"/>
           </a:p>
           <a:p>
@@ -6228,7 +6210,7 @@
     </p:spTree>
     <p:extLst>
       <p:ext uri="{BB962C8B-B14F-4D97-AF65-F5344CB8AC3E}">
-        <p14:creationId xmlns:p14="http://schemas.microsoft.com/office/powerpoint/2010/main" val="2796152035"/>
+        <p14:creationId xmlns:p14="http://schemas.microsoft.com/office/powerpoint/2010/main" val="2257765608"/>
       </p:ext>
     </p:extLst>
   </p:cSld>
@@ -6303,8 +6285,17 @@
           <a:p>
             <a:r>
               <a:rPr lang="en-CA" dirty="0"/>
-              <a:t>Azure</a:t>
-            </a:r>
+              <a:t>HTML 5 </a:t>
+            </a:r>
+            <a:r>
+              <a:rPr lang="en-CA" dirty="0" err="1" smtClean="0"/>
+              <a:t>MultiMedia</a:t>
+            </a:r>
+            <a:r>
+              <a:rPr lang="en-CA" dirty="0" smtClean="0"/>
+              <a:t> Enhancements</a:t>
+            </a:r>
+            <a:endParaRPr lang="en-CA" dirty="0"/>
           </a:p>
         </p:txBody>
       </p:sp>
@@ -6321,163 +6312,50 @@
         <p:spPr>
           <a:xfrm>
             <a:off x="979488" y="1630362"/>
-            <a:ext cx="6697663" cy="4246909"/>
+            <a:ext cx="6697663" cy="4462933"/>
           </a:xfrm>
         </p:spPr>
         <p:txBody>
-          <a:bodyPr>
-            <a:normAutofit fontScale="92500" lnSpcReduction="20000"/>
-          </a:bodyPr>
-          <a:lstStyle/>
-          <a:p>
-            <a:r>
-              <a:rPr lang="en-CA" dirty="0" smtClean="0"/>
-              <a:t>Sessions I attended:</a:t>
-            </a:r>
-            <a:endParaRPr lang="en-CA" dirty="0"/>
+          <a:bodyPr/>
+          <a:lstStyle/>
+          <a:p>
+            <a:r>
+              <a:rPr lang="en-CA" dirty="0" smtClean="0"/>
+              <a:t>New “audio” and “video” tags</a:t>
+            </a:r>
+          </a:p>
+          <a:p>
+            <a:r>
+              <a:rPr lang="en-CA" dirty="0" smtClean="0"/>
+              <a:t>Demo 5</a:t>
+            </a:r>
           </a:p>
           <a:p>
             <a:pPr lvl="1"/>
-            <a:r>
-              <a:rPr lang="en-CA" dirty="0"/>
-              <a:t>Most made reference to it / used </a:t>
-            </a:r>
-            <a:r>
-              <a:rPr lang="en-CA" dirty="0" smtClean="0"/>
-              <a:t>it</a:t>
-            </a:r>
-            <a:endParaRPr lang="en-CA" dirty="0"/>
-          </a:p>
-          <a:p>
-            <a:r>
-              <a:rPr lang="en-CA" dirty="0"/>
-              <a:t>What is it?</a:t>
-            </a:r>
-          </a:p>
-          <a:p>
-            <a:pPr lvl="1"/>
-            <a:r>
-              <a:rPr lang="en-CA" dirty="0"/>
-              <a:t>cloud computing is really doing just-in-time provisioning and </a:t>
-            </a:r>
-            <a:r>
-              <a:rPr lang="en-CA" dirty="0" smtClean="0"/>
-              <a:t>scaling </a:t>
-            </a:r>
-            <a:r>
-              <a:rPr lang="en-CA" dirty="0"/>
-              <a:t>of services, software and solutions delivered as a service on a pool of hardware</a:t>
-            </a:r>
-          </a:p>
-          <a:p>
-            <a:pPr lvl="1"/>
-            <a:r>
-              <a:rPr lang="en-CA" dirty="0"/>
-              <a:t>On demand provisioning</a:t>
-            </a:r>
-          </a:p>
-          <a:p>
-            <a:pPr lvl="1"/>
-            <a:r>
-              <a:rPr lang="en-CA" dirty="0"/>
-              <a:t>scaling resources... example </a:t>
-            </a:r>
-            <a:r>
-              <a:rPr lang="en-CA" dirty="0" smtClean="0"/>
-              <a:t>“tonight </a:t>
-            </a:r>
-            <a:r>
-              <a:rPr lang="en-CA" dirty="0"/>
-              <a:t>I need 10,000 nodes for an hour until batch is </a:t>
-            </a:r>
-            <a:r>
-              <a:rPr lang="en-CA" dirty="0" smtClean="0"/>
-              <a:t>done”</a:t>
-            </a:r>
-            <a:endParaRPr lang="en-CA" dirty="0"/>
-          </a:p>
-          <a:p>
-            <a:pPr lvl="1"/>
-            <a:r>
-              <a:rPr lang="en-CA" dirty="0"/>
-              <a:t>abstraction over </a:t>
-            </a:r>
-            <a:r>
-              <a:rPr lang="en-CA" dirty="0" smtClean="0"/>
-              <a:t>resources</a:t>
-            </a:r>
-          </a:p>
-          <a:p>
-            <a:r>
-              <a:rPr lang="en-CA" dirty="0"/>
-              <a:t>Demo </a:t>
-            </a:r>
-            <a:r>
-              <a:rPr lang="en-CA" dirty="0" smtClean="0"/>
-              <a:t>6</a:t>
-            </a:r>
-            <a:endParaRPr lang="en-CA" dirty="0"/>
-          </a:p>
-          <a:p>
-            <a:pPr lvl="1"/>
-            <a:r>
-              <a:rPr lang="en-CA" dirty="0"/>
-              <a:t>Create a website using </a:t>
-            </a:r>
-            <a:r>
-              <a:rPr lang="en-CA" dirty="0" smtClean="0"/>
-              <a:t>Azure… show other options here</a:t>
-            </a:r>
-          </a:p>
-          <a:p>
-            <a:pPr lvl="2"/>
             <a:r>
               <a:rPr lang="en-CA" dirty="0">
                 <a:hlinkClick r:id="rId2"/>
               </a:rPr>
-              <a:t>https://</a:t>
+              <a:t>http://</a:t>
             </a:r>
             <a:r>
               <a:rPr lang="en-CA" dirty="0" smtClean="0">
                 <a:hlinkClick r:id="rId2"/>
               </a:rPr>
-              <a:t>manage.windowsazure.com</a:t>
+              <a:t>html5demo1.azurewebsites.net/Demo05-Multimedia.html</a:t>
             </a:r>
             <a:endParaRPr lang="en-CA" dirty="0" smtClean="0"/>
           </a:p>
           <a:p>
             <a:pPr lvl="1"/>
-            <a:r>
-              <a:rPr lang="en-CA" dirty="0" smtClean="0"/>
-              <a:t>Link </a:t>
-            </a:r>
-            <a:r>
-              <a:rPr lang="en-CA" dirty="0"/>
-              <a:t>to my </a:t>
-            </a:r>
-            <a:r>
-              <a:rPr lang="en-CA" dirty="0" err="1"/>
-              <a:t>github</a:t>
-            </a:r>
-            <a:r>
-              <a:rPr lang="en-CA" dirty="0"/>
-              <a:t> </a:t>
-            </a:r>
-            <a:r>
-              <a:rPr lang="en-CA" dirty="0" smtClean="0"/>
-              <a:t>repository</a:t>
-            </a:r>
+            <a:endParaRPr lang="en-CA" dirty="0" smtClean="0"/>
+          </a:p>
+          <a:p>
+            <a:endParaRPr lang="en-CA" dirty="0" smtClean="0"/>
           </a:p>
           <a:p>
             <a:pPr lvl="1"/>
-            <a:r>
-              <a:rPr lang="en-CA" dirty="0" smtClean="0"/>
-              <a:t>Create new site and download publish settings for deploying in Visual Studio</a:t>
-            </a:r>
-            <a:endParaRPr lang="en-CA" dirty="0"/>
-          </a:p>
-          <a:p>
-            <a:endParaRPr lang="en-CA" dirty="0"/>
+            <a:endParaRPr lang="en-CA" dirty="0" smtClean="0"/>
           </a:p>
           <a:p>
             <a:endParaRPr lang="en-CA" dirty="0"/>
@@ -6487,7 +6365,7 @@
     </p:spTree>
     <p:extLst>
       <p:ext uri="{BB962C8B-B14F-4D97-AF65-F5344CB8AC3E}">
-        <p14:creationId xmlns:p14="http://schemas.microsoft.com/office/powerpoint/2010/main" val="1419882203"/>
+        <p14:creationId xmlns:p14="http://schemas.microsoft.com/office/powerpoint/2010/main" val="2796152035"/>
       </p:ext>
     </p:extLst>
   </p:cSld>
@@ -6562,7 +6440,7 @@
           <a:p>
             <a:r>
               <a:rPr lang="en-CA" dirty="0"/>
-              <a:t>Mobile</a:t>
+              <a:t>Azure</a:t>
             </a:r>
           </a:p>
         </p:txBody>
@@ -6580,7 +6458,7 @@
         <p:spPr>
           <a:xfrm>
             <a:off x="979488" y="1630362"/>
-            <a:ext cx="6697663" cy="4534941"/>
+            <a:ext cx="6697663" cy="4246909"/>
           </a:xfrm>
         </p:spPr>
         <p:txBody>
@@ -6598,127 +6476,147 @@
           <a:p>
             <a:pPr lvl="1"/>
             <a:r>
+              <a:rPr lang="en-CA" dirty="0"/>
+              <a:t>Most made reference to it / used </a:t>
+            </a:r>
+            <a:r>
+              <a:rPr lang="en-CA" dirty="0" smtClean="0"/>
+              <a:t>it</a:t>
+            </a:r>
+            <a:endParaRPr lang="en-CA" dirty="0"/>
+          </a:p>
+          <a:p>
+            <a:r>
+              <a:rPr lang="en-CA" dirty="0"/>
+              <a:t>What is it?</a:t>
+            </a:r>
+          </a:p>
+          <a:p>
+            <a:pPr lvl="1"/>
+            <a:r>
+              <a:rPr lang="en-CA" dirty="0"/>
+              <a:t>cloud computing is really doing just-in-time provisioning and </a:t>
+            </a:r>
+            <a:r>
+              <a:rPr lang="en-CA" dirty="0" smtClean="0"/>
+              <a:t>scaling </a:t>
+            </a:r>
+            <a:r>
+              <a:rPr lang="en-CA" dirty="0"/>
+              <a:t>of services, software and solutions delivered as a service on a pool of hardware</a:t>
+            </a:r>
+          </a:p>
+          <a:p>
+            <a:pPr lvl="1"/>
+            <a:r>
+              <a:rPr lang="en-CA" dirty="0"/>
+              <a:t>On demand provisioning</a:t>
+            </a:r>
+          </a:p>
+          <a:p>
+            <a:pPr lvl="1"/>
+            <a:r>
+              <a:rPr lang="en-CA" dirty="0"/>
+              <a:t>scaling resources... example </a:t>
+            </a:r>
+            <a:r>
+              <a:rPr lang="en-CA" dirty="0" smtClean="0"/>
+              <a:t>“tonight </a:t>
+            </a:r>
+            <a:r>
+              <a:rPr lang="en-CA" dirty="0"/>
+              <a:t>I need 10,000 nodes for an hour until batch is </a:t>
+            </a:r>
+            <a:r>
+              <a:rPr lang="en-CA" dirty="0" smtClean="0"/>
+              <a:t>done”</a:t>
+            </a:r>
+            <a:endParaRPr lang="en-CA" dirty="0"/>
+          </a:p>
+          <a:p>
+            <a:pPr lvl="1"/>
+            <a:r>
+              <a:rPr lang="en-CA" dirty="0"/>
+              <a:t>abstraction over </a:t>
+            </a:r>
+            <a:r>
+              <a:rPr lang="en-CA" dirty="0" smtClean="0"/>
+              <a:t>resources</a:t>
+            </a:r>
+          </a:p>
+          <a:p>
+            <a:r>
+              <a:rPr lang="en-CA" dirty="0"/>
+              <a:t>Demo </a:t>
+            </a:r>
+            <a:r>
+              <a:rPr lang="en-CA" dirty="0" smtClean="0"/>
+              <a:t>6</a:t>
+            </a:r>
+            <a:endParaRPr lang="en-CA" dirty="0"/>
+          </a:p>
+          <a:p>
+            <a:pPr lvl="1"/>
+            <a:r>
+              <a:rPr lang="en-CA" dirty="0"/>
+              <a:t>Create a website using </a:t>
+            </a:r>
+            <a:r>
+              <a:rPr lang="en-CA" dirty="0" smtClean="0"/>
+              <a:t>Azure… show other options here</a:t>
+            </a:r>
+          </a:p>
+          <a:p>
+            <a:pPr lvl="2"/>
+            <a:r>
               <a:rPr lang="en-CA" dirty="0">
                 <a:hlinkClick r:id="rId2"/>
               </a:rPr>
-              <a:t>VSW8 – MVC4 and </a:t>
-            </a:r>
-            <a:r>
-              <a:rPr lang="en-CA" dirty="0" err="1">
+              <a:t>https://</a:t>
+            </a:r>
+            <a:r>
+              <a:rPr lang="en-CA" dirty="0" smtClean="0">
                 <a:hlinkClick r:id="rId2"/>
               </a:rPr>
-              <a:t>jQuery</a:t>
-            </a:r>
-            <a:r>
-              <a:rPr lang="en-CA" dirty="0">
-                <a:hlinkClick r:id="rId2"/>
-              </a:rPr>
-              <a:t> mobile</a:t>
+              <a:t>manage.windowsazure.com</a:t>
+            </a:r>
+            <a:endParaRPr lang="en-CA" dirty="0" smtClean="0"/>
+          </a:p>
+          <a:p>
+            <a:pPr lvl="1"/>
+            <a:r>
+              <a:rPr lang="en-CA" dirty="0" smtClean="0"/>
+              <a:t>Link </a:t>
+            </a:r>
+            <a:r>
+              <a:rPr lang="en-CA" dirty="0"/>
+              <a:t>to my </a:t>
+            </a:r>
+            <a:r>
+              <a:rPr lang="en-CA" dirty="0" err="1"/>
+              <a:t>github</a:t>
+            </a:r>
+            <a:r>
+              <a:rPr lang="en-CA" dirty="0"/>
+              <a:t> </a:t>
+            </a:r>
+            <a:r>
+              <a:rPr lang="en-CA" dirty="0" smtClean="0"/>
+              <a:t>repository</a:t>
+            </a:r>
+          </a:p>
+          <a:p>
+            <a:pPr lvl="1"/>
+            <a:r>
+              <a:rPr lang="en-CA" dirty="0" smtClean="0"/>
+              <a:t>Create new site and download publish settings for deploying in Visual Studio</a:t>
             </a:r>
             <a:endParaRPr lang="en-CA" dirty="0"/>
           </a:p>
           <a:p>
-            <a:pPr lvl="1"/>
-            <a:r>
-              <a:rPr lang="en-CA" dirty="0">
-                <a:hlinkClick r:id="rId3"/>
-              </a:rPr>
-              <a:t>VST8 – Windows Phone 8 enhancements</a:t>
-            </a:r>
-            <a:r>
-              <a:rPr lang="en-CA" dirty="0"/>
-              <a:t> (was a waste of time)</a:t>
-            </a:r>
-          </a:p>
-          <a:p>
-            <a:r>
-              <a:rPr lang="en-CA" dirty="0" smtClean="0"/>
-              <a:t>Unfortunately </a:t>
-            </a:r>
-            <a:r>
-              <a:rPr lang="en-CA" dirty="0"/>
-              <a:t>not the conference to learn a lot of mobile</a:t>
-            </a:r>
-          </a:p>
-          <a:p>
-            <a:r>
-              <a:rPr lang="en-CA" dirty="0"/>
-              <a:t>Concentration on HTML5 including CSS3 for formatting with mobile in mind</a:t>
-            </a:r>
-          </a:p>
-          <a:p>
-            <a:r>
-              <a:rPr lang="en-CA" dirty="0" smtClean="0"/>
-              <a:t>3 good takeaways</a:t>
-            </a:r>
-          </a:p>
-          <a:p>
-            <a:pPr lvl="1"/>
-            <a:r>
-              <a:rPr lang="en-CA" dirty="0" smtClean="0"/>
-              <a:t>JSON for serialized data for smaller payload</a:t>
-            </a:r>
-          </a:p>
-          <a:p>
-            <a:pPr lvl="1"/>
-            <a:r>
-              <a:rPr lang="en-CA" dirty="0" smtClean="0">
-                <a:hlinkClick r:id="rId4"/>
-              </a:rPr>
-              <a:t>Opera mobile emulator</a:t>
-            </a:r>
-            <a:endParaRPr lang="en-CA" dirty="0" smtClean="0"/>
-          </a:p>
-          <a:p>
-            <a:pPr lvl="1"/>
-            <a:r>
-              <a:rPr lang="en-CA" dirty="0" smtClean="0"/>
-              <a:t>By default, add the below “</a:t>
-            </a:r>
-            <a:r>
-              <a:rPr lang="en-CA" dirty="0" smtClean="0">
-                <a:hlinkClick r:id="rId5"/>
-              </a:rPr>
-              <a:t>viewport</a:t>
-            </a:r>
-            <a:r>
-              <a:rPr lang="en-CA" dirty="0" smtClean="0"/>
-              <a:t>” to all web pages:</a:t>
-            </a:r>
-          </a:p>
-          <a:p>
-            <a:pPr lvl="2"/>
-            <a:r>
-              <a:rPr lang="en-CA" dirty="0" smtClean="0"/>
-              <a:t>&lt;</a:t>
-            </a:r>
-            <a:r>
-              <a:rPr lang="en-CA" dirty="0"/>
-              <a:t>meta name="viewport" content="width=device-width, user-scalable=no"&gt;</a:t>
-            </a:r>
-          </a:p>
-          <a:p>
-            <a:r>
-              <a:rPr lang="en-CA" dirty="0" smtClean="0"/>
-              <a:t>Demo 7</a:t>
-            </a:r>
-          </a:p>
-          <a:p>
-            <a:pPr lvl="1"/>
-            <a:r>
-              <a:rPr lang="en-CA" dirty="0" smtClean="0">
-                <a:hlinkClick r:id="rId6" action="ppaction://hlinkfile"/>
-              </a:rPr>
-              <a:t>Opera mobile emulator</a:t>
-            </a:r>
-            <a:endParaRPr lang="en-CA" dirty="0" smtClean="0"/>
-          </a:p>
-          <a:p>
-            <a:pPr lvl="1"/>
-            <a:r>
-              <a:rPr lang="en-CA" dirty="0" smtClean="0"/>
-              <a:t>Page with and without meta tag</a:t>
-            </a:r>
+            <a:endParaRPr lang="en-CA" dirty="0"/>
+          </a:p>
+          <a:p>
             <a:endParaRPr lang="en-CA" dirty="0"/>
           </a:p>
         </p:txBody>
@@ -6726,7 +6624,7 @@
     </p:spTree>
     <p:extLst>
       <p:ext uri="{BB962C8B-B14F-4D97-AF65-F5344CB8AC3E}">
-        <p14:creationId xmlns:p14="http://schemas.microsoft.com/office/powerpoint/2010/main" val="3103964138"/>
+        <p14:creationId xmlns:p14="http://schemas.microsoft.com/office/powerpoint/2010/main" val="1419882203"/>
       </p:ext>
     </p:extLst>
   </p:cSld>
@@ -6801,13 +6699,8 @@
           <a:p>
             <a:r>
               <a:rPr lang="en-CA" dirty="0"/>
-              <a:t>Trends - </a:t>
-            </a:r>
-            <a:r>
-              <a:rPr lang="en-CA" dirty="0" err="1"/>
-              <a:t>SignalR</a:t>
-            </a:r>
-            <a:endParaRPr lang="en-CA" dirty="0"/>
+              <a:t>Mobile</a:t>
+            </a:r>
           </a:p>
         </p:txBody>
       </p:sp>
@@ -6824,7 +6717,7 @@
         <p:spPr>
           <a:xfrm>
             <a:off x="979488" y="1630362"/>
-            <a:ext cx="6697663" cy="4462933"/>
+            <a:ext cx="6697663" cy="4534941"/>
           </a:xfrm>
         </p:spPr>
         <p:txBody>
@@ -6837,110 +6730,123 @@
               <a:rPr lang="en-CA" dirty="0" smtClean="0"/>
               <a:t>Sessions I attended:</a:t>
             </a:r>
+            <a:endParaRPr lang="en-CA" dirty="0"/>
           </a:p>
           <a:p>
             <a:pPr lvl="1"/>
             <a:r>
-              <a:rPr lang="en-CA" dirty="0" smtClean="0">
+              <a:rPr lang="en-CA" dirty="0">
+                <a:hlinkClick r:id="rId2"/>
+              </a:rPr>
+              <a:t>VSW8 – MVC4 and </a:t>
+            </a:r>
+            <a:r>
+              <a:rPr lang="en-CA" dirty="0" err="1">
+                <a:hlinkClick r:id="rId2"/>
+              </a:rPr>
+              <a:t>jQuery</a:t>
+            </a:r>
+            <a:r>
+              <a:rPr lang="en-CA" dirty="0">
+                <a:hlinkClick r:id="rId2"/>
+              </a:rPr>
+              <a:t> mobile</a:t>
+            </a:r>
+            <a:endParaRPr lang="en-CA" dirty="0"/>
+          </a:p>
+          <a:p>
+            <a:pPr lvl="1"/>
+            <a:r>
+              <a:rPr lang="en-CA" dirty="0">
                 <a:hlinkClick r:id="rId3"/>
               </a:rPr>
-              <a:t>CVTH05 – Real-Time Communications with </a:t>
-            </a:r>
-            <a:r>
-              <a:rPr lang="en-CA" dirty="0" err="1" smtClean="0">
-                <a:hlinkClick r:id="rId3"/>
-              </a:rPr>
-              <a:t>SignalR</a:t>
-            </a:r>
-            <a:r>
-              <a:rPr lang="en-CA" dirty="0" smtClean="0">
-                <a:hlinkClick r:id="rId3"/>
-              </a:rPr>
-              <a:t> And Windows Azure</a:t>
-            </a:r>
-            <a:endParaRPr lang="en-CA" dirty="0" smtClean="0"/>
-          </a:p>
-          <a:p>
-            <a:r>
-              <a:rPr lang="en-CA" dirty="0" smtClean="0"/>
-              <a:t>“</a:t>
+              <a:t>VST8 – Windows Phone 8 enhancements</a:t>
             </a:r>
             <a:r>
               <a:rPr lang="en-CA" dirty="0"/>
-              <a:t>Any sufficiently advanced technology is indistinguishable from magic” – Arthur C. </a:t>
-            </a:r>
-            <a:r>
-              <a:rPr lang="en-CA" dirty="0" smtClean="0"/>
-              <a:t>Clarke</a:t>
-            </a:r>
-          </a:p>
-          <a:p>
-            <a:r>
-              <a:rPr lang="en-CA" dirty="0" smtClean="0"/>
-              <a:t>An </a:t>
+              <a:t> (was a waste of time)</a:t>
+            </a:r>
+          </a:p>
+          <a:p>
+            <a:r>
+              <a:rPr lang="en-CA" dirty="0" smtClean="0"/>
+              <a:t>Unfortunately </a:t>
             </a:r>
             <a:r>
               <a:rPr lang="en-CA" dirty="0"/>
-              <a:t>open source series of libraries that provide an abstraction around persistent HTTP connections</a:t>
-            </a:r>
-          </a:p>
-          <a:p>
-            <a:r>
-              <a:rPr lang="en-CA" dirty="0" smtClean="0"/>
-              <a:t>Makes </a:t>
-            </a:r>
+              <a:t>not the conference to learn a lot of mobile</a:t>
+            </a:r>
+          </a:p>
+          <a:p>
             <a:r>
               <a:rPr lang="en-CA" dirty="0"/>
-              <a:t>real-time HTTP so easy it seems like </a:t>
-            </a:r>
-            <a:r>
-              <a:rPr lang="en-CA" dirty="0" smtClean="0"/>
-              <a:t>“magic”</a:t>
+              <a:t>Concentration on HTML5 including CSS3 for formatting with mobile in mind</a:t>
+            </a:r>
+          </a:p>
+          <a:p>
+            <a:r>
+              <a:rPr lang="en-CA" dirty="0" smtClean="0"/>
+              <a:t>3 good takeaways</a:t>
             </a:r>
           </a:p>
           <a:p>
             <a:pPr lvl="1"/>
             <a:r>
               <a:rPr lang="en-CA" dirty="0" smtClean="0"/>
-              <a:t>Uses HTML 5 </a:t>
-            </a:r>
-            <a:r>
-              <a:rPr lang="en-CA" dirty="0" err="1" smtClean="0"/>
-              <a:t>WebSockets</a:t>
-            </a:r>
-            <a:r>
-              <a:rPr lang="en-CA" dirty="0" smtClean="0"/>
-              <a:t> if available then does fallbacks</a:t>
-            </a:r>
-          </a:p>
-          <a:p>
-            <a:r>
-              <a:rPr lang="en-CA" dirty="0">
-                <a:hlinkClick r:id="rId4"/>
-              </a:rPr>
-              <a:t>http://</a:t>
-            </a:r>
+              <a:t>JSON for serialized data for smaller payload</a:t>
+            </a:r>
+          </a:p>
+          <a:p>
+            <a:pPr lvl="1"/>
             <a:r>
               <a:rPr lang="en-CA" dirty="0" smtClean="0">
                 <a:hlinkClick r:id="rId4"/>
               </a:rPr>
-              <a:t>www.asp.net/signalr/</a:t>
+              <a:t>Opera mobile emulator</a:t>
             </a:r>
             <a:endParaRPr lang="en-CA" dirty="0" smtClean="0"/>
           </a:p>
           <a:p>
-            <a:r>
-              <a:rPr lang="en-CA" dirty="0" smtClean="0"/>
-              <a:t>Demo 8</a:t>
-            </a:r>
-          </a:p>
-          <a:p>
             <a:pPr lvl="1"/>
+            <a:r>
+              <a:rPr lang="en-CA" dirty="0" smtClean="0"/>
+              <a:t>By default, add the below “</a:t>
+            </a:r>
             <a:r>
               <a:rPr lang="en-CA" dirty="0" smtClean="0">
                 <a:hlinkClick r:id="rId5"/>
               </a:rPr>
-              <a:t>Start up demo site on Azure</a:t>
+              <a:t>viewport</a:t>
+            </a:r>
+            <a:r>
+              <a:rPr lang="en-CA" dirty="0" smtClean="0"/>
+              <a:t>” to all web pages:</a:t>
+            </a:r>
+          </a:p>
+          <a:p>
+            <a:pPr lvl="2"/>
+            <a:r>
+              <a:rPr lang="en-CA" dirty="0" smtClean="0"/>
+              <a:t>&lt;</a:t>
+            </a:r>
+            <a:r>
+              <a:rPr lang="en-CA" dirty="0"/>
+              <a:t>meta name="viewport" content="width=device-width, user-scalable=no"&gt;</a:t>
+            </a:r>
+          </a:p>
+          <a:p>
+            <a:r>
+              <a:rPr lang="en-CA" dirty="0" smtClean="0"/>
+              <a:t>Demo 7</a:t>
+            </a:r>
+          </a:p>
+          <a:p>
+            <a:pPr lvl="1"/>
+            <a:r>
+              <a:rPr lang="en-CA" dirty="0" smtClean="0">
+                <a:hlinkClick r:id="rId6" action="ppaction://hlinkfile"/>
+              </a:rPr>
+              <a:t>Opera mobile emulator</a:t>
             </a:r>
             <a:endParaRPr lang="en-CA" dirty="0" smtClean="0"/>
           </a:p>
@@ -6948,31 +6854,8 @@
             <a:pPr lvl="1"/>
             <a:r>
               <a:rPr lang="en-CA" dirty="0" smtClean="0"/>
-              <a:t>2 different demos here:</a:t>
-            </a:r>
-          </a:p>
-          <a:p>
-            <a:pPr lvl="2"/>
-            <a:r>
-              <a:rPr lang="en-CA" dirty="0" err="1" smtClean="0">
-                <a:hlinkClick r:id="rId6"/>
-              </a:rPr>
-              <a:t>HitCounter</a:t>
-            </a:r>
-            <a:endParaRPr lang="en-CA" dirty="0" smtClean="0"/>
-          </a:p>
-          <a:p>
-            <a:pPr lvl="2"/>
-            <a:r>
-              <a:rPr lang="en-CA" dirty="0" smtClean="0">
-                <a:hlinkClick r:id="rId7"/>
-              </a:rPr>
-              <a:t>Chat</a:t>
-            </a:r>
-            <a:endParaRPr lang="en-CA" dirty="0" smtClean="0"/>
-          </a:p>
-          <a:p>
-            <a:pPr lvl="1"/>
+              <a:t>Page with and without meta tag</a:t>
+            </a:r>
             <a:endParaRPr lang="en-CA" dirty="0"/>
           </a:p>
         </p:txBody>
@@ -6980,7 +6863,7 @@
     </p:spTree>
     <p:extLst>
       <p:ext uri="{BB962C8B-B14F-4D97-AF65-F5344CB8AC3E}">
-        <p14:creationId xmlns:p14="http://schemas.microsoft.com/office/powerpoint/2010/main" val="1976493137"/>
+        <p14:creationId xmlns:p14="http://schemas.microsoft.com/office/powerpoint/2010/main" val="3103964138"/>
       </p:ext>
     </p:extLst>
   </p:cSld>
@@ -7055,8 +6938,13 @@
           <a:p>
             <a:r>
               <a:rPr lang="en-CA" dirty="0"/>
-              <a:t>Other observations</a:t>
-            </a:r>
+              <a:t>Trends - </a:t>
+            </a:r>
+            <a:r>
+              <a:rPr lang="en-CA" dirty="0" err="1"/>
+              <a:t>SignalR</a:t>
+            </a:r>
+            <a:endParaRPr lang="en-CA" dirty="0"/>
           </a:p>
         </p:txBody>
       </p:sp>
@@ -7070,102 +6958,158 @@
             <p:ph sz="quarter" idx="13"/>
           </p:nvPr>
         </p:nvSpPr>
-        <p:spPr/>
-        <p:txBody>
-          <a:bodyPr/>
-          <a:lstStyle/>
-          <a:p>
+        <p:spPr>
+          <a:xfrm>
+            <a:off x="979488" y="1630362"/>
+            <a:ext cx="6697663" cy="4462933"/>
+          </a:xfrm>
+        </p:spPr>
+        <p:txBody>
+          <a:bodyPr>
+            <a:normAutofit fontScale="92500" lnSpcReduction="20000"/>
+          </a:bodyPr>
+          <a:lstStyle/>
+          <a:p>
+            <a:r>
+              <a:rPr lang="en-CA" dirty="0" smtClean="0"/>
+              <a:t>Sessions I attended:</a:t>
+            </a:r>
+          </a:p>
+          <a:p>
+            <a:pPr lvl="1"/>
+            <a:r>
+              <a:rPr lang="en-CA" dirty="0" smtClean="0">
+                <a:hlinkClick r:id="rId3"/>
+              </a:rPr>
+              <a:t>CVTH05 – Real-Time Communications with </a:t>
+            </a:r>
             <a:r>
               <a:rPr lang="en-CA" dirty="0" err="1" smtClean="0">
                 <a:hlinkClick r:id="rId3"/>
               </a:rPr>
-              <a:t>Nuget</a:t>
+              <a:t>SignalR</a:t>
+            </a:r>
+            <a:r>
+              <a:rPr lang="en-CA" dirty="0" smtClean="0">
+                <a:hlinkClick r:id="rId3"/>
+              </a:rPr>
+              <a:t> And Windows Azure</a:t>
             </a:r>
             <a:endParaRPr lang="en-CA" dirty="0" smtClean="0"/>
           </a:p>
           <a:p>
+            <a:r>
+              <a:rPr lang="en-CA" dirty="0" smtClean="0"/>
+              <a:t>“</a:t>
+            </a:r>
+            <a:r>
+              <a:rPr lang="en-CA" dirty="0"/>
+              <a:t>Any sufficiently advanced technology is indistinguishable from magic” – Arthur C. </a:t>
+            </a:r>
+            <a:r>
+              <a:rPr lang="en-CA" dirty="0" smtClean="0"/>
+              <a:t>Clarke</a:t>
+            </a:r>
+          </a:p>
+          <a:p>
+            <a:r>
+              <a:rPr lang="en-CA" dirty="0" smtClean="0"/>
+              <a:t>An </a:t>
+            </a:r>
+            <a:r>
+              <a:rPr lang="en-CA" dirty="0"/>
+              <a:t>open source series of libraries that provide an abstraction around persistent HTTP connections</a:t>
+            </a:r>
+          </a:p>
+          <a:p>
+            <a:r>
+              <a:rPr lang="en-CA" dirty="0" smtClean="0"/>
+              <a:t>Makes </a:t>
+            </a:r>
+            <a:r>
+              <a:rPr lang="en-CA" dirty="0"/>
+              <a:t>real-time HTTP so easy it seems like </a:t>
+            </a:r>
+            <a:r>
+              <a:rPr lang="en-CA" dirty="0" smtClean="0"/>
+              <a:t>“magic”</a:t>
+            </a:r>
+          </a:p>
+          <a:p>
             <a:pPr lvl="1"/>
             <a:r>
               <a:rPr lang="en-CA" dirty="0" smtClean="0"/>
-              <a:t>Visual Studio add-in to import in external resources easily</a:t>
-            </a:r>
-          </a:p>
-          <a:p>
+              <a:t>Uses HTML 5 </a:t>
+            </a:r>
+            <a:r>
+              <a:rPr lang="en-CA" dirty="0" err="1" smtClean="0"/>
+              <a:t>WebSockets</a:t>
+            </a:r>
+            <a:r>
+              <a:rPr lang="en-CA" dirty="0" smtClean="0"/>
+              <a:t> if available then does fallbacks</a:t>
+            </a:r>
+          </a:p>
+          <a:p>
+            <a:r>
+              <a:rPr lang="en-CA" dirty="0">
+                <a:hlinkClick r:id="rId4"/>
+              </a:rPr>
+              <a:t>http://</a:t>
+            </a:r>
             <a:r>
               <a:rPr lang="en-CA" dirty="0" smtClean="0">
                 <a:hlinkClick r:id="rId4"/>
               </a:rPr>
-              <a:t>Git</a:t>
+              <a:t>www.asp.net/signalr/</a:t>
             </a:r>
             <a:endParaRPr lang="en-CA" dirty="0" smtClean="0"/>
           </a:p>
           <a:p>
+            <a:r>
+              <a:rPr lang="en-CA" dirty="0" smtClean="0"/>
+              <a:t>Demo 8</a:t>
+            </a:r>
+          </a:p>
+          <a:p>
             <a:pPr lvl="1"/>
-            <a:r>
-              <a:rPr lang="en-CA" dirty="0" err="1" smtClean="0">
-                <a:hlinkClick r:id="rId5"/>
-              </a:rPr>
-              <a:t>Cvs</a:t>
-            </a:r>
             <a:r>
               <a:rPr lang="en-CA" dirty="0" smtClean="0">
                 <a:hlinkClick r:id="rId5"/>
               </a:rPr>
-              <a:t> -&gt; </a:t>
-            </a:r>
+              <a:t>Start up demo site on Azure</a:t>
+            </a:r>
+            <a:endParaRPr lang="en-CA" dirty="0" smtClean="0"/>
+          </a:p>
+          <a:p>
+            <a:pPr lvl="1"/>
+            <a:r>
+              <a:rPr lang="en-CA" dirty="0" smtClean="0"/>
+              <a:t>2 different demos here:</a:t>
+            </a:r>
+          </a:p>
+          <a:p>
+            <a:pPr lvl="2"/>
             <a:r>
               <a:rPr lang="en-CA" dirty="0" err="1" smtClean="0">
-                <a:hlinkClick r:id="rId5"/>
-              </a:rPr>
-              <a:t>svn</a:t>
-            </a:r>
-            <a:r>
-              <a:rPr lang="en-CA" dirty="0" smtClean="0">
-                <a:hlinkClick r:id="rId5"/>
-              </a:rPr>
-              <a:t> -&gt; git</a:t>
-            </a:r>
-            <a:endParaRPr lang="en-CA" dirty="0"/>
-          </a:p>
-          <a:p>
-            <a:r>
-              <a:rPr lang="en-CA" dirty="0" smtClean="0">
                 <a:hlinkClick r:id="rId6"/>
               </a:rPr>
-              <a:t>Bit.ly</a:t>
+              <a:t>HitCounter</a:t>
             </a:r>
             <a:endParaRPr lang="en-CA" dirty="0" smtClean="0"/>
           </a:p>
           <a:p>
-            <a:pPr lvl="1"/>
-            <a:r>
-              <a:rPr lang="en-CA" dirty="0" smtClean="0"/>
-              <a:t>Less and less people using tinyurl.com</a:t>
-            </a:r>
-            <a:endParaRPr lang="en-CA" dirty="0"/>
-          </a:p>
-          <a:p>
-            <a:r>
-              <a:rPr lang="en-CA" dirty="0"/>
-              <a:t>“</a:t>
-            </a:r>
-            <a:r>
-              <a:rPr lang="en-CA" dirty="0">
+            <a:pPr lvl="2"/>
+            <a:r>
+              <a:rPr lang="en-CA" dirty="0" smtClean="0">
                 <a:hlinkClick r:id="rId7"/>
               </a:rPr>
-              <a:t>Big data</a:t>
-            </a:r>
-            <a:r>
-              <a:rPr lang="en-CA" dirty="0"/>
-              <a:t>” still in </a:t>
-            </a:r>
-            <a:r>
-              <a:rPr lang="en-CA" dirty="0" smtClean="0"/>
-              <a:t>infancy (IMO)</a:t>
-            </a:r>
-            <a:endParaRPr lang="en-CA" dirty="0"/>
-          </a:p>
-          <a:p>
+              <a:t>Chat</a:t>
+            </a:r>
+            <a:endParaRPr lang="en-CA" dirty="0" smtClean="0"/>
+          </a:p>
+          <a:p>
+            <a:pPr lvl="1"/>
             <a:endParaRPr lang="en-CA" dirty="0"/>
           </a:p>
         </p:txBody>
@@ -7173,7 +7117,7 @@
     </p:spTree>
     <p:extLst>
       <p:ext uri="{BB962C8B-B14F-4D97-AF65-F5344CB8AC3E}">
-        <p14:creationId xmlns:p14="http://schemas.microsoft.com/office/powerpoint/2010/main" val="1108212067"/>
+        <p14:creationId xmlns:p14="http://schemas.microsoft.com/office/powerpoint/2010/main" val="1976493137"/>
       </p:ext>
     </p:extLst>
   </p:cSld>
@@ -7243,140 +7187,122 @@
         </p:nvSpPr>
         <p:spPr/>
         <p:txBody>
-          <a:bodyPr>
-            <a:normAutofit fontScale="90000"/>
-          </a:bodyPr>
-          <a:lstStyle/>
-          <a:p>
-            <a:r>
-              <a:rPr lang="en-CA" dirty="0" smtClean="0"/>
-              <a:t>Missing from presentation / not enough time</a:t>
+          <a:bodyPr/>
+          <a:lstStyle/>
+          <a:p>
+            <a:r>
+              <a:rPr lang="en-CA" dirty="0"/>
+              <a:t>Other observations</a:t>
+            </a:r>
+          </a:p>
+        </p:txBody>
+      </p:sp>
+      <p:sp>
+        <p:nvSpPr>
+          <p:cNvPr id="4" name="Content Placeholder 3"/>
+          <p:cNvSpPr>
+            <a:spLocks noGrp="1"/>
+          </p:cNvSpPr>
+          <p:nvPr>
+            <p:ph sz="quarter" idx="13"/>
+          </p:nvPr>
+        </p:nvSpPr>
+        <p:spPr/>
+        <p:txBody>
+          <a:bodyPr/>
+          <a:lstStyle/>
+          <a:p>
+            <a:r>
+              <a:rPr lang="en-CA" dirty="0" err="1" smtClean="0">
+                <a:hlinkClick r:id="rId3"/>
+              </a:rPr>
+              <a:t>Nuget</a:t>
+            </a:r>
+            <a:endParaRPr lang="en-CA" dirty="0" smtClean="0"/>
+          </a:p>
+          <a:p>
+            <a:pPr lvl="1"/>
+            <a:r>
+              <a:rPr lang="en-CA" dirty="0" smtClean="0"/>
+              <a:t>Visual Studio add-in to import in external resources easily</a:t>
+            </a:r>
+          </a:p>
+          <a:p>
+            <a:r>
+              <a:rPr lang="en-CA" dirty="0" smtClean="0">
+                <a:hlinkClick r:id="rId4"/>
+              </a:rPr>
+              <a:t>Git</a:t>
+            </a:r>
+            <a:endParaRPr lang="en-CA" dirty="0" smtClean="0"/>
+          </a:p>
+          <a:p>
+            <a:pPr lvl="1"/>
+            <a:r>
+              <a:rPr lang="en-CA" dirty="0" err="1" smtClean="0">
+                <a:hlinkClick r:id="rId5"/>
+              </a:rPr>
+              <a:t>Cvs</a:t>
+            </a:r>
+            <a:r>
+              <a:rPr lang="en-CA" dirty="0" smtClean="0">
+                <a:hlinkClick r:id="rId5"/>
+              </a:rPr>
+              <a:t> -&gt; </a:t>
+            </a:r>
+            <a:r>
+              <a:rPr lang="en-CA" dirty="0" err="1" smtClean="0">
+                <a:hlinkClick r:id="rId5"/>
+              </a:rPr>
+              <a:t>svn</a:t>
+            </a:r>
+            <a:r>
+              <a:rPr lang="en-CA" dirty="0" smtClean="0">
+                <a:hlinkClick r:id="rId5"/>
+              </a:rPr>
+              <a:t> -&gt; git</a:t>
             </a:r>
             <a:endParaRPr lang="en-CA" dirty="0"/>
           </a:p>
-        </p:txBody>
-      </p:sp>
-      <p:sp>
-        <p:nvSpPr>
-          <p:cNvPr id="4" name="Content Placeholder 3"/>
-          <p:cNvSpPr>
-            <a:spLocks noGrp="1"/>
-          </p:cNvSpPr>
-          <p:nvPr>
-            <p:ph sz="quarter" idx="13"/>
-          </p:nvPr>
-        </p:nvSpPr>
-        <p:spPr>
-          <a:xfrm>
-            <a:off x="979488" y="1630362"/>
-            <a:ext cx="6697663" cy="4534941"/>
-          </a:xfrm>
-        </p:spPr>
-        <p:txBody>
-          <a:bodyPr>
-            <a:normAutofit lnSpcReduction="10000"/>
-          </a:bodyPr>
-          <a:lstStyle/>
-          <a:p>
-            <a:r>
-              <a:rPr lang="en-CA" dirty="0" smtClean="0"/>
-              <a:t>Azure… just touched on it</a:t>
-            </a:r>
-          </a:p>
-          <a:p>
-            <a:r>
-              <a:rPr lang="en-CA" dirty="0" smtClean="0"/>
-              <a:t>CSS 3... For example: media queries</a:t>
-            </a:r>
-          </a:p>
-          <a:p>
-            <a:r>
-              <a:rPr lang="en-CA" dirty="0" smtClean="0"/>
-              <a:t>“Big Data”</a:t>
-            </a:r>
-          </a:p>
-          <a:p>
-            <a:r>
-              <a:rPr lang="en-CA" dirty="0" err="1" smtClean="0"/>
-              <a:t>Modernizr</a:t>
-            </a:r>
-            <a:r>
-              <a:rPr lang="en-CA" dirty="0" smtClean="0"/>
-              <a:t>… only mentioned it, didn’t really show it</a:t>
-            </a:r>
-          </a:p>
-          <a:p>
-            <a:r>
-              <a:rPr lang="en-CA" dirty="0" smtClean="0"/>
-              <a:t>Other HTML 5 features</a:t>
-            </a:r>
+          <a:p>
+            <a:r>
+              <a:rPr lang="en-CA" dirty="0" smtClean="0">
+                <a:hlinkClick r:id="rId6"/>
+              </a:rPr>
+              <a:t>Bit.ly</a:t>
+            </a:r>
+            <a:endParaRPr lang="en-CA" dirty="0" smtClean="0"/>
           </a:p>
           <a:p>
             <a:pPr lvl="1"/>
             <a:r>
               <a:rPr lang="en-CA" dirty="0" smtClean="0"/>
-              <a:t>More </a:t>
-            </a:r>
-            <a:r>
-              <a:rPr lang="en-CA" dirty="0" err="1" smtClean="0"/>
-              <a:t>MultiMedia</a:t>
-            </a:r>
-            <a:r>
-              <a:rPr lang="en-CA" dirty="0" smtClean="0"/>
-              <a:t> capabilities (i.e. Video and Audio)</a:t>
-            </a:r>
-          </a:p>
-          <a:p>
-            <a:pPr lvl="2"/>
-            <a:r>
-              <a:rPr lang="en-CA" dirty="0" smtClean="0"/>
-              <a:t>Ex. Closed captioning</a:t>
-            </a:r>
-          </a:p>
-          <a:p>
-            <a:pPr lvl="1"/>
-            <a:r>
-              <a:rPr lang="en-CA" dirty="0" smtClean="0"/>
-              <a:t>Storage</a:t>
-            </a:r>
-          </a:p>
-          <a:p>
-            <a:pPr lvl="1"/>
-            <a:r>
-              <a:rPr lang="en-CA" dirty="0" smtClean="0"/>
-              <a:t>Offline</a:t>
-            </a:r>
-          </a:p>
-          <a:p>
-            <a:pPr lvl="1"/>
-            <a:r>
-              <a:rPr lang="en-CA" dirty="0" err="1" smtClean="0"/>
-              <a:t>Geolocation</a:t>
-            </a:r>
-            <a:endParaRPr lang="en-CA" dirty="0" smtClean="0"/>
-          </a:p>
-          <a:p>
-            <a:pPr lvl="1"/>
-            <a:r>
-              <a:rPr lang="en-CA" dirty="0" smtClean="0"/>
-              <a:t>Canvas</a:t>
-            </a:r>
-          </a:p>
-          <a:p>
-            <a:pPr lvl="1"/>
-            <a:r>
-              <a:rPr lang="en-CA" dirty="0" smtClean="0"/>
-              <a:t>SVG</a:t>
-            </a:r>
-          </a:p>
-          <a:p>
-            <a:pPr lvl="1"/>
-            <a:r>
-              <a:rPr lang="en-CA" dirty="0" err="1" smtClean="0">
-                <a:hlinkClick r:id="rId2"/>
+              <a:t>Less and less people using tinyurl.com</a:t>
+            </a:r>
+            <a:endParaRPr lang="en-CA" dirty="0"/>
+          </a:p>
+          <a:p>
+            <a:r>
+              <a:rPr lang="en-CA" dirty="0"/>
+              <a:t>“</a:t>
+            </a:r>
+            <a:r>
+              <a:rPr lang="en-CA" dirty="0">
+                <a:hlinkClick r:id="rId7"/>
               </a:rPr>
-              <a:t>etc</a:t>
-            </a:r>
+              <a:t>Big data</a:t>
+            </a:r>
+            <a:r>
+              <a:rPr lang="en-CA" dirty="0"/>
+              <a:t>” still in </a:t>
+            </a:r>
+            <a:r>
+              <a:rPr lang="en-CA" dirty="0" smtClean="0"/>
+              <a:t>infancy (IMO)</a:t>
+            </a:r>
+            <a:endParaRPr lang="en-CA" dirty="0"/>
+          </a:p>
+          <a:p>
             <a:endParaRPr lang="en-CA" dirty="0"/>
           </a:p>
         </p:txBody>
@@ -7384,13 +7310,20 @@
     </p:spTree>
     <p:extLst>
       <p:ext uri="{BB962C8B-B14F-4D97-AF65-F5344CB8AC3E}">
-        <p14:creationId xmlns:p14="http://schemas.microsoft.com/office/powerpoint/2010/main" val="4134665322"/>
+        <p14:creationId xmlns:p14="http://schemas.microsoft.com/office/powerpoint/2010/main" val="1108212067"/>
       </p:ext>
     </p:extLst>
   </p:cSld>
   <p:clrMapOvr>
     <a:masterClrMapping/>
   </p:clrMapOvr>
+  <p:timing>
+    <p:tnLst>
+      <p:par>
+        <p:cTn id="1" dur="indefinite" restart="never" nodeType="tmRoot"/>
+      </p:par>
+    </p:tnLst>
+  </p:timing>
 </p:sld>
 </file>
 
@@ -7430,6 +7363,210 @@
               <a:rPr lang="en-US" smtClean="0"/>
               <a:pPr/>
               <a:t>17</a:t>
+            </a:fld>
+            <a:endParaRPr lang="en-US"/>
+          </a:p>
+        </p:txBody>
+      </p:sp>
+      <p:sp>
+        <p:nvSpPr>
+          <p:cNvPr id="3" name="Title 2"/>
+          <p:cNvSpPr>
+            <a:spLocks noGrp="1"/>
+          </p:cNvSpPr>
+          <p:nvPr>
+            <p:ph type="title"/>
+          </p:nvPr>
+        </p:nvSpPr>
+        <p:spPr/>
+        <p:txBody>
+          <a:bodyPr>
+            <a:normAutofit fontScale="90000"/>
+          </a:bodyPr>
+          <a:lstStyle/>
+          <a:p>
+            <a:r>
+              <a:rPr lang="en-CA" dirty="0" smtClean="0"/>
+              <a:t>Missing from presentation / not enough time</a:t>
+            </a:r>
+            <a:endParaRPr lang="en-CA" dirty="0"/>
+          </a:p>
+        </p:txBody>
+      </p:sp>
+      <p:sp>
+        <p:nvSpPr>
+          <p:cNvPr id="4" name="Content Placeholder 3"/>
+          <p:cNvSpPr>
+            <a:spLocks noGrp="1"/>
+          </p:cNvSpPr>
+          <p:nvPr>
+            <p:ph sz="quarter" idx="13"/>
+          </p:nvPr>
+        </p:nvSpPr>
+        <p:spPr>
+          <a:xfrm>
+            <a:off x="979488" y="1630362"/>
+            <a:ext cx="6697663" cy="4534941"/>
+          </a:xfrm>
+        </p:spPr>
+        <p:txBody>
+          <a:bodyPr>
+            <a:normAutofit lnSpcReduction="10000"/>
+          </a:bodyPr>
+          <a:lstStyle/>
+          <a:p>
+            <a:r>
+              <a:rPr lang="en-CA" dirty="0" smtClean="0"/>
+              <a:t>Azure… just touched on it</a:t>
+            </a:r>
+          </a:p>
+          <a:p>
+            <a:r>
+              <a:rPr lang="en-CA" dirty="0" smtClean="0"/>
+              <a:t>CSS 3... For example: media queries</a:t>
+            </a:r>
+          </a:p>
+          <a:p>
+            <a:r>
+              <a:rPr lang="en-CA" dirty="0" smtClean="0"/>
+              <a:t>“Big Data”</a:t>
+            </a:r>
+          </a:p>
+          <a:p>
+            <a:r>
+              <a:rPr lang="en-CA" dirty="0" err="1" smtClean="0"/>
+              <a:t>Modernizr</a:t>
+            </a:r>
+            <a:r>
+              <a:rPr lang="en-CA" dirty="0" smtClean="0"/>
+              <a:t>… only mentioned it, didn’t really show it</a:t>
+            </a:r>
+          </a:p>
+          <a:p>
+            <a:r>
+              <a:rPr lang="en-CA" dirty="0" smtClean="0"/>
+              <a:t>Other HTML 5 features</a:t>
+            </a:r>
+          </a:p>
+          <a:p>
+            <a:pPr lvl="1"/>
+            <a:r>
+              <a:rPr lang="en-CA" dirty="0" smtClean="0"/>
+              <a:t>More </a:t>
+            </a:r>
+            <a:r>
+              <a:rPr lang="en-CA" dirty="0" err="1" smtClean="0"/>
+              <a:t>MultiMedia</a:t>
+            </a:r>
+            <a:r>
+              <a:rPr lang="en-CA" dirty="0" smtClean="0"/>
+              <a:t> capabilities (i.e. Video and Audio)</a:t>
+            </a:r>
+          </a:p>
+          <a:p>
+            <a:pPr lvl="2"/>
+            <a:r>
+              <a:rPr lang="en-CA" dirty="0" smtClean="0"/>
+              <a:t>Ex. Closed captioning</a:t>
+            </a:r>
+          </a:p>
+          <a:p>
+            <a:pPr lvl="1"/>
+            <a:r>
+              <a:rPr lang="en-CA" dirty="0" smtClean="0"/>
+              <a:t>Storage</a:t>
+            </a:r>
+          </a:p>
+          <a:p>
+            <a:pPr lvl="1"/>
+            <a:r>
+              <a:rPr lang="en-CA" dirty="0" smtClean="0"/>
+              <a:t>Offline</a:t>
+            </a:r>
+          </a:p>
+          <a:p>
+            <a:pPr lvl="1"/>
+            <a:r>
+              <a:rPr lang="en-CA" dirty="0" err="1" smtClean="0"/>
+              <a:t>Geolocation</a:t>
+            </a:r>
+            <a:endParaRPr lang="en-CA" dirty="0" smtClean="0"/>
+          </a:p>
+          <a:p>
+            <a:pPr lvl="1"/>
+            <a:r>
+              <a:rPr lang="en-CA" dirty="0" smtClean="0"/>
+              <a:t>Canvas</a:t>
+            </a:r>
+          </a:p>
+          <a:p>
+            <a:pPr lvl="1"/>
+            <a:r>
+              <a:rPr lang="en-CA" dirty="0" smtClean="0"/>
+              <a:t>SVG</a:t>
+            </a:r>
+          </a:p>
+          <a:p>
+            <a:pPr lvl="1"/>
+            <a:r>
+              <a:rPr lang="en-CA" dirty="0" err="1" smtClean="0">
+                <a:hlinkClick r:id="rId2"/>
+              </a:rPr>
+              <a:t>etc</a:t>
+            </a:r>
+            <a:endParaRPr lang="en-CA" dirty="0"/>
+          </a:p>
+        </p:txBody>
+      </p:sp>
+    </p:spTree>
+    <p:extLst>
+      <p:ext uri="{BB962C8B-B14F-4D97-AF65-F5344CB8AC3E}">
+        <p14:creationId xmlns:p14="http://schemas.microsoft.com/office/powerpoint/2010/main" val="4134665322"/>
+      </p:ext>
+    </p:extLst>
+  </p:cSld>
+  <p:clrMapOvr>
+    <a:masterClrMapping/>
+  </p:clrMapOvr>
+</p:sld>
+</file>
+
+<file path=ppt/slides/slide19.xml><?xml version="1.0" encoding="utf-8"?>
+<p:sld xmlns:a="http://schemas.openxmlformats.org/drawingml/2006/main" xmlns:r="http://schemas.openxmlformats.org/officeDocument/2006/relationships" xmlns:p="http://schemas.openxmlformats.org/presentationml/2006/main">
+  <p:cSld>
+    <p:spTree>
+      <p:nvGrpSpPr>
+        <p:cNvPr id="1" name=""/>
+        <p:cNvGrpSpPr/>
+        <p:nvPr/>
+      </p:nvGrpSpPr>
+      <p:grpSpPr>
+        <a:xfrm>
+          <a:off x="0" y="0"/>
+          <a:ext cx="0" cy="0"/>
+          <a:chOff x="0" y="0"/>
+          <a:chExt cx="0" cy="0"/>
+        </a:xfrm>
+      </p:grpSpPr>
+      <p:sp>
+        <p:nvSpPr>
+          <p:cNvPr id="2" name="Slide Number Placeholder 1"/>
+          <p:cNvSpPr>
+            <a:spLocks noGrp="1"/>
+          </p:cNvSpPr>
+          <p:nvPr>
+            <p:ph type="sldNum" sz="quarter" idx="12"/>
+          </p:nvPr>
+        </p:nvSpPr>
+        <p:spPr/>
+        <p:txBody>
+          <a:bodyPr/>
+          <a:lstStyle/>
+          <a:p>
+            <a:fld id="{1D72EBF8-7CF5-44B7-B2BF-E22DE4D0703D}" type="slidenum">
+              <a:rPr lang="en-US" smtClean="0"/>
+              <a:pPr/>
+              <a:t>18</a:t>
             </a:fld>
             <a:endParaRPr lang="en-US"/>
           </a:p>
@@ -7978,155 +8115,1031 @@
           <a:lstStyle/>
           <a:p>
             <a:r>
-              <a:rPr lang="en-CA" dirty="0"/>
-              <a:t>What I learnt – HTML 5</a:t>
-            </a:r>
-          </a:p>
-        </p:txBody>
-      </p:sp>
-      <p:sp>
-        <p:nvSpPr>
-          <p:cNvPr id="4" name="Content Placeholder 3"/>
-          <p:cNvSpPr>
-            <a:spLocks noGrp="1"/>
-          </p:cNvSpPr>
-          <p:nvPr>
-            <p:ph sz="quarter" idx="13"/>
-          </p:nvPr>
+              <a:rPr lang="en-US" dirty="0" smtClean="0"/>
+              <a:t>What I learnt – A Visual</a:t>
+            </a:r>
+            <a:endParaRPr lang="en-CA" dirty="0"/>
+          </a:p>
+        </p:txBody>
+      </p:sp>
+      <p:sp>
+        <p:nvSpPr>
+          <p:cNvPr id="5" name="Oval 4"/>
+          <p:cNvSpPr/>
+          <p:nvPr/>
         </p:nvSpPr>
         <p:spPr>
           <a:xfrm>
-            <a:off x="979488" y="1630362"/>
-            <a:ext cx="6697663" cy="4390925"/>
+            <a:off x="2699792" y="2204864"/>
+            <a:ext cx="3672408" cy="2736304"/>
           </a:xfrm>
+          <a:prstGeom prst="ellipse">
+            <a:avLst/>
+          </a:prstGeom>
+          <a:solidFill>
+            <a:schemeClr val="accent1">
+              <a:lumMod val="20000"/>
+              <a:lumOff val="80000"/>
+            </a:schemeClr>
+          </a:solidFill>
+          <a:ln>
+            <a:solidFill>
+              <a:schemeClr val="tx2">
+                <a:lumMod val="10000"/>
+                <a:lumOff val="90000"/>
+              </a:schemeClr>
+            </a:solidFill>
+          </a:ln>
         </p:spPr>
-        <p:txBody>
-          <a:bodyPr>
-            <a:normAutofit lnSpcReduction="10000"/>
+        <p:style>
+          <a:lnRef idx="2">
+            <a:schemeClr val="accent1">
+              <a:shade val="50000"/>
+            </a:schemeClr>
+          </a:lnRef>
+          <a:fillRef idx="1">
+            <a:schemeClr val="accent1"/>
+          </a:fillRef>
+          <a:effectRef idx="0">
+            <a:schemeClr val="accent1"/>
+          </a:effectRef>
+          <a:fontRef idx="minor">
+            <a:schemeClr val="lt1"/>
+          </a:fontRef>
+        </p:style>
+        <p:txBody>
+          <a:bodyPr rtlCol="0" anchor="ctr"/>
+          <a:lstStyle/>
+          <a:p>
+            <a:pPr algn="ctr"/>
+            <a:endParaRPr lang="en-CA"/>
+          </a:p>
+        </p:txBody>
+      </p:sp>
+      <p:sp>
+        <p:nvSpPr>
+          <p:cNvPr id="6" name="TextBox 5"/>
+          <p:cNvSpPr txBox="1"/>
+          <p:nvPr/>
+        </p:nvSpPr>
+        <p:spPr>
+          <a:xfrm>
+            <a:off x="4031940" y="2312903"/>
+            <a:ext cx="1008112" cy="369332"/>
+          </a:xfrm>
+          <a:prstGeom prst="rect">
+            <a:avLst/>
+          </a:prstGeom>
+          <a:noFill/>
+        </p:spPr>
+        <p:txBody>
+          <a:bodyPr wrap="square" rtlCol="0">
+            <a:spAutoFit/>
           </a:bodyPr>
           <a:lstStyle/>
           <a:p>
             <a:r>
-              <a:rPr lang="en-CA" dirty="0"/>
-              <a:t>Sessions I attended:</a:t>
-            </a:r>
-          </a:p>
-          <a:p>
-            <a:pPr lvl="1"/>
-            <a:r>
-              <a:rPr lang="en-CA" dirty="0">
-                <a:hlinkClick r:id="rId3"/>
+              <a:rPr lang="en-US" dirty="0" smtClean="0"/>
+              <a:t>HTML 5</a:t>
+            </a:r>
+            <a:endParaRPr lang="en-CA" dirty="0"/>
+          </a:p>
+        </p:txBody>
+      </p:sp>
+      <p:sp>
+        <p:nvSpPr>
+          <p:cNvPr id="7" name="Oval 6"/>
+          <p:cNvSpPr/>
+          <p:nvPr/>
+        </p:nvSpPr>
+        <p:spPr>
+          <a:xfrm>
+            <a:off x="3203848" y="2924944"/>
+            <a:ext cx="648072" cy="360040"/>
+          </a:xfrm>
+          <a:prstGeom prst="ellipse">
+            <a:avLst/>
+          </a:prstGeom>
+        </p:spPr>
+        <p:style>
+          <a:lnRef idx="2">
+            <a:schemeClr val="accent1">
+              <a:shade val="50000"/>
+            </a:schemeClr>
+          </a:lnRef>
+          <a:fillRef idx="1">
+            <a:schemeClr val="accent1"/>
+          </a:fillRef>
+          <a:effectRef idx="0">
+            <a:schemeClr val="accent1"/>
+          </a:effectRef>
+          <a:fontRef idx="minor">
+            <a:schemeClr val="lt1"/>
+          </a:fontRef>
+        </p:style>
+        <p:txBody>
+          <a:bodyPr rtlCol="0" anchor="ctr"/>
+          <a:lstStyle/>
+          <a:p>
+            <a:pPr algn="ctr"/>
+            <a:r>
+              <a:rPr lang="en-US" sz="800" dirty="0" smtClean="0">
+                <a:solidFill>
+                  <a:schemeClr val="tx1"/>
+                </a:solidFill>
               </a:rPr>
-              <a:t>CVM3 – Workshop HTML5 – Cloud: Reach Everyone, Everywhere</a:t>
-            </a:r>
+              <a:t>CSS3</a:t>
+            </a:r>
+            <a:endParaRPr lang="en-CA" sz="800" dirty="0">
+              <a:solidFill>
+                <a:schemeClr val="tx1"/>
+              </a:solidFill>
+            </a:endParaRPr>
+          </a:p>
+        </p:txBody>
+      </p:sp>
+      <p:sp>
+        <p:nvSpPr>
+          <p:cNvPr id="8" name="Oval 7"/>
+          <p:cNvSpPr/>
+          <p:nvPr/>
+        </p:nvSpPr>
+        <p:spPr>
+          <a:xfrm>
+            <a:off x="4211960" y="2754996"/>
+            <a:ext cx="828092" cy="360040"/>
+          </a:xfrm>
+          <a:prstGeom prst="ellipse">
+            <a:avLst/>
+          </a:prstGeom>
+        </p:spPr>
+        <p:style>
+          <a:lnRef idx="2">
+            <a:schemeClr val="accent1">
+              <a:shade val="50000"/>
+            </a:schemeClr>
+          </a:lnRef>
+          <a:fillRef idx="1">
+            <a:schemeClr val="accent1"/>
+          </a:fillRef>
+          <a:effectRef idx="0">
+            <a:schemeClr val="accent1"/>
+          </a:effectRef>
+          <a:fontRef idx="minor">
+            <a:schemeClr val="lt1"/>
+          </a:fontRef>
+        </p:style>
+        <p:txBody>
+          <a:bodyPr rtlCol="0" anchor="ctr"/>
+          <a:lstStyle/>
+          <a:p>
+            <a:pPr algn="ctr"/>
+            <a:r>
+              <a:rPr lang="en-US" sz="800" dirty="0" smtClean="0">
+                <a:solidFill>
+                  <a:schemeClr val="tx1"/>
+                </a:solidFill>
+              </a:rPr>
+              <a:t>&lt;audio&gt;</a:t>
+            </a:r>
+            <a:endParaRPr lang="en-CA" sz="800" dirty="0">
+              <a:solidFill>
+                <a:schemeClr val="tx1"/>
+              </a:solidFill>
+            </a:endParaRPr>
+          </a:p>
+        </p:txBody>
+      </p:sp>
+      <p:sp>
+        <p:nvSpPr>
+          <p:cNvPr id="9" name="Oval 8"/>
+          <p:cNvSpPr/>
+          <p:nvPr/>
+        </p:nvSpPr>
+        <p:spPr>
+          <a:xfrm>
+            <a:off x="5194512" y="2769723"/>
+            <a:ext cx="828092" cy="360040"/>
+          </a:xfrm>
+          <a:prstGeom prst="ellipse">
+            <a:avLst/>
+          </a:prstGeom>
+        </p:spPr>
+        <p:style>
+          <a:lnRef idx="2">
+            <a:schemeClr val="accent1">
+              <a:shade val="50000"/>
+            </a:schemeClr>
+          </a:lnRef>
+          <a:fillRef idx="1">
+            <a:schemeClr val="accent1"/>
+          </a:fillRef>
+          <a:effectRef idx="0">
+            <a:schemeClr val="accent1"/>
+          </a:effectRef>
+          <a:fontRef idx="minor">
+            <a:schemeClr val="lt1"/>
+          </a:fontRef>
+        </p:style>
+        <p:txBody>
+          <a:bodyPr rtlCol="0" anchor="ctr"/>
+          <a:lstStyle/>
+          <a:p>
+            <a:pPr algn="ctr"/>
+            <a:r>
+              <a:rPr lang="en-US" sz="800" dirty="0" smtClean="0">
+                <a:solidFill>
+                  <a:schemeClr val="tx1"/>
+                </a:solidFill>
+              </a:rPr>
+              <a:t>&lt;video&gt;</a:t>
+            </a:r>
+            <a:endParaRPr lang="en-CA" sz="800" dirty="0">
+              <a:solidFill>
+                <a:schemeClr val="tx1"/>
+              </a:solidFill>
+            </a:endParaRPr>
+          </a:p>
+        </p:txBody>
+      </p:sp>
+      <p:sp>
+        <p:nvSpPr>
+          <p:cNvPr id="10" name="Oval 9"/>
+          <p:cNvSpPr/>
+          <p:nvPr/>
+        </p:nvSpPr>
+        <p:spPr>
+          <a:xfrm>
+            <a:off x="2843808" y="3519964"/>
+            <a:ext cx="828092" cy="360040"/>
+          </a:xfrm>
+          <a:prstGeom prst="ellipse">
+            <a:avLst/>
+          </a:prstGeom>
+        </p:spPr>
+        <p:style>
+          <a:lnRef idx="2">
+            <a:schemeClr val="accent1">
+              <a:shade val="50000"/>
+            </a:schemeClr>
+          </a:lnRef>
+          <a:fillRef idx="1">
+            <a:schemeClr val="accent1"/>
+          </a:fillRef>
+          <a:effectRef idx="0">
+            <a:schemeClr val="accent1"/>
+          </a:effectRef>
+          <a:fontRef idx="minor">
+            <a:schemeClr val="lt1"/>
+          </a:fontRef>
+        </p:style>
+        <p:txBody>
+          <a:bodyPr rtlCol="0" anchor="ctr"/>
+          <a:lstStyle/>
+          <a:p>
+            <a:pPr algn="ctr"/>
+            <a:r>
+              <a:rPr lang="en-US" sz="800" dirty="0" smtClean="0">
+                <a:solidFill>
+                  <a:schemeClr val="tx1"/>
+                </a:solidFill>
+              </a:rPr>
+              <a:t>&lt;canvas&gt;</a:t>
+            </a:r>
+            <a:endParaRPr lang="en-CA" sz="800" dirty="0">
+              <a:solidFill>
+                <a:schemeClr val="tx1"/>
+              </a:solidFill>
+            </a:endParaRPr>
+          </a:p>
+        </p:txBody>
+      </p:sp>
+      <p:sp>
+        <p:nvSpPr>
+          <p:cNvPr id="11" name="Oval 10"/>
+          <p:cNvSpPr/>
+          <p:nvPr/>
+        </p:nvSpPr>
+        <p:spPr>
+          <a:xfrm>
+            <a:off x="4932040" y="4005064"/>
+            <a:ext cx="828092" cy="648072"/>
+          </a:xfrm>
+          <a:prstGeom prst="ellipse">
+            <a:avLst/>
+          </a:prstGeom>
+        </p:spPr>
+        <p:style>
+          <a:lnRef idx="2">
+            <a:schemeClr val="accent1">
+              <a:shade val="50000"/>
+            </a:schemeClr>
+          </a:lnRef>
+          <a:fillRef idx="1">
+            <a:schemeClr val="accent1"/>
+          </a:fillRef>
+          <a:effectRef idx="0">
+            <a:schemeClr val="accent1"/>
+          </a:effectRef>
+          <a:fontRef idx="minor">
+            <a:schemeClr val="lt1"/>
+          </a:fontRef>
+        </p:style>
+        <p:txBody>
+          <a:bodyPr rtlCol="0" anchor="ctr"/>
+          <a:lstStyle/>
+          <a:p>
+            <a:pPr algn="ctr"/>
+            <a:r>
+              <a:rPr lang="en-US" sz="800" dirty="0" smtClean="0">
+                <a:solidFill>
+                  <a:schemeClr val="tx1"/>
+                </a:solidFill>
+              </a:rPr>
+              <a:t>Semantic tags</a:t>
+            </a:r>
+            <a:endParaRPr lang="en-CA" sz="800" dirty="0">
+              <a:solidFill>
+                <a:schemeClr val="tx1"/>
+              </a:solidFill>
+            </a:endParaRPr>
+          </a:p>
+        </p:txBody>
+      </p:sp>
+      <p:sp>
+        <p:nvSpPr>
+          <p:cNvPr id="12" name="Oval 11"/>
+          <p:cNvSpPr/>
+          <p:nvPr/>
+        </p:nvSpPr>
+        <p:spPr>
+          <a:xfrm>
+            <a:off x="5076056" y="3432041"/>
+            <a:ext cx="946548" cy="288032"/>
+          </a:xfrm>
+          <a:prstGeom prst="ellipse">
+            <a:avLst/>
+          </a:prstGeom>
+        </p:spPr>
+        <p:style>
+          <a:lnRef idx="2">
+            <a:schemeClr val="accent1">
+              <a:shade val="50000"/>
+            </a:schemeClr>
+          </a:lnRef>
+          <a:fillRef idx="1">
+            <a:schemeClr val="accent1"/>
+          </a:fillRef>
+          <a:effectRef idx="0">
+            <a:schemeClr val="accent1"/>
+          </a:effectRef>
+          <a:fontRef idx="minor">
+            <a:schemeClr val="lt1"/>
+          </a:fontRef>
+        </p:style>
+        <p:txBody>
+          <a:bodyPr rtlCol="0" anchor="ctr"/>
+          <a:lstStyle/>
+          <a:p>
+            <a:pPr algn="ctr"/>
+            <a:r>
+              <a:rPr lang="en-US" sz="800" dirty="0" err="1" smtClean="0">
+                <a:solidFill>
+                  <a:schemeClr val="tx1"/>
+                </a:solidFill>
+              </a:rPr>
+              <a:t>Modernizr</a:t>
+            </a:r>
+            <a:endParaRPr lang="en-CA" sz="800" dirty="0">
+              <a:solidFill>
+                <a:schemeClr val="tx1"/>
+              </a:solidFill>
+            </a:endParaRPr>
+          </a:p>
+        </p:txBody>
+      </p:sp>
+      <p:sp>
+        <p:nvSpPr>
+          <p:cNvPr id="14" name="Oval 13"/>
+          <p:cNvSpPr/>
+          <p:nvPr/>
+        </p:nvSpPr>
+        <p:spPr>
+          <a:xfrm>
+            <a:off x="3347864" y="4005064"/>
+            <a:ext cx="1278142" cy="720080"/>
+          </a:xfrm>
+          <a:prstGeom prst="ellipse">
+            <a:avLst/>
+          </a:prstGeom>
+        </p:spPr>
+        <p:style>
+          <a:lnRef idx="2">
+            <a:schemeClr val="accent1">
+              <a:shade val="50000"/>
+            </a:schemeClr>
+          </a:lnRef>
+          <a:fillRef idx="1">
+            <a:schemeClr val="accent1"/>
+          </a:fillRef>
+          <a:effectRef idx="0">
+            <a:schemeClr val="accent1"/>
+          </a:effectRef>
+          <a:fontRef idx="minor">
+            <a:schemeClr val="lt1"/>
+          </a:fontRef>
+        </p:style>
+        <p:txBody>
+          <a:bodyPr rtlCol="0" anchor="ctr"/>
+          <a:lstStyle/>
+          <a:p>
+            <a:pPr algn="ctr"/>
+            <a:r>
+              <a:rPr lang="en-US" sz="800" dirty="0" smtClean="0">
+                <a:solidFill>
+                  <a:schemeClr val="tx1"/>
+                </a:solidFill>
+              </a:rPr>
+              <a:t>&lt;form&gt; enhancements</a:t>
+            </a:r>
+            <a:endParaRPr lang="en-CA" sz="800" dirty="0">
+              <a:solidFill>
+                <a:schemeClr val="tx1"/>
+              </a:solidFill>
+            </a:endParaRPr>
+          </a:p>
+        </p:txBody>
+      </p:sp>
+      <p:sp>
+        <p:nvSpPr>
+          <p:cNvPr id="15" name="Oval 14"/>
+          <p:cNvSpPr/>
+          <p:nvPr/>
+        </p:nvSpPr>
+        <p:spPr>
+          <a:xfrm>
+            <a:off x="4211960" y="3392996"/>
+            <a:ext cx="504056" cy="360040"/>
+          </a:xfrm>
+          <a:prstGeom prst="ellipse">
+            <a:avLst/>
+          </a:prstGeom>
+        </p:spPr>
+        <p:style>
+          <a:lnRef idx="2">
+            <a:schemeClr val="accent1">
+              <a:shade val="50000"/>
+            </a:schemeClr>
+          </a:lnRef>
+          <a:fillRef idx="1">
+            <a:schemeClr val="accent1"/>
+          </a:fillRef>
+          <a:effectRef idx="0">
+            <a:schemeClr val="accent1"/>
+          </a:effectRef>
+          <a:fontRef idx="minor">
+            <a:schemeClr val="lt1"/>
+          </a:fontRef>
+        </p:style>
+        <p:txBody>
+          <a:bodyPr rtlCol="0" anchor="ctr"/>
+          <a:lstStyle/>
+          <a:p>
+            <a:pPr algn="ctr"/>
+            <a:r>
+              <a:rPr lang="en-US" sz="800" dirty="0" err="1" smtClean="0">
+                <a:solidFill>
+                  <a:schemeClr val="tx1"/>
+                </a:solidFill>
+              </a:rPr>
+              <a:t>svg</a:t>
+            </a:r>
+            <a:endParaRPr lang="en-CA" sz="800" dirty="0">
+              <a:solidFill>
+                <a:schemeClr val="tx1"/>
+              </a:solidFill>
+            </a:endParaRPr>
+          </a:p>
+        </p:txBody>
+      </p:sp>
+      <p:sp>
+        <p:nvSpPr>
+          <p:cNvPr id="16" name="Oval 15"/>
+          <p:cNvSpPr/>
+          <p:nvPr/>
+        </p:nvSpPr>
+        <p:spPr>
+          <a:xfrm>
+            <a:off x="6372200" y="1916832"/>
+            <a:ext cx="936104" cy="580737"/>
+          </a:xfrm>
+          <a:prstGeom prst="ellipse">
+            <a:avLst/>
+          </a:prstGeom>
+        </p:spPr>
+        <p:style>
+          <a:lnRef idx="2">
+            <a:schemeClr val="accent1">
+              <a:shade val="50000"/>
+            </a:schemeClr>
+          </a:lnRef>
+          <a:fillRef idx="1">
+            <a:schemeClr val="accent1"/>
+          </a:fillRef>
+          <a:effectRef idx="0">
+            <a:schemeClr val="accent1"/>
+          </a:effectRef>
+          <a:fontRef idx="minor">
+            <a:schemeClr val="lt1"/>
+          </a:fontRef>
+        </p:style>
+        <p:txBody>
+          <a:bodyPr rtlCol="0" anchor="ctr"/>
+          <a:lstStyle/>
+          <a:p>
+            <a:pPr algn="ctr"/>
+            <a:r>
+              <a:rPr lang="en-US" sz="1000" dirty="0" smtClean="0">
+                <a:solidFill>
+                  <a:schemeClr val="tx1"/>
+                </a:solidFill>
+              </a:rPr>
+              <a:t>Big Data</a:t>
+            </a:r>
+            <a:endParaRPr lang="en-CA" sz="1000" dirty="0">
+              <a:solidFill>
+                <a:schemeClr val="tx1"/>
+              </a:solidFill>
+            </a:endParaRPr>
+          </a:p>
+        </p:txBody>
+      </p:sp>
+      <p:sp>
+        <p:nvSpPr>
+          <p:cNvPr id="19" name="Oval 18"/>
+          <p:cNvSpPr/>
+          <p:nvPr/>
+        </p:nvSpPr>
+        <p:spPr>
+          <a:xfrm>
+            <a:off x="6571328" y="3045586"/>
+            <a:ext cx="1097016" cy="654398"/>
+          </a:xfrm>
+          <a:prstGeom prst="ellipse">
+            <a:avLst/>
+          </a:prstGeom>
+        </p:spPr>
+        <p:style>
+          <a:lnRef idx="2">
+            <a:schemeClr val="accent1">
+              <a:shade val="50000"/>
+            </a:schemeClr>
+          </a:lnRef>
+          <a:fillRef idx="1">
+            <a:schemeClr val="accent1"/>
+          </a:fillRef>
+          <a:effectRef idx="0">
+            <a:schemeClr val="accent1"/>
+          </a:effectRef>
+          <a:fontRef idx="minor">
+            <a:schemeClr val="lt1"/>
+          </a:fontRef>
+        </p:style>
+        <p:txBody>
+          <a:bodyPr rtlCol="0" anchor="ctr"/>
+          <a:lstStyle/>
+          <a:p>
+            <a:pPr algn="ctr"/>
+            <a:r>
+              <a:rPr lang="en-US" sz="1000" dirty="0" smtClean="0">
+                <a:solidFill>
+                  <a:schemeClr val="tx1"/>
+                </a:solidFill>
+              </a:rPr>
+              <a:t>SharePoint</a:t>
+            </a:r>
+            <a:endParaRPr lang="en-CA" sz="1000" dirty="0">
+              <a:solidFill>
+                <a:schemeClr val="tx1"/>
+              </a:solidFill>
+            </a:endParaRPr>
+          </a:p>
+        </p:txBody>
+      </p:sp>
+      <p:sp>
+        <p:nvSpPr>
+          <p:cNvPr id="21" name="Oval 20"/>
+          <p:cNvSpPr/>
+          <p:nvPr/>
+        </p:nvSpPr>
+        <p:spPr>
+          <a:xfrm>
+            <a:off x="6558771" y="4221089"/>
+            <a:ext cx="677525" cy="360039"/>
+          </a:xfrm>
+          <a:prstGeom prst="ellipse">
+            <a:avLst/>
+          </a:prstGeom>
+        </p:spPr>
+        <p:style>
+          <a:lnRef idx="2">
+            <a:schemeClr val="accent1">
+              <a:shade val="50000"/>
+            </a:schemeClr>
+          </a:lnRef>
+          <a:fillRef idx="1">
+            <a:schemeClr val="accent1"/>
+          </a:fillRef>
+          <a:effectRef idx="0">
+            <a:schemeClr val="accent1"/>
+          </a:effectRef>
+          <a:fontRef idx="minor">
+            <a:schemeClr val="lt1"/>
+          </a:fontRef>
+        </p:style>
+        <p:txBody>
+          <a:bodyPr rtlCol="0" anchor="ctr"/>
+          <a:lstStyle/>
+          <a:p>
+            <a:pPr algn="ctr"/>
+            <a:r>
+              <a:rPr lang="en-US" sz="800" dirty="0" err="1" smtClean="0">
+                <a:solidFill>
+                  <a:schemeClr val="tx1"/>
+                </a:solidFill>
+              </a:rPr>
+              <a:t>OAuth</a:t>
+            </a:r>
+            <a:endParaRPr lang="en-CA" sz="800" dirty="0">
+              <a:solidFill>
+                <a:schemeClr val="tx1"/>
+              </a:solidFill>
+            </a:endParaRPr>
+          </a:p>
+        </p:txBody>
+      </p:sp>
+      <p:sp>
+        <p:nvSpPr>
+          <p:cNvPr id="22" name="Oval 21"/>
+          <p:cNvSpPr/>
+          <p:nvPr/>
+        </p:nvSpPr>
+        <p:spPr>
+          <a:xfrm>
+            <a:off x="5346086" y="5085184"/>
+            <a:ext cx="882098" cy="360040"/>
+          </a:xfrm>
+          <a:prstGeom prst="ellipse">
+            <a:avLst/>
+          </a:prstGeom>
+        </p:spPr>
+        <p:style>
+          <a:lnRef idx="2">
+            <a:schemeClr val="accent1">
+              <a:shade val="50000"/>
+            </a:schemeClr>
+          </a:lnRef>
+          <a:fillRef idx="1">
+            <a:schemeClr val="accent1"/>
+          </a:fillRef>
+          <a:effectRef idx="0">
+            <a:schemeClr val="accent1"/>
+          </a:effectRef>
+          <a:fontRef idx="minor">
+            <a:schemeClr val="lt1"/>
+          </a:fontRef>
+        </p:style>
+        <p:txBody>
+          <a:bodyPr rtlCol="0" anchor="ctr"/>
+          <a:lstStyle/>
+          <a:p>
+            <a:pPr algn="ctr"/>
+            <a:r>
+              <a:rPr lang="en-US" sz="800" dirty="0" err="1" smtClean="0">
+                <a:solidFill>
+                  <a:schemeClr val="tx1"/>
+                </a:solidFill>
+              </a:rPr>
+              <a:t>jQuery</a:t>
+            </a:r>
+            <a:r>
+              <a:rPr lang="en-US" sz="800" dirty="0" smtClean="0">
+                <a:solidFill>
+                  <a:schemeClr val="tx1"/>
+                </a:solidFill>
+              </a:rPr>
+              <a:t> mobile</a:t>
+            </a:r>
+            <a:endParaRPr lang="en-CA" sz="800" dirty="0">
+              <a:solidFill>
+                <a:schemeClr val="tx1"/>
+              </a:solidFill>
+            </a:endParaRPr>
+          </a:p>
+        </p:txBody>
+      </p:sp>
+      <p:sp>
+        <p:nvSpPr>
+          <p:cNvPr id="23" name="Oval 22"/>
+          <p:cNvSpPr/>
+          <p:nvPr/>
+        </p:nvSpPr>
+        <p:spPr>
+          <a:xfrm>
+            <a:off x="2979376" y="5085184"/>
+            <a:ext cx="1097016" cy="654398"/>
+          </a:xfrm>
+          <a:prstGeom prst="ellipse">
+            <a:avLst/>
+          </a:prstGeom>
+        </p:spPr>
+        <p:style>
+          <a:lnRef idx="2">
+            <a:schemeClr val="accent1">
+              <a:shade val="50000"/>
+            </a:schemeClr>
+          </a:lnRef>
+          <a:fillRef idx="1">
+            <a:schemeClr val="accent1"/>
+          </a:fillRef>
+          <a:effectRef idx="0">
+            <a:schemeClr val="accent1"/>
+          </a:effectRef>
+          <a:fontRef idx="minor">
+            <a:schemeClr val="lt1"/>
+          </a:fontRef>
+        </p:style>
+        <p:txBody>
+          <a:bodyPr rtlCol="0" anchor="ctr"/>
+          <a:lstStyle/>
+          <a:p>
+            <a:pPr algn="ctr"/>
+            <a:r>
+              <a:rPr lang="en-US" sz="1000" dirty="0" smtClean="0">
+                <a:solidFill>
+                  <a:schemeClr val="tx1"/>
+                </a:solidFill>
+              </a:rPr>
+              <a:t>SQL Server 2012 New Features</a:t>
+            </a:r>
+            <a:endParaRPr lang="en-CA" sz="1000" dirty="0">
+              <a:solidFill>
+                <a:schemeClr val="tx1"/>
+              </a:solidFill>
+            </a:endParaRPr>
+          </a:p>
+        </p:txBody>
+      </p:sp>
+      <p:sp>
+        <p:nvSpPr>
+          <p:cNvPr id="25" name="Oval 24"/>
+          <p:cNvSpPr/>
+          <p:nvPr/>
+        </p:nvSpPr>
+        <p:spPr>
+          <a:xfrm>
+            <a:off x="1691680" y="4361941"/>
+            <a:ext cx="799444" cy="582390"/>
+          </a:xfrm>
+          <a:prstGeom prst="ellipse">
+            <a:avLst/>
+          </a:prstGeom>
+        </p:spPr>
+        <p:style>
+          <a:lnRef idx="2">
+            <a:schemeClr val="accent1">
+              <a:shade val="50000"/>
+            </a:schemeClr>
+          </a:lnRef>
+          <a:fillRef idx="1">
+            <a:schemeClr val="accent1"/>
+          </a:fillRef>
+          <a:effectRef idx="0">
+            <a:schemeClr val="accent1"/>
+          </a:effectRef>
+          <a:fontRef idx="minor">
+            <a:schemeClr val="lt1"/>
+          </a:fontRef>
+        </p:style>
+        <p:txBody>
+          <a:bodyPr rtlCol="0" anchor="ctr"/>
+          <a:lstStyle/>
+          <a:p>
+            <a:pPr algn="ctr"/>
+            <a:r>
+              <a:rPr lang="en-US" sz="1000" dirty="0" err="1" smtClean="0">
+                <a:solidFill>
+                  <a:schemeClr val="tx1"/>
+                </a:solidFill>
+              </a:rPr>
+              <a:t>SignalR</a:t>
+            </a:r>
+            <a:endParaRPr lang="en-CA" sz="1000" dirty="0">
+              <a:solidFill>
+                <a:schemeClr val="tx1"/>
+              </a:solidFill>
+            </a:endParaRPr>
+          </a:p>
+        </p:txBody>
+      </p:sp>
+      <p:sp>
+        <p:nvSpPr>
+          <p:cNvPr id="27" name="Oval 26"/>
+          <p:cNvSpPr/>
+          <p:nvPr/>
+        </p:nvSpPr>
+        <p:spPr>
+          <a:xfrm>
+            <a:off x="549700" y="1936622"/>
+            <a:ext cx="1952104" cy="1666202"/>
+          </a:xfrm>
+          <a:prstGeom prst="ellipse">
+            <a:avLst/>
+          </a:prstGeom>
+          <a:solidFill>
+            <a:schemeClr val="accent1">
+              <a:lumMod val="20000"/>
+              <a:lumOff val="80000"/>
+            </a:schemeClr>
+          </a:solidFill>
+          <a:ln>
+            <a:solidFill>
+              <a:schemeClr val="tx2">
+                <a:lumMod val="10000"/>
+                <a:lumOff val="90000"/>
+              </a:schemeClr>
+            </a:solidFill>
+          </a:ln>
+        </p:spPr>
+        <p:style>
+          <a:lnRef idx="2">
+            <a:schemeClr val="accent1">
+              <a:shade val="50000"/>
+            </a:schemeClr>
+          </a:lnRef>
+          <a:fillRef idx="1">
+            <a:schemeClr val="accent1"/>
+          </a:fillRef>
+          <a:effectRef idx="0">
+            <a:schemeClr val="accent1"/>
+          </a:effectRef>
+          <a:fontRef idx="minor">
+            <a:schemeClr val="lt1"/>
+          </a:fontRef>
+        </p:style>
+        <p:txBody>
+          <a:bodyPr rtlCol="0" anchor="ctr"/>
+          <a:lstStyle/>
+          <a:p>
+            <a:pPr algn="ctr"/>
             <a:endParaRPr lang="en-CA" dirty="0"/>
           </a:p>
-          <a:p>
-            <a:pPr lvl="1"/>
-            <a:r>
-              <a:rPr lang="en-CA" dirty="0">
-                <a:hlinkClick r:id="rId4"/>
+        </p:txBody>
+      </p:sp>
+      <p:sp>
+        <p:nvSpPr>
+          <p:cNvPr id="28" name="TextBox 27"/>
+          <p:cNvSpPr txBox="1"/>
+          <p:nvPr/>
+        </p:nvSpPr>
+        <p:spPr>
+          <a:xfrm>
+            <a:off x="1134782" y="2112875"/>
+            <a:ext cx="781940" cy="369332"/>
+          </a:xfrm>
+          <a:prstGeom prst="rect">
+            <a:avLst/>
+          </a:prstGeom>
+          <a:noFill/>
+        </p:spPr>
+        <p:txBody>
+          <a:bodyPr wrap="square" rtlCol="0">
+            <a:spAutoFit/>
+          </a:bodyPr>
+          <a:lstStyle/>
+          <a:p>
+            <a:r>
+              <a:rPr lang="en-US" dirty="0" smtClean="0"/>
+              <a:t>Azure</a:t>
+            </a:r>
+            <a:endParaRPr lang="en-CA" dirty="0"/>
+          </a:p>
+        </p:txBody>
+      </p:sp>
+      <p:sp>
+        <p:nvSpPr>
+          <p:cNvPr id="29" name="Oval 28"/>
+          <p:cNvSpPr/>
+          <p:nvPr/>
+        </p:nvSpPr>
+        <p:spPr>
+          <a:xfrm>
+            <a:off x="683568" y="2502833"/>
+            <a:ext cx="1097016" cy="654398"/>
+          </a:xfrm>
+          <a:prstGeom prst="ellipse">
+            <a:avLst/>
+          </a:prstGeom>
+        </p:spPr>
+        <p:style>
+          <a:lnRef idx="2">
+            <a:schemeClr val="accent1">
+              <a:shade val="50000"/>
+            </a:schemeClr>
+          </a:lnRef>
+          <a:fillRef idx="1">
+            <a:schemeClr val="accent1"/>
+          </a:fillRef>
+          <a:effectRef idx="0">
+            <a:schemeClr val="accent1"/>
+          </a:effectRef>
+          <a:fontRef idx="minor">
+            <a:schemeClr val="lt1"/>
+          </a:fontRef>
+        </p:style>
+        <p:txBody>
+          <a:bodyPr rtlCol="0" anchor="ctr"/>
+          <a:lstStyle/>
+          <a:p>
+            <a:pPr algn="ctr"/>
+            <a:r>
+              <a:rPr lang="en-US" sz="1000" dirty="0" smtClean="0">
+                <a:solidFill>
+                  <a:schemeClr val="tx1"/>
+                </a:solidFill>
               </a:rPr>
-              <a:t>VSW9 – HTML5 Forms</a:t>
-            </a:r>
-            <a:endParaRPr lang="en-CA" dirty="0"/>
-          </a:p>
-          <a:p>
-            <a:pPr lvl="1"/>
-            <a:r>
-              <a:rPr lang="en-CA" dirty="0">
-                <a:hlinkClick r:id="rId5"/>
+              <a:t>Websites</a:t>
+            </a:r>
+            <a:endParaRPr lang="en-CA" sz="1000" dirty="0">
+              <a:solidFill>
+                <a:schemeClr val="tx1"/>
+              </a:solidFill>
+            </a:endParaRPr>
+          </a:p>
+        </p:txBody>
+      </p:sp>
+      <p:sp>
+        <p:nvSpPr>
+          <p:cNvPr id="31" name="Oval 30"/>
+          <p:cNvSpPr/>
+          <p:nvPr/>
+        </p:nvSpPr>
+        <p:spPr>
+          <a:xfrm>
+            <a:off x="1725897" y="2394957"/>
+            <a:ext cx="677525" cy="360039"/>
+          </a:xfrm>
+          <a:prstGeom prst="ellipse">
+            <a:avLst/>
+          </a:prstGeom>
+        </p:spPr>
+        <p:style>
+          <a:lnRef idx="2">
+            <a:schemeClr val="accent1">
+              <a:shade val="50000"/>
+            </a:schemeClr>
+          </a:lnRef>
+          <a:fillRef idx="1">
+            <a:schemeClr val="accent1"/>
+          </a:fillRef>
+          <a:effectRef idx="0">
+            <a:schemeClr val="accent1"/>
+          </a:effectRef>
+          <a:fontRef idx="minor">
+            <a:schemeClr val="lt1"/>
+          </a:fontRef>
+        </p:style>
+        <p:txBody>
+          <a:bodyPr rtlCol="0" anchor="ctr"/>
+          <a:lstStyle/>
+          <a:p>
+            <a:pPr algn="ctr"/>
+            <a:r>
+              <a:rPr lang="en-US" sz="800" dirty="0" smtClean="0">
+                <a:solidFill>
+                  <a:schemeClr val="tx1"/>
+                </a:solidFill>
               </a:rPr>
-              <a:t>VSW13 – HTML5 Everywhere</a:t>
-            </a:r>
-            <a:endParaRPr lang="en-CA" dirty="0"/>
-          </a:p>
-          <a:p>
-            <a:r>
-              <a:rPr lang="en-CA" dirty="0" smtClean="0"/>
-              <a:t>Wee bit of history</a:t>
-            </a:r>
-            <a:r>
-              <a:rPr lang="en-CA" dirty="0"/>
-              <a:t>: </a:t>
-            </a:r>
-            <a:endParaRPr lang="en-CA" dirty="0" smtClean="0"/>
-          </a:p>
-          <a:p>
-            <a:pPr lvl="1"/>
-            <a:r>
-              <a:rPr lang="en-CA" dirty="0" smtClean="0"/>
-              <a:t>HTML </a:t>
-            </a:r>
-            <a:r>
-              <a:rPr lang="en-CA" dirty="0"/>
-              <a:t>(1991), HTML2 (1994), HTML3 (1995), HTML3.2 &amp; 4 (1997), XHTML1 (2000), AJAX (2005), HTML5 (2007)</a:t>
-            </a:r>
-          </a:p>
-          <a:p>
-            <a:r>
-              <a:rPr lang="en-CA" dirty="0"/>
-              <a:t>W3C wanted XHTML 2, browser groups wanted HTML 5… so they created </a:t>
-            </a:r>
-            <a:r>
-              <a:rPr lang="en-CA" dirty="0" smtClean="0">
-                <a:hlinkClick r:id="rId6"/>
-              </a:rPr>
-              <a:t>WHATWG</a:t>
-            </a:r>
-            <a:r>
-              <a:rPr lang="en-CA" baseline="30000" dirty="0" smtClean="0"/>
-              <a:t>1</a:t>
-            </a:r>
-            <a:r>
-              <a:rPr lang="en-CA" dirty="0" smtClean="0"/>
-              <a:t>.</a:t>
-            </a:r>
-          </a:p>
-          <a:p>
-            <a:r>
-              <a:rPr lang="en-CA" dirty="0" smtClean="0"/>
-              <a:t>W3C’s XHTML 2 ultimately died on July 2, 2009</a:t>
-            </a:r>
-          </a:p>
-          <a:p>
-            <a:r>
-              <a:rPr lang="en-CA" dirty="0" smtClean="0"/>
-              <a:t>WHATWG survived</a:t>
-            </a:r>
-          </a:p>
-          <a:p>
-            <a:r>
-              <a:rPr lang="en-CA" dirty="0" smtClean="0"/>
-              <a:t>WHATWG gave </a:t>
-            </a:r>
-            <a:r>
-              <a:rPr lang="en-CA" dirty="0"/>
-              <a:t>W3C permission to publish HTML 5… so really are 2 “specs” out there</a:t>
-            </a:r>
-          </a:p>
-          <a:p>
-            <a:endParaRPr lang="en-CA" dirty="0"/>
+              <a:t>Other…</a:t>
+            </a:r>
+            <a:endParaRPr lang="en-CA" sz="800" dirty="0">
+              <a:solidFill>
+                <a:schemeClr val="tx1"/>
+              </a:solidFill>
+            </a:endParaRPr>
           </a:p>
         </p:txBody>
       </p:sp>
     </p:spTree>
     <p:extLst>
       <p:ext uri="{BB962C8B-B14F-4D97-AF65-F5344CB8AC3E}">
-        <p14:creationId xmlns:p14="http://schemas.microsoft.com/office/powerpoint/2010/main" val="3288918414"/>
+        <p14:creationId xmlns:p14="http://schemas.microsoft.com/office/powerpoint/2010/main" val="2099669088"/>
       </p:ext>
     </p:extLst>
   </p:cSld>
   <p:clrMapOvr>
     <a:masterClrMapping/>
   </p:clrMapOvr>
-  <p:timing>
-    <p:tnLst>
-      <p:par>
-        <p:cTn id="1" dur="indefinite" restart="never" nodeType="tmRoot"/>
-      </p:par>
-    </p:tnLst>
-  </p:timing>
 </p:sld>
 </file>
 
@@ -8188,7 +9201,7 @@
           <a:p>
             <a:r>
               <a:rPr lang="en-CA" dirty="0"/>
-              <a:t>HTML 5 (cont’d)</a:t>
+              <a:t>What I learnt – HTML 5</a:t>
             </a:r>
           </a:p>
         </p:txBody>
@@ -8206,129 +9219,82 @@
         <p:spPr>
           <a:xfrm>
             <a:off x="979488" y="1630362"/>
-            <a:ext cx="6697663" cy="4318917"/>
+            <a:ext cx="6697663" cy="4390925"/>
           </a:xfrm>
         </p:spPr>
         <p:txBody>
           <a:bodyPr>
-            <a:normAutofit fontScale="92500"/>
+            <a:normAutofit lnSpcReduction="10000"/>
           </a:bodyPr>
           <a:lstStyle/>
           <a:p>
             <a:r>
               <a:rPr lang="en-CA" dirty="0"/>
-              <a:t>Apple’s affect:</a:t>
+              <a:t>Sessions I attended:</a:t>
             </a:r>
           </a:p>
           <a:p>
             <a:pPr lvl="1"/>
-            <a:r>
-              <a:rPr lang="en-CA" dirty="0"/>
-              <a:t>“</a:t>
-            </a:r>
             <a:r>
               <a:rPr lang="en-CA" dirty="0">
                 <a:hlinkClick r:id="rId3"/>
               </a:rPr>
-              <a:t>The world is moving to HTML 5</a:t>
-            </a:r>
-            <a:r>
-              <a:rPr lang="en-CA" dirty="0"/>
-              <a:t>” – Steve </a:t>
-            </a:r>
-            <a:r>
-              <a:rPr lang="en-CA" dirty="0" smtClean="0"/>
-              <a:t>Jobs</a:t>
+              <a:t>CVM3 – Workshop HTML5 – Cloud: Reach Everyone, Everywhere</a:t>
             </a:r>
             <a:endParaRPr lang="en-CA" dirty="0"/>
           </a:p>
           <a:p>
             <a:pPr lvl="1"/>
-            <a:r>
-              <a:rPr lang="en-CA" dirty="0" err="1">
-                <a:hlinkClick r:id="rId4"/>
-              </a:rPr>
-              <a:t>iDevices</a:t>
-            </a:r>
             <a:r>
               <a:rPr lang="en-CA" dirty="0">
                 <a:hlinkClick r:id="rId4"/>
               </a:rPr>
-              <a:t> </a:t>
-            </a:r>
-            <a:r>
-              <a:rPr lang="en-CA" dirty="0" smtClean="0">
-                <a:hlinkClick r:id="rId4"/>
-              </a:rPr>
-              <a:t>have no </a:t>
-            </a:r>
+              <a:t>VSW9 – HTML5 Forms</a:t>
+            </a:r>
+            <a:endParaRPr lang="en-CA" dirty="0"/>
+          </a:p>
+          <a:p>
+            <a:pPr lvl="1"/>
             <a:r>
               <a:rPr lang="en-CA" dirty="0">
-                <a:hlinkClick r:id="rId4"/>
-              </a:rPr>
-              <a:t>support for Flash</a:t>
-            </a:r>
-            <a:endParaRPr lang="en-CA" dirty="0"/>
-          </a:p>
-          <a:p>
-            <a:r>
-              <a:rPr lang="en-CA" dirty="0" smtClean="0">
                 <a:hlinkClick r:id="rId5"/>
               </a:rPr>
-              <a:t>Logo</a:t>
-            </a:r>
-            <a:r>
-              <a:rPr lang="en-CA" dirty="0" smtClean="0"/>
-              <a:t> / </a:t>
-            </a:r>
-            <a:r>
-              <a:rPr lang="en-CA" dirty="0">
-                <a:hlinkClick r:id="rId6"/>
-              </a:rPr>
-              <a:t>marketing </a:t>
+              <a:t>VSW13 – HTML5 Everywhere</a:t>
+            </a:r>
+            <a:endParaRPr lang="en-CA" dirty="0"/>
+          </a:p>
+          <a:p>
+            <a:r>
+              <a:rPr lang="en-CA" dirty="0" smtClean="0"/>
+              <a:t>Wee bit of history</a:t>
+            </a:r>
+            <a:r>
+              <a:rPr lang="en-CA" dirty="0"/>
+              <a:t>: </a:t>
+            </a:r>
+            <a:endParaRPr lang="en-CA" dirty="0" smtClean="0"/>
+          </a:p>
+          <a:p>
+            <a:pPr lvl="1"/>
+            <a:r>
+              <a:rPr lang="en-CA" dirty="0" smtClean="0"/>
+              <a:t>HTML </a:t>
+            </a:r>
+            <a:r>
+              <a:rPr lang="en-CA" dirty="0"/>
+              <a:t>(1991), HTML2 (1994), HTML3 (1995), HTML3.2 &amp; 4 (1997), XHTML1 (2000), AJAX (2005), HTML5 (2007)</a:t>
+            </a:r>
+          </a:p>
+          <a:p>
+            <a:r>
+              <a:rPr lang="en-CA" dirty="0"/>
+              <a:t>W3C wanted XHTML 2, browser groups wanted HTML 5… so they created </a:t>
             </a:r>
             <a:r>
               <a:rPr lang="en-CA" dirty="0" smtClean="0">
                 <a:hlinkClick r:id="rId6"/>
               </a:rPr>
-              <a:t>material</a:t>
-            </a:r>
-            <a:r>
-              <a:rPr lang="en-CA" baseline="30000" dirty="0" smtClean="0"/>
-              <a:t>2 </a:t>
-            </a:r>
-            <a:endParaRPr lang="en-CA" dirty="0"/>
-          </a:p>
-          <a:p>
-            <a:r>
-              <a:rPr lang="en-CA" dirty="0"/>
-              <a:t>Spec moves through:</a:t>
-            </a:r>
-          </a:p>
-          <a:p>
-            <a:pPr lvl="1"/>
-            <a:r>
-              <a:rPr lang="en-CA" dirty="0"/>
-              <a:t>1</a:t>
-            </a:r>
-            <a:r>
-              <a:rPr lang="en-CA" baseline="30000" dirty="0"/>
-              <a:t>st</a:t>
-            </a:r>
-            <a:r>
-              <a:rPr lang="en-CA" dirty="0"/>
-              <a:t> Published Working Draft -&gt; Working Draft -&gt; Last Call -&gt; Candidate Recommendation -&gt; Recommendation</a:t>
-            </a:r>
-          </a:p>
-          <a:p>
-            <a:pPr lvl="1"/>
-            <a:r>
-              <a:rPr lang="en-CA" dirty="0"/>
-              <a:t>IE goal is CR and </a:t>
-            </a:r>
-            <a:r>
-              <a:rPr lang="en-CA" dirty="0" smtClean="0"/>
-              <a:t>up</a:t>
+              <a:t>WHATWG</a:t>
             </a:r>
             <a:r>
               <a:rPr lang="en-CA" baseline="30000" dirty="0" smtClean="0"/>
@@ -8336,61 +9302,29 @@
             </a:r>
             <a:r>
               <a:rPr lang="en-CA" dirty="0" smtClean="0"/>
-              <a:t> … as a result, they “score” much lower</a:t>
-            </a:r>
-            <a:endParaRPr lang="en-CA" baseline="30000" dirty="0"/>
-          </a:p>
-          <a:p>
-            <a:pPr lvl="1"/>
-            <a:r>
-              <a:rPr lang="en-CA" dirty="0" smtClean="0"/>
-              <a:t>WHATWG </a:t>
+              <a:t>.</a:t>
+            </a:r>
+          </a:p>
+          <a:p>
+            <a:r>
+              <a:rPr lang="en-CA" dirty="0" smtClean="0"/>
+              <a:t>W3C’s XHTML 2 ultimately died on July 2, 2009</a:t>
+            </a:r>
+          </a:p>
+          <a:p>
+            <a:r>
+              <a:rPr lang="en-CA" dirty="0" smtClean="0"/>
+              <a:t>WHATWG survived</a:t>
+            </a:r>
+          </a:p>
+          <a:p>
+            <a:r>
+              <a:rPr lang="en-CA" dirty="0" smtClean="0"/>
+              <a:t>WHATWG gave </a:t>
             </a:r>
             <a:r>
               <a:rPr lang="en-CA" dirty="0"/>
-              <a:t>said “maybe” 2022 for finalization </a:t>
-            </a:r>
-            <a:r>
-              <a:rPr lang="en-CA" dirty="0" smtClean="0">
-                <a:sym typeface="Wingdings" pitchFamily="2" charset="2"/>
-              </a:rPr>
-              <a:t> HOWEVER, there are sections that go through above spec movement / flow</a:t>
-            </a:r>
-            <a:endParaRPr lang="en-CA" dirty="0">
-              <a:sym typeface="Wingdings" pitchFamily="2" charset="2"/>
-            </a:endParaRPr>
-          </a:p>
-          <a:p>
-            <a:pPr lvl="1"/>
-            <a:r>
-              <a:rPr lang="en-CA" dirty="0">
-                <a:sym typeface="Wingdings" pitchFamily="2" charset="2"/>
-              </a:rPr>
-              <a:t>What does “recommendation” really mean? 2 independent browsers must implement spec 100%... That’s it. Again, it’s the </a:t>
-            </a:r>
-            <a:r>
-              <a:rPr lang="en-CA" dirty="0" smtClean="0">
-                <a:sym typeface="Wingdings" pitchFamily="2" charset="2"/>
-              </a:rPr>
-              <a:t>browser groups that </a:t>
-            </a:r>
-            <a:r>
-              <a:rPr lang="en-CA" dirty="0">
-                <a:sym typeface="Wingdings" pitchFamily="2" charset="2"/>
-              </a:rPr>
-              <a:t>are creating it and have to agree together</a:t>
-            </a:r>
-            <a:endParaRPr lang="en-CA" dirty="0"/>
-          </a:p>
-          <a:p>
-            <a:pPr lvl="1"/>
-            <a:r>
-              <a:rPr lang="en-CA" dirty="0"/>
-              <a:t>Current main browsers are: IE, Chrome, Firefox, Safari and </a:t>
-            </a:r>
-            <a:r>
-              <a:rPr lang="en-CA" dirty="0" smtClean="0"/>
-              <a:t>Opera</a:t>
+              <a:t>W3C permission to publish HTML 5… so really are 2 “specs” out there</a:t>
             </a:r>
           </a:p>
           <a:p>
@@ -8401,7 +9335,7 @@
     </p:spTree>
     <p:extLst>
       <p:ext uri="{BB962C8B-B14F-4D97-AF65-F5344CB8AC3E}">
-        <p14:creationId xmlns:p14="http://schemas.microsoft.com/office/powerpoint/2010/main" val="831845966"/>
+        <p14:creationId xmlns:p14="http://schemas.microsoft.com/office/powerpoint/2010/main" val="3288918414"/>
       </p:ext>
     </p:extLst>
   </p:cSld>
@@ -8454,6 +9388,294 @@
               <a:rPr lang="en-US" smtClean="0"/>
               <a:pPr/>
               <a:t>5</a:t>
+            </a:fld>
+            <a:endParaRPr lang="en-US"/>
+          </a:p>
+        </p:txBody>
+      </p:sp>
+      <p:sp>
+        <p:nvSpPr>
+          <p:cNvPr id="3" name="Title 2"/>
+          <p:cNvSpPr>
+            <a:spLocks noGrp="1"/>
+          </p:cNvSpPr>
+          <p:nvPr>
+            <p:ph type="title"/>
+          </p:nvPr>
+        </p:nvSpPr>
+        <p:spPr/>
+        <p:txBody>
+          <a:bodyPr/>
+          <a:lstStyle/>
+          <a:p>
+            <a:r>
+              <a:rPr lang="en-CA" dirty="0"/>
+              <a:t>HTML 5 (cont’d)</a:t>
+            </a:r>
+          </a:p>
+        </p:txBody>
+      </p:sp>
+      <p:sp>
+        <p:nvSpPr>
+          <p:cNvPr id="4" name="Content Placeholder 3"/>
+          <p:cNvSpPr>
+            <a:spLocks noGrp="1"/>
+          </p:cNvSpPr>
+          <p:nvPr>
+            <p:ph sz="quarter" idx="13"/>
+          </p:nvPr>
+        </p:nvSpPr>
+        <p:spPr>
+          <a:xfrm>
+            <a:off x="979488" y="1630362"/>
+            <a:ext cx="6697663" cy="4318917"/>
+          </a:xfrm>
+        </p:spPr>
+        <p:txBody>
+          <a:bodyPr>
+            <a:normAutofit fontScale="92500"/>
+          </a:bodyPr>
+          <a:lstStyle/>
+          <a:p>
+            <a:r>
+              <a:rPr lang="en-CA" dirty="0"/>
+              <a:t>Apple’s affect:</a:t>
+            </a:r>
+          </a:p>
+          <a:p>
+            <a:pPr lvl="1"/>
+            <a:r>
+              <a:rPr lang="en-CA" dirty="0"/>
+              <a:t>“</a:t>
+            </a:r>
+            <a:r>
+              <a:rPr lang="en-CA" dirty="0">
+                <a:hlinkClick r:id="rId3"/>
+              </a:rPr>
+              <a:t>The world is moving to HTML 5</a:t>
+            </a:r>
+            <a:r>
+              <a:rPr lang="en-CA" dirty="0"/>
+              <a:t>” – Steve </a:t>
+            </a:r>
+            <a:r>
+              <a:rPr lang="en-CA" dirty="0" smtClean="0"/>
+              <a:t>Jobs</a:t>
+            </a:r>
+            <a:endParaRPr lang="en-CA" dirty="0"/>
+          </a:p>
+          <a:p>
+            <a:pPr lvl="1"/>
+            <a:r>
+              <a:rPr lang="en-CA" dirty="0" err="1">
+                <a:hlinkClick r:id="rId4"/>
+              </a:rPr>
+              <a:t>iDevices</a:t>
+            </a:r>
+            <a:r>
+              <a:rPr lang="en-CA" dirty="0">
+                <a:hlinkClick r:id="rId4"/>
+              </a:rPr>
+              <a:t> </a:t>
+            </a:r>
+            <a:r>
+              <a:rPr lang="en-CA" dirty="0" smtClean="0">
+                <a:hlinkClick r:id="rId4"/>
+              </a:rPr>
+              <a:t>have no </a:t>
+            </a:r>
+            <a:r>
+              <a:rPr lang="en-CA" dirty="0">
+                <a:hlinkClick r:id="rId4"/>
+              </a:rPr>
+              <a:t>support for Flash</a:t>
+            </a:r>
+            <a:endParaRPr lang="en-CA" dirty="0"/>
+          </a:p>
+          <a:p>
+            <a:r>
+              <a:rPr lang="en-CA" dirty="0" smtClean="0">
+                <a:hlinkClick r:id="rId5"/>
+              </a:rPr>
+              <a:t>Logo</a:t>
+            </a:r>
+            <a:r>
+              <a:rPr lang="en-CA" dirty="0" smtClean="0"/>
+              <a:t> / </a:t>
+            </a:r>
+            <a:r>
+              <a:rPr lang="en-CA" dirty="0">
+                <a:hlinkClick r:id="rId6"/>
+              </a:rPr>
+              <a:t>marketing </a:t>
+            </a:r>
+            <a:r>
+              <a:rPr lang="en-CA" dirty="0" smtClean="0">
+                <a:hlinkClick r:id="rId6"/>
+              </a:rPr>
+              <a:t>material</a:t>
+            </a:r>
+            <a:r>
+              <a:rPr lang="en-CA" baseline="30000" dirty="0" smtClean="0"/>
+              <a:t>2 </a:t>
+            </a:r>
+            <a:endParaRPr lang="en-CA" dirty="0"/>
+          </a:p>
+          <a:p>
+            <a:r>
+              <a:rPr lang="en-CA" dirty="0"/>
+              <a:t>Spec moves through:</a:t>
+            </a:r>
+          </a:p>
+          <a:p>
+            <a:pPr lvl="1"/>
+            <a:r>
+              <a:rPr lang="en-CA" dirty="0"/>
+              <a:t>1</a:t>
+            </a:r>
+            <a:r>
+              <a:rPr lang="en-CA" baseline="30000" dirty="0"/>
+              <a:t>st</a:t>
+            </a:r>
+            <a:r>
+              <a:rPr lang="en-CA" dirty="0"/>
+              <a:t> Published Working Draft -&gt; Working Draft -&gt; Last Call -&gt; Candidate Recommendation -&gt; Recommendation</a:t>
+            </a:r>
+          </a:p>
+          <a:p>
+            <a:pPr lvl="1"/>
+            <a:r>
+              <a:rPr lang="en-CA" dirty="0"/>
+              <a:t>IE goal is CR and </a:t>
+            </a:r>
+            <a:r>
+              <a:rPr lang="en-CA" dirty="0" smtClean="0"/>
+              <a:t>up</a:t>
+            </a:r>
+            <a:r>
+              <a:rPr lang="en-CA" baseline="30000" dirty="0" smtClean="0"/>
+              <a:t>1</a:t>
+            </a:r>
+            <a:r>
+              <a:rPr lang="en-CA" dirty="0" smtClean="0"/>
+              <a:t> … as a result, they “score” much lower</a:t>
+            </a:r>
+            <a:endParaRPr lang="en-CA" baseline="30000" dirty="0"/>
+          </a:p>
+          <a:p>
+            <a:pPr lvl="1"/>
+            <a:r>
+              <a:rPr lang="en-CA" dirty="0" smtClean="0"/>
+              <a:t>WHATWG </a:t>
+            </a:r>
+            <a:r>
+              <a:rPr lang="en-CA" dirty="0"/>
+              <a:t>said “maybe” 2022 for finalization </a:t>
+            </a:r>
+            <a:r>
+              <a:rPr lang="en-CA" dirty="0" smtClean="0">
+                <a:sym typeface="Wingdings" pitchFamily="2" charset="2"/>
+              </a:rPr>
+              <a:t> HOWEVER, there are sections that go through above spec movement / flow</a:t>
+            </a:r>
+            <a:endParaRPr lang="en-CA" dirty="0">
+              <a:sym typeface="Wingdings" pitchFamily="2" charset="2"/>
+            </a:endParaRPr>
+          </a:p>
+          <a:p>
+            <a:pPr lvl="1"/>
+            <a:r>
+              <a:rPr lang="en-CA" dirty="0">
+                <a:sym typeface="Wingdings" pitchFamily="2" charset="2"/>
+              </a:rPr>
+              <a:t>What does “recommendation” really mean? 2 independent browsers must implement spec 100%... That’s it. Again, it’s the </a:t>
+            </a:r>
+            <a:r>
+              <a:rPr lang="en-CA" dirty="0" smtClean="0">
+                <a:sym typeface="Wingdings" pitchFamily="2" charset="2"/>
+              </a:rPr>
+              <a:t>browser groups that </a:t>
+            </a:r>
+            <a:r>
+              <a:rPr lang="en-CA" dirty="0">
+                <a:sym typeface="Wingdings" pitchFamily="2" charset="2"/>
+              </a:rPr>
+              <a:t>are creating it and have to agree together</a:t>
+            </a:r>
+            <a:endParaRPr lang="en-CA" dirty="0"/>
+          </a:p>
+          <a:p>
+            <a:pPr lvl="1"/>
+            <a:r>
+              <a:rPr lang="en-CA" dirty="0"/>
+              <a:t>Current main browsers are: IE, Chrome, Firefox, Safari and </a:t>
+            </a:r>
+            <a:r>
+              <a:rPr lang="en-CA" dirty="0" smtClean="0"/>
+              <a:t>Opera</a:t>
+            </a:r>
+          </a:p>
+          <a:p>
+            <a:endParaRPr lang="en-CA" dirty="0"/>
+          </a:p>
+        </p:txBody>
+      </p:sp>
+    </p:spTree>
+    <p:extLst>
+      <p:ext uri="{BB962C8B-B14F-4D97-AF65-F5344CB8AC3E}">
+        <p14:creationId xmlns:p14="http://schemas.microsoft.com/office/powerpoint/2010/main" val="831845966"/>
+      </p:ext>
+    </p:extLst>
+  </p:cSld>
+  <p:clrMapOvr>
+    <a:masterClrMapping/>
+  </p:clrMapOvr>
+  <p:timing>
+    <p:tnLst>
+      <p:par>
+        <p:cTn id="1" dur="indefinite" restart="never" nodeType="tmRoot"/>
+      </p:par>
+    </p:tnLst>
+  </p:timing>
+</p:sld>
+</file>
+
+<file path=ppt/slides/slide7.xml><?xml version="1.0" encoding="utf-8"?>
+<p:sld xmlns:a="http://schemas.openxmlformats.org/drawingml/2006/main" xmlns:r="http://schemas.openxmlformats.org/officeDocument/2006/relationships" xmlns:p="http://schemas.openxmlformats.org/presentationml/2006/main">
+  <p:cSld>
+    <p:spTree>
+      <p:nvGrpSpPr>
+        <p:cNvPr id="1" name=""/>
+        <p:cNvGrpSpPr/>
+        <p:nvPr/>
+      </p:nvGrpSpPr>
+      <p:grpSpPr>
+        <a:xfrm>
+          <a:off x="0" y="0"/>
+          <a:ext cx="0" cy="0"/>
+          <a:chOff x="0" y="0"/>
+          <a:chExt cx="0" cy="0"/>
+        </a:xfrm>
+      </p:grpSpPr>
+      <p:sp>
+        <p:nvSpPr>
+          <p:cNvPr id="2" name="Slide Number Placeholder 1"/>
+          <p:cNvSpPr>
+            <a:spLocks noGrp="1"/>
+          </p:cNvSpPr>
+          <p:nvPr>
+            <p:ph type="sldNum" sz="quarter" idx="12"/>
+          </p:nvPr>
+        </p:nvSpPr>
+        <p:spPr/>
+        <p:txBody>
+          <a:bodyPr/>
+          <a:lstStyle/>
+          <a:p>
+            <a:fld id="{1D72EBF8-7CF5-44B7-B2BF-E22DE4D0703D}" type="slidenum">
+              <a:rPr lang="en-US" smtClean="0"/>
+              <a:pPr/>
+              <a:t>6</a:t>
             </a:fld>
             <a:endParaRPr lang="en-US"/>
           </a:p>
@@ -8587,7 +9809,7 @@
 </p:sld>
 </file>
 
-<file path=ppt/slides/slide7.xml><?xml version="1.0" encoding="utf-8"?>
+<file path=ppt/slides/slide8.xml><?xml version="1.0" encoding="utf-8"?>
 <p:sld xmlns:a="http://schemas.openxmlformats.org/drawingml/2006/main" xmlns:r="http://schemas.openxmlformats.org/officeDocument/2006/relationships" xmlns:p="http://schemas.openxmlformats.org/presentationml/2006/main">
   <p:cSld>
     <p:spTree>
@@ -8622,7 +9844,7 @@
             <a:fld id="{1D72EBF8-7CF5-44B7-B2BF-E22DE4D0703D}" type="slidenum">
               <a:rPr lang="en-US" smtClean="0"/>
               <a:pPr/>
-              <a:t>6</a:t>
+              <a:t>7</a:t>
             </a:fld>
             <a:endParaRPr lang="en-US"/>
           </a:p>
@@ -8769,7 +9991,7 @@
 </p:sld>
 </file>
 
-<file path=ppt/slides/slide8.xml><?xml version="1.0" encoding="utf-8"?>
+<file path=ppt/slides/slide9.xml><?xml version="1.0" encoding="utf-8"?>
 <p:sld xmlns:a="http://schemas.openxmlformats.org/drawingml/2006/main" xmlns:r="http://schemas.openxmlformats.org/officeDocument/2006/relationships" xmlns:p="http://schemas.openxmlformats.org/presentationml/2006/main">
   <p:cSld>
     <p:spTree>
@@ -8804,7 +10026,7 @@
             <a:fld id="{1D72EBF8-7CF5-44B7-B2BF-E22DE4D0703D}" type="slidenum">
               <a:rPr lang="en-US" smtClean="0"/>
               <a:pPr/>
-              <a:t>7</a:t>
+              <a:t>8</a:t>
             </a:fld>
             <a:endParaRPr lang="en-US"/>
           </a:p>
@@ -8899,148 +10121,6 @@
     <p:extLst>
       <p:ext uri="{BB962C8B-B14F-4D97-AF65-F5344CB8AC3E}">
         <p14:creationId xmlns:p14="http://schemas.microsoft.com/office/powerpoint/2010/main" val="3123026944"/>
-      </p:ext>
-    </p:extLst>
-  </p:cSld>
-  <p:clrMapOvr>
-    <a:masterClrMapping/>
-  </p:clrMapOvr>
-  <p:timing>
-    <p:tnLst>
-      <p:par>
-        <p:cTn id="1" dur="indefinite" restart="never" nodeType="tmRoot"/>
-      </p:par>
-    </p:tnLst>
-  </p:timing>
-</p:sld>
-</file>
-
-<file path=ppt/slides/slide9.xml><?xml version="1.0" encoding="utf-8"?>
-<p:sld xmlns:a="http://schemas.openxmlformats.org/drawingml/2006/main" xmlns:r="http://schemas.openxmlformats.org/officeDocument/2006/relationships" xmlns:p="http://schemas.openxmlformats.org/presentationml/2006/main">
-  <p:cSld>
-    <p:spTree>
-      <p:nvGrpSpPr>
-        <p:cNvPr id="1" name=""/>
-        <p:cNvGrpSpPr/>
-        <p:nvPr/>
-      </p:nvGrpSpPr>
-      <p:grpSpPr>
-        <a:xfrm>
-          <a:off x="0" y="0"/>
-          <a:ext cx="0" cy="0"/>
-          <a:chOff x="0" y="0"/>
-          <a:chExt cx="0" cy="0"/>
-        </a:xfrm>
-      </p:grpSpPr>
-      <p:sp>
-        <p:nvSpPr>
-          <p:cNvPr id="2" name="Slide Number Placeholder 1"/>
-          <p:cNvSpPr>
-            <a:spLocks noGrp="1"/>
-          </p:cNvSpPr>
-          <p:nvPr>
-            <p:ph type="sldNum" sz="quarter" idx="12"/>
-          </p:nvPr>
-        </p:nvSpPr>
-        <p:spPr/>
-        <p:txBody>
-          <a:bodyPr/>
-          <a:lstStyle/>
-          <a:p>
-            <a:fld id="{1D72EBF8-7CF5-44B7-B2BF-E22DE4D0703D}" type="slidenum">
-              <a:rPr lang="en-US" smtClean="0"/>
-              <a:pPr/>
-              <a:t>8</a:t>
-            </a:fld>
-            <a:endParaRPr lang="en-US"/>
-          </a:p>
-        </p:txBody>
-      </p:sp>
-      <p:sp>
-        <p:nvSpPr>
-          <p:cNvPr id="3" name="Title 2"/>
-          <p:cNvSpPr>
-            <a:spLocks noGrp="1"/>
-          </p:cNvSpPr>
-          <p:nvPr>
-            <p:ph type="title"/>
-          </p:nvPr>
-        </p:nvSpPr>
-        <p:spPr/>
-        <p:txBody>
-          <a:bodyPr/>
-          <a:lstStyle/>
-          <a:p>
-            <a:r>
-              <a:rPr lang="en-CA" dirty="0"/>
-              <a:t>HTML 5 </a:t>
-            </a:r>
-            <a:r>
-              <a:rPr lang="en-CA" dirty="0" smtClean="0"/>
-              <a:t>– New Tags</a:t>
-            </a:r>
-            <a:endParaRPr lang="en-CA" dirty="0"/>
-          </a:p>
-        </p:txBody>
-      </p:sp>
-      <p:pic>
-        <p:nvPicPr>
-          <p:cNvPr id="1027" name="Picture 3"/>
-          <p:cNvPicPr>
-            <a:picLocks noChangeAspect="1" noChangeArrowheads="1"/>
-          </p:cNvPicPr>
-          <p:nvPr/>
-        </p:nvPicPr>
-        <p:blipFill>
-          <a:blip r:embed="rId3" cstate="email">
-            <a:extLst>
-              <a:ext uri="{28A0092B-C50C-407E-A947-70E740481C1C}">
-                <a14:useLocalDpi xmlns:a14="http://schemas.microsoft.com/office/drawing/2010/main" val="0"/>
-              </a:ext>
-            </a:extLst>
-          </a:blip>
-          <a:srcRect/>
-          <a:stretch>
-            <a:fillRect/>
-          </a:stretch>
-        </p:blipFill>
-        <p:spPr bwMode="auto">
-          <a:xfrm>
-            <a:off x="2267744" y="1556575"/>
-            <a:ext cx="5480844" cy="4453699"/>
-          </a:xfrm>
-          <a:prstGeom prst="rect">
-            <a:avLst/>
-          </a:prstGeom>
-          <a:noFill/>
-          <a:ln>
-            <a:noFill/>
-          </a:ln>
-          <a:extLst>
-            <a:ext uri="{909E8E84-426E-40DD-AFC4-6F175D3DCCD1}">
-              <a14:hiddenFill xmlns:a14="http://schemas.microsoft.com/office/drawing/2010/main">
-                <a:solidFill>
-                  <a:schemeClr val="accent1"/>
-                </a:solidFill>
-              </a14:hiddenFill>
-            </a:ext>
-            <a:ext uri="{91240B29-F687-4F45-9708-019B960494DF}">
-              <a14:hiddenLine xmlns:a14="http://schemas.microsoft.com/office/drawing/2010/main" w="9525">
-                <a:solidFill>
-                  <a:schemeClr val="tx1"/>
-                </a:solidFill>
-                <a:miter lim="800000"/>
-                <a:headEnd/>
-                <a:tailEnd/>
-              </a14:hiddenLine>
-            </a:ext>
-          </a:extLst>
-        </p:spPr>
-      </p:pic>
-    </p:spTree>
-    <p:extLst>
-      <p:ext uri="{BB962C8B-B14F-4D97-AF65-F5344CB8AC3E}">
-        <p14:creationId xmlns:p14="http://schemas.microsoft.com/office/powerpoint/2010/main" val="270904078"/>
       </p:ext>
     </p:extLst>
   </p:cSld>

</xml_diff>

<commit_message>
Applied Kara's recommended changes
</commit_message>
<xml_diff>
--- a/Docs/2012 - Live360 Event Review (NEWER).pptx
+++ b/Docs/2012 - Live360 Event Review (NEWER).pptx
@@ -5,10 +5,10 @@
     <p:sldMasterId id="2147483887" r:id="rId1"/>
   </p:sldMasterIdLst>
   <p:notesMasterIdLst>
-    <p:notesMasterId r:id="rId28"/>
+    <p:notesMasterId r:id="rId27"/>
   </p:notesMasterIdLst>
   <p:handoutMasterIdLst>
-    <p:handoutMasterId r:id="rId29"/>
+    <p:handoutMasterId r:id="rId28"/>
   </p:handoutMasterIdLst>
   <p:sldIdLst>
     <p:sldId id="260" r:id="rId2"/>
@@ -36,7 +36,6 @@
     <p:sldId id="269" r:id="rId24"/>
     <p:sldId id="288" r:id="rId25"/>
     <p:sldId id="270" r:id="rId26"/>
-    <p:sldId id="276" r:id="rId27"/>
   </p:sldIdLst>
   <p:sldSz cx="9144000" cy="6858000" type="screen4x3"/>
   <p:notesSz cx="7315200" cy="9601200"/>
@@ -1151,19 +1150,7 @@
               <a:rPr lang="en-US" dirty="0" smtClean="0">
                 <a:hlinkClick r:id="rId3"/>
               </a:rPr>
-              <a:t>http</a:t>
-            </a:r>
-            <a:r>
-              <a:rPr lang="en-US" dirty="0" smtClean="0">
-                <a:hlinkClick r:id="rId3"/>
-              </a:rPr>
-              <a:t>://remysharp.com/2010/10/08/what-is-a-polyfill</a:t>
-            </a:r>
-            <a:r>
-              <a:rPr lang="en-US" dirty="0" smtClean="0">
-                <a:hlinkClick r:id="rId3"/>
-              </a:rPr>
-              <a:t>/</a:t>
+              <a:t>http://remysharp.com/2010/10/08/what-is-a-polyfill/</a:t>
             </a:r>
             <a:r>
               <a:rPr lang="en-US" dirty="0" smtClean="0"/>
@@ -2378,90 +2365,6 @@
     <p:extLst>
       <p:ext uri="{BB962C8B-B14F-4D97-AF65-F5344CB8AC3E}">
         <p14:creationId xmlns:p14="http://schemas.microsoft.com/office/powerpoint/2010/main" val="210866962"/>
-      </p:ext>
-    </p:extLst>
-  </p:cSld>
-  <p:clrMapOvr>
-    <a:masterClrMapping/>
-  </p:clrMapOvr>
-</p:notes>
-</file>
-
-<file path=ppt/notesSlides/notesSlide26.xml><?xml version="1.0" encoding="utf-8"?>
-<p:notes xmlns:a="http://schemas.openxmlformats.org/drawingml/2006/main" xmlns:r="http://schemas.openxmlformats.org/officeDocument/2006/relationships" xmlns:p="http://schemas.openxmlformats.org/presentationml/2006/main">
-  <p:cSld>
-    <p:spTree>
-      <p:nvGrpSpPr>
-        <p:cNvPr id="1" name=""/>
-        <p:cNvGrpSpPr/>
-        <p:nvPr/>
-      </p:nvGrpSpPr>
-      <p:grpSpPr>
-        <a:xfrm>
-          <a:off x="0" y="0"/>
-          <a:ext cx="0" cy="0"/>
-          <a:chOff x="0" y="0"/>
-          <a:chExt cx="0" cy="0"/>
-        </a:xfrm>
-      </p:grpSpPr>
-      <p:sp>
-        <p:nvSpPr>
-          <p:cNvPr id="2" name="Slide Image Placeholder 1"/>
-          <p:cNvSpPr>
-            <a:spLocks noGrp="1" noRot="1" noChangeAspect="1"/>
-          </p:cNvSpPr>
-          <p:nvPr>
-            <p:ph type="sldImg"/>
-          </p:nvPr>
-        </p:nvSpPr>
-        <p:spPr/>
-      </p:sp>
-      <p:sp>
-        <p:nvSpPr>
-          <p:cNvPr id="3" name="Notes Placeholder 2"/>
-          <p:cNvSpPr>
-            <a:spLocks noGrp="1"/>
-          </p:cNvSpPr>
-          <p:nvPr>
-            <p:ph type="body" idx="1"/>
-          </p:nvPr>
-        </p:nvSpPr>
-        <p:spPr/>
-        <p:txBody>
-          <a:bodyPr/>
-          <a:lstStyle/>
-          <a:p>
-            <a:endParaRPr lang="en-CA"/>
-          </a:p>
-        </p:txBody>
-      </p:sp>
-      <p:sp>
-        <p:nvSpPr>
-          <p:cNvPr id="4" name="Slide Number Placeholder 3"/>
-          <p:cNvSpPr>
-            <a:spLocks noGrp="1"/>
-          </p:cNvSpPr>
-          <p:nvPr>
-            <p:ph type="sldNum" sz="quarter" idx="10"/>
-          </p:nvPr>
-        </p:nvSpPr>
-        <p:spPr/>
-        <p:txBody>
-          <a:bodyPr/>
-          <a:lstStyle/>
-          <a:p>
-            <a:fld id="{4FCB2955-686B-EC42-828C-18431921459F}" type="slidenum">
-              <a:rPr lang="en-US" smtClean="0"/>
-              <a:t>25</a:t>
-            </a:fld>
-            <a:endParaRPr lang="en-US"/>
-          </a:p>
-        </p:txBody>
-      </p:sp>
-    </p:spTree>
-    <p:extLst>
-      <p:ext uri="{BB962C8B-B14F-4D97-AF65-F5344CB8AC3E}">
-        <p14:creationId xmlns:p14="http://schemas.microsoft.com/office/powerpoint/2010/main" val="2900780547"/>
       </p:ext>
     </p:extLst>
   </p:cSld>
@@ -7177,8 +7080,21 @@
           <a:p>
             <a:r>
               <a:rPr lang="en-CA" dirty="0" smtClean="0"/>
-              <a:t>Elements that are by nature self-closing now do not need “/”</a:t>
-            </a:r>
+              <a:t>Elements that are by nature self-closing </a:t>
+            </a:r>
+            <a:r>
+              <a:rPr lang="en-CA" dirty="0" smtClean="0"/>
+              <a:t>no longer </a:t>
+            </a:r>
+            <a:r>
+              <a:rPr lang="en-CA" dirty="0" smtClean="0"/>
+              <a:t>need </a:t>
+            </a:r>
+            <a:r>
+              <a:rPr lang="en-CA" dirty="0" smtClean="0"/>
+              <a:t>a “/”</a:t>
+            </a:r>
+            <a:endParaRPr lang="en-CA" dirty="0" smtClean="0"/>
           </a:p>
           <a:p>
             <a:pPr lvl="1"/>
@@ -7510,11 +7426,11 @@
   <p:clrMapOvr>
     <a:masterClrMapping/>
   </p:clrMapOvr>
-  <mc:AlternateContent xmlns:mc="http://schemas.openxmlformats.org/markup-compatibility/2006">
-    <mc:Choice xmlns:p14="http://schemas.microsoft.com/office/powerpoint/2010/main" Requires="p14">
+  <mc:AlternateContent xmlns:mc="http://schemas.openxmlformats.org/markup-compatibility/2006" xmlns:p14="http://schemas.microsoft.com/office/powerpoint/2010/main">
+    <mc:Choice Requires="p14">
       <p:transition spd="slow" p14:dur="2000"/>
     </mc:Choice>
-    <mc:Fallback>
+    <mc:Fallback xmlns="">
       <p:transition spd="slow"/>
     </mc:Fallback>
   </mc:AlternateContent>
@@ -9822,11 +9738,7 @@
           <a:p>
             <a:r>
               <a:rPr lang="en-US" dirty="0" smtClean="0"/>
-              <a:t>What I </a:t>
-            </a:r>
-            <a:r>
-              <a:rPr lang="en-US" dirty="0" smtClean="0"/>
-              <a:t>learnt</a:t>
+              <a:t>What I learnt</a:t>
             </a:r>
             <a:endParaRPr lang="en-CA" dirty="0"/>
           </a:p>
@@ -11630,8 +11542,12 @@
               <a:t>Don’t </a:t>
             </a:r>
             <a:r>
+              <a:rPr lang="en-CA" dirty="0" smtClean="0"/>
+              <a:t>“sniff” for </a:t>
+            </a:r>
+            <a:r>
               <a:rPr lang="en-CA" dirty="0"/>
-              <a:t>sniff browsers… test for features</a:t>
+              <a:t>browsers… test for features</a:t>
             </a:r>
           </a:p>
           <a:p>
@@ -11668,11 +11584,7 @@
             </a:r>
             <a:r>
               <a:rPr lang="en-CA" dirty="0" smtClean="0"/>
-              <a:t>denominator, </a:t>
-            </a:r>
-            <a:r>
-              <a:rPr lang="en-CA" dirty="0" smtClean="0"/>
-              <a:t>polyfill</a:t>
+              <a:t>denominator, polyfill</a:t>
             </a:r>
             <a:r>
               <a:rPr lang="en-CA" baseline="30000" dirty="0"/>
@@ -11686,11 +11598,7 @@
           <a:p>
             <a:r>
               <a:rPr lang="en-CA" dirty="0" smtClean="0"/>
-              <a:t>DEMO </a:t>
-            </a:r>
-            <a:r>
-              <a:rPr lang="en-CA" dirty="0" smtClean="0"/>
-              <a:t>1 – 3</a:t>
+              <a:t>DEMO 1 – 3</a:t>
             </a:r>
           </a:p>
           <a:p>
@@ -11789,11 +11697,7 @@
           <a:p>
             <a:r>
               <a:rPr lang="en-US" dirty="0" smtClean="0"/>
-              <a:t>What I </a:t>
-            </a:r>
-            <a:r>
-              <a:rPr lang="en-US" dirty="0" smtClean="0"/>
-              <a:t>learnt</a:t>
+              <a:t>What I learnt</a:t>
             </a:r>
             <a:endParaRPr lang="en-CA" dirty="0"/>
           </a:p>
@@ -13795,11 +13699,7 @@
           <a:p>
             <a:r>
               <a:rPr lang="en-US" dirty="0" smtClean="0"/>
-              <a:t>What I </a:t>
-            </a:r>
-            <a:r>
-              <a:rPr lang="en-US" dirty="0" smtClean="0"/>
-              <a:t>learnt</a:t>
+              <a:t>What I learnt</a:t>
             </a:r>
             <a:endParaRPr lang="en-CA" dirty="0"/>
           </a:p>
@@ -15784,11 +15684,7 @@
           <a:p>
             <a:r>
               <a:rPr lang="en-US" dirty="0" smtClean="0"/>
-              <a:t>What I </a:t>
-            </a:r>
-            <a:r>
-              <a:rPr lang="en-US" dirty="0" smtClean="0"/>
-              <a:t>learnt</a:t>
+              <a:t>What I learnt</a:t>
             </a:r>
             <a:endParaRPr lang="en-CA" dirty="0"/>
           </a:p>
@@ -17675,7 +17571,7 @@
         </p:spPr>
         <p:txBody>
           <a:bodyPr>
-            <a:normAutofit lnSpcReduction="10000"/>
+            <a:normAutofit/>
           </a:bodyPr>
           <a:lstStyle/>
           <a:p>
@@ -17755,21 +17651,16 @@
           <a:p>
             <a:pPr lvl="1"/>
             <a:r>
-              <a:rPr lang="en-CA" dirty="0"/>
-              <a:t>Create a website using </a:t>
-            </a:r>
-            <a:r>
-              <a:rPr lang="en-CA" dirty="0" smtClean="0"/>
-              <a:t>Azure… show other options here</a:t>
-            </a:r>
-          </a:p>
-          <a:p>
-            <a:pPr lvl="2"/>
+              <a:rPr lang="en-CA" dirty="0" smtClean="0">
+                <a:hlinkClick r:id="rId3"/>
+              </a:rPr>
+              <a:t>https</a:t>
+            </a:r>
             <a:r>
               <a:rPr lang="en-CA" dirty="0">
                 <a:hlinkClick r:id="rId3"/>
               </a:rPr>
-              <a:t>https://</a:t>
+              <a:t>://</a:t>
             </a:r>
             <a:r>
               <a:rPr lang="en-CA" dirty="0" smtClean="0">
@@ -17778,37 +17669,6 @@
               <a:t>manage.windowsazure.com</a:t>
             </a:r>
             <a:endParaRPr lang="en-CA" dirty="0" smtClean="0"/>
-          </a:p>
-          <a:p>
-            <a:pPr lvl="1"/>
-            <a:r>
-              <a:rPr lang="en-CA" dirty="0" smtClean="0"/>
-              <a:t>Link </a:t>
-            </a:r>
-            <a:r>
-              <a:rPr lang="en-CA" dirty="0"/>
-              <a:t>to my </a:t>
-            </a:r>
-            <a:r>
-              <a:rPr lang="en-CA" dirty="0" err="1"/>
-              <a:t>github</a:t>
-            </a:r>
-            <a:r>
-              <a:rPr lang="en-CA" dirty="0"/>
-              <a:t> </a:t>
-            </a:r>
-            <a:r>
-              <a:rPr lang="en-CA" dirty="0" smtClean="0"/>
-              <a:t>repository</a:t>
-            </a:r>
-          </a:p>
-          <a:p>
-            <a:pPr lvl="1"/>
-            <a:r>
-              <a:rPr lang="en-CA" dirty="0" smtClean="0"/>
-              <a:t>Create new site and download publish settings for deploying in Visual Studio</a:t>
-            </a:r>
-            <a:endParaRPr lang="en-CA" dirty="0"/>
           </a:p>
           <a:p>
             <a:endParaRPr lang="en-CA" dirty="0"/>
@@ -17905,8 +17765,8 @@
               <a:t>Historically</a:t>
             </a:r>
             <a:r>
-              <a:rPr lang="en-CA" dirty="0"/>
-              <a:t>, </a:t>
+              <a:rPr lang="en-CA" dirty="0" smtClean="0"/>
+              <a:t>, was a </a:t>
             </a:r>
             <a:r>
               <a:rPr lang="en-CA" dirty="0">
@@ -18117,11 +17977,7 @@
           <a:p>
             <a:r>
               <a:rPr lang="en-US" dirty="0" smtClean="0"/>
-              <a:t>What I </a:t>
-            </a:r>
-            <a:r>
-              <a:rPr lang="en-US" dirty="0" smtClean="0"/>
-              <a:t>learnt</a:t>
+              <a:t>What I learnt</a:t>
             </a:r>
             <a:endParaRPr lang="en-CA" dirty="0"/>
           </a:p>
@@ -20096,17 +19952,11 @@
           <a:p>
             <a:r>
               <a:rPr lang="en-CA" dirty="0" smtClean="0"/>
-              <a:t>Unfortunately </a:t>
+              <a:t>Concentration </a:t>
             </a:r>
             <a:r>
               <a:rPr lang="en-CA" dirty="0"/>
-              <a:t>not the conference to learn a lot of mobile</a:t>
-            </a:r>
-          </a:p>
-          <a:p>
-            <a:r>
-              <a:rPr lang="en-CA" dirty="0"/>
-              <a:t>Concentration on HTML5 including CSS3 for formatting with mobile in mind</a:t>
+              <a:t>on HTML5 including CSS3 for formatting with mobile in mind</a:t>
             </a:r>
           </a:p>
           <a:p>
@@ -20264,11 +20114,7 @@
           <a:p>
             <a:r>
               <a:rPr lang="en-US" dirty="0" smtClean="0"/>
-              <a:t>What I </a:t>
-            </a:r>
-            <a:r>
-              <a:rPr lang="en-US" dirty="0" smtClean="0"/>
-              <a:t>learnt</a:t>
+              <a:t>What I learnt</a:t>
             </a:r>
             <a:endParaRPr lang="en-CA" dirty="0"/>
           </a:p>
@@ -22324,11 +22170,7 @@
           <a:p>
             <a:r>
               <a:rPr lang="en-CA" dirty="0" smtClean="0"/>
-              <a:t>Demo </a:t>
-            </a:r>
-            <a:r>
-              <a:rPr lang="en-CA" dirty="0" smtClean="0"/>
-              <a:t>8</a:t>
+              <a:t>Demo 8</a:t>
             </a:r>
           </a:p>
           <a:p>
@@ -22452,11 +22294,7 @@
           <a:p>
             <a:r>
               <a:rPr lang="en-US" dirty="0" smtClean="0"/>
-              <a:t>What I </a:t>
-            </a:r>
-            <a:r>
-              <a:rPr lang="en-US" dirty="0" smtClean="0"/>
-              <a:t>learnt</a:t>
+              <a:t>What I learnt</a:t>
             </a:r>
             <a:endParaRPr lang="en-CA" dirty="0"/>
           </a:p>
@@ -24617,185 +24455,6 @@
 </p:sld>
 </file>
 
-<file path=ppt/slides/slide26.xml><?xml version="1.0" encoding="utf-8"?>
-<p:sld xmlns:a="http://schemas.openxmlformats.org/drawingml/2006/main" xmlns:r="http://schemas.openxmlformats.org/officeDocument/2006/relationships" xmlns:p="http://schemas.openxmlformats.org/presentationml/2006/main">
-  <p:cSld>
-    <p:spTree>
-      <p:nvGrpSpPr>
-        <p:cNvPr id="1" name=""/>
-        <p:cNvGrpSpPr/>
-        <p:nvPr/>
-      </p:nvGrpSpPr>
-      <p:grpSpPr>
-        <a:xfrm>
-          <a:off x="0" y="0"/>
-          <a:ext cx="0" cy="0"/>
-          <a:chOff x="0" y="0"/>
-          <a:chExt cx="0" cy="0"/>
-        </a:xfrm>
-      </p:grpSpPr>
-      <p:sp>
-        <p:nvSpPr>
-          <p:cNvPr id="2" name="Slide Number Placeholder 1"/>
-          <p:cNvSpPr>
-            <a:spLocks noGrp="1"/>
-          </p:cNvSpPr>
-          <p:nvPr>
-            <p:ph type="sldNum" sz="quarter" idx="12"/>
-          </p:nvPr>
-        </p:nvSpPr>
-        <p:spPr/>
-        <p:txBody>
-          <a:bodyPr/>
-          <a:lstStyle/>
-          <a:p>
-            <a:fld id="{1D72EBF8-7CF5-44B7-B2BF-E22DE4D0703D}" type="slidenum">
-              <a:rPr lang="en-US" smtClean="0"/>
-              <a:pPr/>
-              <a:t>25</a:t>
-            </a:fld>
-            <a:endParaRPr lang="en-US"/>
-          </a:p>
-        </p:txBody>
-      </p:sp>
-      <p:sp>
-        <p:nvSpPr>
-          <p:cNvPr id="3" name="Title 2"/>
-          <p:cNvSpPr>
-            <a:spLocks noGrp="1"/>
-          </p:cNvSpPr>
-          <p:nvPr>
-            <p:ph type="title"/>
-          </p:nvPr>
-        </p:nvSpPr>
-        <p:spPr/>
-        <p:txBody>
-          <a:bodyPr>
-            <a:normAutofit/>
-          </a:bodyPr>
-          <a:lstStyle/>
-          <a:p>
-            <a:r>
-              <a:rPr lang="en-CA" dirty="0" smtClean="0"/>
-              <a:t>Overall Opinion of Conference</a:t>
-            </a:r>
-            <a:endParaRPr lang="en-CA" dirty="0"/>
-          </a:p>
-        </p:txBody>
-      </p:sp>
-      <p:sp>
-        <p:nvSpPr>
-          <p:cNvPr id="4" name="Content Placeholder 3"/>
-          <p:cNvSpPr>
-            <a:spLocks noGrp="1"/>
-          </p:cNvSpPr>
-          <p:nvPr>
-            <p:ph sz="quarter" idx="13"/>
-          </p:nvPr>
-        </p:nvSpPr>
-        <p:spPr>
-          <a:xfrm>
-            <a:off x="979488" y="1630362"/>
-            <a:ext cx="6697663" cy="4390925"/>
-          </a:xfrm>
-        </p:spPr>
-        <p:txBody>
-          <a:bodyPr/>
-          <a:lstStyle/>
-          <a:p>
-            <a:r>
-              <a:rPr lang="en-CA" dirty="0" smtClean="0"/>
-              <a:t>While there… </a:t>
-            </a:r>
-          </a:p>
-          <a:p>
-            <a:pPr lvl="1"/>
-            <a:r>
-              <a:rPr lang="en-CA" dirty="0"/>
-              <a:t>W</a:t>
-            </a:r>
-            <a:r>
-              <a:rPr lang="en-CA" dirty="0" smtClean="0"/>
-              <a:t>anted more… more HTML 5, more mobile</a:t>
-            </a:r>
-          </a:p>
-          <a:p>
-            <a:pPr lvl="1"/>
-            <a:r>
-              <a:rPr lang="en-CA" dirty="0" smtClean="0"/>
-              <a:t>Logistics… felt could have been better</a:t>
-            </a:r>
-          </a:p>
-          <a:p>
-            <a:pPr lvl="1"/>
-            <a:r>
-              <a:rPr lang="en-CA" dirty="0" err="1" smtClean="0"/>
-              <a:t>Accomodations</a:t>
-            </a:r>
-            <a:r>
-              <a:rPr lang="en-CA" dirty="0" smtClean="0"/>
-              <a:t>… beautiful, close to Universal Studios</a:t>
-            </a:r>
-          </a:p>
-          <a:p>
-            <a:pPr lvl="1"/>
-            <a:r>
-              <a:rPr lang="en-CA" dirty="0" smtClean="0"/>
-              <a:t>Not a “swag” conference</a:t>
-            </a:r>
-          </a:p>
-          <a:p>
-            <a:r>
-              <a:rPr lang="en-CA" dirty="0" smtClean="0"/>
-              <a:t>Looking back…</a:t>
-            </a:r>
-          </a:p>
-          <a:p>
-            <a:pPr lvl="1"/>
-            <a:r>
-              <a:rPr lang="en-CA" dirty="0" smtClean="0"/>
-              <a:t>I am surprised at how much I did actually learn… or at least spark an interest in</a:t>
-            </a:r>
-          </a:p>
-          <a:p>
-            <a:pPr lvl="1"/>
-            <a:r>
-              <a:rPr lang="en-CA" dirty="0" smtClean="0"/>
-              <a:t>Would recommend in the future</a:t>
-            </a:r>
-          </a:p>
-          <a:p>
-            <a:pPr lvl="1"/>
-            <a:r>
-              <a:rPr lang="en-CA" dirty="0" smtClean="0"/>
-              <a:t>Ability to jump from session to session because of so many running concurrently was a big benefit</a:t>
-            </a:r>
-          </a:p>
-          <a:p>
-            <a:endParaRPr lang="en-CA" dirty="0"/>
-          </a:p>
-        </p:txBody>
-      </p:sp>
-    </p:spTree>
-    <p:extLst>
-      <p:ext uri="{BB962C8B-B14F-4D97-AF65-F5344CB8AC3E}">
-        <p14:creationId xmlns:p14="http://schemas.microsoft.com/office/powerpoint/2010/main" val="1805342507"/>
-      </p:ext>
-    </p:extLst>
-  </p:cSld>
-  <p:clrMapOvr>
-    <a:masterClrMapping/>
-  </p:clrMapOvr>
-  <p:timing>
-    <p:tnLst>
-      <p:par>
-        <p:cTn id="1" dur="indefinite" restart="never" nodeType="tmRoot"/>
-      </p:par>
-    </p:tnLst>
-  </p:timing>
-</p:sld>
-</file>
-
 <file path=ppt/slides/slide3.xml><?xml version="1.0" encoding="utf-8"?>
 <p:sld xmlns:a="http://schemas.openxmlformats.org/drawingml/2006/main" xmlns:r="http://schemas.openxmlformats.org/officeDocument/2006/relationships" xmlns:p="http://schemas.openxmlformats.org/presentationml/2006/main">
   <p:cSld>
@@ -25039,11 +24698,7 @@
           <a:p>
             <a:r>
               <a:rPr lang="en-US" dirty="0" smtClean="0"/>
-              <a:t>What I </a:t>
-            </a:r>
-            <a:r>
-              <a:rPr lang="en-US" dirty="0" smtClean="0"/>
-              <a:t>learnt</a:t>
+              <a:t>What I learnt</a:t>
             </a:r>
             <a:endParaRPr lang="en-CA" dirty="0"/>
           </a:p>
@@ -26510,11 +26165,7 @@
           <a:p>
             <a:r>
               <a:rPr lang="en-US" dirty="0" smtClean="0"/>
-              <a:t>What I </a:t>
-            </a:r>
-            <a:r>
-              <a:rPr lang="en-US" dirty="0" smtClean="0"/>
-              <a:t>learnt</a:t>
+              <a:t>What I learnt</a:t>
             </a:r>
             <a:endParaRPr lang="en-CA" dirty="0"/>
           </a:p>
@@ -28186,15 +27837,7 @@
           <a:p>
             <a:r>
               <a:rPr lang="en-CA" dirty="0" smtClean="0"/>
-              <a:t>Wee </a:t>
-            </a:r>
-            <a:r>
-              <a:rPr lang="en-CA" dirty="0" smtClean="0"/>
-              <a:t>bit of </a:t>
-            </a:r>
-            <a:r>
-              <a:rPr lang="en-CA" dirty="0" smtClean="0"/>
-              <a:t>history</a:t>
+              <a:t>Wee bit of history</a:t>
             </a:r>
             <a:r>
               <a:rPr lang="en-CA" baseline="30000" dirty="0"/>
@@ -28204,7 +27847,6 @@
               <a:rPr lang="en-CA" dirty="0" smtClean="0"/>
               <a:t>: </a:t>
             </a:r>
-            <a:endParaRPr lang="en-CA" dirty="0" smtClean="0"/>
           </a:p>
           <a:p>
             <a:pPr lvl="1"/>
@@ -28254,7 +27896,6 @@
               <a:rPr lang="en-CA" dirty="0" smtClean="0"/>
               <a:t> and created HTML5</a:t>
             </a:r>
-            <a:endParaRPr lang="en-CA" dirty="0" smtClean="0"/>
           </a:p>
           <a:p>
             <a:r>
@@ -28265,15 +27906,31 @@
           <a:p>
             <a:r>
               <a:rPr lang="en-CA" dirty="0" smtClean="0"/>
-              <a:t>WHATWG </a:t>
+              <a:t>WHATWG gave </a:t>
+            </a:r>
+            <a:r>
+              <a:rPr lang="en-CA" dirty="0"/>
+              <a:t>W3C permission to publish HTML 5… so really </a:t>
             </a:r>
             <a:r>
               <a:rPr lang="en-CA" dirty="0" smtClean="0"/>
-              <a:t>gave </a:t>
+              <a:t>there are </a:t>
             </a:r>
             <a:r>
               <a:rPr lang="en-CA" dirty="0"/>
-              <a:t>W3C permission to publish HTML 5… so really are 2 “specs” out there</a:t>
+              <a:t>2 </a:t>
+            </a:r>
+            <a:r>
+              <a:rPr lang="en-CA" dirty="0" err="1" smtClean="0"/>
+              <a:t>specifcations</a:t>
+            </a:r>
+            <a:r>
+              <a:rPr lang="en-CA" dirty="0" smtClean="0"/>
+              <a:t> </a:t>
+            </a:r>
+            <a:r>
+              <a:rPr lang="en-CA" dirty="0"/>
+              <a:t>out there</a:t>
             </a:r>
           </a:p>
           <a:p>
@@ -28361,7 +28018,6 @@
               <a:rPr lang="en-CA" dirty="0"/>
               <a:t>HTML 5 History</a:t>
             </a:r>
-            <a:endParaRPr lang="en-CA" dirty="0"/>
           </a:p>
         </p:txBody>
       </p:sp>
@@ -28453,7 +28109,6 @@
               <a:rPr lang="en-CA" dirty="0" smtClean="0"/>
               <a:t> </a:t>
             </a:r>
-            <a:endParaRPr lang="en-CA" dirty="0" smtClean="0"/>
           </a:p>
           <a:p>
             <a:endParaRPr lang="en-CA" dirty="0" smtClean="0"/>
@@ -28779,11 +28434,7 @@
           <a:p>
             <a:r>
               <a:rPr lang="en-US" dirty="0" smtClean="0"/>
-              <a:t>What I </a:t>
-            </a:r>
-            <a:r>
-              <a:rPr lang="en-US" dirty="0" smtClean="0"/>
-              <a:t>learnt</a:t>
+              <a:t>What I learnt</a:t>
             </a:r>
             <a:endParaRPr lang="en-CA" dirty="0"/>
           </a:p>

</xml_diff>

<commit_message>
forgot to commit this
</commit_message>
<xml_diff>
--- a/Docs/2012 - Live360 Event Review (NEWER).pptx
+++ b/Docs/2012 - Live360 Event Review (NEWER).pptx
@@ -7080,21 +7080,8 @@
           <a:p>
             <a:r>
               <a:rPr lang="en-CA" dirty="0" smtClean="0"/>
-              <a:t>Elements that are by nature self-closing </a:t>
-            </a:r>
-            <a:r>
-              <a:rPr lang="en-CA" dirty="0" smtClean="0"/>
-              <a:t>no longer </a:t>
-            </a:r>
-            <a:r>
-              <a:rPr lang="en-CA" dirty="0" smtClean="0"/>
-              <a:t>need </a:t>
-            </a:r>
-            <a:r>
-              <a:rPr lang="en-CA" dirty="0" smtClean="0"/>
-              <a:t>a “/”</a:t>
-            </a:r>
-            <a:endParaRPr lang="en-CA" dirty="0" smtClean="0"/>
+              <a:t>Elements that are by nature self-closing no longer need a “/”</a:t>
+            </a:r>
           </a:p>
           <a:p>
             <a:pPr lvl="1"/>
@@ -7132,6 +7119,9 @@
           <a:prstGeom prst="rect">
             <a:avLst/>
           </a:prstGeom>
+          <a:ln>
+            <a:noFill/>
+          </a:ln>
         </p:spPr>
         <p:style>
           <a:lnRef idx="2">
@@ -7169,12 +7159,15 @@
         </p:nvSpPr>
         <p:spPr>
           <a:xfrm>
-            <a:off x="979488" y="1628800"/>
+            <a:off x="979707" y="1628800"/>
             <a:ext cx="6480720" cy="504056"/>
           </a:xfrm>
           <a:prstGeom prst="rect">
             <a:avLst/>
           </a:prstGeom>
+          <a:ln>
+            <a:noFill/>
+          </a:ln>
         </p:spPr>
         <p:style>
           <a:lnRef idx="2">
@@ -7212,12 +7205,15 @@
         </p:nvSpPr>
         <p:spPr>
           <a:xfrm>
-            <a:off x="979706" y="2204864"/>
+            <a:off x="979706" y="2132856"/>
             <a:ext cx="6480720" cy="504056"/>
           </a:xfrm>
           <a:prstGeom prst="rect">
             <a:avLst/>
           </a:prstGeom>
+          <a:ln>
+            <a:noFill/>
+          </a:ln>
         </p:spPr>
         <p:style>
           <a:lnRef idx="2">
@@ -7279,12 +7275,15 @@
         </p:nvSpPr>
         <p:spPr>
           <a:xfrm>
-            <a:off x="979706" y="2204864"/>
+            <a:off x="979706" y="2132856"/>
             <a:ext cx="6480720" cy="504056"/>
           </a:xfrm>
           <a:prstGeom prst="rect">
             <a:avLst/>
           </a:prstGeom>
+          <a:ln>
+            <a:noFill/>
+          </a:ln>
         </p:spPr>
         <p:style>
           <a:lnRef idx="2">
@@ -7330,12 +7329,15 @@
         </p:nvSpPr>
         <p:spPr>
           <a:xfrm>
-            <a:off x="979706" y="2780928"/>
+            <a:off x="979706" y="2636912"/>
             <a:ext cx="6480720" cy="504056"/>
           </a:xfrm>
           <a:prstGeom prst="rect">
             <a:avLst/>
           </a:prstGeom>
+          <a:ln>
+            <a:noFill/>
+          </a:ln>
         </p:spPr>
         <p:style>
           <a:lnRef idx="2">
@@ -7381,12 +7383,15 @@
         </p:nvSpPr>
         <p:spPr>
           <a:xfrm>
-            <a:off x="979706" y="2780928"/>
+            <a:off x="979706" y="2636912"/>
             <a:ext cx="6480720" cy="504056"/>
           </a:xfrm>
           <a:prstGeom prst="rect">
             <a:avLst/>
           </a:prstGeom>
+          <a:ln>
+            <a:noFill/>
+          </a:ln>
         </p:spPr>
         <p:style>
           <a:lnRef idx="2">
@@ -7455,14 +7460,136 @@
                             </p:stCondLst>
                             <p:childTnLst>
                               <p:par>
-                                <p:cTn id="5" presetID="22" presetClass="exit" presetSubtype="4" fill="hold" grpId="0" nodeType="clickEffect">
+                                <p:cTn id="5" presetID="31" presetClass="entr" presetSubtype="0" fill="hold" grpId="1" nodeType="clickEffect">
+                                  <p:stCondLst>
+                                    <p:cond delay="0"/>
+                                  </p:stCondLst>
+                                  <p:childTnLst>
+                                    <p:set>
+                                      <p:cBhvr>
+                                        <p:cTn id="6" dur="1" fill="hold">
+                                          <p:stCondLst>
+                                            <p:cond delay="0"/>
+                                          </p:stCondLst>
+                                        </p:cTn>
+                                        <p:tgtEl>
+                                          <p:spTgt spid="7"/>
+                                        </p:tgtEl>
+                                        <p:attrNameLst>
+                                          <p:attrName>style.visibility</p:attrName>
+                                        </p:attrNameLst>
+                                      </p:cBhvr>
+                                      <p:to>
+                                        <p:strVal val="visible"/>
+                                      </p:to>
+                                    </p:set>
+                                    <p:anim calcmode="lin" valueType="num">
+                                      <p:cBhvr>
+                                        <p:cTn id="7" dur="1000" fill="hold"/>
+                                        <p:tgtEl>
+                                          <p:spTgt spid="7"/>
+                                        </p:tgtEl>
+                                        <p:attrNameLst>
+                                          <p:attrName>ppt_w</p:attrName>
+                                        </p:attrNameLst>
+                                      </p:cBhvr>
+                                      <p:tavLst>
+                                        <p:tav tm="0">
+                                          <p:val>
+                                            <p:fltVal val="0"/>
+                                          </p:val>
+                                        </p:tav>
+                                        <p:tav tm="100000">
+                                          <p:val>
+                                            <p:strVal val="#ppt_w"/>
+                                          </p:val>
+                                        </p:tav>
+                                      </p:tavLst>
+                                    </p:anim>
+                                    <p:anim calcmode="lin" valueType="num">
+                                      <p:cBhvr>
+                                        <p:cTn id="8" dur="1000" fill="hold"/>
+                                        <p:tgtEl>
+                                          <p:spTgt spid="7"/>
+                                        </p:tgtEl>
+                                        <p:attrNameLst>
+                                          <p:attrName>ppt_h</p:attrName>
+                                        </p:attrNameLst>
+                                      </p:cBhvr>
+                                      <p:tavLst>
+                                        <p:tav tm="0">
+                                          <p:val>
+                                            <p:fltVal val="0"/>
+                                          </p:val>
+                                        </p:tav>
+                                        <p:tav tm="100000">
+                                          <p:val>
+                                            <p:strVal val="#ppt_h"/>
+                                          </p:val>
+                                        </p:tav>
+                                      </p:tavLst>
+                                    </p:anim>
+                                    <p:anim calcmode="lin" valueType="num">
+                                      <p:cBhvr>
+                                        <p:cTn id="9" dur="1000" fill="hold"/>
+                                        <p:tgtEl>
+                                          <p:spTgt spid="7"/>
+                                        </p:tgtEl>
+                                        <p:attrNameLst>
+                                          <p:attrName>style.rotation</p:attrName>
+                                        </p:attrNameLst>
+                                      </p:cBhvr>
+                                      <p:tavLst>
+                                        <p:tav tm="0">
+                                          <p:val>
+                                            <p:fltVal val="90"/>
+                                          </p:val>
+                                        </p:tav>
+                                        <p:tav tm="100000">
+                                          <p:val>
+                                            <p:fltVal val="0"/>
+                                          </p:val>
+                                        </p:tav>
+                                      </p:tavLst>
+                                    </p:anim>
+                                    <p:animEffect transition="in" filter="fade">
+                                      <p:cBhvr>
+                                        <p:cTn id="10" dur="1000"/>
+                                        <p:tgtEl>
+                                          <p:spTgt spid="7"/>
+                                        </p:tgtEl>
+                                      </p:cBhvr>
+                                    </p:animEffect>
+                                  </p:childTnLst>
+                                </p:cTn>
+                              </p:par>
+                            </p:childTnLst>
+                          </p:cTn>
+                        </p:par>
+                      </p:childTnLst>
+                    </p:cTn>
+                  </p:par>
+                  <p:par>
+                    <p:cTn id="11" fill="hold">
+                      <p:stCondLst>
+                        <p:cond delay="indefinite"/>
+                      </p:stCondLst>
+                      <p:childTnLst>
+                        <p:par>
+                          <p:cTn id="12" fill="hold">
+                            <p:stCondLst>
+                              <p:cond delay="0"/>
+                            </p:stCondLst>
+                            <p:childTnLst>
+                              <p:par>
+                                <p:cTn id="13" presetID="22" presetClass="exit" presetSubtype="4" fill="hold" grpId="0" nodeType="clickEffect">
                                   <p:stCondLst>
                                     <p:cond delay="0"/>
                                   </p:stCondLst>
                                   <p:childTnLst>
                                     <p:animEffect transition="out" filter="wipe(down)">
                                       <p:cBhvr>
-                                        <p:cTn id="6" dur="500"/>
+                                        <p:cTn id="14" dur="500"/>
                                         <p:tgtEl>
                                           <p:spTgt spid="7"/>
                                         </p:tgtEl>
@@ -7470,7 +7597,7 @@
                                     </p:animEffect>
                                     <p:set>
                                       <p:cBhvr>
-                                        <p:cTn id="7" dur="1" fill="hold">
+                                        <p:cTn id="15" dur="1" fill="hold">
                                           <p:stCondLst>
                                             <p:cond delay="499"/>
                                           </p:stCondLst>
@@ -7496,26 +7623,26 @@
                     </p:cTn>
                   </p:par>
                   <p:par>
-                    <p:cTn id="8" fill="hold">
+                    <p:cTn id="16" fill="hold">
                       <p:stCondLst>
                         <p:cond delay="indefinite"/>
                       </p:stCondLst>
                       <p:childTnLst>
                         <p:par>
-                          <p:cTn id="9" fill="hold">
+                          <p:cTn id="17" fill="hold">
                             <p:stCondLst>
                               <p:cond delay="0"/>
                             </p:stCondLst>
                             <p:childTnLst>
                               <p:par>
-                                <p:cTn id="10" presetID="22" presetClass="entr" presetSubtype="4" fill="hold" grpId="0" nodeType="clickEffect">
+                                <p:cTn id="18" presetID="22" presetClass="entr" presetSubtype="4" fill="hold" grpId="0" nodeType="clickEffect">
                                   <p:stCondLst>
                                     <p:cond delay="0"/>
                                   </p:stCondLst>
                                   <p:childTnLst>
                                     <p:set>
                                       <p:cBhvr>
-                                        <p:cTn id="11" dur="1" fill="hold">
+                                        <p:cTn id="19" dur="1" fill="hold">
                                           <p:stCondLst>
                                             <p:cond delay="0"/>
                                           </p:stCondLst>
@@ -7533,7 +7660,7 @@
                                     </p:set>
                                     <p:animEffect transition="in" filter="wipe(down)">
                                       <p:cBhvr>
-                                        <p:cTn id="12" dur="500"/>
+                                        <p:cTn id="20" dur="500"/>
                                         <p:tgtEl>
                                           <p:spTgt spid="8"/>
                                         </p:tgtEl>
@@ -7549,26 +7676,71 @@
                     </p:cTn>
                   </p:par>
                   <p:par>
-                    <p:cTn id="13" fill="hold">
+                    <p:cTn id="21" fill="hold">
                       <p:stCondLst>
                         <p:cond delay="indefinite"/>
                       </p:stCondLst>
                       <p:childTnLst>
                         <p:par>
-                          <p:cTn id="14" fill="hold">
+                          <p:cTn id="22" fill="hold">
                             <p:stCondLst>
                               <p:cond delay="0"/>
                             </p:stCondLst>
                             <p:childTnLst>
                               <p:par>
-                                <p:cTn id="15" presetID="6" presetClass="exit" presetSubtype="32" fill="hold" grpId="0" nodeType="clickEffect">
+                                <p:cTn id="23" presetID="1" presetClass="entr" presetSubtype="0" fill="hold" grpId="1" nodeType="clickEffect">
+                                  <p:stCondLst>
+                                    <p:cond delay="0"/>
+                                  </p:stCondLst>
+                                  <p:childTnLst>
+                                    <p:set>
+                                      <p:cBhvr>
+                                        <p:cTn id="24" dur="1" fill="hold">
+                                          <p:stCondLst>
+                                            <p:cond delay="0"/>
+                                          </p:stCondLst>
+                                        </p:cTn>
+                                        <p:tgtEl>
+                                          <p:spTgt spid="9"/>
+                                        </p:tgtEl>
+                                        <p:attrNameLst>
+                                          <p:attrName>style.visibility</p:attrName>
+                                        </p:attrNameLst>
+                                      </p:cBhvr>
+                                      <p:to>
+                                        <p:strVal val="visible"/>
+                                      </p:to>
+                                    </p:set>
+                                  </p:childTnLst>
+                                </p:cTn>
+                              </p:par>
+                            </p:childTnLst>
+                          </p:cTn>
+                        </p:par>
+                      </p:childTnLst>
+                    </p:cTn>
+                  </p:par>
+                  <p:par>
+                    <p:cTn id="25" fill="hold">
+                      <p:stCondLst>
+                        <p:cond delay="indefinite"/>
+                      </p:stCondLst>
+                      <p:childTnLst>
+                        <p:par>
+                          <p:cTn id="26" fill="hold">
+                            <p:stCondLst>
+                              <p:cond delay="0"/>
+                            </p:stCondLst>
+                            <p:childTnLst>
+                              <p:par>
+                                <p:cTn id="27" presetID="6" presetClass="exit" presetSubtype="32" fill="hold" grpId="0" nodeType="clickEffect">
                                   <p:stCondLst>
                                     <p:cond delay="0"/>
                                   </p:stCondLst>
                                   <p:childTnLst>
                                     <p:animEffect transition="out" filter="circle(out)">
                                       <p:cBhvr>
-                                        <p:cTn id="16" dur="2000"/>
+                                        <p:cTn id="28" dur="2000"/>
                                         <p:tgtEl>
                                           <p:spTgt spid="9"/>
                                         </p:tgtEl>
@@ -7576,7 +7748,7 @@
                                     </p:animEffect>
                                     <p:set>
                                       <p:cBhvr>
-                                        <p:cTn id="17" dur="1" fill="hold">
+                                        <p:cTn id="29" dur="1" fill="hold">
                                           <p:stCondLst>
                                             <p:cond delay="1999"/>
                                           </p:stCondLst>
@@ -7602,26 +7774,26 @@
                     </p:cTn>
                   </p:par>
                   <p:par>
-                    <p:cTn id="18" fill="hold">
+                    <p:cTn id="30" fill="hold">
                       <p:stCondLst>
                         <p:cond delay="indefinite"/>
                       </p:stCondLst>
                       <p:childTnLst>
                         <p:par>
-                          <p:cTn id="19" fill="hold">
+                          <p:cTn id="31" fill="hold">
                             <p:stCondLst>
                               <p:cond delay="0"/>
                             </p:stCondLst>
                             <p:childTnLst>
                               <p:par>
-                                <p:cTn id="20" presetID="6" presetClass="entr" presetSubtype="16" fill="hold" grpId="0" nodeType="clickEffect">
+                                <p:cTn id="32" presetID="6" presetClass="entr" presetSubtype="16" fill="hold" grpId="0" nodeType="clickEffect">
                                   <p:stCondLst>
                                     <p:cond delay="0"/>
                                   </p:stCondLst>
                                   <p:childTnLst>
                                     <p:set>
                                       <p:cBhvr>
-                                        <p:cTn id="21" dur="1" fill="hold">
+                                        <p:cTn id="33" dur="1" fill="hold">
                                           <p:stCondLst>
                                             <p:cond delay="0"/>
                                           </p:stCondLst>
@@ -7639,7 +7811,7 @@
                                     </p:set>
                                     <p:animEffect transition="in" filter="circle(in)">
                                       <p:cBhvr>
-                                        <p:cTn id="22" dur="2000"/>
+                                        <p:cTn id="34" dur="2000"/>
                                         <p:tgtEl>
                                           <p:spTgt spid="10"/>
                                         </p:tgtEl>
@@ -7655,26 +7827,125 @@
                     </p:cTn>
                   </p:par>
                   <p:par>
-                    <p:cTn id="23" fill="hold">
+                    <p:cTn id="35" fill="hold">
                       <p:stCondLst>
                         <p:cond delay="indefinite"/>
                       </p:stCondLst>
                       <p:childTnLst>
                         <p:par>
-                          <p:cTn id="24" fill="hold">
+                          <p:cTn id="36" fill="hold">
                             <p:stCondLst>
                               <p:cond delay="0"/>
                             </p:stCondLst>
                             <p:childTnLst>
                               <p:par>
-                                <p:cTn id="25" presetID="14" presetClass="exit" presetSubtype="10" fill="hold" grpId="0" nodeType="clickEffect">
+                                <p:cTn id="37" presetID="53" presetClass="entr" presetSubtype="16" fill="hold" grpId="1" nodeType="clickEffect">
+                                  <p:stCondLst>
+                                    <p:cond delay="0"/>
+                                  </p:stCondLst>
+                                  <p:childTnLst>
+                                    <p:set>
+                                      <p:cBhvr>
+                                        <p:cTn id="38" dur="1" fill="hold">
+                                          <p:stCondLst>
+                                            <p:cond delay="0"/>
+                                          </p:stCondLst>
+                                        </p:cTn>
+                                        <p:tgtEl>
+                                          <p:spTgt spid="11"/>
+                                        </p:tgtEl>
+                                        <p:attrNameLst>
+                                          <p:attrName>style.visibility</p:attrName>
+                                        </p:attrNameLst>
+                                      </p:cBhvr>
+                                      <p:to>
+                                        <p:strVal val="visible"/>
+                                      </p:to>
+                                    </p:set>
+                                    <p:anim calcmode="lin" valueType="num">
+                                      <p:cBhvr>
+                                        <p:cTn id="39" dur="500" fill="hold"/>
+                                        <p:tgtEl>
+                                          <p:spTgt spid="11"/>
+                                        </p:tgtEl>
+                                        <p:attrNameLst>
+                                          <p:attrName>ppt_w</p:attrName>
+                                        </p:attrNameLst>
+                                      </p:cBhvr>
+                                      <p:tavLst>
+                                        <p:tav tm="0">
+                                          <p:val>
+                                            <p:fltVal val="0"/>
+                                          </p:val>
+                                        </p:tav>
+                                        <p:tav tm="100000">
+                                          <p:val>
+                                            <p:strVal val="#ppt_w"/>
+                                          </p:val>
+                                        </p:tav>
+                                      </p:tavLst>
+                                    </p:anim>
+                                    <p:anim calcmode="lin" valueType="num">
+                                      <p:cBhvr>
+                                        <p:cTn id="40" dur="500" fill="hold"/>
+                                        <p:tgtEl>
+                                          <p:spTgt spid="11"/>
+                                        </p:tgtEl>
+                                        <p:attrNameLst>
+                                          <p:attrName>ppt_h</p:attrName>
+                                        </p:attrNameLst>
+                                      </p:cBhvr>
+                                      <p:tavLst>
+                                        <p:tav tm="0">
+                                          <p:val>
+                                            <p:fltVal val="0"/>
+                                          </p:val>
+                                        </p:tav>
+                                        <p:tav tm="100000">
+                                          <p:val>
+                                            <p:strVal val="#ppt_h"/>
+                                          </p:val>
+                                        </p:tav>
+                                      </p:tavLst>
+                                    </p:anim>
+                                    <p:animEffect transition="in" filter="fade">
+                                      <p:cBhvr>
+                                        <p:cTn id="41" dur="500"/>
+                                        <p:tgtEl>
+                                          <p:spTgt spid="11"/>
+                                        </p:tgtEl>
+                                      </p:cBhvr>
+                                    </p:animEffect>
+                                  </p:childTnLst>
+                                </p:cTn>
+                              </p:par>
+                            </p:childTnLst>
+                          </p:cTn>
+                        </p:par>
+                      </p:childTnLst>
+                    </p:cTn>
+                  </p:par>
+                  <p:par>
+                    <p:cTn id="42" fill="hold">
+                      <p:stCondLst>
+                        <p:cond delay="indefinite"/>
+                      </p:stCondLst>
+                      <p:childTnLst>
+                        <p:par>
+                          <p:cTn id="43" fill="hold">
+                            <p:stCondLst>
+                              <p:cond delay="0"/>
+                            </p:stCondLst>
+                            <p:childTnLst>
+                              <p:par>
+                                <p:cTn id="44" presetID="14" presetClass="exit" presetSubtype="10" fill="hold" grpId="0" nodeType="clickEffect">
                                   <p:stCondLst>
                                     <p:cond delay="0"/>
                                   </p:stCondLst>
                                   <p:childTnLst>
                                     <p:animEffect transition="out" filter="randombar(horizontal)">
                                       <p:cBhvr>
-                                        <p:cTn id="26" dur="500"/>
+                                        <p:cTn id="45" dur="500"/>
                                         <p:tgtEl>
                                           <p:spTgt spid="11"/>
                                         </p:tgtEl>
@@ -7682,7 +7953,7 @@
                                     </p:animEffect>
                                     <p:set>
                                       <p:cBhvr>
-                                        <p:cTn id="27" dur="1" fill="hold">
+                                        <p:cTn id="46" dur="1" fill="hold">
                                           <p:stCondLst>
                                             <p:cond delay="499"/>
                                           </p:stCondLst>
@@ -7708,26 +7979,26 @@
                     </p:cTn>
                   </p:par>
                   <p:par>
-                    <p:cTn id="28" fill="hold">
+                    <p:cTn id="47" fill="hold">
                       <p:stCondLst>
                         <p:cond delay="indefinite"/>
                       </p:stCondLst>
                       <p:childTnLst>
                         <p:par>
-                          <p:cTn id="29" fill="hold">
+                          <p:cTn id="48" fill="hold">
                             <p:stCondLst>
                               <p:cond delay="0"/>
                             </p:stCondLst>
                             <p:childTnLst>
                               <p:par>
-                                <p:cTn id="30" presetID="14" presetClass="entr" presetSubtype="10" fill="hold" grpId="0" nodeType="clickEffect">
+                                <p:cTn id="49" presetID="14" presetClass="entr" presetSubtype="10" fill="hold" grpId="0" nodeType="clickEffect">
                                   <p:stCondLst>
                                     <p:cond delay="0"/>
                                   </p:stCondLst>
                                   <p:childTnLst>
                                     <p:set>
                                       <p:cBhvr>
-                                        <p:cTn id="31" dur="1" fill="hold">
+                                        <p:cTn id="50" dur="1" fill="hold">
                                           <p:stCondLst>
                                             <p:cond delay="0"/>
                                           </p:stCondLst>
@@ -7745,7 +8016,7 @@
                                     </p:set>
                                     <p:animEffect transition="in" filter="randombar(horizontal)">
                                       <p:cBhvr>
-                                        <p:cTn id="32" dur="500"/>
+                                        <p:cTn id="51" dur="500"/>
                                         <p:tgtEl>
                                           <p:spTgt spid="12"/>
                                         </p:tgtEl>
@@ -7761,26 +8032,26 @@
                     </p:cTn>
                   </p:par>
                   <p:par>
-                    <p:cTn id="33" fill="hold">
+                    <p:cTn id="52" fill="hold">
                       <p:stCondLst>
                         <p:cond delay="indefinite"/>
                       </p:stCondLst>
                       <p:childTnLst>
                         <p:par>
-                          <p:cTn id="34" fill="hold">
+                          <p:cTn id="53" fill="hold">
                             <p:stCondLst>
                               <p:cond delay="0"/>
                             </p:stCondLst>
                             <p:childTnLst>
                               <p:par>
-                                <p:cTn id="35" presetID="2" presetClass="entr" presetSubtype="4" fill="hold" grpId="0" nodeType="clickEffect">
+                                <p:cTn id="54" presetID="2" presetClass="entr" presetSubtype="4" fill="hold" grpId="0" nodeType="clickEffect">
                                   <p:stCondLst>
                                     <p:cond delay="0"/>
                                   </p:stCondLst>
                                   <p:childTnLst>
                                     <p:set>
                                       <p:cBhvr>
-                                        <p:cTn id="36" dur="1" fill="hold">
+                                        <p:cTn id="55" dur="1" fill="hold">
                                           <p:stCondLst>
                                             <p:cond delay="0"/>
                                           </p:stCondLst>
@@ -7802,7 +8073,7 @@
                                     </p:set>
                                     <p:anim calcmode="lin" valueType="num">
                                       <p:cBhvr additive="base">
-                                        <p:cTn id="37" dur="500" fill="hold"/>
+                                        <p:cTn id="56" dur="500" fill="hold"/>
                                         <p:tgtEl>
                                           <p:spTgt spid="4">
                                             <p:txEl>
@@ -7829,7 +8100,7 @@
                                     </p:anim>
                                     <p:anim calcmode="lin" valueType="num">
                                       <p:cBhvr additive="base">
-                                        <p:cTn id="38" dur="500" fill="hold"/>
+                                        <p:cTn id="57" dur="500" fill="hold"/>
                                         <p:tgtEl>
                                           <p:spTgt spid="4">
                                             <p:txEl>
@@ -7864,26 +8135,26 @@
                     </p:cTn>
                   </p:par>
                   <p:par>
-                    <p:cTn id="39" fill="hold">
+                    <p:cTn id="58" fill="hold">
                       <p:stCondLst>
                         <p:cond delay="indefinite"/>
                       </p:stCondLst>
                       <p:childTnLst>
                         <p:par>
-                          <p:cTn id="40" fill="hold">
+                          <p:cTn id="59" fill="hold">
                             <p:stCondLst>
                               <p:cond delay="0"/>
                             </p:stCondLst>
                             <p:childTnLst>
                               <p:par>
-                                <p:cTn id="41" presetID="2" presetClass="entr" presetSubtype="4" fill="hold" grpId="0" nodeType="clickEffect">
+                                <p:cTn id="60" presetID="2" presetClass="entr" presetSubtype="4" fill="hold" grpId="0" nodeType="clickEffect">
                                   <p:stCondLst>
                                     <p:cond delay="0"/>
                                   </p:stCondLst>
                                   <p:childTnLst>
                                     <p:set>
                                       <p:cBhvr>
-                                        <p:cTn id="42" dur="1" fill="hold">
+                                        <p:cTn id="61" dur="1" fill="hold">
                                           <p:stCondLst>
                                             <p:cond delay="0"/>
                                           </p:stCondLst>
@@ -7905,7 +8176,7 @@
                                     </p:set>
                                     <p:anim calcmode="lin" valueType="num">
                                       <p:cBhvr additive="base">
-                                        <p:cTn id="43" dur="500" fill="hold"/>
+                                        <p:cTn id="62" dur="500" fill="hold"/>
                                         <p:tgtEl>
                                           <p:spTgt spid="4">
                                             <p:txEl>
@@ -7932,7 +8203,7 @@
                                     </p:anim>
                                     <p:anim calcmode="lin" valueType="num">
                                       <p:cBhvr additive="base">
-                                        <p:cTn id="44" dur="500" fill="hold"/>
+                                        <p:cTn id="63" dur="500" fill="hold"/>
                                         <p:tgtEl>
                                           <p:spTgt spid="4">
                                             <p:txEl>
@@ -7967,26 +8238,26 @@
                     </p:cTn>
                   </p:par>
                   <p:par>
-                    <p:cTn id="45" fill="hold">
+                    <p:cTn id="64" fill="hold">
                       <p:stCondLst>
                         <p:cond delay="indefinite"/>
                       </p:stCondLst>
                       <p:childTnLst>
                         <p:par>
-                          <p:cTn id="46" fill="hold">
+                          <p:cTn id="65" fill="hold">
                             <p:stCondLst>
                               <p:cond delay="0"/>
                             </p:stCondLst>
                             <p:childTnLst>
                               <p:par>
-                                <p:cTn id="47" presetID="2" presetClass="entr" presetSubtype="4" fill="hold" grpId="0" nodeType="clickEffect">
+                                <p:cTn id="66" presetID="2" presetClass="entr" presetSubtype="4" fill="hold" grpId="0" nodeType="clickEffect">
                                   <p:stCondLst>
                                     <p:cond delay="0"/>
                                   </p:stCondLst>
                                   <p:childTnLst>
                                     <p:set>
                                       <p:cBhvr>
-                                        <p:cTn id="48" dur="1" fill="hold">
+                                        <p:cTn id="67" dur="1" fill="hold">
                                           <p:stCondLst>
                                             <p:cond delay="0"/>
                                           </p:stCondLst>
@@ -8008,7 +8279,7 @@
                                     </p:set>
                                     <p:anim calcmode="lin" valueType="num">
                                       <p:cBhvr additive="base">
-                                        <p:cTn id="49" dur="500" fill="hold"/>
+                                        <p:cTn id="68" dur="500" fill="hold"/>
                                         <p:tgtEl>
                                           <p:spTgt spid="4">
                                             <p:txEl>
@@ -8035,7 +8306,7 @@
                                     </p:anim>
                                     <p:anim calcmode="lin" valueType="num">
                                       <p:cBhvr additive="base">
-                                        <p:cTn id="50" dur="500" fill="hold"/>
+                                        <p:cTn id="69" dur="500" fill="hold"/>
                                         <p:tgtEl>
                                           <p:spTgt spid="4">
                                             <p:txEl>
@@ -8064,14 +8335,14 @@
                                 </p:cTn>
                               </p:par>
                               <p:par>
-                                <p:cTn id="51" presetID="2" presetClass="entr" presetSubtype="4" fill="hold" grpId="0" nodeType="withEffect">
+                                <p:cTn id="70" presetID="2" presetClass="entr" presetSubtype="4" fill="hold" grpId="0" nodeType="withEffect">
                                   <p:stCondLst>
                                     <p:cond delay="0"/>
                                   </p:stCondLst>
                                   <p:childTnLst>
                                     <p:set>
                                       <p:cBhvr>
-                                        <p:cTn id="52" dur="1" fill="hold">
+                                        <p:cTn id="71" dur="1" fill="hold">
                                           <p:stCondLst>
                                             <p:cond delay="0"/>
                                           </p:stCondLst>
@@ -8093,7 +8364,7 @@
                                     </p:set>
                                     <p:anim calcmode="lin" valueType="num">
                                       <p:cBhvr additive="base">
-                                        <p:cTn id="53" dur="500" fill="hold"/>
+                                        <p:cTn id="72" dur="500" fill="hold"/>
                                         <p:tgtEl>
                                           <p:spTgt spid="4">
                                             <p:txEl>
@@ -8120,7 +8391,7 @@
                                     </p:anim>
                                     <p:anim calcmode="lin" valueType="num">
                                       <p:cBhvr additive="base">
-                                        <p:cTn id="54" dur="500" fill="hold"/>
+                                        <p:cTn id="73" dur="500" fill="hold"/>
                                         <p:tgtEl>
                                           <p:spTgt spid="4">
                                             <p:txEl>
@@ -8149,14 +8420,14 @@
                                 </p:cTn>
                               </p:par>
                               <p:par>
-                                <p:cTn id="55" presetID="2" presetClass="entr" presetSubtype="4" fill="hold" grpId="0" nodeType="withEffect">
+                                <p:cTn id="74" presetID="2" presetClass="entr" presetSubtype="4" fill="hold" grpId="0" nodeType="withEffect">
                                   <p:stCondLst>
                                     <p:cond delay="0"/>
                                   </p:stCondLst>
                                   <p:childTnLst>
                                     <p:set>
                                       <p:cBhvr>
-                                        <p:cTn id="56" dur="1" fill="hold">
+                                        <p:cTn id="75" dur="1" fill="hold">
                                           <p:stCondLst>
                                             <p:cond delay="0"/>
                                           </p:stCondLst>
@@ -8178,7 +8449,7 @@
                                     </p:set>
                                     <p:anim calcmode="lin" valueType="num">
                                       <p:cBhvr additive="base">
-                                        <p:cTn id="57" dur="500" fill="hold"/>
+                                        <p:cTn id="76" dur="500" fill="hold"/>
                                         <p:tgtEl>
                                           <p:spTgt spid="4">
                                             <p:txEl>
@@ -8205,7 +8476,7 @@
                                     </p:anim>
                                     <p:anim calcmode="lin" valueType="num">
                                       <p:cBhvr additive="base">
-                                        <p:cTn id="58" dur="500" fill="hold"/>
+                                        <p:cTn id="77" dur="500" fill="hold"/>
                                         <p:tgtEl>
                                           <p:spTgt spid="4">
                                             <p:txEl>
@@ -8263,10 +8534,13 @@
     <p:bldLst>
       <p:bldP spid="4" grpId="0" uiExpand="1" build="p"/>
       <p:bldP spid="7" grpId="0" animBg="1"/>
+      <p:bldP spid="7" grpId="1" animBg="1"/>
       <p:bldP spid="8" grpId="0" animBg="1"/>
       <p:bldP spid="9" grpId="0" animBg="1"/>
+      <p:bldP spid="9" grpId="1" animBg="1"/>
       <p:bldP spid="10" grpId="0" animBg="1"/>
       <p:bldP spid="11" grpId="0" animBg="1"/>
+      <p:bldP spid="11" grpId="1" animBg="1"/>
       <p:bldP spid="12" grpId="0" animBg="1"/>
     </p:bldLst>
   </p:timing>
@@ -8616,7 +8890,7 @@
         </p:nvSpPr>
         <p:spPr>
           <a:xfrm>
-            <a:off x="1115616" y="2285256"/>
+            <a:off x="1115616" y="2276872"/>
             <a:ext cx="6480720" cy="432048"/>
           </a:xfrm>
           <a:prstGeom prst="rect">
@@ -8708,7 +8982,7 @@
         </p:nvSpPr>
         <p:spPr>
           <a:xfrm>
-            <a:off x="2708176" y="2842474"/>
+            <a:off x="2708176" y="2852936"/>
             <a:ext cx="4888160" cy="2088232"/>
           </a:xfrm>
           <a:prstGeom prst="rect">
@@ -8822,14 +9096,58 @@
                             </p:stCondLst>
                             <p:childTnLst>
                               <p:par>
-                                <p:cTn id="5" presetID="2" presetClass="exit" presetSubtype="8" fill="hold" grpId="0" nodeType="clickEffect">
+                                <p:cTn id="5" presetID="26" presetClass="emph" presetSubtype="0" fill="hold" grpId="1" nodeType="clickEffect">
+                                  <p:stCondLst>
+                                    <p:cond delay="0"/>
+                                  </p:stCondLst>
+                                  <p:childTnLst>
+                                    <p:animEffect transition="out" filter="fade">
+                                      <p:cBhvr>
+                                        <p:cTn id="6" dur="500" tmFilter="0, 0; .2, .5; .8, .5; 1, 0"/>
+                                        <p:tgtEl>
+                                          <p:spTgt spid="4"/>
+                                        </p:tgtEl>
+                                      </p:cBhvr>
+                                    </p:animEffect>
+                                    <p:animScale>
+                                      <p:cBhvr>
+                                        <p:cTn id="7" dur="250" autoRev="1" fill="hold"/>
+                                        <p:tgtEl>
+                                          <p:spTgt spid="4"/>
+                                        </p:tgtEl>
+                                      </p:cBhvr>
+                                      <p:by x="105000" y="105000"/>
+                                    </p:animScale>
+                                  </p:childTnLst>
+                                </p:cTn>
+                              </p:par>
+                            </p:childTnLst>
+                          </p:cTn>
+                        </p:par>
+                      </p:childTnLst>
+                    </p:cTn>
+                  </p:par>
+                  <p:par>
+                    <p:cTn id="8" fill="hold">
+                      <p:stCondLst>
+                        <p:cond delay="indefinite"/>
+                      </p:stCondLst>
+                      <p:childTnLst>
+                        <p:par>
+                          <p:cTn id="9" fill="hold">
+                            <p:stCondLst>
+                              <p:cond delay="0"/>
+                            </p:stCondLst>
+                            <p:childTnLst>
+                              <p:par>
+                                <p:cTn id="10" presetID="2" presetClass="exit" presetSubtype="8" fill="hold" grpId="0" nodeType="clickEffect">
                                   <p:stCondLst>
                                     <p:cond delay="0"/>
                                   </p:stCondLst>
                                   <p:childTnLst>
                                     <p:anim calcmode="lin" valueType="num">
                                       <p:cBhvr additive="base">
-                                        <p:cTn id="6" dur="500"/>
+                                        <p:cTn id="11" dur="500"/>
                                         <p:tgtEl>
                                           <p:spTgt spid="4"/>
                                         </p:tgtEl>
@@ -8852,7 +9170,7 @@
                                     </p:anim>
                                     <p:anim calcmode="lin" valueType="num">
                                       <p:cBhvr additive="base">
-                                        <p:cTn id="7" dur="500"/>
+                                        <p:cTn id="12" dur="500"/>
                                         <p:tgtEl>
                                           <p:spTgt spid="4"/>
                                         </p:tgtEl>
@@ -8875,7 +9193,7 @@
                                     </p:anim>
                                     <p:set>
                                       <p:cBhvr>
-                                        <p:cTn id="8" dur="1" fill="hold">
+                                        <p:cTn id="13" dur="1" fill="hold">
                                           <p:stCondLst>
                                             <p:cond delay="499"/>
                                           </p:stCondLst>
@@ -8901,26 +9219,26 @@
                     </p:cTn>
                   </p:par>
                   <p:par>
-                    <p:cTn id="9" fill="hold">
+                    <p:cTn id="14" fill="hold">
                       <p:stCondLst>
                         <p:cond delay="indefinite"/>
                       </p:stCondLst>
                       <p:childTnLst>
                         <p:par>
-                          <p:cTn id="10" fill="hold">
+                          <p:cTn id="15" fill="hold">
                             <p:stCondLst>
                               <p:cond delay="0"/>
                             </p:stCondLst>
                             <p:childTnLst>
                               <p:par>
-                                <p:cTn id="11" presetID="2" presetClass="entr" presetSubtype="2" fill="hold" grpId="0" nodeType="clickEffect">
+                                <p:cTn id="16" presetID="2" presetClass="entr" presetSubtype="2" fill="hold" grpId="0" nodeType="clickEffect">
                                   <p:stCondLst>
                                     <p:cond delay="0"/>
                                   </p:stCondLst>
                                   <p:childTnLst>
                                     <p:set>
                                       <p:cBhvr>
-                                        <p:cTn id="12" dur="1" fill="hold">
+                                        <p:cTn id="17" dur="1" fill="hold">
                                           <p:stCondLst>
                                             <p:cond delay="0"/>
                                           </p:stCondLst>
@@ -8938,7 +9256,7 @@
                                     </p:set>
                                     <p:anim calcmode="lin" valueType="num">
                                       <p:cBhvr additive="base">
-                                        <p:cTn id="13" dur="500" fill="hold"/>
+                                        <p:cTn id="18" dur="500" fill="hold"/>
                                         <p:tgtEl>
                                           <p:spTgt spid="10"/>
                                         </p:tgtEl>
@@ -8961,7 +9279,7 @@
                                     </p:anim>
                                     <p:anim calcmode="lin" valueType="num">
                                       <p:cBhvr additive="base">
-                                        <p:cTn id="14" dur="500" fill="hold"/>
+                                        <p:cTn id="19" dur="500" fill="hold"/>
                                         <p:tgtEl>
                                           <p:spTgt spid="10"/>
                                         </p:tgtEl>
@@ -8992,26 +9310,128 @@
                     </p:cTn>
                   </p:par>
                   <p:par>
-                    <p:cTn id="15" fill="hold">
+                    <p:cTn id="20" fill="hold">
                       <p:stCondLst>
                         <p:cond delay="indefinite"/>
                       </p:stCondLst>
                       <p:childTnLst>
                         <p:par>
-                          <p:cTn id="16" fill="hold">
+                          <p:cTn id="21" fill="hold">
                             <p:stCondLst>
                               <p:cond delay="0"/>
                             </p:stCondLst>
                             <p:childTnLst>
                               <p:par>
-                                <p:cTn id="17" presetID="2" presetClass="exit" presetSubtype="8" fill="hold" grpId="0" nodeType="clickEffect">
+                                <p:cTn id="22" presetID="32" presetClass="emph" presetSubtype="0" fill="hold" grpId="1" nodeType="clickEffect">
+                                  <p:stCondLst>
+                                    <p:cond delay="0"/>
+                                  </p:stCondLst>
+                                  <p:childTnLst>
+                                    <p:animRot by="120000">
+                                      <p:cBhvr>
+                                        <p:cTn id="23" dur="100" fill="hold">
+                                          <p:stCondLst>
+                                            <p:cond delay="0"/>
+                                          </p:stCondLst>
+                                        </p:cTn>
+                                        <p:tgtEl>
+                                          <p:spTgt spid="6"/>
+                                        </p:tgtEl>
+                                        <p:attrNameLst>
+                                          <p:attrName>r</p:attrName>
+                                        </p:attrNameLst>
+                                      </p:cBhvr>
+                                    </p:animRot>
+                                    <p:animRot by="-240000">
+                                      <p:cBhvr>
+                                        <p:cTn id="24" dur="200" fill="hold">
+                                          <p:stCondLst>
+                                            <p:cond delay="200"/>
+                                          </p:stCondLst>
+                                        </p:cTn>
+                                        <p:tgtEl>
+                                          <p:spTgt spid="6"/>
+                                        </p:tgtEl>
+                                        <p:attrNameLst>
+                                          <p:attrName>r</p:attrName>
+                                        </p:attrNameLst>
+                                      </p:cBhvr>
+                                    </p:animRot>
+                                    <p:animRot by="240000">
+                                      <p:cBhvr>
+                                        <p:cTn id="25" dur="200" fill="hold">
+                                          <p:stCondLst>
+                                            <p:cond delay="400"/>
+                                          </p:stCondLst>
+                                        </p:cTn>
+                                        <p:tgtEl>
+                                          <p:spTgt spid="6"/>
+                                        </p:tgtEl>
+                                        <p:attrNameLst>
+                                          <p:attrName>r</p:attrName>
+                                        </p:attrNameLst>
+                                      </p:cBhvr>
+                                    </p:animRot>
+                                    <p:animRot by="-240000">
+                                      <p:cBhvr>
+                                        <p:cTn id="26" dur="200" fill="hold">
+                                          <p:stCondLst>
+                                            <p:cond delay="600"/>
+                                          </p:stCondLst>
+                                        </p:cTn>
+                                        <p:tgtEl>
+                                          <p:spTgt spid="6"/>
+                                        </p:tgtEl>
+                                        <p:attrNameLst>
+                                          <p:attrName>r</p:attrName>
+                                        </p:attrNameLst>
+                                      </p:cBhvr>
+                                    </p:animRot>
+                                    <p:animRot by="120000">
+                                      <p:cBhvr>
+                                        <p:cTn id="27" dur="200" fill="hold">
+                                          <p:stCondLst>
+                                            <p:cond delay="800"/>
+                                          </p:stCondLst>
+                                        </p:cTn>
+                                        <p:tgtEl>
+                                          <p:spTgt spid="6"/>
+                                        </p:tgtEl>
+                                        <p:attrNameLst>
+                                          <p:attrName>r</p:attrName>
+                                        </p:attrNameLst>
+                                      </p:cBhvr>
+                                    </p:animRot>
+                                  </p:childTnLst>
+                                </p:cTn>
+                              </p:par>
+                            </p:childTnLst>
+                          </p:cTn>
+                        </p:par>
+                      </p:childTnLst>
+                    </p:cTn>
+                  </p:par>
+                  <p:par>
+                    <p:cTn id="28" fill="hold">
+                      <p:stCondLst>
+                        <p:cond delay="indefinite"/>
+                      </p:stCondLst>
+                      <p:childTnLst>
+                        <p:par>
+                          <p:cTn id="29" fill="hold">
+                            <p:stCondLst>
+                              <p:cond delay="0"/>
+                            </p:stCondLst>
+                            <p:childTnLst>
+                              <p:par>
+                                <p:cTn id="30" presetID="2" presetClass="exit" presetSubtype="8" fill="hold" grpId="0" nodeType="clickEffect">
                                   <p:stCondLst>
                                     <p:cond delay="0"/>
                                   </p:stCondLst>
                                   <p:childTnLst>
                                     <p:anim calcmode="lin" valueType="num">
                                       <p:cBhvr additive="base">
-                                        <p:cTn id="18" dur="500"/>
+                                        <p:cTn id="31" dur="500"/>
                                         <p:tgtEl>
                                           <p:spTgt spid="6"/>
                                         </p:tgtEl>
@@ -9034,7 +9454,7 @@
                                     </p:anim>
                                     <p:anim calcmode="lin" valueType="num">
                                       <p:cBhvr additive="base">
-                                        <p:cTn id="19" dur="500"/>
+                                        <p:cTn id="32" dur="500"/>
                                         <p:tgtEl>
                                           <p:spTgt spid="6"/>
                                         </p:tgtEl>
@@ -9057,7 +9477,7 @@
                                     </p:anim>
                                     <p:set>
                                       <p:cBhvr>
-                                        <p:cTn id="20" dur="1" fill="hold">
+                                        <p:cTn id="33" dur="1" fill="hold">
                                           <p:stCondLst>
                                             <p:cond delay="499"/>
                                           </p:stCondLst>
@@ -9083,26 +9503,26 @@
                     </p:cTn>
                   </p:par>
                   <p:par>
-                    <p:cTn id="21" fill="hold">
+                    <p:cTn id="34" fill="hold">
                       <p:stCondLst>
                         <p:cond delay="indefinite"/>
                       </p:stCondLst>
                       <p:childTnLst>
                         <p:par>
-                          <p:cTn id="22" fill="hold">
+                          <p:cTn id="35" fill="hold">
                             <p:stCondLst>
                               <p:cond delay="0"/>
                             </p:stCondLst>
                             <p:childTnLst>
                               <p:par>
-                                <p:cTn id="23" presetID="2" presetClass="entr" presetSubtype="2" fill="hold" grpId="0" nodeType="clickEffect">
+                                <p:cTn id="36" presetID="2" presetClass="entr" presetSubtype="2" fill="hold" grpId="0" nodeType="clickEffect">
                                   <p:stCondLst>
                                     <p:cond delay="0"/>
                                   </p:stCondLst>
                                   <p:childTnLst>
                                     <p:set>
                                       <p:cBhvr>
-                                        <p:cTn id="24" dur="1" fill="hold">
+                                        <p:cTn id="37" dur="1" fill="hold">
                                           <p:stCondLst>
                                             <p:cond delay="0"/>
                                           </p:stCondLst>
@@ -9120,7 +9540,7 @@
                                     </p:set>
                                     <p:anim calcmode="lin" valueType="num">
                                       <p:cBhvr additive="base">
-                                        <p:cTn id="25" dur="500" fill="hold"/>
+                                        <p:cTn id="38" dur="500" fill="hold"/>
                                         <p:tgtEl>
                                           <p:spTgt spid="11"/>
                                         </p:tgtEl>
@@ -9143,7 +9563,7 @@
                                     </p:anim>
                                     <p:anim calcmode="lin" valueType="num">
                                       <p:cBhvr additive="base">
-                                        <p:cTn id="26" dur="500" fill="hold"/>
+                                        <p:cTn id="39" dur="500" fill="hold"/>
                                         <p:tgtEl>
                                           <p:spTgt spid="11"/>
                                         </p:tgtEl>
@@ -9174,26 +9594,109 @@
                     </p:cTn>
                   </p:par>
                   <p:par>
-                    <p:cTn id="27" fill="hold">
+                    <p:cTn id="40" fill="hold">
                       <p:stCondLst>
                         <p:cond delay="indefinite"/>
                       </p:stCondLst>
                       <p:childTnLst>
                         <p:par>
-                          <p:cTn id="28" fill="hold">
+                          <p:cTn id="41" fill="hold">
                             <p:stCondLst>
                               <p:cond delay="0"/>
                             </p:stCondLst>
                             <p:childTnLst>
                               <p:par>
-                                <p:cTn id="29" presetID="2" presetClass="exit" presetSubtype="8" fill="hold" grpId="0" nodeType="clickEffect">
+                                <p:cTn id="42" presetID="27" presetClass="emph" presetSubtype="0" fill="remove" grpId="1" nodeType="clickEffect">
+                                  <p:stCondLst>
+                                    <p:cond delay="0"/>
+                                  </p:stCondLst>
+                                  <p:childTnLst>
+                                    <p:animClr clrSpc="rgb" dir="cw">
+                                      <p:cBhvr override="childStyle">
+                                        <p:cTn id="43" dur="250" autoRev="1" fill="remove"/>
+                                        <p:tgtEl>
+                                          <p:spTgt spid="7"/>
+                                        </p:tgtEl>
+                                        <p:attrNameLst>
+                                          <p:attrName>style.color</p:attrName>
+                                        </p:attrNameLst>
+                                      </p:cBhvr>
+                                      <p:to>
+                                        <a:schemeClr val="bg1"/>
+                                      </p:to>
+                                    </p:animClr>
+                                    <p:animClr clrSpc="rgb" dir="cw">
+                                      <p:cBhvr>
+                                        <p:cTn id="44" dur="250" autoRev="1" fill="remove"/>
+                                        <p:tgtEl>
+                                          <p:spTgt spid="7"/>
+                                        </p:tgtEl>
+                                        <p:attrNameLst>
+                                          <p:attrName>fillcolor</p:attrName>
+                                        </p:attrNameLst>
+                                      </p:cBhvr>
+                                      <p:to>
+                                        <a:schemeClr val="bg1"/>
+                                      </p:to>
+                                    </p:animClr>
+                                    <p:set>
+                                      <p:cBhvr>
+                                        <p:cTn id="45" dur="250" autoRev="1" fill="remove"/>
+                                        <p:tgtEl>
+                                          <p:spTgt spid="7"/>
+                                        </p:tgtEl>
+                                        <p:attrNameLst>
+                                          <p:attrName>fill.type</p:attrName>
+                                        </p:attrNameLst>
+                                      </p:cBhvr>
+                                      <p:to>
+                                        <p:strVal val="solid"/>
+                                      </p:to>
+                                    </p:set>
+                                    <p:set>
+                                      <p:cBhvr>
+                                        <p:cTn id="46" dur="250" autoRev="1" fill="remove"/>
+                                        <p:tgtEl>
+                                          <p:spTgt spid="7"/>
+                                        </p:tgtEl>
+                                        <p:attrNameLst>
+                                          <p:attrName>fill.on</p:attrName>
+                                        </p:attrNameLst>
+                                      </p:cBhvr>
+                                      <p:to>
+                                        <p:strVal val="true"/>
+                                      </p:to>
+                                    </p:set>
+                                  </p:childTnLst>
+                                </p:cTn>
+                              </p:par>
+                            </p:childTnLst>
+                          </p:cTn>
+                        </p:par>
+                      </p:childTnLst>
+                    </p:cTn>
+                  </p:par>
+                  <p:par>
+                    <p:cTn id="47" fill="hold">
+                      <p:stCondLst>
+                        <p:cond delay="indefinite"/>
+                      </p:stCondLst>
+                      <p:childTnLst>
+                        <p:par>
+                          <p:cTn id="48" fill="hold">
+                            <p:stCondLst>
+                              <p:cond delay="0"/>
+                            </p:stCondLst>
+                            <p:childTnLst>
+                              <p:par>
+                                <p:cTn id="49" presetID="2" presetClass="exit" presetSubtype="8" fill="hold" grpId="0" nodeType="clickEffect">
                                   <p:stCondLst>
                                     <p:cond delay="0"/>
                                   </p:stCondLst>
                                   <p:childTnLst>
                                     <p:anim calcmode="lin" valueType="num">
                                       <p:cBhvr additive="base">
-                                        <p:cTn id="30" dur="500"/>
+                                        <p:cTn id="50" dur="500"/>
                                         <p:tgtEl>
                                           <p:spTgt spid="7"/>
                                         </p:tgtEl>
@@ -9216,7 +9719,7 @@
                                     </p:anim>
                                     <p:anim calcmode="lin" valueType="num">
                                       <p:cBhvr additive="base">
-                                        <p:cTn id="31" dur="500"/>
+                                        <p:cTn id="51" dur="500"/>
                                         <p:tgtEl>
                                           <p:spTgt spid="7"/>
                                         </p:tgtEl>
@@ -9239,7 +9742,7 @@
                                     </p:anim>
                                     <p:set>
                                       <p:cBhvr>
-                                        <p:cTn id="32" dur="1" fill="hold">
+                                        <p:cTn id="52" dur="1" fill="hold">
                                           <p:stCondLst>
                                             <p:cond delay="499"/>
                                           </p:stCondLst>
@@ -9265,26 +9768,26 @@
                     </p:cTn>
                   </p:par>
                   <p:par>
-                    <p:cTn id="33" fill="hold">
+                    <p:cTn id="53" fill="hold">
                       <p:stCondLst>
                         <p:cond delay="indefinite"/>
                       </p:stCondLst>
                       <p:childTnLst>
                         <p:par>
-                          <p:cTn id="34" fill="hold">
+                          <p:cTn id="54" fill="hold">
                             <p:stCondLst>
                               <p:cond delay="0"/>
                             </p:stCondLst>
                             <p:childTnLst>
                               <p:par>
-                                <p:cTn id="35" presetID="2" presetClass="entr" presetSubtype="4" fill="hold" grpId="0" nodeType="clickEffect">
+                                <p:cTn id="55" presetID="2" presetClass="entr" presetSubtype="4" fill="hold" grpId="0" nodeType="clickEffect">
                                   <p:stCondLst>
                                     <p:cond delay="0"/>
                                   </p:stCondLst>
                                   <p:childTnLst>
                                     <p:set>
                                       <p:cBhvr>
-                                        <p:cTn id="36" dur="1" fill="hold">
+                                        <p:cTn id="56" dur="1" fill="hold">
                                           <p:stCondLst>
                                             <p:cond delay="0"/>
                                           </p:stCondLst>
@@ -9302,7 +9805,7 @@
                                     </p:set>
                                     <p:anim calcmode="lin" valueType="num">
                                       <p:cBhvr additive="base">
-                                        <p:cTn id="37" dur="500" fill="hold"/>
+                                        <p:cTn id="57" dur="500" fill="hold"/>
                                         <p:tgtEl>
                                           <p:spTgt spid="12"/>
                                         </p:tgtEl>
@@ -9325,7 +9828,7 @@
                                     </p:anim>
                                     <p:anim calcmode="lin" valueType="num">
                                       <p:cBhvr additive="base">
-                                        <p:cTn id="38" dur="500" fill="hold"/>
+                                        <p:cTn id="58" dur="500" fill="hold"/>
                                         <p:tgtEl>
                                           <p:spTgt spid="12"/>
                                         </p:tgtEl>
@@ -9356,26 +9859,135 @@
                     </p:cTn>
                   </p:par>
                   <p:par>
-                    <p:cTn id="39" fill="hold">
+                    <p:cTn id="59" fill="hold">
                       <p:stCondLst>
                         <p:cond delay="indefinite"/>
                       </p:stCondLst>
                       <p:childTnLst>
                         <p:par>
-                          <p:cTn id="40" fill="hold">
+                          <p:cTn id="60" fill="hold">
                             <p:stCondLst>
                               <p:cond delay="0"/>
                             </p:stCondLst>
                             <p:childTnLst>
                               <p:par>
-                                <p:cTn id="41" presetID="22" presetClass="exit" presetSubtype="4" fill="hold" grpId="0" nodeType="clickEffect">
+                                <p:cTn id="61" presetID="34" presetClass="emph" presetSubtype="0" fill="hold" grpId="1" nodeType="clickEffect">
                                   <p:stCondLst>
                                     <p:cond delay="0"/>
                                   </p:stCondLst>
+                                  <p:iterate type="lt">
+                                    <p:tmPct val="10000"/>
+                                  </p:iterate>
+                                  <p:childTnLst>
+                                    <p:animMotion origin="layout" path="M 0.0 0.0 L 0.0 -0.07213" pathEditMode="relative" ptsTypes="">
+                                      <p:cBhvr>
+                                        <p:cTn id="62" dur="250" accel="50000" decel="50000" autoRev="1" fill="hold">
+                                          <p:stCondLst>
+                                            <p:cond delay="0"/>
+                                          </p:stCondLst>
+                                        </p:cTn>
+                                        <p:tgtEl>
+                                          <p:spTgt spid="9"/>
+                                        </p:tgtEl>
+                                        <p:attrNameLst>
+                                          <p:attrName>ppt_x</p:attrName>
+                                          <p:attrName>ppt_y</p:attrName>
+                                        </p:attrNameLst>
+                                      </p:cBhvr>
+                                    </p:animMotion>
+                                    <p:animRot by="1500000">
+                                      <p:cBhvr>
+                                        <p:cTn id="63" dur="125" fill="hold">
+                                          <p:stCondLst>
+                                            <p:cond delay="0"/>
+                                          </p:stCondLst>
+                                        </p:cTn>
+                                        <p:tgtEl>
+                                          <p:spTgt spid="9"/>
+                                        </p:tgtEl>
+                                        <p:attrNameLst>
+                                          <p:attrName>r</p:attrName>
+                                        </p:attrNameLst>
+                                      </p:cBhvr>
+                                    </p:animRot>
+                                    <p:animRot by="-1500000">
+                                      <p:cBhvr>
+                                        <p:cTn id="64" dur="125" fill="hold">
+                                          <p:stCondLst>
+                                            <p:cond delay="125"/>
+                                          </p:stCondLst>
+                                        </p:cTn>
+                                        <p:tgtEl>
+                                          <p:spTgt spid="9"/>
+                                        </p:tgtEl>
+                                        <p:attrNameLst>
+                                          <p:attrName>r</p:attrName>
+                                        </p:attrNameLst>
+                                      </p:cBhvr>
+                                    </p:animRot>
+                                    <p:animRot by="-1500000">
+                                      <p:cBhvr>
+                                        <p:cTn id="65" dur="125" fill="hold">
+                                          <p:stCondLst>
+                                            <p:cond delay="250"/>
+                                          </p:stCondLst>
+                                        </p:cTn>
+                                        <p:tgtEl>
+                                          <p:spTgt spid="9"/>
+                                        </p:tgtEl>
+                                        <p:attrNameLst>
+                                          <p:attrName>r</p:attrName>
+                                        </p:attrNameLst>
+                                      </p:cBhvr>
+                                    </p:animRot>
+                                    <p:animRot by="1500000">
+                                      <p:cBhvr>
+                                        <p:cTn id="66" dur="125" fill="hold">
+                                          <p:stCondLst>
+                                            <p:cond delay="375"/>
+                                          </p:stCondLst>
+                                        </p:cTn>
+                                        <p:tgtEl>
+                                          <p:spTgt spid="9"/>
+                                        </p:tgtEl>
+                                        <p:attrNameLst>
+                                          <p:attrName>r</p:attrName>
+                                        </p:attrNameLst>
+                                      </p:cBhvr>
+                                    </p:animRot>
+                                  </p:childTnLst>
+                                </p:cTn>
+                              </p:par>
+                            </p:childTnLst>
+                          </p:cTn>
+                        </p:par>
+                      </p:childTnLst>
+                    </p:cTn>
+                  </p:par>
+                  <p:par>
+                    <p:cTn id="67" fill="hold">
+                      <p:stCondLst>
+                        <p:cond delay="indefinite"/>
+                      </p:stCondLst>
+                      <p:childTnLst>
+                        <p:par>
+                          <p:cTn id="68" fill="hold">
+                            <p:stCondLst>
+                              <p:cond delay="0"/>
+                            </p:stCondLst>
+                            <p:childTnLst>
+                              <p:par>
+                                <p:cTn id="69" presetID="22" presetClass="exit" presetSubtype="4" fill="hold" grpId="0" nodeType="clickEffect">
+                                  <p:stCondLst>
+                                    <p:cond delay="0"/>
+                                  </p:stCondLst>
+                                  <p:iterate type="lt">
+                                    <p:tmPct val="0"/>
+                                  </p:iterate>
                                   <p:childTnLst>
                                     <p:animEffect transition="out" filter="wipe(down)">
                                       <p:cBhvr>
-                                        <p:cTn id="42" dur="500"/>
+                                        <p:cTn id="70" dur="500"/>
                                         <p:tgtEl>
                                           <p:spTgt spid="9"/>
                                         </p:tgtEl>
@@ -9383,7 +9995,7 @@
                                     </p:animEffect>
                                     <p:set>
                                       <p:cBhvr>
-                                        <p:cTn id="43" dur="1" fill="hold">
+                                        <p:cTn id="71" dur="1" fill="hold">
                                           <p:stCondLst>
                                             <p:cond delay="499"/>
                                           </p:stCondLst>
@@ -9409,26 +10021,26 @@
                     </p:cTn>
                   </p:par>
                   <p:par>
-                    <p:cTn id="44" fill="hold">
+                    <p:cTn id="72" fill="hold">
                       <p:stCondLst>
                         <p:cond delay="indefinite"/>
                       </p:stCondLst>
                       <p:childTnLst>
                         <p:par>
-                          <p:cTn id="45" fill="hold">
+                          <p:cTn id="73" fill="hold">
                             <p:stCondLst>
                               <p:cond delay="0"/>
                             </p:stCondLst>
                             <p:childTnLst>
                               <p:par>
-                                <p:cTn id="46" presetID="22" presetClass="entr" presetSubtype="4" fill="hold" grpId="0" nodeType="clickEffect">
+                                <p:cTn id="74" presetID="22" presetClass="entr" presetSubtype="4" fill="hold" grpId="0" nodeType="clickEffect">
                                   <p:stCondLst>
                                     <p:cond delay="0"/>
                                   </p:stCondLst>
                                   <p:childTnLst>
                                     <p:set>
                                       <p:cBhvr>
-                                        <p:cTn id="47" dur="1" fill="hold">
+                                        <p:cTn id="75" dur="1" fill="hold">
                                           <p:stCondLst>
                                             <p:cond delay="0"/>
                                           </p:stCondLst>
@@ -9446,7 +10058,7 @@
                                     </p:set>
                                     <p:animEffect transition="in" filter="wipe(down)">
                                       <p:cBhvr>
-                                        <p:cTn id="48" dur="500"/>
+                                        <p:cTn id="76" dur="500"/>
                                         <p:tgtEl>
                                           <p:spTgt spid="13"/>
                                         </p:tgtEl>
@@ -9462,26 +10074,109 @@
                     </p:cTn>
                   </p:par>
                   <p:par>
-                    <p:cTn id="49" fill="hold">
+                    <p:cTn id="77" fill="hold">
                       <p:stCondLst>
                         <p:cond delay="indefinite"/>
                       </p:stCondLst>
                       <p:childTnLst>
                         <p:par>
-                          <p:cTn id="50" fill="hold">
+                          <p:cTn id="78" fill="hold">
                             <p:stCondLst>
                               <p:cond delay="0"/>
                             </p:stCondLst>
                             <p:childTnLst>
                               <p:par>
-                                <p:cTn id="51" presetID="2" presetClass="exit" presetSubtype="4" fill="hold" grpId="0" nodeType="clickEffect">
+                                <p:cTn id="79" presetID="27" presetClass="emph" presetSubtype="0" fill="remove" grpId="1" nodeType="clickEffect">
+                                  <p:stCondLst>
+                                    <p:cond delay="0"/>
+                                  </p:stCondLst>
+                                  <p:childTnLst>
+                                    <p:animClr clrSpc="rgb" dir="cw">
+                                      <p:cBhvr override="childStyle">
+                                        <p:cTn id="80" dur="250" autoRev="1" fill="remove"/>
+                                        <p:tgtEl>
+                                          <p:spTgt spid="8"/>
+                                        </p:tgtEl>
+                                        <p:attrNameLst>
+                                          <p:attrName>style.color</p:attrName>
+                                        </p:attrNameLst>
+                                      </p:cBhvr>
+                                      <p:to>
+                                        <a:schemeClr val="bg1"/>
+                                      </p:to>
+                                    </p:animClr>
+                                    <p:animClr clrSpc="rgb" dir="cw">
+                                      <p:cBhvr>
+                                        <p:cTn id="81" dur="250" autoRev="1" fill="remove"/>
+                                        <p:tgtEl>
+                                          <p:spTgt spid="8"/>
+                                        </p:tgtEl>
+                                        <p:attrNameLst>
+                                          <p:attrName>fillcolor</p:attrName>
+                                        </p:attrNameLst>
+                                      </p:cBhvr>
+                                      <p:to>
+                                        <a:schemeClr val="bg1"/>
+                                      </p:to>
+                                    </p:animClr>
+                                    <p:set>
+                                      <p:cBhvr>
+                                        <p:cTn id="82" dur="250" autoRev="1" fill="remove"/>
+                                        <p:tgtEl>
+                                          <p:spTgt spid="8"/>
+                                        </p:tgtEl>
+                                        <p:attrNameLst>
+                                          <p:attrName>fill.type</p:attrName>
+                                        </p:attrNameLst>
+                                      </p:cBhvr>
+                                      <p:to>
+                                        <p:strVal val="solid"/>
+                                      </p:to>
+                                    </p:set>
+                                    <p:set>
+                                      <p:cBhvr>
+                                        <p:cTn id="83" dur="250" autoRev="1" fill="remove"/>
+                                        <p:tgtEl>
+                                          <p:spTgt spid="8"/>
+                                        </p:tgtEl>
+                                        <p:attrNameLst>
+                                          <p:attrName>fill.on</p:attrName>
+                                        </p:attrNameLst>
+                                      </p:cBhvr>
+                                      <p:to>
+                                        <p:strVal val="true"/>
+                                      </p:to>
+                                    </p:set>
+                                  </p:childTnLst>
+                                </p:cTn>
+                              </p:par>
+                            </p:childTnLst>
+                          </p:cTn>
+                        </p:par>
+                      </p:childTnLst>
+                    </p:cTn>
+                  </p:par>
+                  <p:par>
+                    <p:cTn id="84" fill="hold">
+                      <p:stCondLst>
+                        <p:cond delay="indefinite"/>
+                      </p:stCondLst>
+                      <p:childTnLst>
+                        <p:par>
+                          <p:cTn id="85" fill="hold">
+                            <p:stCondLst>
+                              <p:cond delay="0"/>
+                            </p:stCondLst>
+                            <p:childTnLst>
+                              <p:par>
+                                <p:cTn id="86" presetID="2" presetClass="exit" presetSubtype="4" fill="hold" grpId="0" nodeType="clickEffect">
                                   <p:stCondLst>
                                     <p:cond delay="0"/>
                                   </p:stCondLst>
                                   <p:childTnLst>
                                     <p:anim calcmode="lin" valueType="num">
                                       <p:cBhvr additive="base">
-                                        <p:cTn id="52" dur="500"/>
+                                        <p:cTn id="87" dur="500"/>
                                         <p:tgtEl>
                                           <p:spTgt spid="8"/>
                                         </p:tgtEl>
@@ -9504,7 +10199,7 @@
                                     </p:anim>
                                     <p:anim calcmode="lin" valueType="num">
                                       <p:cBhvr additive="base">
-                                        <p:cTn id="53" dur="500"/>
+                                        <p:cTn id="88" dur="500"/>
                                         <p:tgtEl>
                                           <p:spTgt spid="8"/>
                                         </p:tgtEl>
@@ -9527,7 +10222,7 @@
                                     </p:anim>
                                     <p:set>
                                       <p:cBhvr>
-                                        <p:cTn id="54" dur="1" fill="hold">
+                                        <p:cTn id="89" dur="1" fill="hold">
                                           <p:stCondLst>
                                             <p:cond delay="499"/>
                                           </p:stCondLst>
@@ -9553,26 +10248,26 @@
                     </p:cTn>
                   </p:par>
                   <p:par>
-                    <p:cTn id="55" fill="hold">
+                    <p:cTn id="90" fill="hold">
                       <p:stCondLst>
                         <p:cond delay="indefinite"/>
                       </p:stCondLst>
                       <p:childTnLst>
                         <p:par>
-                          <p:cTn id="56" fill="hold">
+                          <p:cTn id="91" fill="hold">
                             <p:stCondLst>
                               <p:cond delay="0"/>
                             </p:stCondLst>
                             <p:childTnLst>
                               <p:par>
-                                <p:cTn id="57" presetID="2" presetClass="entr" presetSubtype="4" fill="hold" grpId="0" nodeType="clickEffect">
+                                <p:cTn id="92" presetID="2" presetClass="entr" presetSubtype="4" fill="hold" grpId="0" nodeType="clickEffect">
                                   <p:stCondLst>
                                     <p:cond delay="0"/>
                                   </p:stCondLst>
                                   <p:childTnLst>
                                     <p:set>
                                       <p:cBhvr>
-                                        <p:cTn id="58" dur="1" fill="hold">
+                                        <p:cTn id="93" dur="1" fill="hold">
                                           <p:stCondLst>
                                             <p:cond delay="0"/>
                                           </p:stCondLst>
@@ -9590,7 +10285,7 @@
                                     </p:set>
                                     <p:anim calcmode="lin" valueType="num">
                                       <p:cBhvr additive="base">
-                                        <p:cTn id="59" dur="500" fill="hold"/>
+                                        <p:cTn id="94" dur="500" fill="hold"/>
                                         <p:tgtEl>
                                           <p:spTgt spid="14"/>
                                         </p:tgtEl>
@@ -9613,7 +10308,7 @@
                                     </p:anim>
                                     <p:anim calcmode="lin" valueType="num">
                                       <p:cBhvr additive="base">
-                                        <p:cTn id="60" dur="500" fill="hold"/>
+                                        <p:cTn id="95" dur="500" fill="hold"/>
                                         <p:tgtEl>
                                           <p:spTgt spid="14"/>
                                         </p:tgtEl>
@@ -9666,10 +10361,15 @@
     </p:tnLst>
     <p:bldLst>
       <p:bldP spid="4" grpId="0" animBg="1"/>
+      <p:bldP spid="4" grpId="1" animBg="1"/>
       <p:bldP spid="6" grpId="0" animBg="1"/>
+      <p:bldP spid="6" grpId="1" animBg="1"/>
       <p:bldP spid="7" grpId="0" animBg="1"/>
+      <p:bldP spid="7" grpId="1" animBg="1"/>
       <p:bldP spid="8" grpId="0" animBg="1"/>
+      <p:bldP spid="8" grpId="1" animBg="1"/>
       <p:bldP spid="9" grpId="0" animBg="1"/>
+      <p:bldP spid="9" grpId="1" animBg="1"/>
       <p:bldP spid="10" grpId="0" animBg="1"/>
       <p:bldP spid="11" grpId="0" animBg="1"/>
       <p:bldP spid="12" grpId="0" animBg="1"/>
@@ -11539,11 +12239,7 @@
           <a:p>
             <a:r>
               <a:rPr lang="en-CA" dirty="0" smtClean="0"/>
-              <a:t>Don’t </a:t>
-            </a:r>
-            <a:r>
-              <a:rPr lang="en-CA" dirty="0" smtClean="0"/>
-              <a:t>“sniff” for </a:t>
+              <a:t>Don’t “sniff” for </a:t>
             </a:r>
             <a:r>
               <a:rPr lang="en-CA" dirty="0"/>
@@ -17762,11 +18458,7 @@
           <a:p>
             <a:r>
               <a:rPr lang="en-CA" dirty="0" smtClean="0"/>
-              <a:t>Historically</a:t>
-            </a:r>
-            <a:r>
-              <a:rPr lang="en-CA" dirty="0" smtClean="0"/>
-              <a:t>, was a </a:t>
+              <a:t>Historically, was a </a:t>
             </a:r>
             <a:r>
               <a:rPr lang="en-CA" dirty="0">

</xml_diff>

<commit_message>
felt I was redundant with my first example
removed first example
</commit_message>
<xml_diff>
--- a/Docs/2012 - Live360 Event Review (NEWER).pptx
+++ b/Docs/2012 - Live360 Event Review (NEWER).pptx
@@ -219,7 +219,7 @@
           <a:p>
             <a:fld id="{6D05735F-B05D-4640-A99E-EDFA21E90228}" type="datetimeFigureOut">
               <a:rPr lang="en-US" smtClean="0"/>
-              <a:t>3/7/2013</a:t>
+              <a:t>3/9/2013</a:t>
             </a:fld>
             <a:endParaRPr lang="en-US"/>
           </a:p>
@@ -385,7 +385,7 @@
           <a:p>
             <a:fld id="{EB5D2808-713F-1C4D-AF0B-AEC7B1F49BC4}" type="datetimeFigureOut">
               <a:rPr lang="en-US" smtClean="0"/>
-              <a:t>3/7/2013</a:t>
+              <a:t>3/9/2013</a:t>
             </a:fld>
             <a:endParaRPr lang="en-US"/>
           </a:p>
@@ -2680,8 +2680,19 @@
             </a:r>
             <a:r>
               <a:rPr lang="en-CA" baseline="0" dirty="0" smtClean="0"/>
-              <a:t> an interesting “history” read, check out http://html5forwebdesigners.com/history/index.html</a:t>
-            </a:r>
+              <a:t> an interesting “history” read, check out </a:t>
+            </a:r>
+            <a:r>
+              <a:rPr lang="en-CA" baseline="0" dirty="0" smtClean="0"/>
+              <a:t>http://html5forwebdesigners.com/history/index.html or WHATWG’s </a:t>
+            </a:r>
+            <a:r>
+              <a:rPr lang="en-CA" dirty="0" smtClean="0">
+                <a:hlinkClick r:id="rId3"/>
+              </a:rPr>
+              <a:t>http://www.whatwg.org/specs/web-apps/current-work/multipage/introduction.html#history-1</a:t>
+            </a:r>
+            <a:endParaRPr lang="en-CA" baseline="0" dirty="0" smtClean="0"/>
           </a:p>
           <a:p>
             <a:pPr marL="0" marR="0" indent="0" algn="l" defTabSz="457200" rtl="0" eaLnBrk="1" fontAlgn="auto" latinLnBrk="0" hangingPunct="1">
@@ -3265,7 +3276,7 @@
           <a:p>
             <a:fld id="{EB6F4DCC-4F1E-F54C-AA63-5E9B8139A2C7}" type="datetime4">
               <a:rPr lang="en-CA" smtClean="0"/>
-              <a:t>March-7-13</a:t>
+              <a:t>March-9-13</a:t>
             </a:fld>
             <a:endParaRPr lang="en-US" dirty="0"/>
           </a:p>
@@ -3511,7 +3522,7 @@
           <a:p>
             <a:fld id="{E89AD498-328C-DE45-9033-626F46332D12}" type="datetime4">
               <a:rPr lang="en-CA" smtClean="0"/>
-              <a:t>March-7-13</a:t>
+              <a:t>March-9-13</a:t>
             </a:fld>
             <a:endParaRPr lang="en-US"/>
           </a:p>
@@ -3832,7 +3843,7 @@
           <a:p>
             <a:fld id="{205C405F-71DA-D945-AC37-528E00489EC0}" type="datetime4">
               <a:rPr lang="en-CA" smtClean="0"/>
-              <a:t>March-7-13</a:t>
+              <a:t>March-9-13</a:t>
             </a:fld>
             <a:endParaRPr lang="en-US"/>
           </a:p>
@@ -4364,7 +4375,7 @@
           <a:p>
             <a:fld id="{A706A332-CB54-F44D-AAB8-905B7A2134BC}" type="datetime4">
               <a:rPr lang="en-CA" smtClean="0"/>
-              <a:t>March-7-13</a:t>
+              <a:t>March-9-13</a:t>
             </a:fld>
             <a:endParaRPr lang="en-US" dirty="0"/>
           </a:p>
@@ -4741,7 +4752,7 @@
           <a:p>
             <a:fld id="{C8774548-0BB4-5443-9210-BF9E4921324F}" type="datetime4">
               <a:rPr lang="en-CA" smtClean="0"/>
-              <a:t>March-7-13</a:t>
+              <a:t>March-9-13</a:t>
             </a:fld>
             <a:endParaRPr lang="en-US"/>
           </a:p>
@@ -5118,7 +5129,7 @@
           <a:p>
             <a:fld id="{DA5AA9F5-8C84-A342-A63E-20B4B9965A72}" type="datetime4">
               <a:rPr lang="en-CA" smtClean="0"/>
-              <a:t>March-7-13</a:t>
+              <a:t>March-9-13</a:t>
             </a:fld>
             <a:endParaRPr lang="en-US"/>
           </a:p>
@@ -5525,7 +5536,7 @@
           <a:p>
             <a:fld id="{B75CC70B-AAA2-1A4B-980F-5795C4FC07F0}" type="datetime4">
               <a:rPr lang="en-CA" smtClean="0"/>
-              <a:t>March-7-13</a:t>
+              <a:t>March-9-13</a:t>
             </a:fld>
             <a:endParaRPr lang="en-US"/>
           </a:p>
@@ -5789,7 +5800,7 @@
           <a:p>
             <a:fld id="{634933C9-6163-F741-B0D7-A3D45CDF27BE}" type="datetime4">
               <a:rPr lang="en-CA" smtClean="0"/>
-              <a:t>March-7-13</a:t>
+              <a:t>March-9-13</a:t>
             </a:fld>
             <a:endParaRPr lang="en-US"/>
           </a:p>
@@ -6293,7 +6304,7 @@
           <a:p>
             <a:fld id="{952FD3B8-8B26-5944-8B2D-223A1203AFC1}" type="datetime4">
               <a:rPr lang="en-CA" smtClean="0"/>
-              <a:t>March-7-13</a:t>
+              <a:t>March-9-13</a:t>
             </a:fld>
             <a:endParaRPr lang="en-US" dirty="0" err="1"/>
           </a:p>
@@ -7021,8 +7032,8 @@
           <a:lstStyle/>
           <a:p>
             <a:r>
-              <a:rPr lang="en-CA" dirty="0"/>
-              <a:t>HTML 5 </a:t>
+              <a:rPr lang="en-CA" dirty="0" smtClean="0"/>
+              <a:t>HTML5 </a:t>
             </a:r>
             <a:r>
               <a:rPr lang="en-CA" dirty="0" smtClean="0"/>
@@ -8604,8 +8615,8 @@
           <a:lstStyle/>
           <a:p>
             <a:r>
-              <a:rPr lang="en-CA" dirty="0"/>
-              <a:t>HTML 5 </a:t>
+              <a:rPr lang="en-CA" dirty="0" smtClean="0"/>
+              <a:t>HTML5 </a:t>
             </a:r>
             <a:r>
               <a:rPr lang="en-CA" dirty="0" smtClean="0"/>
@@ -10522,7 +10533,7 @@
           <a:p>
             <a:r>
               <a:rPr lang="en-US" dirty="0" smtClean="0"/>
-              <a:t>HTML 5</a:t>
+              <a:t>HTML5</a:t>
             </a:r>
             <a:endParaRPr lang="en-CA" dirty="0"/>
           </a:p>
@@ -12147,8 +12158,12 @@
           <a:lstStyle/>
           <a:p>
             <a:r>
+              <a:rPr lang="en-CA" dirty="0" smtClean="0"/>
+              <a:t>HTML5 </a:t>
+            </a:r>
+            <a:r>
               <a:rPr lang="en-CA" dirty="0"/>
-              <a:t>HTML 5 - Browser Support</a:t>
+              <a:t>- Browser Support</a:t>
             </a:r>
           </a:p>
         </p:txBody>
@@ -12477,7 +12492,7 @@
           <a:p>
             <a:r>
               <a:rPr lang="en-US" dirty="0" smtClean="0"/>
-              <a:t>HTML 5</a:t>
+              <a:t>HTML5</a:t>
             </a:r>
             <a:endParaRPr lang="en-CA" dirty="0"/>
           </a:p>
@@ -14188,8 +14203,8 @@
           <a:lstStyle/>
           <a:p>
             <a:r>
-              <a:rPr lang="en-CA" dirty="0"/>
-              <a:t>HTML 5 </a:t>
+              <a:rPr lang="en-CA" dirty="0" smtClean="0"/>
+              <a:t>HTML5 </a:t>
             </a:r>
             <a:r>
               <a:rPr lang="en-CA" dirty="0" smtClean="0"/>
@@ -14479,7 +14494,7 @@
           <a:p>
             <a:r>
               <a:rPr lang="en-US" dirty="0" smtClean="0"/>
-              <a:t>HTML 5</a:t>
+              <a:t>HTML5</a:t>
             </a:r>
             <a:endParaRPr lang="en-CA" dirty="0"/>
           </a:p>
@@ -16224,8 +16239,8 @@
           <a:lstStyle/>
           <a:p>
             <a:r>
-              <a:rPr lang="en-CA" dirty="0"/>
-              <a:t>HTML 5 </a:t>
+              <a:rPr lang="en-CA" dirty="0" smtClean="0"/>
+              <a:t>HTML5 </a:t>
             </a:r>
             <a:r>
               <a:rPr lang="en-CA" dirty="0" err="1" smtClean="0"/>
@@ -16464,7 +16479,7 @@
           <a:p>
             <a:r>
               <a:rPr lang="en-US" dirty="0" smtClean="0"/>
-              <a:t>HTML 5</a:t>
+              <a:t>HTML5</a:t>
             </a:r>
             <a:endParaRPr lang="en-CA" dirty="0"/>
           </a:p>
@@ -18753,7 +18768,7 @@
           <a:p>
             <a:r>
               <a:rPr lang="en-US" dirty="0" smtClean="0"/>
-              <a:t>HTML 5</a:t>
+              <a:t>HTML5</a:t>
             </a:r>
             <a:endParaRPr lang="en-CA" dirty="0"/>
           </a:p>
@@ -20890,7 +20905,7 @@
           <a:p>
             <a:r>
               <a:rPr lang="en-US" dirty="0" smtClean="0"/>
-              <a:t>HTML 5</a:t>
+              <a:t>HTML5</a:t>
             </a:r>
             <a:endParaRPr lang="en-CA" dirty="0"/>
           </a:p>
@@ -23070,7 +23085,7 @@
           <a:p>
             <a:r>
               <a:rPr lang="en-US" dirty="0" smtClean="0"/>
-              <a:t>HTML 5</a:t>
+              <a:t>HTML5</a:t>
             </a:r>
             <a:endParaRPr lang="en-CA" dirty="0"/>
           </a:p>
@@ -25213,8 +25228,8 @@
           <a:lstStyle/>
           <a:p>
             <a:r>
-              <a:rPr lang="en-CA" dirty="0"/>
-              <a:t>HTML 5… </a:t>
+              <a:rPr lang="en-CA" dirty="0" smtClean="0"/>
+              <a:t>HTML5… </a:t>
             </a:r>
             <a:endParaRPr lang="en-CA" dirty="0" smtClean="0"/>
           </a:p>
@@ -25474,7 +25489,7 @@
           <a:p>
             <a:r>
               <a:rPr lang="en-US" dirty="0" smtClean="0"/>
-              <a:t>HTML 5</a:t>
+              <a:t>HTML5</a:t>
             </a:r>
             <a:endParaRPr lang="en-CA" dirty="0"/>
           </a:p>
@@ -26941,7 +26956,7 @@
           <a:p>
             <a:r>
               <a:rPr lang="en-US" dirty="0" smtClean="0"/>
-              <a:t>HTML 5</a:t>
+              <a:t>HTML5</a:t>
             </a:r>
             <a:endParaRPr lang="en-CA" dirty="0"/>
           </a:p>
@@ -28499,7 +28514,11 @@
           <a:p>
             <a:r>
               <a:rPr lang="en-CA" dirty="0" smtClean="0"/>
-              <a:t>HTML 5 History</a:t>
+              <a:t>HTML5 </a:t>
+            </a:r>
+            <a:r>
+              <a:rPr lang="en-CA" dirty="0" smtClean="0"/>
+              <a:t>History</a:t>
             </a:r>
             <a:endParaRPr lang="en-CA" dirty="0"/>
           </a:p>
@@ -28544,11 +28563,49 @@
             <a:pPr lvl="1"/>
             <a:r>
               <a:rPr lang="en-CA" dirty="0" smtClean="0"/>
-              <a:t>HTML </a:t>
+              <a:t>CERN and IETF: HTML </a:t>
             </a:r>
             <a:r>
               <a:rPr lang="en-CA" dirty="0"/>
-              <a:t>(1991), HTML2 (1994), HTML3 (1995), HTML3.2 &amp; 4 (1997), XHTML1 (2000</a:t>
+              <a:t>(1991), HTML2 (1994</a:t>
+            </a:r>
+            <a:r>
+              <a:rPr lang="en-CA" dirty="0" smtClean="0"/>
+              <a:t>)</a:t>
+            </a:r>
+          </a:p>
+          <a:p>
+            <a:pPr lvl="1"/>
+            <a:r>
+              <a:rPr lang="en-CA" dirty="0" smtClean="0"/>
+              <a:t>W3C: HTML3 </a:t>
+            </a:r>
+            <a:r>
+              <a:rPr lang="en-CA" dirty="0"/>
+              <a:t>(1995), HTML3.2 &amp; 4 (1997</a:t>
+            </a:r>
+            <a:r>
+              <a:rPr lang="en-CA" dirty="0" smtClean="0"/>
+              <a:t>)</a:t>
+            </a:r>
+          </a:p>
+          <a:p>
+            <a:pPr lvl="1"/>
+            <a:r>
+              <a:rPr lang="en-CA" dirty="0" smtClean="0"/>
+              <a:t>W3C decided to stop evolving “HTML” (1998)</a:t>
+            </a:r>
+            <a:endParaRPr lang="en-CA" dirty="0"/>
+          </a:p>
+          <a:p>
+            <a:pPr lvl="1"/>
+            <a:r>
+              <a:rPr lang="en-CA" dirty="0" smtClean="0"/>
+              <a:t>W3C: </a:t>
+            </a:r>
+            <a:r>
+              <a:rPr lang="en-CA" dirty="0"/>
+              <a:t>XHTML1 (2000</a:t>
             </a:r>
             <a:r>
               <a:rPr lang="en-CA" dirty="0" smtClean="0"/>
@@ -28586,8 +28643,20 @@
             </a:r>
             <a:r>
               <a:rPr lang="en-CA" dirty="0" smtClean="0"/>
-              <a:t> and created HTML5</a:t>
-            </a:r>
+              <a:t> and created </a:t>
+            </a:r>
+            <a:r>
+              <a:rPr lang="en-CA" dirty="0" smtClean="0"/>
+              <a:t>HTML5</a:t>
+            </a:r>
+          </a:p>
+          <a:p>
+            <a:pPr lvl="1"/>
+            <a:r>
+              <a:rPr lang="en-CA" dirty="0" smtClean="0"/>
+              <a:t>Group contained: Apple, Mozilla, Opera</a:t>
+            </a:r>
+            <a:endParaRPr lang="en-CA" dirty="0" smtClean="0"/>
           </a:p>
           <a:p>
             <a:r>
@@ -28602,7 +28671,15 @@
             </a:r>
             <a:r>
               <a:rPr lang="en-CA" dirty="0"/>
-              <a:t>W3C permission to publish HTML 5… so really </a:t>
+              <a:t>W3C permission to publish </a:t>
+            </a:r>
+            <a:r>
+              <a:rPr lang="en-CA" dirty="0" smtClean="0"/>
+              <a:t>HTML5… </a:t>
+            </a:r>
+            <a:r>
+              <a:rPr lang="en-CA" dirty="0"/>
+              <a:t>so really </a:t>
             </a:r>
             <a:r>
               <a:rPr lang="en-CA" dirty="0" smtClean="0"/>
@@ -28707,8 +28784,12 @@
           <a:lstStyle/>
           <a:p>
             <a:r>
+              <a:rPr lang="en-CA" dirty="0" smtClean="0"/>
+              <a:t>HTML5 </a:t>
+            </a:r>
+            <a:r>
               <a:rPr lang="en-CA" dirty="0"/>
-              <a:t>HTML 5 History</a:t>
+              <a:t>History</a:t>
             </a:r>
           </a:p>
         </p:txBody>
@@ -28750,11 +28831,21 @@
               <a:rPr lang="en-CA" dirty="0">
                 <a:hlinkClick r:id="rId3"/>
               </a:rPr>
-              <a:t>The world is moving to HTML 5</a:t>
+              <a:t>The world is moving to </a:t>
+            </a:r>
+            <a:r>
+              <a:rPr lang="en-CA" dirty="0" smtClean="0">
+                <a:hlinkClick r:id="rId3"/>
+              </a:rPr>
+              <a:t>HTML5</a:t>
+            </a:r>
+            <a:r>
+              <a:rPr lang="en-CA" dirty="0" smtClean="0"/>
+              <a:t>” </a:t>
             </a:r>
             <a:r>
               <a:rPr lang="en-CA" dirty="0"/>
-              <a:t>” – Steve </a:t>
+              <a:t>– Steve </a:t>
             </a:r>
             <a:r>
               <a:rPr lang="en-CA" dirty="0" smtClean="0"/>
@@ -28956,8 +29047,12 @@
           <a:lstStyle/>
           <a:p>
             <a:r>
+              <a:rPr lang="en-CA" dirty="0" smtClean="0"/>
+              <a:t>HTML5 </a:t>
+            </a:r>
+            <a:r>
               <a:rPr lang="en-CA" dirty="0"/>
-              <a:t>HTML 5 – What is it?</a:t>
+              <a:t>– What is it?</a:t>
             </a:r>
           </a:p>
         </p:txBody>
@@ -29210,7 +29305,7 @@
           <a:p>
             <a:r>
               <a:rPr lang="en-US" dirty="0" smtClean="0"/>
-              <a:t>HTML 5</a:t>
+              <a:t>HTML5</a:t>
             </a:r>
             <a:endParaRPr lang="en-CA" dirty="0"/>
           </a:p>

</xml_diff>

<commit_message>
more updates... again based on old redundant demos
</commit_message>
<xml_diff>
--- a/Docs/2012 - Live360 Event Review (NEWER).pptx
+++ b/Docs/2012 - Live360 Event Review (NEWER).pptx
@@ -12309,8 +12309,13 @@
           <a:p>
             <a:r>
               <a:rPr lang="en-CA" dirty="0" smtClean="0"/>
-              <a:t>DEMO 1 – 3</a:t>
-            </a:r>
+              <a:t>DEMO 1 – </a:t>
+            </a:r>
+            <a:r>
+              <a:rPr lang="en-CA" dirty="0" smtClean="0"/>
+              <a:t>2</a:t>
+            </a:r>
+            <a:endParaRPr lang="en-CA" dirty="0" smtClean="0"/>
           </a:p>
           <a:p>
             <a:pPr lvl="1"/>
@@ -14304,8 +14309,13 @@
           <a:p>
             <a:r>
               <a:rPr lang="en-CA" dirty="0" smtClean="0"/>
-              <a:t>Demo 4</a:t>
-            </a:r>
+              <a:t>Demo </a:t>
+            </a:r>
+            <a:r>
+              <a:rPr lang="en-CA" dirty="0" smtClean="0"/>
+              <a:t>3</a:t>
+            </a:r>
+            <a:endParaRPr lang="en-CA" dirty="0" smtClean="0"/>
           </a:p>
           <a:p>
             <a:pPr lvl="1"/>
@@ -14319,7 +14329,7 @@
               <a:rPr lang="en-CA" dirty="0" smtClean="0">
                 <a:hlinkClick r:id="rId3"/>
               </a:rPr>
-              <a:t>html5demo1.azurewebsites.net/Demo04-NewInputTypes.html</a:t>
+              <a:t>html5demo1.azurewebsites.net/Demo03-NewInputTypes.html</a:t>
             </a:r>
             <a:endParaRPr lang="en-CA" dirty="0" smtClean="0"/>
           </a:p>
@@ -16282,8 +16292,13 @@
           <a:p>
             <a:r>
               <a:rPr lang="en-CA" dirty="0" smtClean="0"/>
-              <a:t>Demo 5</a:t>
-            </a:r>
+              <a:t>Demo </a:t>
+            </a:r>
+            <a:r>
+              <a:rPr lang="en-CA" dirty="0" smtClean="0"/>
+              <a:t>4</a:t>
+            </a:r>
+            <a:endParaRPr lang="en-CA" dirty="0" smtClean="0"/>
           </a:p>
           <a:p>
             <a:pPr lvl="1"/>
@@ -16297,7 +16312,7 @@
               <a:rPr lang="en-CA" dirty="0" smtClean="0">
                 <a:hlinkClick r:id="rId3"/>
               </a:rPr>
-              <a:t>html5demo1.azurewebsites.net/Demo05-Multimedia.html</a:t>
+              <a:t>html5demo1.azurewebsites.net/Demo04-Multimedia.html</a:t>
             </a:r>
             <a:endParaRPr lang="en-CA" dirty="0" smtClean="0"/>
           </a:p>
@@ -18354,8 +18369,8 @@
               <a:t>Demo </a:t>
             </a:r>
             <a:r>
-              <a:rPr lang="en-CA" dirty="0" smtClean="0"/>
-              <a:t>6</a:t>
+              <a:rPr lang="en-CA" dirty="0"/>
+              <a:t>5</a:t>
             </a:r>
             <a:endParaRPr lang="en-CA" dirty="0"/>
           </a:p>
@@ -20720,8 +20735,13 @@
           <a:p>
             <a:r>
               <a:rPr lang="en-CA" dirty="0" smtClean="0"/>
-              <a:t>Demo 7</a:t>
-            </a:r>
+              <a:t>Demo </a:t>
+            </a:r>
+            <a:r>
+              <a:rPr lang="en-CA" dirty="0" smtClean="0"/>
+              <a:t>6</a:t>
+            </a:r>
+            <a:endParaRPr lang="en-CA" dirty="0" smtClean="0"/>
           </a:p>
           <a:p>
             <a:pPr lvl="1"/>
@@ -22877,8 +22897,13 @@
           <a:p>
             <a:r>
               <a:rPr lang="en-CA" dirty="0" smtClean="0"/>
-              <a:t>Demo 8</a:t>
-            </a:r>
+              <a:t>Demo </a:t>
+            </a:r>
+            <a:r>
+              <a:rPr lang="en-CA" dirty="0" smtClean="0"/>
+              <a:t>7</a:t>
+            </a:r>
+            <a:endParaRPr lang="en-CA" dirty="0" smtClean="0"/>
           </a:p>
           <a:p>
             <a:pPr lvl="1"/>

</xml_diff>

<commit_message>
updated to power point
</commit_message>
<xml_diff>
--- a/Docs/2012 - Live360 Event Review (NEWER).pptx
+++ b/Docs/2012 - Live360 Event Review (NEWER).pptx
@@ -219,7 +219,7 @@
           <a:p>
             <a:fld id="{6D05735F-B05D-4640-A99E-EDFA21E90228}" type="datetimeFigureOut">
               <a:rPr lang="en-US" smtClean="0"/>
-              <a:t>3/13/2013</a:t>
+              <a:t>3/14/2013</a:t>
             </a:fld>
             <a:endParaRPr lang="en-US"/>
           </a:p>
@@ -385,7 +385,7 @@
           <a:p>
             <a:fld id="{EB5D2808-713F-1C4D-AF0B-AEC7B1F49BC4}" type="datetimeFigureOut">
               <a:rPr lang="en-US" smtClean="0"/>
-              <a:t>3/13/2013</a:t>
+              <a:t>3/14/2013</a:t>
             </a:fld>
             <a:endParaRPr lang="en-US"/>
           </a:p>
@@ -709,7 +709,6 @@
               <a:rPr lang="en-CA" baseline="0" dirty="0" smtClean="0"/>
               <a:t> allowed the opportunity of attending a conference in December called Live360. </a:t>
             </a:r>
-            <a:endParaRPr lang="en-CA" baseline="0" dirty="0" smtClean="0"/>
           </a:p>
           <a:p>
             <a:pPr defTabSz="483306">
@@ -717,45 +716,21 @@
             </a:pPr>
             <a:r>
               <a:rPr lang="en-CA" baseline="0" dirty="0" smtClean="0"/>
-              <a:t>This </a:t>
+              <a:t>This presentation had its genesis from attending this.</a:t>
+            </a:r>
+          </a:p>
+          <a:p>
+            <a:r>
+              <a:rPr lang="en-CA" dirty="0" smtClean="0"/>
+              <a:t>You may access all of the mater</a:t>
             </a:r>
             <a:r>
               <a:rPr lang="en-CA" baseline="0" dirty="0" smtClean="0"/>
-              <a:t>presentation had its genesis from attending this</a:t>
-            </a:r>
-            <a:r>
-              <a:rPr lang="en-CA" baseline="0" dirty="0" smtClean="0"/>
-              <a:t>.</a:t>
-            </a:r>
-          </a:p>
-          <a:p>
+              <a:t>ial for the event by clicking on the title (which will take you to </a:t>
+            </a:r>
             <a:r>
               <a:rPr lang="en-CA" dirty="0" smtClean="0"/>
-              <a:t>You </a:t>
-            </a:r>
-            <a:r>
-              <a:rPr lang="en-CA" dirty="0" smtClean="0"/>
-              <a:t>may access all of the mater</a:t>
-            </a:r>
-            <a:r>
-              <a:rPr lang="en-CA" baseline="0" dirty="0" smtClean="0"/>
-              <a:t>ial for the event by </a:t>
-            </a:r>
-            <a:r>
-              <a:rPr lang="en-CA" baseline="0" dirty="0" smtClean="0"/>
-              <a:t>clicking on the title (which will take you to </a:t>
-            </a:r>
-            <a:r>
-              <a:rPr lang="en-CA" dirty="0" smtClean="0"/>
-              <a:t>http</a:t>
-            </a:r>
-            <a:r>
-              <a:rPr lang="en-CA" dirty="0" smtClean="0"/>
-              <a:t>://www.redmondevents.com/virtual/login.aspx?ReturnUrl=%</a:t>
-            </a:r>
-            <a:r>
-              <a:rPr lang="en-CA" dirty="0" smtClean="0"/>
-              <a:t>2fvirtual%2fvslive%2f2012%2flive360%2fDefault.aspx)</a:t>
+              <a:t>http://www.redmondevents.com/virtual/login.aspx?ReturnUrl=%2fvirtual%2fvslive%2f2012%2flive360%2fDefault.aspx)</a:t>
             </a:r>
           </a:p>
           <a:p>
@@ -763,7 +738,6 @@
               <a:rPr lang="en-CA" dirty="0" smtClean="0"/>
               <a:t>From there, you can authenticate using the following credentials:</a:t>
             </a:r>
-            <a:endParaRPr lang="en-CA" dirty="0" smtClean="0"/>
           </a:p>
           <a:p>
             <a:r>
@@ -1006,12 +980,20 @@
               <a:t>There is actually quite a bit to be said in this area including the theory behind a section </a:t>
             </a:r>
             <a:r>
-              <a:rPr lang="en-CA" baseline="0" dirty="0" err="1" smtClean="0"/>
-              <a:t>vs</a:t>
-            </a:r>
-            <a:r>
               <a:rPr lang="en-CA" baseline="0" dirty="0" smtClean="0"/>
-              <a:t> an article; however, want to move on with the presentation.</a:t>
+              <a:t>vs. </a:t>
+            </a:r>
+            <a:r>
+              <a:rPr lang="en-CA" baseline="0" dirty="0" smtClean="0"/>
+              <a:t>an article; however, </a:t>
+            </a:r>
+            <a:r>
+              <a:rPr lang="en-CA" baseline="0" dirty="0" smtClean="0"/>
+              <a:t>I am not going to focus on this in this presentation</a:t>
+            </a:r>
+            <a:r>
+              <a:rPr lang="en-CA" baseline="0" dirty="0" smtClean="0"/>
+              <a:t>.</a:t>
             </a:r>
             <a:endParaRPr lang="en-CA" dirty="0"/>
           </a:p>
@@ -1187,7 +1169,11 @@
           <a:p>
             <a:r>
               <a:rPr lang="en-US" dirty="0" smtClean="0"/>
-              <a:t>So… what about browser support? First, it is important to understand a bit about how features</a:t>
+              <a:t>What </a:t>
+            </a:r>
+            <a:r>
+              <a:rPr lang="en-US" dirty="0" smtClean="0"/>
+              <a:t>about browser support? First, it is important to understand a bit about how features</a:t>
             </a:r>
             <a:r>
               <a:rPr lang="en-US" baseline="0" dirty="0" smtClean="0"/>
@@ -1197,19 +1183,63 @@
           <a:p>
             <a:r>
               <a:rPr lang="en-US" baseline="0" dirty="0" smtClean="0"/>
-              <a:t>What Microsoft’s IE team decided on originally was only to support “Candidate Recommendation” and up… as a result, they “score” much lower… so as a developer you need to keep this in mind and come up with solutions to this problem. Note that the absolute easy way regarding this is to use something called “Google Chrome Frame” which brings the “goodness” of Chrome into IE… however, this is a plugin.</a:t>
-            </a:r>
+              <a:t>What Microsoft’s IE team decided on originally was only to support “Candidate Recommendation” and up… as a result, they “score” much lower… so as a developer you need to keep this in mind and come up with solutions to this problem. </a:t>
+            </a:r>
+            <a:endParaRPr lang="en-US" baseline="0" dirty="0" smtClean="0"/>
           </a:p>
           <a:p>
             <a:r>
               <a:rPr lang="en-US" baseline="0" dirty="0" smtClean="0"/>
-              <a:t>To backup for a second… when I say “score” and mentioning how IE doesn’t score very well, what do I really mean by this? Well, here are a couple of sites where you can see how the browsers “stack up” against one another.</a:t>
-            </a:r>
-          </a:p>
-          <a:p>
+              <a:t>Note </a:t>
+            </a:r>
             <a:r>
               <a:rPr lang="en-US" baseline="0" dirty="0" smtClean="0"/>
-              <a:t>So, how to deal with? One way is to determine what the lowest common denominator might be… the next is to use something called “</a:t>
+              <a:t>that the absolute easy way regarding </a:t>
+            </a:r>
+            <a:r>
+              <a:rPr lang="en-US" baseline="0" dirty="0" smtClean="0"/>
+              <a:t>this in IE </a:t>
+            </a:r>
+            <a:r>
+              <a:rPr lang="en-US" baseline="0" dirty="0" smtClean="0"/>
+              <a:t>is to use something called “Google Chrome Frame” which brings the “goodness” of Chrome into IE… however, this is a plugin</a:t>
+            </a:r>
+            <a:r>
+              <a:rPr lang="en-US" baseline="0" dirty="0" smtClean="0"/>
+              <a:t>. I will show this in a demo.</a:t>
+            </a:r>
+            <a:endParaRPr lang="en-US" baseline="0" dirty="0" smtClean="0"/>
+          </a:p>
+          <a:p>
+            <a:r>
+              <a:rPr lang="en-US" baseline="0" dirty="0" smtClean="0"/>
+              <a:t>To </a:t>
+            </a:r>
+            <a:r>
+              <a:rPr lang="en-US" baseline="0" dirty="0" smtClean="0"/>
+              <a:t>backup for a second… when I say “score” and mentioning how IE doesn’t score very well, what do I really mean by this? Well, </a:t>
+            </a:r>
+            <a:r>
+              <a:rPr lang="en-US" baseline="0" dirty="0" smtClean="0"/>
+              <a:t>on this slide are </a:t>
+            </a:r>
+            <a:r>
+              <a:rPr lang="en-US" baseline="0" dirty="0" smtClean="0"/>
+              <a:t>a couple of sites where you can see how the browsers “stack up” against one another.</a:t>
+            </a:r>
+          </a:p>
+          <a:p>
+            <a:r>
+              <a:rPr lang="en-US" baseline="0" dirty="0" smtClean="0"/>
+              <a:t>So, how to deal with? One way is to determine what the lowest common denominator might be</a:t>
+            </a:r>
+            <a:r>
+              <a:rPr lang="en-US" baseline="0" dirty="0" smtClean="0"/>
+              <a:t>… that is, what browsers are being used to access your site and then only use features that are common across those browsers. The </a:t>
+            </a:r>
+            <a:r>
+              <a:rPr lang="en-US" baseline="0" dirty="0" smtClean="0"/>
+              <a:t>next is to use something called “</a:t>
             </a:r>
             <a:r>
               <a:rPr lang="en-US" baseline="0" dirty="0" err="1" smtClean="0"/>
@@ -1217,8 +1247,21 @@
             </a:r>
             <a:r>
               <a:rPr lang="en-US" baseline="0" dirty="0" smtClean="0"/>
-              <a:t>” to bring up the browser to a more supported one.</a:t>
-            </a:r>
+              <a:t>” to </a:t>
+            </a:r>
+            <a:r>
+              <a:rPr lang="en-US" baseline="0" dirty="0" smtClean="0"/>
+              <a:t>give a browser more HTML5 features. I wasn’t intending to show “</a:t>
+            </a:r>
+            <a:r>
+              <a:rPr lang="en-US" baseline="0" dirty="0" err="1" smtClean="0"/>
+              <a:t>polyfills</a:t>
+            </a:r>
+            <a:r>
+              <a:rPr lang="en-US" baseline="0" dirty="0" smtClean="0"/>
+              <a:t>” in this presentation, but it is a big topic that basically involves using JavaScript to implant HTML5 functionality into a browser that does not offer native support.</a:t>
+            </a:r>
+            <a:endParaRPr lang="en-US" baseline="0" dirty="0" smtClean="0"/>
           </a:p>
           <a:p>
             <a:r>
@@ -1284,12 +1327,16 @@
               <a:t> </a:t>
             </a:r>
             <a:r>
-              <a:rPr lang="en-CA" dirty="0" err="1" smtClean="0"/>
-              <a:t>Polyfill</a:t>
-            </a:r>
-            <a:r>
               <a:rPr lang="en-CA" dirty="0" smtClean="0"/>
-              <a:t> is JavaScript that implants HTML5 functionality in a browser that does not offer native support. See: </a:t>
+              <a:t>Recommended</a:t>
+            </a:r>
+            <a:r>
+              <a:rPr lang="en-CA" baseline="0" dirty="0" smtClean="0"/>
+              <a:t> resources</a:t>
+            </a:r>
+            <a:r>
+              <a:rPr lang="en-CA" dirty="0" smtClean="0"/>
+              <a:t>: </a:t>
             </a:r>
             <a:r>
               <a:rPr lang="en-US" dirty="0" smtClean="0">
@@ -1396,7 +1443,15 @@
           <a:p>
             <a:r>
               <a:rPr lang="en-CA" dirty="0" smtClean="0"/>
-              <a:t>Next… “form enhancements”…</a:t>
+              <a:t>Next… “form enhancements</a:t>
+            </a:r>
+            <a:r>
+              <a:rPr lang="en-CA" dirty="0" smtClean="0"/>
+              <a:t>”…</a:t>
+            </a:r>
+            <a:r>
+              <a:rPr lang="en-CA" baseline="0" dirty="0" smtClean="0"/>
+              <a:t> this is an area that is important for developers creating pages that are meant to capture data</a:t>
             </a:r>
             <a:endParaRPr lang="en-CA" dirty="0"/>
           </a:p>
@@ -1487,10 +1542,24 @@
               <a:t>HTML5 introduced a number of new </a:t>
             </a:r>
             <a:r>
-              <a:rPr lang="en-CA" smtClean="0"/>
-              <a:t>“types”</a:t>
-            </a:r>
-            <a:endParaRPr lang="en-CA"/>
+              <a:rPr lang="en-CA" dirty="0" smtClean="0"/>
+              <a:t>input</a:t>
+            </a:r>
+            <a:r>
+              <a:rPr lang="en-CA" baseline="0" dirty="0" smtClean="0"/>
+              <a:t> </a:t>
+            </a:r>
+            <a:r>
+              <a:rPr lang="en-CA" dirty="0" smtClean="0"/>
+              <a:t>“types” as listed here along with a few new attributes</a:t>
+            </a:r>
+          </a:p>
+          <a:p>
+            <a:r>
+              <a:rPr lang="en-US" dirty="0" smtClean="0"/>
+              <a:t>Instead of talking about these features off of the slide, I will demonstrate these using various browsers at the link that is shown on the slide.</a:t>
+            </a:r>
+            <a:endParaRPr lang="en-CA" dirty="0"/>
           </a:p>
         </p:txBody>
       </p:sp>
@@ -1574,7 +1643,15 @@
           <a:bodyPr/>
           <a:lstStyle/>
           <a:p>
-            <a:endParaRPr lang="en-CA"/>
+            <a:r>
+              <a:rPr lang="en-US" dirty="0" smtClean="0"/>
+              <a:t>Next up, multimedia enhancements such</a:t>
+            </a:r>
+            <a:r>
+              <a:rPr lang="en-US" baseline="0" dirty="0" smtClean="0"/>
+              <a:t> as the new video tag…</a:t>
+            </a:r>
+            <a:endParaRPr lang="en-CA" dirty="0"/>
           </a:p>
         </p:txBody>
       </p:sp>
@@ -1658,7 +1735,15 @@
           <a:bodyPr/>
           <a:lstStyle/>
           <a:p>
-            <a:endParaRPr lang="en-CA"/>
+            <a:r>
+              <a:rPr lang="en-US" dirty="0" smtClean="0"/>
+              <a:t>As</a:t>
+            </a:r>
+            <a:r>
+              <a:rPr lang="en-US" baseline="0" dirty="0" smtClean="0"/>
+              <a:t> with the form enhancements, I am going to go straight into a quick demo for this one by clicking the link on the slide</a:t>
+            </a:r>
+            <a:endParaRPr lang="en-CA" dirty="0"/>
           </a:p>
         </p:txBody>
       </p:sp>
@@ -1742,7 +1827,19 @@
           <a:bodyPr/>
           <a:lstStyle/>
           <a:p>
-            <a:endParaRPr lang="en-CA"/>
+            <a:r>
+              <a:rPr lang="en-US" dirty="0" smtClean="0"/>
+              <a:t>Next up… everyone’s </a:t>
+            </a:r>
+            <a:r>
+              <a:rPr lang="en-US" dirty="0" err="1" smtClean="0"/>
+              <a:t>favourite</a:t>
+            </a:r>
+            <a:r>
+              <a:rPr lang="en-US" dirty="0" smtClean="0"/>
+              <a:t> cloud computing...</a:t>
+            </a:r>
+            <a:endParaRPr lang="en-CA" dirty="0"/>
           </a:p>
         </p:txBody>
       </p:sp>
@@ -1826,7 +1923,15 @@
           <a:bodyPr/>
           <a:lstStyle/>
           <a:p>
-            <a:endParaRPr lang="en-CA"/>
+            <a:r>
+              <a:rPr lang="en-US" dirty="0" smtClean="0"/>
+              <a:t>For those that don’t know, Windows</a:t>
+            </a:r>
+            <a:r>
+              <a:rPr lang="en-US" baseline="0" dirty="0" smtClean="0"/>
+              <a:t> Azure is Microsoft’s cloud computing platform… there is a lot that can be shown here so I am going to jump into my next demo by logging into my Azure account</a:t>
+            </a:r>
+            <a:endParaRPr lang="en-CA" dirty="0"/>
           </a:p>
         </p:txBody>
       </p:sp>
@@ -1912,7 +2017,11 @@
           <a:p>
             <a:r>
               <a:rPr lang="en-CA" dirty="0" smtClean="0"/>
-              <a:t>So, a really quick summary of the</a:t>
+              <a:t>A </a:t>
+            </a:r>
+            <a:r>
+              <a:rPr lang="en-CA" dirty="0" smtClean="0"/>
+              <a:t>really quick summary of the</a:t>
             </a:r>
             <a:r>
               <a:rPr lang="en-CA" baseline="0" dirty="0" smtClean="0"/>
@@ -1923,11 +2032,27 @@
           <a:p>
             <a:r>
               <a:rPr lang="en-CA" dirty="0" smtClean="0"/>
-              <a:t>The “Live360Events” name was a new one as it had historically</a:t>
+              <a:t>The “</a:t>
+            </a:r>
+            <a:r>
+              <a:rPr lang="en-CA" dirty="0" smtClean="0"/>
+              <a:t>Live 360! Events</a:t>
+            </a:r>
+            <a:r>
+              <a:rPr lang="en-CA" dirty="0" smtClean="0"/>
+              <a:t>” name was a new one as it had historically</a:t>
             </a:r>
             <a:r>
               <a:rPr lang="en-CA" baseline="0" dirty="0" smtClean="0"/>
-              <a:t> been a “VS Live” event… this year is its 20</a:t>
+              <a:t> been a “VS Live” event… this </a:t>
+            </a:r>
+            <a:r>
+              <a:rPr lang="en-CA" baseline="0" dirty="0" smtClean="0"/>
+              <a:t>year, 2013, is actually its </a:t>
+            </a:r>
+            <a:r>
+              <a:rPr lang="en-CA" baseline="0" dirty="0" smtClean="0"/>
+              <a:t>20</a:t>
             </a:r>
             <a:r>
               <a:rPr lang="en-CA" baseline="30000" dirty="0" smtClean="0"/>
@@ -1952,7 +2077,15 @@
           <a:p>
             <a:r>
               <a:rPr lang="en-CA" baseline="0" dirty="0" smtClean="0"/>
-              <a:t>Having the ability to choose from up to 16 different sessions at once was quite ideal and overall it was a great conference to attend… being next to Universal Studios was definitely nice as well, although the days were quite full and Universal Studios is not open late.</a:t>
+              <a:t>Having the ability to choose from up to 16 different sessions at once was quite ideal and overall it was a great conference to attend… being </a:t>
+            </a:r>
+            <a:r>
+              <a:rPr lang="en-CA" baseline="0" dirty="0" smtClean="0"/>
+              <a:t>in Orlando next </a:t>
+            </a:r>
+            <a:r>
+              <a:rPr lang="en-CA" baseline="0" dirty="0" smtClean="0"/>
+              <a:t>to Universal Studios was definitely nice as well, although the days were quite full and Universal Studios is not open late.</a:t>
             </a:r>
             <a:endParaRPr lang="en-CA" dirty="0"/>
           </a:p>
@@ -2038,7 +2171,15 @@
           <a:bodyPr/>
           <a:lstStyle/>
           <a:p>
-            <a:endParaRPr lang="en-CA"/>
+            <a:r>
+              <a:rPr lang="en-US" dirty="0" smtClean="0"/>
+              <a:t>Next</a:t>
+            </a:r>
+            <a:r>
+              <a:rPr lang="en-US" baseline="0" dirty="0" smtClean="0"/>
+              <a:t> up, mobile…</a:t>
+            </a:r>
+            <a:endParaRPr lang="en-CA" dirty="0"/>
           </a:p>
         </p:txBody>
       </p:sp>
@@ -2122,7 +2263,66 @@
           <a:bodyPr/>
           <a:lstStyle/>
           <a:p>
-            <a:endParaRPr lang="en-CA"/>
+            <a:r>
+              <a:rPr lang="en-US" dirty="0" smtClean="0"/>
+              <a:t>Although</a:t>
+            </a:r>
+            <a:r>
+              <a:rPr lang="en-US" baseline="0" dirty="0" smtClean="0"/>
+              <a:t> the conference did not have a lot of mobile specific content, there were a few good nuggets of information… </a:t>
+            </a:r>
+          </a:p>
+          <a:p>
+            <a:r>
+              <a:rPr lang="en-US" baseline="0" dirty="0" smtClean="0"/>
+              <a:t>First of all, as I hopefully remembered to demonstrate earlier, with CSS 3 and media queries you can much more easily have the same web page look good on a lot of different form factors</a:t>
+            </a:r>
+          </a:p>
+          <a:p>
+            <a:r>
+              <a:rPr lang="en-US" dirty="0" smtClean="0"/>
+              <a:t>A few other takeaways</a:t>
+            </a:r>
+            <a:r>
+              <a:rPr lang="en-US" baseline="0" dirty="0" smtClean="0"/>
+              <a:t> I got from the conference are listed on the slide:</a:t>
+            </a:r>
+          </a:p>
+          <a:p>
+            <a:pPr marL="171450" indent="-171450">
+              <a:buFontTx/>
+              <a:buChar char="-"/>
+            </a:pPr>
+            <a:r>
+              <a:rPr lang="en-US" baseline="0" dirty="0" smtClean="0"/>
+              <a:t>When passing data back and forth, use JSON not XML or some other serialized format</a:t>
+            </a:r>
+            <a:r>
+              <a:rPr lang="en-CA" baseline="0" dirty="0" smtClean="0"/>
+              <a:t>. The size is much smaller and easily consumable</a:t>
+            </a:r>
+            <a:endParaRPr lang="en-US" baseline="0" dirty="0" smtClean="0"/>
+          </a:p>
+          <a:p>
+            <a:pPr marL="171450" indent="-171450">
+              <a:buFontTx/>
+              <a:buChar char="-"/>
+            </a:pPr>
+            <a:r>
+              <a:rPr lang="en-US" baseline="0" dirty="0" smtClean="0"/>
+              <a:t>Opera has a wonderful mobile emulator that I previously was not aware of that can be used to test a number of different form factors</a:t>
+            </a:r>
+          </a:p>
+          <a:p>
+            <a:pPr marL="171450" indent="-171450">
+              <a:buFontTx/>
+              <a:buChar char="-"/>
+            </a:pPr>
+            <a:r>
+              <a:rPr lang="en-US" baseline="0" dirty="0" smtClean="0"/>
+              <a:t>And lastly a quick “win” is to always add the meta tag to all of your web pages, even today as it will ensure they are sized much more properly</a:t>
+            </a:r>
+            <a:endParaRPr lang="en-CA" baseline="0" dirty="0" smtClean="0"/>
           </a:p>
         </p:txBody>
       </p:sp>
@@ -2206,7 +2406,19 @@
           <a:bodyPr/>
           <a:lstStyle/>
           <a:p>
-            <a:endParaRPr lang="en-CA"/>
+            <a:r>
+              <a:rPr lang="en-US" dirty="0" smtClean="0"/>
+              <a:t>Now to</a:t>
+            </a:r>
+            <a:r>
+              <a:rPr lang="en-US" baseline="0" dirty="0" smtClean="0"/>
+              <a:t> a trend that I had not heard about until the conference… Microsoft’s </a:t>
+            </a:r>
+            <a:r>
+              <a:rPr lang="en-US" baseline="0" dirty="0" err="1" smtClean="0"/>
+              <a:t>SignalR</a:t>
+            </a:r>
+            <a:endParaRPr lang="en-CA" dirty="0"/>
           </a:p>
         </p:txBody>
       </p:sp>
@@ -2308,6 +2520,77 @@
               <a:defRPr/>
             </a:pPr>
             <a:r>
+              <a:rPr lang="en-CA" dirty="0" smtClean="0"/>
+              <a:t>Microsoft</a:t>
+            </a:r>
+            <a:r>
+              <a:rPr lang="en-CA" baseline="0" dirty="0" smtClean="0"/>
+              <a:t> has come up with a wrapper that can be incredibly easy to use to provide real-time HTTP communication.</a:t>
+            </a:r>
+          </a:p>
+          <a:p>
+            <a:pPr marL="0" marR="0" indent="0" algn="l" defTabSz="457200" rtl="0" eaLnBrk="1" fontAlgn="auto" latinLnBrk="0" hangingPunct="1">
+              <a:lnSpc>
+                <a:spcPct val="100000"/>
+              </a:lnSpc>
+              <a:spcBef>
+                <a:spcPts val="0"/>
+              </a:spcBef>
+              <a:spcAft>
+                <a:spcPts val="0"/>
+              </a:spcAft>
+              <a:buClrTx/>
+              <a:buSzTx/>
+              <a:buFontTx/>
+              <a:buNone/>
+              <a:tabLst/>
+              <a:defRPr/>
+            </a:pPr>
+            <a:r>
+              <a:rPr lang="en-US" baseline="0" dirty="0" smtClean="0"/>
+              <a:t>To demonstrate, I am going to jump right into another demo</a:t>
+            </a:r>
+            <a:endParaRPr lang="en-CA" dirty="0" smtClean="0"/>
+          </a:p>
+          <a:p>
+            <a:pPr marL="0" marR="0" indent="0" algn="l" defTabSz="457200" rtl="0" eaLnBrk="1" fontAlgn="auto" latinLnBrk="0" hangingPunct="1">
+              <a:lnSpc>
+                <a:spcPct val="100000"/>
+              </a:lnSpc>
+              <a:spcBef>
+                <a:spcPts val="0"/>
+              </a:spcBef>
+              <a:spcAft>
+                <a:spcPts val="0"/>
+              </a:spcAft>
+              <a:buClrTx/>
+              <a:buSzTx/>
+              <a:buFontTx/>
+              <a:buNone/>
+              <a:tabLst/>
+              <a:defRPr/>
+            </a:pPr>
+            <a:endParaRPr lang="en-CA" baseline="30000" dirty="0" smtClean="0"/>
+          </a:p>
+          <a:p>
+            <a:pPr marL="0" marR="0" indent="0" algn="l" defTabSz="457200" rtl="0" eaLnBrk="1" fontAlgn="auto" latinLnBrk="0" hangingPunct="1">
+              <a:lnSpc>
+                <a:spcPct val="100000"/>
+              </a:lnSpc>
+              <a:spcBef>
+                <a:spcPts val="0"/>
+              </a:spcBef>
+              <a:spcAft>
+                <a:spcPts val="0"/>
+              </a:spcAft>
+              <a:buClrTx/>
+              <a:buSzTx/>
+              <a:buFontTx/>
+              <a:buNone/>
+              <a:tabLst/>
+              <a:defRPr/>
+            </a:pPr>
+            <a:r>
               <a:rPr lang="en-CA" baseline="30000" dirty="0" smtClean="0"/>
               <a:t>1 </a:t>
             </a:r>
@@ -2451,7 +2734,15 @@
           <a:bodyPr/>
           <a:lstStyle/>
           <a:p>
-            <a:endParaRPr lang="en-CA"/>
+            <a:r>
+              <a:rPr lang="en-US" dirty="0" smtClean="0"/>
+              <a:t>Lastly,</a:t>
+            </a:r>
+            <a:r>
+              <a:rPr lang="en-US" baseline="0" dirty="0" smtClean="0"/>
+              <a:t> a couple of other comments regarding some of the circles on the bottom right of my graphic that I created</a:t>
+            </a:r>
+            <a:endParaRPr lang="en-CA" dirty="0"/>
           </a:p>
         </p:txBody>
       </p:sp>
@@ -2535,6 +2826,68 @@
           <a:bodyPr/>
           <a:lstStyle/>
           <a:p>
+            <a:r>
+              <a:rPr lang="en-US" dirty="0" smtClean="0"/>
+              <a:t>Almost</a:t>
+            </a:r>
+            <a:r>
+              <a:rPr lang="en-US" baseline="0" dirty="0" smtClean="0"/>
+              <a:t> every demonstration that involved Visual Studio meant the use of </a:t>
+            </a:r>
+            <a:r>
+              <a:rPr lang="en-US" baseline="0" dirty="0" err="1" smtClean="0"/>
+              <a:t>Nuget</a:t>
+            </a:r>
+            <a:r>
+              <a:rPr lang="en-US" baseline="0" dirty="0" smtClean="0"/>
+              <a:t>. As a Microsoft developer, if you are not aware of </a:t>
+            </a:r>
+            <a:r>
+              <a:rPr lang="en-US" baseline="0" dirty="0" err="1" smtClean="0"/>
+              <a:t>Nuget</a:t>
+            </a:r>
+            <a:r>
+              <a:rPr lang="en-US" baseline="0" dirty="0" smtClean="0"/>
+              <a:t> you will be soon as it has become a key way to import in external resources easily. Even for a client site that is building internal projects, I can see this being something that we start doing more of… for example, want to create a new project? Open up Visual Studio and use </a:t>
+            </a:r>
+            <a:r>
+              <a:rPr lang="en-US" baseline="0" dirty="0" err="1" smtClean="0"/>
+              <a:t>Nuget</a:t>
+            </a:r>
+            <a:r>
+              <a:rPr lang="en-US" baseline="0" dirty="0" smtClean="0"/>
+              <a:t> to get you started / all setup.</a:t>
+            </a:r>
+          </a:p>
+          <a:p>
+            <a:endParaRPr lang="en-US" baseline="0" dirty="0" smtClean="0"/>
+          </a:p>
+          <a:p>
+            <a:r>
+              <a:rPr lang="en-US" smtClean="0"/>
+              <a:t>Git</a:t>
+            </a:r>
+            <a:r>
+              <a:rPr lang="en-US" dirty="0" smtClean="0"/>
+              <a:t>… I heard something about </a:t>
+            </a:r>
+            <a:r>
+              <a:rPr lang="en-US" dirty="0" err="1" smtClean="0"/>
+              <a:t>Git</a:t>
+            </a:r>
+            <a:r>
+              <a:rPr lang="en-US" baseline="0" dirty="0" smtClean="0"/>
+              <a:t> before this conference, but did not realize the extent to which people are embracing it. All indications are it is the current standard for source management and, for example, is what I used while creating this presentation as I was able to easily develop across multiple machines, checking in and out, regardless of it I was connected to the internet or not. And it is FAST!</a:t>
+            </a:r>
+          </a:p>
+          <a:p>
+            <a:endParaRPr lang="en-US" baseline="0" dirty="0" smtClean="0"/>
+          </a:p>
+          <a:p>
+            <a:r>
+              <a:rPr lang="en-US" baseline="0" dirty="0" smtClean="0"/>
+              <a:t>Bit.ly</a:t>
+            </a:r>
             <a:endParaRPr lang="en-CA" dirty="0"/>
           </a:p>
         </p:txBody>
@@ -2632,29 +2985,50 @@
           <a:p>
             <a:r>
               <a:rPr lang="en-US" dirty="0" smtClean="0"/>
-              <a:t>I</a:t>
+              <a:t>- I</a:t>
             </a:r>
             <a:r>
               <a:rPr lang="en-US" baseline="0" dirty="0" smtClean="0"/>
-              <a:t> knew at a high level that HTML5 was important, I was hoping to use this conference as a “kick start” to learn more information regarding it</a:t>
-            </a:r>
-          </a:p>
-          <a:p>
+              <a:t> </a:t>
+            </a:r>
             <a:r>
               <a:rPr lang="en-US" baseline="0" dirty="0" smtClean="0"/>
-              <a:t>I knew that Microsoft was pushing Azure a lot, but honestly I had not played with an actual account before this conference</a:t>
+              <a:t>knew at a high level that HTML5 was important, I was hoping to use this conference as a “kick start” to learn more information regarding it</a:t>
             </a:r>
           </a:p>
           <a:p>
             <a:r>
               <a:rPr lang="en-US" baseline="0" dirty="0" smtClean="0"/>
-              <a:t>For mobile, I was open to hearing anything that I could relate to mobile, and although this was not a conference that was big on mobile, there was some knowledge I gained in this area.</a:t>
-            </a:r>
-          </a:p>
-          <a:p>
+              <a:t>- I </a:t>
+            </a:r>
             <a:r>
               <a:rPr lang="en-US" baseline="0" dirty="0" smtClean="0"/>
-              <a:t>Finally, for trends, I was conscious of looking for anything that people were talking a lot about</a:t>
+              <a:t>knew that Microsoft was pushing Azure a lot, but honestly I had not </a:t>
+            </a:r>
+            <a:r>
+              <a:rPr lang="en-US" baseline="0" dirty="0" smtClean="0"/>
+              <a:t>laid hands on it before… just read and watched training sessions for it</a:t>
+            </a:r>
+            <a:endParaRPr lang="en-US" baseline="0" dirty="0" smtClean="0"/>
+          </a:p>
+          <a:p>
+            <a:r>
+              <a:rPr lang="en-US" baseline="0" dirty="0" smtClean="0"/>
+              <a:t>- For </a:t>
+            </a:r>
+            <a:r>
+              <a:rPr lang="en-US" baseline="0" dirty="0" smtClean="0"/>
+              <a:t>mobile, I was open to hearing anything that I could relate to mobile, and although this was not a conference that was big on mobile, there was some knowledge I gained in this area.</a:t>
+            </a:r>
+          </a:p>
+          <a:p>
+            <a:r>
+              <a:rPr lang="en-US" baseline="0" dirty="0" smtClean="0"/>
+              <a:t>- Finally</a:t>
+            </a:r>
+            <a:r>
+              <a:rPr lang="en-US" baseline="0" dirty="0" smtClean="0"/>
+              <a:t>, for trends, I was conscious of looking for anything that people were talking a lot about</a:t>
             </a:r>
             <a:endParaRPr lang="en-US" dirty="0"/>
           </a:p>
@@ -2846,7 +3220,15 @@
           <a:p>
             <a:r>
               <a:rPr lang="en-CA" dirty="0" smtClean="0"/>
-              <a:t>So… let’s talk a little bit about the history of HTML5</a:t>
+              <a:t>Let’s </a:t>
+            </a:r>
+            <a:r>
+              <a:rPr lang="en-CA" dirty="0" smtClean="0"/>
+              <a:t>talk a little bit about the history of </a:t>
+            </a:r>
+            <a:r>
+              <a:rPr lang="en-CA" dirty="0" smtClean="0"/>
+              <a:t>HTML5…</a:t>
             </a:r>
             <a:endParaRPr lang="en-CA" dirty="0"/>
           </a:p>
@@ -2992,11 +3374,7 @@
             </a:r>
             <a:r>
               <a:rPr lang="en-CA" baseline="0" dirty="0" smtClean="0"/>
-              <a:t> </a:t>
-            </a:r>
-            <a:r>
-              <a:rPr lang="en-CA" baseline="0" dirty="0" smtClean="0"/>
-              <a:t>an interesting “history” read, check out http://html5forwebdesigners.com/history/index.html or WHATWG’s </a:t>
+              <a:t> an interesting “history” read, check out http://html5forwebdesigners.com/history/index.html or WHATWG’s </a:t>
             </a:r>
             <a:r>
               <a:rPr lang="en-CA" dirty="0" smtClean="0">
@@ -3034,13 +3412,8 @@
             </a:r>
             <a:r>
               <a:rPr lang="en-CA" baseline="0" dirty="0" smtClean="0"/>
-              <a:t> an acronym for the “Web Hypertext Application Technology Working Group” http://www.whatwg.org</a:t>
-            </a:r>
-            <a:r>
-              <a:rPr lang="en-CA" baseline="0" dirty="0" smtClean="0"/>
-              <a:t>/</a:t>
-            </a:r>
-            <a:endParaRPr lang="en-CA" baseline="0" dirty="0" smtClean="0"/>
+              <a:t> an acronym for the “Web Hypertext Application Technology Working Group” http://www.whatwg.org/</a:t>
+            </a:r>
           </a:p>
         </p:txBody>
       </p:sp>
@@ -3130,13 +3503,26 @@
             </a:r>
             <a:r>
               <a:rPr lang="en-CA" baseline="0" dirty="0" smtClean="0"/>
-              <a:t> as well.</a:t>
-            </a:r>
-          </a:p>
-          <a:p>
+              <a:t> as </a:t>
+            </a:r>
             <a:r>
               <a:rPr lang="en-CA" baseline="0" dirty="0" smtClean="0"/>
-              <a:t>First, there was the “Steve Jobs” affect, both by him agreeing that HTML5 was the way of the future and the fact that all of the </a:t>
+              <a:t>well other than just the browser groups creating it.</a:t>
+            </a:r>
+            <a:endParaRPr lang="en-CA" baseline="0" dirty="0" smtClean="0"/>
+          </a:p>
+          <a:p>
+            <a:r>
+              <a:rPr lang="en-CA" baseline="0" dirty="0" smtClean="0"/>
+              <a:t>First, there was the “Steve </a:t>
+            </a:r>
+            <a:r>
+              <a:rPr lang="en-CA" baseline="0" dirty="0" smtClean="0"/>
+              <a:t>Jobs effect”, </a:t>
+            </a:r>
+            <a:r>
+              <a:rPr lang="en-CA" baseline="0" dirty="0" smtClean="0"/>
+              <a:t>both by him agreeing that HTML5 was the way of the future and the fact that all of the </a:t>
             </a:r>
             <a:r>
               <a:rPr lang="en-CA" baseline="0" dirty="0" err="1" smtClean="0"/>
@@ -3339,7 +3725,15 @@
             </a:r>
             <a:r>
               <a:rPr lang="en-CA" baseline="0" dirty="0" smtClean="0"/>
-              <a:t> on from history to talking about tags… simplification to them and the creation of more semantic tags…</a:t>
+              <a:t> on from history to talking about </a:t>
+            </a:r>
+            <a:r>
+              <a:rPr lang="en-CA" baseline="0" dirty="0" smtClean="0"/>
+              <a:t>HTML tags</a:t>
+            </a:r>
+            <a:r>
+              <a:rPr lang="en-CA" baseline="0" dirty="0" smtClean="0"/>
+              <a:t>… simplification to them and the creation of more semantic tags…</a:t>
             </a:r>
             <a:endParaRPr lang="en-CA" dirty="0"/>
           </a:p>
@@ -3639,7 +4033,7 @@
           <a:p>
             <a:fld id="{EB6F4DCC-4F1E-F54C-AA63-5E9B8139A2C7}" type="datetime4">
               <a:rPr lang="en-CA" smtClean="0"/>
-              <a:t>March-13-13</a:t>
+              <a:t>March-14-13</a:t>
             </a:fld>
             <a:endParaRPr lang="en-US" dirty="0"/>
           </a:p>
@@ -3885,7 +4279,7 @@
           <a:p>
             <a:fld id="{E89AD498-328C-DE45-9033-626F46332D12}" type="datetime4">
               <a:rPr lang="en-CA" smtClean="0"/>
-              <a:t>March-13-13</a:t>
+              <a:t>March-14-13</a:t>
             </a:fld>
             <a:endParaRPr lang="en-US"/>
           </a:p>
@@ -4206,7 +4600,7 @@
           <a:p>
             <a:fld id="{205C405F-71DA-D945-AC37-528E00489EC0}" type="datetime4">
               <a:rPr lang="en-CA" smtClean="0"/>
-              <a:t>March-13-13</a:t>
+              <a:t>March-14-13</a:t>
             </a:fld>
             <a:endParaRPr lang="en-US"/>
           </a:p>
@@ -4738,7 +5132,7 @@
           <a:p>
             <a:fld id="{A706A332-CB54-F44D-AAB8-905B7A2134BC}" type="datetime4">
               <a:rPr lang="en-CA" smtClean="0"/>
-              <a:t>March-13-13</a:t>
+              <a:t>March-14-13</a:t>
             </a:fld>
             <a:endParaRPr lang="en-US" dirty="0"/>
           </a:p>
@@ -5115,7 +5509,7 @@
           <a:p>
             <a:fld id="{C8774548-0BB4-5443-9210-BF9E4921324F}" type="datetime4">
               <a:rPr lang="en-CA" smtClean="0"/>
-              <a:t>March-13-13</a:t>
+              <a:t>March-14-13</a:t>
             </a:fld>
             <a:endParaRPr lang="en-US"/>
           </a:p>
@@ -5492,7 +5886,7 @@
           <a:p>
             <a:fld id="{DA5AA9F5-8C84-A342-A63E-20B4B9965A72}" type="datetime4">
               <a:rPr lang="en-CA" smtClean="0"/>
-              <a:t>March-13-13</a:t>
+              <a:t>March-14-13</a:t>
             </a:fld>
             <a:endParaRPr lang="en-US"/>
           </a:p>
@@ -5899,7 +6293,7 @@
           <a:p>
             <a:fld id="{B75CC70B-AAA2-1A4B-980F-5795C4FC07F0}" type="datetime4">
               <a:rPr lang="en-CA" smtClean="0"/>
-              <a:t>March-13-13</a:t>
+              <a:t>March-14-13</a:t>
             </a:fld>
             <a:endParaRPr lang="en-US"/>
           </a:p>
@@ -6163,7 +6557,7 @@
           <a:p>
             <a:fld id="{634933C9-6163-F741-B0D7-A3D45CDF27BE}" type="datetime4">
               <a:rPr lang="en-CA" smtClean="0"/>
-              <a:t>March-13-13</a:t>
+              <a:t>March-14-13</a:t>
             </a:fld>
             <a:endParaRPr lang="en-US"/>
           </a:p>
@@ -6667,7 +7061,7 @@
           <a:p>
             <a:fld id="{952FD3B8-8B26-5944-8B2D-223A1203AFC1}" type="datetime4">
               <a:rPr lang="en-CA" smtClean="0"/>
-              <a:t>March-13-13</a:t>
+              <a:t>March-14-13</a:t>
             </a:fld>
             <a:endParaRPr lang="en-US" dirty="0" err="1"/>
           </a:p>
@@ -15668,13 +16062,15 @@
             <a:pPr lvl="1"/>
             <a:r>
               <a:rPr lang="en-CA" dirty="0"/>
-              <a:t>Placeholder, autofocus</a:t>
-            </a:r>
-          </a:p>
-          <a:p>
+              <a:t>Placeholder, </a:t>
+            </a:r>
+            <a:r>
+              <a:rPr lang="en-CA" dirty="0" smtClean="0"/>
+              <a:t>autofocus, </a:t>
+            </a:r>
             <a:r>
               <a:rPr lang="en-CA" dirty="0" err="1" smtClean="0"/>
-              <a:t>Contenteditable</a:t>
+              <a:t>contenteditable</a:t>
             </a:r>
             <a:endParaRPr lang="en-CA" dirty="0" smtClean="0"/>
           </a:p>
@@ -15714,11 +16110,7 @@
           <a:p>
             <a:r>
               <a:rPr lang="en-CA" dirty="0" smtClean="0"/>
-              <a:t>Demo </a:t>
-            </a:r>
-            <a:r>
-              <a:rPr lang="en-CA" dirty="0" smtClean="0"/>
-              <a:t>3</a:t>
+              <a:t>Demo 3</a:t>
             </a:r>
           </a:p>
           <a:p>
@@ -20000,34 +20392,42 @@
           <a:p>
             <a:pPr lvl="1"/>
             <a:r>
-              <a:rPr lang="en-CA" dirty="0"/>
-              <a:t>cloud computing is really doing just-in-time provisioning and </a:t>
+              <a:rPr lang="en-US" dirty="0" smtClean="0"/>
+              <a:t>From Wikipedia: “is a Microsoft cloud computing platform for building, deploying and managing application and services through a global network of Microsoft-managed datacenters”</a:t>
+            </a:r>
+            <a:endParaRPr lang="en-CA" dirty="0" smtClean="0"/>
+          </a:p>
+          <a:p>
+            <a:pPr lvl="1"/>
+            <a:r>
+              <a:rPr lang="en-US" dirty="0" smtClean="0"/>
+              <a:t>Some interesting aspects of this are:</a:t>
+            </a:r>
+          </a:p>
+          <a:p>
+            <a:pPr lvl="2"/>
+            <a:r>
+              <a:rPr lang="en-US" dirty="0" smtClean="0"/>
+              <a:t>Easy on demand </a:t>
             </a:r>
             <a:r>
               <a:rPr lang="en-CA" dirty="0" smtClean="0"/>
-              <a:t>scaling </a:t>
-            </a:r>
-            <a:r>
-              <a:rPr lang="en-CA" dirty="0"/>
-              <a:t>of services, software and solutions delivered as a service on a pool of hardware</a:t>
-            </a:r>
-          </a:p>
-          <a:p>
-            <a:pPr lvl="1"/>
-            <a:r>
-              <a:rPr lang="en-CA" dirty="0"/>
-              <a:t>On demand provisioning</a:t>
-            </a:r>
-          </a:p>
-          <a:p>
-            <a:pPr lvl="1"/>
-            <a:r>
-              <a:rPr lang="en-CA" dirty="0"/>
-              <a:t>scaling resources... example </a:t>
-            </a:r>
+              <a:t>provisioning</a:t>
+            </a:r>
+          </a:p>
+          <a:p>
+            <a:pPr lvl="2"/>
             <a:r>
               <a:rPr lang="en-CA" dirty="0" smtClean="0"/>
-              <a:t>“tonight </a:t>
+              <a:t>Easy scaling of resources… for example</a:t>
+            </a:r>
+            <a:r>
+              <a:rPr lang="en-CA" dirty="0" smtClean="0"/>
+              <a:t> “</a:t>
+            </a:r>
+            <a:r>
+              <a:rPr lang="en-CA" dirty="0" smtClean="0"/>
+              <a:t>tonight </a:t>
             </a:r>
             <a:r>
               <a:rPr lang="en-CA" dirty="0"/>
@@ -20035,20 +20435,13 @@
             </a:r>
             <a:r>
               <a:rPr lang="en-CA" dirty="0" smtClean="0"/>
-              <a:t>done”</a:t>
-            </a:r>
-            <a:endParaRPr lang="en-CA" dirty="0"/>
-          </a:p>
-          <a:p>
-            <a:pPr lvl="1"/>
-            <a:r>
-              <a:rPr lang="en-CA" dirty="0"/>
-              <a:t>abstraction over </a:t>
+              <a:t>done</a:t>
             </a:r>
             <a:r>
               <a:rPr lang="en-CA" dirty="0" smtClean="0"/>
-              <a:t>resources</a:t>
-            </a:r>
+              <a:t>”</a:t>
+            </a:r>
+            <a:endParaRPr lang="en-CA" dirty="0" smtClean="0"/>
           </a:p>
           <a:p>
             <a:r>
@@ -22555,8 +22948,13 @@
             </a:r>
             <a:r>
               <a:rPr lang="en-CA" dirty="0"/>
-              <a:t>meta name="viewport" content="width=device-width, user-scalable=no"&gt;</a:t>
-            </a:r>
+              <a:t>meta name="viewport" content="</a:t>
+            </a:r>
+            <a:r>
+              <a:rPr lang="en-CA" dirty="0" smtClean="0"/>
+              <a:t>width=device-width"&gt;</a:t>
+            </a:r>
+            <a:endParaRPr lang="en-CA" dirty="0"/>
           </a:p>
           <a:p>
             <a:r>
@@ -27284,7 +27682,782 @@
   <p:timing>
     <p:tnLst>
       <p:par>
-        <p:cTn id="1" dur="indefinite" restart="never" nodeType="tmRoot"/>
+        <p:cTn id="1" dur="indefinite" restart="never" nodeType="tmRoot">
+          <p:childTnLst>
+            <p:seq concurrent="1" nextAc="seek">
+              <p:cTn id="2" dur="indefinite" nodeType="mainSeq">
+                <p:childTnLst>
+                  <p:par>
+                    <p:cTn id="3" fill="hold">
+                      <p:stCondLst>
+                        <p:cond delay="indefinite"/>
+                      </p:stCondLst>
+                      <p:childTnLst>
+                        <p:par>
+                          <p:cTn id="4" fill="hold">
+                            <p:stCondLst>
+                              <p:cond delay="0"/>
+                            </p:stCondLst>
+                            <p:childTnLst>
+                              <p:par>
+                                <p:cTn id="5" presetID="2" presetClass="entr" presetSubtype="4" fill="hold" nodeType="clickEffect">
+                                  <p:stCondLst>
+                                    <p:cond delay="0"/>
+                                  </p:stCondLst>
+                                  <p:childTnLst>
+                                    <p:set>
+                                      <p:cBhvr>
+                                        <p:cTn id="6" dur="1" fill="hold">
+                                          <p:stCondLst>
+                                            <p:cond delay="0"/>
+                                          </p:stCondLst>
+                                        </p:cTn>
+                                        <p:tgtEl>
+                                          <p:spTgt spid="4">
+                                            <p:txEl>
+                                              <p:pRg st="0" end="0"/>
+                                            </p:txEl>
+                                          </p:spTgt>
+                                        </p:tgtEl>
+                                        <p:attrNameLst>
+                                          <p:attrName>style.visibility</p:attrName>
+                                        </p:attrNameLst>
+                                      </p:cBhvr>
+                                      <p:to>
+                                        <p:strVal val="visible"/>
+                                      </p:to>
+                                    </p:set>
+                                    <p:anim calcmode="lin" valueType="num">
+                                      <p:cBhvr additive="base">
+                                        <p:cTn id="7" dur="500" fill="hold"/>
+                                        <p:tgtEl>
+                                          <p:spTgt spid="4">
+                                            <p:txEl>
+                                              <p:pRg st="0" end="0"/>
+                                            </p:txEl>
+                                          </p:spTgt>
+                                        </p:tgtEl>
+                                        <p:attrNameLst>
+                                          <p:attrName>ppt_x</p:attrName>
+                                        </p:attrNameLst>
+                                      </p:cBhvr>
+                                      <p:tavLst>
+                                        <p:tav tm="0">
+                                          <p:val>
+                                            <p:strVal val="#ppt_x"/>
+                                          </p:val>
+                                        </p:tav>
+                                        <p:tav tm="100000">
+                                          <p:val>
+                                            <p:strVal val="#ppt_x"/>
+                                          </p:val>
+                                        </p:tav>
+                                      </p:tavLst>
+                                    </p:anim>
+                                    <p:anim calcmode="lin" valueType="num">
+                                      <p:cBhvr additive="base">
+                                        <p:cTn id="8" dur="500" fill="hold"/>
+                                        <p:tgtEl>
+                                          <p:spTgt spid="4">
+                                            <p:txEl>
+                                              <p:pRg st="0" end="0"/>
+                                            </p:txEl>
+                                          </p:spTgt>
+                                        </p:tgtEl>
+                                        <p:attrNameLst>
+                                          <p:attrName>ppt_y</p:attrName>
+                                        </p:attrNameLst>
+                                      </p:cBhvr>
+                                      <p:tavLst>
+                                        <p:tav tm="0">
+                                          <p:val>
+                                            <p:strVal val="1+#ppt_h/2"/>
+                                          </p:val>
+                                        </p:tav>
+                                        <p:tav tm="100000">
+                                          <p:val>
+                                            <p:strVal val="#ppt_y"/>
+                                          </p:val>
+                                        </p:tav>
+                                      </p:tavLst>
+                                    </p:anim>
+                                  </p:childTnLst>
+                                </p:cTn>
+                              </p:par>
+                              <p:par>
+                                <p:cTn id="9" presetID="2" presetClass="entr" presetSubtype="4" fill="hold" nodeType="withEffect">
+                                  <p:stCondLst>
+                                    <p:cond delay="0"/>
+                                  </p:stCondLst>
+                                  <p:childTnLst>
+                                    <p:set>
+                                      <p:cBhvr>
+                                        <p:cTn id="10" dur="1" fill="hold">
+                                          <p:stCondLst>
+                                            <p:cond delay="0"/>
+                                          </p:stCondLst>
+                                        </p:cTn>
+                                        <p:tgtEl>
+                                          <p:spTgt spid="4">
+                                            <p:txEl>
+                                              <p:pRg st="1" end="1"/>
+                                            </p:txEl>
+                                          </p:spTgt>
+                                        </p:tgtEl>
+                                        <p:attrNameLst>
+                                          <p:attrName>style.visibility</p:attrName>
+                                        </p:attrNameLst>
+                                      </p:cBhvr>
+                                      <p:to>
+                                        <p:strVal val="visible"/>
+                                      </p:to>
+                                    </p:set>
+                                    <p:anim calcmode="lin" valueType="num">
+                                      <p:cBhvr additive="base">
+                                        <p:cTn id="11" dur="500" fill="hold"/>
+                                        <p:tgtEl>
+                                          <p:spTgt spid="4">
+                                            <p:txEl>
+                                              <p:pRg st="1" end="1"/>
+                                            </p:txEl>
+                                          </p:spTgt>
+                                        </p:tgtEl>
+                                        <p:attrNameLst>
+                                          <p:attrName>ppt_x</p:attrName>
+                                        </p:attrNameLst>
+                                      </p:cBhvr>
+                                      <p:tavLst>
+                                        <p:tav tm="0">
+                                          <p:val>
+                                            <p:strVal val="#ppt_x"/>
+                                          </p:val>
+                                        </p:tav>
+                                        <p:tav tm="100000">
+                                          <p:val>
+                                            <p:strVal val="#ppt_x"/>
+                                          </p:val>
+                                        </p:tav>
+                                      </p:tavLst>
+                                    </p:anim>
+                                    <p:anim calcmode="lin" valueType="num">
+                                      <p:cBhvr additive="base">
+                                        <p:cTn id="12" dur="500" fill="hold"/>
+                                        <p:tgtEl>
+                                          <p:spTgt spid="4">
+                                            <p:txEl>
+                                              <p:pRg st="1" end="1"/>
+                                            </p:txEl>
+                                          </p:spTgt>
+                                        </p:tgtEl>
+                                        <p:attrNameLst>
+                                          <p:attrName>ppt_y</p:attrName>
+                                        </p:attrNameLst>
+                                      </p:cBhvr>
+                                      <p:tavLst>
+                                        <p:tav tm="0">
+                                          <p:val>
+                                            <p:strVal val="1+#ppt_h/2"/>
+                                          </p:val>
+                                        </p:tav>
+                                        <p:tav tm="100000">
+                                          <p:val>
+                                            <p:strVal val="#ppt_y"/>
+                                          </p:val>
+                                        </p:tav>
+                                      </p:tavLst>
+                                    </p:anim>
+                                  </p:childTnLst>
+                                </p:cTn>
+                              </p:par>
+                            </p:childTnLst>
+                          </p:cTn>
+                        </p:par>
+                      </p:childTnLst>
+                    </p:cTn>
+                  </p:par>
+                  <p:par>
+                    <p:cTn id="13" fill="hold">
+                      <p:stCondLst>
+                        <p:cond delay="indefinite"/>
+                      </p:stCondLst>
+                      <p:childTnLst>
+                        <p:par>
+                          <p:cTn id="14" fill="hold">
+                            <p:stCondLst>
+                              <p:cond delay="0"/>
+                            </p:stCondLst>
+                            <p:childTnLst>
+                              <p:par>
+                                <p:cTn id="15" presetID="2" presetClass="entr" presetSubtype="4" fill="hold" nodeType="clickEffect">
+                                  <p:stCondLst>
+                                    <p:cond delay="0"/>
+                                  </p:stCondLst>
+                                  <p:childTnLst>
+                                    <p:set>
+                                      <p:cBhvr>
+                                        <p:cTn id="16" dur="1" fill="hold">
+                                          <p:stCondLst>
+                                            <p:cond delay="0"/>
+                                          </p:stCondLst>
+                                        </p:cTn>
+                                        <p:tgtEl>
+                                          <p:spTgt spid="4">
+                                            <p:txEl>
+                                              <p:pRg st="2" end="2"/>
+                                            </p:txEl>
+                                          </p:spTgt>
+                                        </p:tgtEl>
+                                        <p:attrNameLst>
+                                          <p:attrName>style.visibility</p:attrName>
+                                        </p:attrNameLst>
+                                      </p:cBhvr>
+                                      <p:to>
+                                        <p:strVal val="visible"/>
+                                      </p:to>
+                                    </p:set>
+                                    <p:anim calcmode="lin" valueType="num">
+                                      <p:cBhvr additive="base">
+                                        <p:cTn id="17" dur="500" fill="hold"/>
+                                        <p:tgtEl>
+                                          <p:spTgt spid="4">
+                                            <p:txEl>
+                                              <p:pRg st="2" end="2"/>
+                                            </p:txEl>
+                                          </p:spTgt>
+                                        </p:tgtEl>
+                                        <p:attrNameLst>
+                                          <p:attrName>ppt_x</p:attrName>
+                                        </p:attrNameLst>
+                                      </p:cBhvr>
+                                      <p:tavLst>
+                                        <p:tav tm="0">
+                                          <p:val>
+                                            <p:strVal val="#ppt_x"/>
+                                          </p:val>
+                                        </p:tav>
+                                        <p:tav tm="100000">
+                                          <p:val>
+                                            <p:strVal val="#ppt_x"/>
+                                          </p:val>
+                                        </p:tav>
+                                      </p:tavLst>
+                                    </p:anim>
+                                    <p:anim calcmode="lin" valueType="num">
+                                      <p:cBhvr additive="base">
+                                        <p:cTn id="18" dur="500" fill="hold"/>
+                                        <p:tgtEl>
+                                          <p:spTgt spid="4">
+                                            <p:txEl>
+                                              <p:pRg st="2" end="2"/>
+                                            </p:txEl>
+                                          </p:spTgt>
+                                        </p:tgtEl>
+                                        <p:attrNameLst>
+                                          <p:attrName>ppt_y</p:attrName>
+                                        </p:attrNameLst>
+                                      </p:cBhvr>
+                                      <p:tavLst>
+                                        <p:tav tm="0">
+                                          <p:val>
+                                            <p:strVal val="1+#ppt_h/2"/>
+                                          </p:val>
+                                        </p:tav>
+                                        <p:tav tm="100000">
+                                          <p:val>
+                                            <p:strVal val="#ppt_y"/>
+                                          </p:val>
+                                        </p:tav>
+                                      </p:tavLst>
+                                    </p:anim>
+                                  </p:childTnLst>
+                                </p:cTn>
+                              </p:par>
+                              <p:par>
+                                <p:cTn id="19" presetID="2" presetClass="entr" presetSubtype="4" fill="hold" nodeType="withEffect">
+                                  <p:stCondLst>
+                                    <p:cond delay="0"/>
+                                  </p:stCondLst>
+                                  <p:childTnLst>
+                                    <p:set>
+                                      <p:cBhvr>
+                                        <p:cTn id="20" dur="1" fill="hold">
+                                          <p:stCondLst>
+                                            <p:cond delay="0"/>
+                                          </p:stCondLst>
+                                        </p:cTn>
+                                        <p:tgtEl>
+                                          <p:spTgt spid="4">
+                                            <p:txEl>
+                                              <p:pRg st="3" end="3"/>
+                                            </p:txEl>
+                                          </p:spTgt>
+                                        </p:tgtEl>
+                                        <p:attrNameLst>
+                                          <p:attrName>style.visibility</p:attrName>
+                                        </p:attrNameLst>
+                                      </p:cBhvr>
+                                      <p:to>
+                                        <p:strVal val="visible"/>
+                                      </p:to>
+                                    </p:set>
+                                    <p:anim calcmode="lin" valueType="num">
+                                      <p:cBhvr additive="base">
+                                        <p:cTn id="21" dur="500" fill="hold"/>
+                                        <p:tgtEl>
+                                          <p:spTgt spid="4">
+                                            <p:txEl>
+                                              <p:pRg st="3" end="3"/>
+                                            </p:txEl>
+                                          </p:spTgt>
+                                        </p:tgtEl>
+                                        <p:attrNameLst>
+                                          <p:attrName>ppt_x</p:attrName>
+                                        </p:attrNameLst>
+                                      </p:cBhvr>
+                                      <p:tavLst>
+                                        <p:tav tm="0">
+                                          <p:val>
+                                            <p:strVal val="#ppt_x"/>
+                                          </p:val>
+                                        </p:tav>
+                                        <p:tav tm="100000">
+                                          <p:val>
+                                            <p:strVal val="#ppt_x"/>
+                                          </p:val>
+                                        </p:tav>
+                                      </p:tavLst>
+                                    </p:anim>
+                                    <p:anim calcmode="lin" valueType="num">
+                                      <p:cBhvr additive="base">
+                                        <p:cTn id="22" dur="500" fill="hold"/>
+                                        <p:tgtEl>
+                                          <p:spTgt spid="4">
+                                            <p:txEl>
+                                              <p:pRg st="3" end="3"/>
+                                            </p:txEl>
+                                          </p:spTgt>
+                                        </p:tgtEl>
+                                        <p:attrNameLst>
+                                          <p:attrName>ppt_y</p:attrName>
+                                        </p:attrNameLst>
+                                      </p:cBhvr>
+                                      <p:tavLst>
+                                        <p:tav tm="0">
+                                          <p:val>
+                                            <p:strVal val="1+#ppt_h/2"/>
+                                          </p:val>
+                                        </p:tav>
+                                        <p:tav tm="100000">
+                                          <p:val>
+                                            <p:strVal val="#ppt_y"/>
+                                          </p:val>
+                                        </p:tav>
+                                      </p:tavLst>
+                                    </p:anim>
+                                  </p:childTnLst>
+                                </p:cTn>
+                              </p:par>
+                            </p:childTnLst>
+                          </p:cTn>
+                        </p:par>
+                      </p:childTnLst>
+                    </p:cTn>
+                  </p:par>
+                  <p:par>
+                    <p:cTn id="23" fill="hold">
+                      <p:stCondLst>
+                        <p:cond delay="indefinite"/>
+                      </p:stCondLst>
+                      <p:childTnLst>
+                        <p:par>
+                          <p:cTn id="24" fill="hold">
+                            <p:stCondLst>
+                              <p:cond delay="0"/>
+                            </p:stCondLst>
+                            <p:childTnLst>
+                              <p:par>
+                                <p:cTn id="25" presetID="2" presetClass="entr" presetSubtype="4" fill="hold" nodeType="clickEffect">
+                                  <p:stCondLst>
+                                    <p:cond delay="0"/>
+                                  </p:stCondLst>
+                                  <p:childTnLst>
+                                    <p:set>
+                                      <p:cBhvr>
+                                        <p:cTn id="26" dur="1" fill="hold">
+                                          <p:stCondLst>
+                                            <p:cond delay="0"/>
+                                          </p:stCondLst>
+                                        </p:cTn>
+                                        <p:tgtEl>
+                                          <p:spTgt spid="4">
+                                            <p:txEl>
+                                              <p:pRg st="4" end="4"/>
+                                            </p:txEl>
+                                          </p:spTgt>
+                                        </p:tgtEl>
+                                        <p:attrNameLst>
+                                          <p:attrName>style.visibility</p:attrName>
+                                        </p:attrNameLst>
+                                      </p:cBhvr>
+                                      <p:to>
+                                        <p:strVal val="visible"/>
+                                      </p:to>
+                                    </p:set>
+                                    <p:anim calcmode="lin" valueType="num">
+                                      <p:cBhvr additive="base">
+                                        <p:cTn id="27" dur="500" fill="hold"/>
+                                        <p:tgtEl>
+                                          <p:spTgt spid="4">
+                                            <p:txEl>
+                                              <p:pRg st="4" end="4"/>
+                                            </p:txEl>
+                                          </p:spTgt>
+                                        </p:tgtEl>
+                                        <p:attrNameLst>
+                                          <p:attrName>ppt_x</p:attrName>
+                                        </p:attrNameLst>
+                                      </p:cBhvr>
+                                      <p:tavLst>
+                                        <p:tav tm="0">
+                                          <p:val>
+                                            <p:strVal val="#ppt_x"/>
+                                          </p:val>
+                                        </p:tav>
+                                        <p:tav tm="100000">
+                                          <p:val>
+                                            <p:strVal val="#ppt_x"/>
+                                          </p:val>
+                                        </p:tav>
+                                      </p:tavLst>
+                                    </p:anim>
+                                    <p:anim calcmode="lin" valueType="num">
+                                      <p:cBhvr additive="base">
+                                        <p:cTn id="28" dur="500" fill="hold"/>
+                                        <p:tgtEl>
+                                          <p:spTgt spid="4">
+                                            <p:txEl>
+                                              <p:pRg st="4" end="4"/>
+                                            </p:txEl>
+                                          </p:spTgt>
+                                        </p:tgtEl>
+                                        <p:attrNameLst>
+                                          <p:attrName>ppt_y</p:attrName>
+                                        </p:attrNameLst>
+                                      </p:cBhvr>
+                                      <p:tavLst>
+                                        <p:tav tm="0">
+                                          <p:val>
+                                            <p:strVal val="1+#ppt_h/2"/>
+                                          </p:val>
+                                        </p:tav>
+                                        <p:tav tm="100000">
+                                          <p:val>
+                                            <p:strVal val="#ppt_y"/>
+                                          </p:val>
+                                        </p:tav>
+                                      </p:tavLst>
+                                    </p:anim>
+                                  </p:childTnLst>
+                                </p:cTn>
+                              </p:par>
+                              <p:par>
+                                <p:cTn id="29" presetID="2" presetClass="entr" presetSubtype="4" fill="hold" nodeType="withEffect">
+                                  <p:stCondLst>
+                                    <p:cond delay="0"/>
+                                  </p:stCondLst>
+                                  <p:childTnLst>
+                                    <p:set>
+                                      <p:cBhvr>
+                                        <p:cTn id="30" dur="1" fill="hold">
+                                          <p:stCondLst>
+                                            <p:cond delay="0"/>
+                                          </p:stCondLst>
+                                        </p:cTn>
+                                        <p:tgtEl>
+                                          <p:spTgt spid="4">
+                                            <p:txEl>
+                                              <p:pRg st="5" end="5"/>
+                                            </p:txEl>
+                                          </p:spTgt>
+                                        </p:tgtEl>
+                                        <p:attrNameLst>
+                                          <p:attrName>style.visibility</p:attrName>
+                                        </p:attrNameLst>
+                                      </p:cBhvr>
+                                      <p:to>
+                                        <p:strVal val="visible"/>
+                                      </p:to>
+                                    </p:set>
+                                    <p:anim calcmode="lin" valueType="num">
+                                      <p:cBhvr additive="base">
+                                        <p:cTn id="31" dur="500" fill="hold"/>
+                                        <p:tgtEl>
+                                          <p:spTgt spid="4">
+                                            <p:txEl>
+                                              <p:pRg st="5" end="5"/>
+                                            </p:txEl>
+                                          </p:spTgt>
+                                        </p:tgtEl>
+                                        <p:attrNameLst>
+                                          <p:attrName>ppt_x</p:attrName>
+                                        </p:attrNameLst>
+                                      </p:cBhvr>
+                                      <p:tavLst>
+                                        <p:tav tm="0">
+                                          <p:val>
+                                            <p:strVal val="#ppt_x"/>
+                                          </p:val>
+                                        </p:tav>
+                                        <p:tav tm="100000">
+                                          <p:val>
+                                            <p:strVal val="#ppt_x"/>
+                                          </p:val>
+                                        </p:tav>
+                                      </p:tavLst>
+                                    </p:anim>
+                                    <p:anim calcmode="lin" valueType="num">
+                                      <p:cBhvr additive="base">
+                                        <p:cTn id="32" dur="500" fill="hold"/>
+                                        <p:tgtEl>
+                                          <p:spTgt spid="4">
+                                            <p:txEl>
+                                              <p:pRg st="5" end="5"/>
+                                            </p:txEl>
+                                          </p:spTgt>
+                                        </p:tgtEl>
+                                        <p:attrNameLst>
+                                          <p:attrName>ppt_y</p:attrName>
+                                        </p:attrNameLst>
+                                      </p:cBhvr>
+                                      <p:tavLst>
+                                        <p:tav tm="0">
+                                          <p:val>
+                                            <p:strVal val="1+#ppt_h/2"/>
+                                          </p:val>
+                                        </p:tav>
+                                        <p:tav tm="100000">
+                                          <p:val>
+                                            <p:strVal val="#ppt_y"/>
+                                          </p:val>
+                                        </p:tav>
+                                      </p:tavLst>
+                                    </p:anim>
+                                  </p:childTnLst>
+                                </p:cTn>
+                              </p:par>
+                            </p:childTnLst>
+                          </p:cTn>
+                        </p:par>
+                      </p:childTnLst>
+                    </p:cTn>
+                  </p:par>
+                  <p:par>
+                    <p:cTn id="33" fill="hold">
+                      <p:stCondLst>
+                        <p:cond delay="indefinite"/>
+                      </p:stCondLst>
+                      <p:childTnLst>
+                        <p:par>
+                          <p:cTn id="34" fill="hold">
+                            <p:stCondLst>
+                              <p:cond delay="0"/>
+                            </p:stCondLst>
+                            <p:childTnLst>
+                              <p:par>
+                                <p:cTn id="35" presetID="2" presetClass="entr" presetSubtype="4" fill="hold" nodeType="clickEffect">
+                                  <p:stCondLst>
+                                    <p:cond delay="0"/>
+                                  </p:stCondLst>
+                                  <p:childTnLst>
+                                    <p:set>
+                                      <p:cBhvr>
+                                        <p:cTn id="36" dur="1" fill="hold">
+                                          <p:stCondLst>
+                                            <p:cond delay="0"/>
+                                          </p:stCondLst>
+                                        </p:cTn>
+                                        <p:tgtEl>
+                                          <p:spTgt spid="4">
+                                            <p:txEl>
+                                              <p:pRg st="6" end="6"/>
+                                            </p:txEl>
+                                          </p:spTgt>
+                                        </p:tgtEl>
+                                        <p:attrNameLst>
+                                          <p:attrName>style.visibility</p:attrName>
+                                        </p:attrNameLst>
+                                      </p:cBhvr>
+                                      <p:to>
+                                        <p:strVal val="visible"/>
+                                      </p:to>
+                                    </p:set>
+                                    <p:anim calcmode="lin" valueType="num">
+                                      <p:cBhvr additive="base">
+                                        <p:cTn id="37" dur="500" fill="hold"/>
+                                        <p:tgtEl>
+                                          <p:spTgt spid="4">
+                                            <p:txEl>
+                                              <p:pRg st="6" end="6"/>
+                                            </p:txEl>
+                                          </p:spTgt>
+                                        </p:tgtEl>
+                                        <p:attrNameLst>
+                                          <p:attrName>ppt_x</p:attrName>
+                                        </p:attrNameLst>
+                                      </p:cBhvr>
+                                      <p:tavLst>
+                                        <p:tav tm="0">
+                                          <p:val>
+                                            <p:strVal val="#ppt_x"/>
+                                          </p:val>
+                                        </p:tav>
+                                        <p:tav tm="100000">
+                                          <p:val>
+                                            <p:strVal val="#ppt_x"/>
+                                          </p:val>
+                                        </p:tav>
+                                      </p:tavLst>
+                                    </p:anim>
+                                    <p:anim calcmode="lin" valueType="num">
+                                      <p:cBhvr additive="base">
+                                        <p:cTn id="38" dur="500" fill="hold"/>
+                                        <p:tgtEl>
+                                          <p:spTgt spid="4">
+                                            <p:txEl>
+                                              <p:pRg st="6" end="6"/>
+                                            </p:txEl>
+                                          </p:spTgt>
+                                        </p:tgtEl>
+                                        <p:attrNameLst>
+                                          <p:attrName>ppt_y</p:attrName>
+                                        </p:attrNameLst>
+                                      </p:cBhvr>
+                                      <p:tavLst>
+                                        <p:tav tm="0">
+                                          <p:val>
+                                            <p:strVal val="1+#ppt_h/2"/>
+                                          </p:val>
+                                        </p:tav>
+                                        <p:tav tm="100000">
+                                          <p:val>
+                                            <p:strVal val="#ppt_y"/>
+                                          </p:val>
+                                        </p:tav>
+                                      </p:tavLst>
+                                    </p:anim>
+                                  </p:childTnLst>
+                                </p:cTn>
+                              </p:par>
+                              <p:par>
+                                <p:cTn id="39" presetID="2" presetClass="entr" presetSubtype="4" fill="hold" nodeType="withEffect">
+                                  <p:stCondLst>
+                                    <p:cond delay="0"/>
+                                  </p:stCondLst>
+                                  <p:childTnLst>
+                                    <p:set>
+                                      <p:cBhvr>
+                                        <p:cTn id="40" dur="1" fill="hold">
+                                          <p:stCondLst>
+                                            <p:cond delay="0"/>
+                                          </p:stCondLst>
+                                        </p:cTn>
+                                        <p:tgtEl>
+                                          <p:spTgt spid="4">
+                                            <p:txEl>
+                                              <p:pRg st="7" end="7"/>
+                                            </p:txEl>
+                                          </p:spTgt>
+                                        </p:tgtEl>
+                                        <p:attrNameLst>
+                                          <p:attrName>style.visibility</p:attrName>
+                                        </p:attrNameLst>
+                                      </p:cBhvr>
+                                      <p:to>
+                                        <p:strVal val="visible"/>
+                                      </p:to>
+                                    </p:set>
+                                    <p:anim calcmode="lin" valueType="num">
+                                      <p:cBhvr additive="base">
+                                        <p:cTn id="41" dur="500" fill="hold"/>
+                                        <p:tgtEl>
+                                          <p:spTgt spid="4">
+                                            <p:txEl>
+                                              <p:pRg st="7" end="7"/>
+                                            </p:txEl>
+                                          </p:spTgt>
+                                        </p:tgtEl>
+                                        <p:attrNameLst>
+                                          <p:attrName>ppt_x</p:attrName>
+                                        </p:attrNameLst>
+                                      </p:cBhvr>
+                                      <p:tavLst>
+                                        <p:tav tm="0">
+                                          <p:val>
+                                            <p:strVal val="#ppt_x"/>
+                                          </p:val>
+                                        </p:tav>
+                                        <p:tav tm="100000">
+                                          <p:val>
+                                            <p:strVal val="#ppt_x"/>
+                                          </p:val>
+                                        </p:tav>
+                                      </p:tavLst>
+                                    </p:anim>
+                                    <p:anim calcmode="lin" valueType="num">
+                                      <p:cBhvr additive="base">
+                                        <p:cTn id="42" dur="500" fill="hold"/>
+                                        <p:tgtEl>
+                                          <p:spTgt spid="4">
+                                            <p:txEl>
+                                              <p:pRg st="7" end="7"/>
+                                            </p:txEl>
+                                          </p:spTgt>
+                                        </p:tgtEl>
+                                        <p:attrNameLst>
+                                          <p:attrName>ppt_y</p:attrName>
+                                        </p:attrNameLst>
+                                      </p:cBhvr>
+                                      <p:tavLst>
+                                        <p:tav tm="0">
+                                          <p:val>
+                                            <p:strVal val="1+#ppt_h/2"/>
+                                          </p:val>
+                                        </p:tav>
+                                        <p:tav tm="100000">
+                                          <p:val>
+                                            <p:strVal val="#ppt_y"/>
+                                          </p:val>
+                                        </p:tav>
+                                      </p:tavLst>
+                                    </p:anim>
+                                  </p:childTnLst>
+                                </p:cTn>
+                              </p:par>
+                            </p:childTnLst>
+                          </p:cTn>
+                        </p:par>
+                      </p:childTnLst>
+                    </p:cTn>
+                  </p:par>
+                </p:childTnLst>
+              </p:cTn>
+              <p:prevCondLst>
+                <p:cond evt="onPrev" delay="0">
+                  <p:tgtEl>
+                    <p:sldTgt/>
+                  </p:tgtEl>
+                </p:cond>
+              </p:prevCondLst>
+              <p:nextCondLst>
+                <p:cond evt="onNext" delay="0">
+                  <p:tgtEl>
+                    <p:sldTgt/>
+                  </p:tgtEl>
+                </p:cond>
+              </p:nextCondLst>
+            </p:seq>
+          </p:childTnLst>
+        </p:cTn>
       </p:par>
     </p:tnLst>
   </p:timing>

</xml_diff>

<commit_message>
minor updates... in presentation notes
</commit_message>
<xml_diff>
--- a/Docs/2012 - Live360 Event Review (NEWER).pptx
+++ b/Docs/2012 - Live360 Event Review (NEWER).pptx
@@ -2864,7 +2864,7 @@
           </a:p>
           <a:p>
             <a:r>
-              <a:rPr lang="en-US" smtClean="0"/>
+              <a:rPr lang="en-US" dirty="0" err="1" smtClean="0"/>
               <a:t>Git</a:t>
             </a:r>
             <a:r>
@@ -2886,7 +2886,36 @@
           <a:p>
             <a:r>
               <a:rPr lang="en-US" baseline="0" dirty="0" smtClean="0"/>
-              <a:t>Bit.ly</a:t>
+              <a:t>Bit.ly… although not really “developer related”, I was just surprised as to how much this is used to shorten URLs. The last time I did a lot of this I was using </a:t>
+            </a:r>
+            <a:r>
+              <a:rPr lang="en-US" baseline="0" dirty="0" err="1" smtClean="0"/>
+              <a:t>shrinkster</a:t>
+            </a:r>
+            <a:r>
+              <a:rPr lang="en-US" baseline="0" dirty="0" smtClean="0"/>
+              <a:t> and </a:t>
+            </a:r>
+            <a:r>
+              <a:rPr lang="en-US" baseline="0" dirty="0" err="1" smtClean="0"/>
+              <a:t>tinyurl</a:t>
+            </a:r>
+            <a:r>
+              <a:rPr lang="en-US" baseline="0" dirty="0" smtClean="0"/>
+              <a:t>… an example of how over the course of just 5 years technology can change so much.</a:t>
+            </a:r>
+          </a:p>
+          <a:p>
+            <a:endParaRPr lang="en-US" baseline="0" dirty="0" smtClean="0"/>
+          </a:p>
+          <a:p>
+            <a:r>
+              <a:rPr lang="en-US" baseline="0" dirty="0" smtClean="0"/>
+              <a:t>Big data… I attended one presentation on this, but it sure feels as though this is just in its infancy. I would like it though if someone could present a compelling presentation regarding it though that would be relevant </a:t>
+            </a:r>
+            <a:r>
+              <a:rPr lang="en-US" baseline="0" smtClean="0"/>
+              <a:t>for our clients.</a:t>
             </a:r>
             <a:endParaRPr lang="en-CA" dirty="0"/>
           </a:p>

</xml_diff>

<commit_message>
very minor updates to powerpoint
</commit_message>
<xml_diff>
--- a/Docs/2012 - Live360 Event Review (NEWER).pptx
+++ b/Docs/2012 - Live360 Event Review (NEWER).pptx
@@ -862,13 +862,67 @@
           </a:p>
           <a:p>
             <a:r>
+              <a:rPr lang="en-US" dirty="0" smtClean="0"/>
+              <a:t>There has been a great </a:t>
+            </a:r>
+            <a:r>
+              <a:rPr lang="en-US" dirty="0" err="1" smtClean="0"/>
+              <a:t>simplication</a:t>
+            </a:r>
+            <a:r>
+              <a:rPr lang="en-US" dirty="0" smtClean="0"/>
+              <a:t> to:</a:t>
+            </a:r>
+          </a:p>
+          <a:p>
+            <a:pPr marL="171450" indent="-171450">
+              <a:buFontTx/>
+              <a:buChar char="-"/>
+            </a:pPr>
+            <a:r>
               <a:rPr lang="en-CA" dirty="0" smtClean="0"/>
-              <a:t>As can be seen here, DOCTYPE,</a:t>
-            </a:r>
+              <a:t>DOCTYPE</a:t>
+            </a:r>
+          </a:p>
+          <a:p>
+            <a:pPr marL="171450" indent="-171450">
+              <a:buFontTx/>
+              <a:buChar char="-"/>
+            </a:pPr>
             <a:r>
               <a:rPr lang="en-CA" baseline="0" dirty="0" smtClean="0"/>
-              <a:t> html and the main meta tags all become much, much simpler.</a:t>
-            </a:r>
+              <a:t>Html</a:t>
+            </a:r>
+          </a:p>
+          <a:p>
+            <a:pPr marL="0" indent="0">
+              <a:buFontTx/>
+              <a:buNone/>
+            </a:pPr>
+            <a:r>
+              <a:rPr lang="en-US" baseline="0" dirty="0" smtClean="0"/>
+              <a:t>and</a:t>
+            </a:r>
+            <a:endParaRPr lang="en-CA" baseline="0" dirty="0" smtClean="0"/>
+          </a:p>
+          <a:p>
+            <a:pPr marL="171450" indent="-171450">
+              <a:buFontTx/>
+              <a:buChar char="-"/>
+            </a:pPr>
+            <a:r>
+              <a:rPr lang="en-CA" baseline="0" dirty="0" smtClean="0"/>
+              <a:t>The main </a:t>
+            </a:r>
+            <a:r>
+              <a:rPr lang="en-CA" baseline="0" dirty="0" smtClean="0"/>
+              <a:t>meta </a:t>
+            </a:r>
+            <a:r>
+              <a:rPr lang="en-CA" baseline="0" dirty="0" smtClean="0"/>
+              <a:t>tag for character encoding</a:t>
+            </a:r>
+            <a:endParaRPr lang="en-CA" baseline="0" dirty="0" smtClean="0"/>
           </a:p>
           <a:p>
             <a:r>
@@ -879,7 +933,15 @@
           <a:p>
             <a:r>
               <a:rPr lang="en-CA" baseline="0" dirty="0" smtClean="0"/>
-              <a:t>Certainly the self-closing tags not needed a closing character is an interesting one and shows how different this spec is from XHTML’s XML style.</a:t>
+              <a:t>Certainly the self-closing tags not needed a closing character is an interesting one and shows how different this spec is from XHTML’s XML </a:t>
+            </a:r>
+            <a:r>
+              <a:rPr lang="en-CA" baseline="0" dirty="0" smtClean="0"/>
+              <a:t>focused style</a:t>
+            </a:r>
+            <a:r>
+              <a:rPr lang="en-CA" baseline="0" dirty="0" smtClean="0"/>
+              <a:t>.</a:t>
             </a:r>
             <a:endParaRPr lang="en-CA" dirty="0"/>
           </a:p>
@@ -977,23 +1039,7 @@
           <a:p>
             <a:r>
               <a:rPr lang="en-CA" baseline="0" dirty="0" smtClean="0"/>
-              <a:t>There is actually quite a bit to be said in this area including the theory behind a section </a:t>
-            </a:r>
-            <a:r>
-              <a:rPr lang="en-CA" baseline="0" dirty="0" smtClean="0"/>
-              <a:t>vs. </a:t>
-            </a:r>
-            <a:r>
-              <a:rPr lang="en-CA" baseline="0" dirty="0" smtClean="0"/>
-              <a:t>an article; however, </a:t>
-            </a:r>
-            <a:r>
-              <a:rPr lang="en-CA" baseline="0" dirty="0" smtClean="0"/>
-              <a:t>I am not going to focus on this in this presentation</a:t>
-            </a:r>
-            <a:r>
-              <a:rPr lang="en-CA" baseline="0" dirty="0" smtClean="0"/>
-              <a:t>.</a:t>
+              <a:t>There is actually quite a bit to be said in this area including the theory behind a section vs. an article; however, I am not going to focus on this in this presentation.</a:t>
             </a:r>
             <a:endParaRPr lang="en-CA" dirty="0"/>
           </a:p>
@@ -1168,127 +1214,80 @@
           <a:lstStyle/>
           <a:p>
             <a:r>
-              <a:rPr lang="en-US" dirty="0" smtClean="0"/>
-              <a:t>What </a:t>
-            </a:r>
-            <a:r>
-              <a:rPr lang="en-US" dirty="0" smtClean="0"/>
-              <a:t>about browser support? First, it is important to understand a bit about how features</a:t>
-            </a:r>
-            <a:r>
-              <a:rPr lang="en-US" baseline="0" dirty="0" smtClean="0"/>
+              <a:rPr lang="en-US" sz="1000" dirty="0" smtClean="0"/>
+              <a:t>What about browser support? First, it is important to understand a bit about how features</a:t>
+            </a:r>
+            <a:r>
+              <a:rPr lang="en-US" sz="1000" baseline="0" dirty="0" smtClean="0"/>
               <a:t> come about… a 5 stage process. </a:t>
             </a:r>
           </a:p>
           <a:p>
             <a:r>
-              <a:rPr lang="en-US" baseline="0" dirty="0" smtClean="0"/>
+              <a:rPr lang="en-US" sz="1000" baseline="0" dirty="0" smtClean="0"/>
               <a:t>What Microsoft’s IE team decided on originally was only to support “Candidate Recommendation” and up… as a result, they “score” much lower… so as a developer you need to keep this in mind and come up with solutions to this problem. </a:t>
             </a:r>
-            <a:endParaRPr lang="en-US" baseline="0" dirty="0" smtClean="0"/>
-          </a:p>
-          <a:p>
-            <a:r>
-              <a:rPr lang="en-US" baseline="0" dirty="0" smtClean="0"/>
-              <a:t>Note </a:t>
-            </a:r>
-            <a:r>
-              <a:rPr lang="en-US" baseline="0" dirty="0" smtClean="0"/>
-              <a:t>that the absolute easy way regarding </a:t>
-            </a:r>
-            <a:r>
-              <a:rPr lang="en-US" baseline="0" dirty="0" smtClean="0"/>
-              <a:t>this in IE </a:t>
-            </a:r>
-            <a:r>
-              <a:rPr lang="en-US" baseline="0" dirty="0" smtClean="0"/>
-              <a:t>is to use something called “Google Chrome Frame” which brings the “goodness” of Chrome into IE… however, this is a plugin</a:t>
-            </a:r>
-            <a:r>
-              <a:rPr lang="en-US" baseline="0" dirty="0" smtClean="0"/>
-              <a:t>. I will show this in a demo.</a:t>
-            </a:r>
-            <a:endParaRPr lang="en-US" baseline="0" dirty="0" smtClean="0"/>
-          </a:p>
-          <a:p>
-            <a:r>
-              <a:rPr lang="en-US" baseline="0" dirty="0" smtClean="0"/>
-              <a:t>To </a:t>
-            </a:r>
-            <a:r>
-              <a:rPr lang="en-US" baseline="0" dirty="0" smtClean="0"/>
-              <a:t>backup for a second… when I say “score” and mentioning how IE doesn’t score very well, what do I really mean by this? Well, </a:t>
-            </a:r>
-            <a:r>
-              <a:rPr lang="en-US" baseline="0" dirty="0" smtClean="0"/>
-              <a:t>on this slide are </a:t>
-            </a:r>
-            <a:r>
-              <a:rPr lang="en-US" baseline="0" dirty="0" smtClean="0"/>
-              <a:t>a couple of sites where you can see how the browsers “stack up” against one another.</a:t>
-            </a:r>
-          </a:p>
-          <a:p>
-            <a:r>
-              <a:rPr lang="en-US" baseline="0" dirty="0" smtClean="0"/>
-              <a:t>So, how to deal with? One way is to determine what the lowest common denominator might be</a:t>
-            </a:r>
-            <a:r>
-              <a:rPr lang="en-US" baseline="0" dirty="0" smtClean="0"/>
-              <a:t>… that is, what browsers are being used to access your site and then only use features that are common across those browsers. The </a:t>
-            </a:r>
-            <a:r>
-              <a:rPr lang="en-US" baseline="0" dirty="0" smtClean="0"/>
-              <a:t>next is to use something called “</a:t>
-            </a:r>
-            <a:r>
-              <a:rPr lang="en-US" baseline="0" dirty="0" err="1" smtClean="0"/>
+          </a:p>
+          <a:p>
+            <a:r>
+              <a:rPr lang="en-US" sz="1000" baseline="0" dirty="0" smtClean="0"/>
+              <a:t>Note that the absolute easy way regarding this in IE is to use something called “Google Chrome Frame” which brings the “goodness” of Chrome into IE… however, this is a plugin. I will show this in a demo.</a:t>
+            </a:r>
+          </a:p>
+          <a:p>
+            <a:r>
+              <a:rPr lang="en-US" sz="1000" baseline="0" dirty="0" smtClean="0"/>
+              <a:t>To backup for a second… when I say “score” and mentioning how IE doesn’t score very well, what do I really mean by this? Well, on this slide are a couple of sites where you can see how the browsers “stack up” against one another.</a:t>
+            </a:r>
+          </a:p>
+          <a:p>
+            <a:r>
+              <a:rPr lang="en-US" sz="1000" baseline="0" dirty="0" smtClean="0"/>
+              <a:t>So, how to deal with? One way is to determine what the lowest common denominator might be… that is, what browsers are being used to access your site and then only use features that are common across those browsers. The next is to use something called “</a:t>
+            </a:r>
+            <a:r>
+              <a:rPr lang="en-US" sz="1000" baseline="0" dirty="0" err="1" smtClean="0"/>
               <a:t>polyfills</a:t>
             </a:r>
             <a:r>
-              <a:rPr lang="en-US" baseline="0" dirty="0" smtClean="0"/>
-              <a:t>” to </a:t>
-            </a:r>
-            <a:r>
-              <a:rPr lang="en-US" baseline="0" dirty="0" smtClean="0"/>
-              <a:t>give a browser more HTML5 features. I wasn’t intending to show “</a:t>
-            </a:r>
-            <a:r>
-              <a:rPr lang="en-US" baseline="0" dirty="0" err="1" smtClean="0"/>
+              <a:rPr lang="en-US" sz="1000" baseline="0" dirty="0" smtClean="0"/>
+              <a:t>” to give a browser more HTML5 features. I wasn’t intending to show “</a:t>
+            </a:r>
+            <a:r>
+              <a:rPr lang="en-US" sz="1000" baseline="0" dirty="0" err="1" smtClean="0"/>
               <a:t>polyfills</a:t>
             </a:r>
             <a:r>
-              <a:rPr lang="en-US" baseline="0" dirty="0" smtClean="0"/>
+              <a:rPr lang="en-US" sz="1000" baseline="0" dirty="0" smtClean="0"/>
               <a:t>” in this presentation, but it is a big topic that basically involves using JavaScript to implant HTML5 functionality into a browser that does not offer native support.</a:t>
             </a:r>
-            <a:endParaRPr lang="en-US" baseline="0" dirty="0" smtClean="0"/>
-          </a:p>
-          <a:p>
-            <a:r>
-              <a:rPr lang="en-US" baseline="0" dirty="0" smtClean="0"/>
+          </a:p>
+          <a:p>
+            <a:r>
+              <a:rPr lang="en-US" sz="1000" baseline="0" dirty="0" smtClean="0"/>
               <a:t>The next 2 demos hopefully demonstrate this a bit.</a:t>
             </a:r>
           </a:p>
           <a:p>
-            <a:endParaRPr lang="en-CA" baseline="30000" dirty="0" smtClean="0"/>
-          </a:p>
-          <a:p>
-            <a:r>
-              <a:rPr lang="en-CA" baseline="30000" dirty="0" smtClean="0"/>
+            <a:endParaRPr lang="en-CA" sz="1000" baseline="30000" dirty="0" smtClean="0"/>
+          </a:p>
+          <a:p>
+            <a:r>
+              <a:rPr lang="en-CA" sz="1000" baseline="30000" dirty="0" smtClean="0"/>
               <a:t>1</a:t>
             </a:r>
             <a:r>
-              <a:rPr lang="en-CA" dirty="0" smtClean="0"/>
+              <a:rPr lang="en-CA" sz="1000" dirty="0" smtClean="0"/>
               <a:t> </a:t>
             </a:r>
             <a:r>
-              <a:rPr lang="en-US" dirty="0" smtClean="0"/>
+              <a:rPr lang="en-US" sz="1000" dirty="0" smtClean="0"/>
               <a:t>Chrome browser engine in IE 6/7/8/9</a:t>
             </a:r>
           </a:p>
           <a:p>
             <a:r>
-              <a:rPr lang="en-US" sz="1300" dirty="0">
+              <a:rPr lang="en-US" sz="1000" dirty="0">
                 <a:latin typeface="Arial" charset="0"/>
               </a:rPr>
               <a:t>chrome=1   - Always active</a:t>
@@ -1296,7 +1295,7 @@
           </a:p>
           <a:p>
             <a:r>
-              <a:rPr lang="en-US" sz="1300" dirty="0">
+              <a:rPr lang="en-US" sz="1000" dirty="0">
                 <a:latin typeface="Arial" charset="0"/>
               </a:rPr>
               <a:t>chrome=IE7 - Active for IE major version 7 or lower</a:t>
@@ -1304,60 +1303,53 @@
           </a:p>
           <a:p>
             <a:r>
-              <a:rPr lang="en-US" sz="1300" dirty="0">
+              <a:rPr lang="en-US" sz="1000" dirty="0">
                 <a:latin typeface="Arial" charset="0"/>
               </a:rPr>
               <a:t>chrome=IE8 - Active for IE major version 8 or lower</a:t>
             </a:r>
           </a:p>
           <a:p>
-            <a:pPr marL="181240" indent="-181240">
-              <a:buFont typeface="Arial" charset="0"/>
-              <a:buChar char="•"/>
-            </a:pPr>
-            <a:endParaRPr lang="en-CA" baseline="0" dirty="0" smtClean="0"/>
-          </a:p>
-          <a:p>
-            <a:r>
-              <a:rPr lang="en-CA" baseline="30000" dirty="0" smtClean="0"/>
+            <a:r>
+              <a:rPr lang="en-CA" sz="1000" baseline="30000" dirty="0" smtClean="0"/>
               <a:t>2</a:t>
             </a:r>
             <a:r>
-              <a:rPr lang="en-CA" dirty="0" smtClean="0"/>
+              <a:rPr lang="en-CA" sz="1000" dirty="0" smtClean="0"/>
               <a:t> </a:t>
             </a:r>
             <a:r>
-              <a:rPr lang="en-CA" dirty="0" smtClean="0"/>
+              <a:rPr lang="en-CA" sz="1000" dirty="0" smtClean="0"/>
               <a:t>Recommended</a:t>
             </a:r>
             <a:r>
-              <a:rPr lang="en-CA" baseline="0" dirty="0" smtClean="0"/>
+              <a:rPr lang="en-CA" sz="1000" baseline="0" dirty="0" smtClean="0"/>
               <a:t> resources</a:t>
             </a:r>
             <a:r>
-              <a:rPr lang="en-CA" dirty="0" smtClean="0"/>
+              <a:rPr lang="en-CA" sz="1000" dirty="0" smtClean="0"/>
               <a:t>: </a:t>
             </a:r>
             <a:r>
-              <a:rPr lang="en-US" dirty="0" smtClean="0">
+              <a:rPr lang="en-US" sz="1000" dirty="0" smtClean="0">
                 <a:hlinkClick r:id="rId3"/>
               </a:rPr>
               <a:t>http://remysharp.com/2010/10/08/what-is-a-polyfill/</a:t>
             </a:r>
             <a:r>
-              <a:rPr lang="en-US" dirty="0" smtClean="0"/>
+              <a:rPr lang="en-US" sz="1000" dirty="0" smtClean="0"/>
               <a:t> or </a:t>
             </a:r>
             <a:r>
-              <a:rPr lang="en-US" dirty="0" smtClean="0">
+              <a:rPr lang="en-US" sz="1000" dirty="0" smtClean="0">
                 <a:hlinkClick r:id="rId4"/>
               </a:rPr>
               <a:t>https://github.com/Modernizr/Modernizr/wiki/HTML5-Cross-browser-Polyfills</a:t>
             </a:r>
-            <a:endParaRPr lang="en-US" dirty="0" smtClean="0"/>
-          </a:p>
-          <a:p>
-            <a:endParaRPr lang="en-CA" dirty="0" smtClean="0"/>
+            <a:endParaRPr lang="en-US" sz="1000" dirty="0" smtClean="0"/>
+          </a:p>
+          <a:p>
+            <a:endParaRPr lang="en-CA" sz="1000" dirty="0" smtClean="0"/>
           </a:p>
         </p:txBody>
       </p:sp>
@@ -1443,11 +1435,7 @@
           <a:p>
             <a:r>
               <a:rPr lang="en-CA" dirty="0" smtClean="0"/>
-              <a:t>Next… “form enhancements</a:t>
-            </a:r>
-            <a:r>
-              <a:rPr lang="en-CA" dirty="0" smtClean="0"/>
-              <a:t>”…</a:t>
+              <a:t>Next… “form enhancements”…</a:t>
             </a:r>
             <a:r>
               <a:rPr lang="en-CA" baseline="0" dirty="0" smtClean="0"/>
@@ -1539,11 +1527,7 @@
           <a:p>
             <a:r>
               <a:rPr lang="en-CA" dirty="0" smtClean="0"/>
-              <a:t>HTML5 introduced a number of new </a:t>
-            </a:r>
-            <a:r>
-              <a:rPr lang="en-CA" dirty="0" smtClean="0"/>
-              <a:t>input</a:t>
+              <a:t>HTML5 introduced a number of new input</a:t>
             </a:r>
             <a:r>
               <a:rPr lang="en-CA" baseline="0" dirty="0" smtClean="0"/>
@@ -1832,12 +1816,20 @@
               <a:t>Next up… everyone’s </a:t>
             </a:r>
             <a:r>
+              <a:rPr lang="en-US" dirty="0" smtClean="0"/>
+              <a:t>“</a:t>
+            </a:r>
+            <a:r>
               <a:rPr lang="en-US" dirty="0" err="1" smtClean="0"/>
               <a:t>favourite</a:t>
             </a:r>
             <a:r>
               <a:rPr lang="en-US" dirty="0" smtClean="0"/>
-              <a:t> cloud computing...</a:t>
+              <a:t>”, </a:t>
+            </a:r>
+            <a:r>
+              <a:rPr lang="en-US" dirty="0" smtClean="0"/>
+              <a:t>cloud computing...</a:t>
             </a:r>
             <a:endParaRPr lang="en-CA" dirty="0"/>
           </a:p>
@@ -2017,11 +2009,7 @@
           <a:p>
             <a:r>
               <a:rPr lang="en-CA" dirty="0" smtClean="0"/>
-              <a:t>A </a:t>
-            </a:r>
-            <a:r>
-              <a:rPr lang="en-CA" dirty="0" smtClean="0"/>
-              <a:t>really quick summary of the</a:t>
+              <a:t>A really quick summary of the</a:t>
             </a:r>
             <a:r>
               <a:rPr lang="en-CA" baseline="0" dirty="0" smtClean="0"/>
@@ -2032,27 +2020,11 @@
           <a:p>
             <a:r>
               <a:rPr lang="en-CA" dirty="0" smtClean="0"/>
-              <a:t>The “</a:t>
-            </a:r>
-            <a:r>
-              <a:rPr lang="en-CA" dirty="0" smtClean="0"/>
-              <a:t>Live 360! Events</a:t>
-            </a:r>
-            <a:r>
-              <a:rPr lang="en-CA" dirty="0" smtClean="0"/>
-              <a:t>” name was a new one as it had historically</a:t>
+              <a:t>The “Live 360! Events” name was a new one as it had historically</a:t>
             </a:r>
             <a:r>
               <a:rPr lang="en-CA" baseline="0" dirty="0" smtClean="0"/>
-              <a:t> been a “VS Live” event… this </a:t>
-            </a:r>
-            <a:r>
-              <a:rPr lang="en-CA" baseline="0" dirty="0" smtClean="0"/>
-              <a:t>year, 2013, is actually its </a:t>
-            </a:r>
-            <a:r>
-              <a:rPr lang="en-CA" baseline="0" dirty="0" smtClean="0"/>
-              <a:t>20</a:t>
+              <a:t> been a “VS Live” event… this year, 2013, is actually its 20</a:t>
             </a:r>
             <a:r>
               <a:rPr lang="en-CA" baseline="30000" dirty="0" smtClean="0"/>
@@ -2077,15 +2049,7 @@
           <a:p>
             <a:r>
               <a:rPr lang="en-CA" baseline="0" dirty="0" smtClean="0"/>
-              <a:t>Having the ability to choose from up to 16 different sessions at once was quite ideal and overall it was a great conference to attend… being </a:t>
-            </a:r>
-            <a:r>
-              <a:rPr lang="en-CA" baseline="0" dirty="0" smtClean="0"/>
-              <a:t>in Orlando next </a:t>
-            </a:r>
-            <a:r>
-              <a:rPr lang="en-CA" baseline="0" dirty="0" smtClean="0"/>
-              <a:t>to Universal Studios was definitely nice as well, although the days were quite full and Universal Studios is not open late.</a:t>
+              <a:t>Having the ability to choose from up to 16 different sessions at once was quite ideal and overall it was a great conference to attend… being in Orlando next to Universal Studios was definitely nice as well, although the days were quite full and Universal Studios is not open late.</a:t>
             </a:r>
             <a:endParaRPr lang="en-CA" dirty="0"/>
           </a:p>
@@ -3018,46 +2982,33 @@
             </a:r>
             <a:r>
               <a:rPr lang="en-US" baseline="0" dirty="0" smtClean="0"/>
-              <a:t> </a:t>
-            </a:r>
+              <a:t> knew at a high level that HTML5 was important, I was hoping to use this conference as a “kick start” to learn more information regarding it</a:t>
+            </a:r>
+          </a:p>
+          <a:p>
             <a:r>
               <a:rPr lang="en-US" baseline="0" dirty="0" smtClean="0"/>
-              <a:t>knew at a high level that HTML5 was important, I was hoping to use this conference as a “kick start” to learn more information regarding it</a:t>
+              <a:t>- I knew that Microsoft was pushing Azure a lot, but honestly I had not laid hands on it before… just read and watched training sessions for it</a:t>
             </a:r>
           </a:p>
           <a:p>
             <a:r>
               <a:rPr lang="en-US" baseline="0" dirty="0" smtClean="0"/>
-              <a:t>- I </a:t>
+              <a:t>- For mobile, I was open to hearing anything that I could </a:t>
             </a:r>
             <a:r>
               <a:rPr lang="en-US" baseline="0" dirty="0" smtClean="0"/>
-              <a:t>knew that Microsoft was pushing Azure a lot, but honestly I had not </a:t>
+              <a:t>related </a:t>
             </a:r>
             <a:r>
               <a:rPr lang="en-US" baseline="0" dirty="0" smtClean="0"/>
-              <a:t>laid hands on it before… just read and watched training sessions for it</a:t>
-            </a:r>
-            <a:endParaRPr lang="en-US" baseline="0" dirty="0" smtClean="0"/>
+              <a:t>to mobile, and although this was not a conference that was big on mobile, there was some knowledge I gained in this area.</a:t>
+            </a:r>
           </a:p>
           <a:p>
             <a:r>
               <a:rPr lang="en-US" baseline="0" dirty="0" smtClean="0"/>
-              <a:t>- For </a:t>
-            </a:r>
-            <a:r>
-              <a:rPr lang="en-US" baseline="0" dirty="0" smtClean="0"/>
-              <a:t>mobile, I was open to hearing anything that I could relate to mobile, and although this was not a conference that was big on mobile, there was some knowledge I gained in this area.</a:t>
-            </a:r>
-          </a:p>
-          <a:p>
-            <a:r>
-              <a:rPr lang="en-US" baseline="0" dirty="0" smtClean="0"/>
-              <a:t>- Finally</a:t>
-            </a:r>
-            <a:r>
-              <a:rPr lang="en-US" baseline="0" dirty="0" smtClean="0"/>
-              <a:t>, for trends, I was conscious of looking for anything that people were talking a lot about</a:t>
+              <a:t>- Finally, for trends, I was conscious of looking for anything that people were talking a lot about</a:t>
             </a:r>
             <a:endParaRPr lang="en-US" dirty="0"/>
           </a:p>
@@ -3145,7 +3096,15 @@
           <a:p>
             <a:r>
               <a:rPr lang="en-CA" dirty="0" smtClean="0"/>
-              <a:t>What *did* I learn… well… quite</a:t>
+              <a:t>What *did* I </a:t>
+            </a:r>
+            <a:r>
+              <a:rPr lang="en-CA" dirty="0" smtClean="0"/>
+              <a:t>learn?… </a:t>
+            </a:r>
+            <a:r>
+              <a:rPr lang="en-CA" dirty="0" smtClean="0"/>
+              <a:t>well… quite</a:t>
             </a:r>
             <a:r>
               <a:rPr lang="en-CA" baseline="0" dirty="0" smtClean="0"/>
@@ -3249,15 +3208,11 @@
           <a:p>
             <a:r>
               <a:rPr lang="en-CA" dirty="0" smtClean="0"/>
-              <a:t>Let’s </a:t>
+              <a:t>First up, a </a:t>
             </a:r>
             <a:r>
               <a:rPr lang="en-CA" dirty="0" smtClean="0"/>
-              <a:t>talk a little bit about the history of </a:t>
-            </a:r>
-            <a:r>
-              <a:rPr lang="en-CA" dirty="0" smtClean="0"/>
-              <a:t>HTML5…</a:t>
+              <a:t>little bit about the history of HTML5…</a:t>
             </a:r>
             <a:endParaRPr lang="en-CA" dirty="0"/>
           </a:p>
@@ -3532,26 +3487,13 @@
             </a:r>
             <a:r>
               <a:rPr lang="en-CA" baseline="0" dirty="0" smtClean="0"/>
-              <a:t> as </a:t>
-            </a:r>
+              <a:t> as well other than just the browser groups creating it.</a:t>
+            </a:r>
+          </a:p>
+          <a:p>
             <a:r>
               <a:rPr lang="en-CA" baseline="0" dirty="0" smtClean="0"/>
-              <a:t>well other than just the browser groups creating it.</a:t>
-            </a:r>
-            <a:endParaRPr lang="en-CA" baseline="0" dirty="0" smtClean="0"/>
-          </a:p>
-          <a:p>
-            <a:r>
-              <a:rPr lang="en-CA" baseline="0" dirty="0" smtClean="0"/>
-              <a:t>First, there was the “Steve </a:t>
-            </a:r>
-            <a:r>
-              <a:rPr lang="en-CA" baseline="0" dirty="0" smtClean="0"/>
-              <a:t>Jobs effect”, </a:t>
-            </a:r>
-            <a:r>
-              <a:rPr lang="en-CA" baseline="0" dirty="0" smtClean="0"/>
-              <a:t>both by him agreeing that HTML5 was the way of the future and the fact that all of the </a:t>
+              <a:t>First, there was the “Steve Jobs effect”, both by him agreeing that HTML5 was the way of the future and the fact that all of the </a:t>
             </a:r>
             <a:r>
               <a:rPr lang="en-CA" baseline="0" dirty="0" err="1" smtClean="0"/>
@@ -3754,15 +3696,27 @@
             </a:r>
             <a:r>
               <a:rPr lang="en-CA" baseline="0" dirty="0" smtClean="0"/>
-              <a:t> on from history to talking about </a:t>
+              <a:t> on from history to talking about HTML tags… </a:t>
             </a:r>
             <a:r>
               <a:rPr lang="en-CA" baseline="0" dirty="0" smtClean="0"/>
-              <a:t>HTML tags</a:t>
+              <a:t>the simplification of some of </a:t>
             </a:r>
             <a:r>
               <a:rPr lang="en-CA" baseline="0" dirty="0" smtClean="0"/>
-              <a:t>… simplification to them and the creation of more semantic tags…</a:t>
+              <a:t>them and the creation of more </a:t>
+            </a:r>
+            <a:r>
+              <a:rPr lang="en-CA" baseline="0" dirty="0" smtClean="0"/>
+              <a:t>“semantic” </a:t>
+            </a:r>
+            <a:r>
+              <a:rPr lang="en-CA" baseline="0" dirty="0" smtClean="0"/>
+              <a:t>tags</a:t>
+            </a:r>
+            <a:r>
+              <a:rPr lang="en-CA" baseline="0" dirty="0" smtClean="0"/>
+              <a:t>… that is, the creation of more tags that have some more meaning to them</a:t>
             </a:r>
             <a:endParaRPr lang="en-CA" dirty="0"/>
           </a:p>
@@ -20448,15 +20402,7 @@
             <a:pPr lvl="2"/>
             <a:r>
               <a:rPr lang="en-CA" dirty="0" smtClean="0"/>
-              <a:t>Easy scaling of resources… for example</a:t>
-            </a:r>
-            <a:r>
-              <a:rPr lang="en-CA" dirty="0" smtClean="0"/>
-              <a:t> “</a:t>
-            </a:r>
-            <a:r>
-              <a:rPr lang="en-CA" dirty="0" smtClean="0"/>
-              <a:t>tonight </a:t>
+              <a:t>Easy scaling of resources… for example “tonight </a:t>
             </a:r>
             <a:r>
               <a:rPr lang="en-CA" dirty="0"/>
@@ -20464,13 +20410,8 @@
             </a:r>
             <a:r>
               <a:rPr lang="en-CA" dirty="0" smtClean="0"/>
-              <a:t>done</a:t>
-            </a:r>
-            <a:r>
-              <a:rPr lang="en-CA" dirty="0" smtClean="0"/>
-              <a:t>”</a:t>
-            </a:r>
-            <a:endParaRPr lang="en-CA" dirty="0" smtClean="0"/>
+              <a:t>done”</a:t>
+            </a:r>
           </a:p>
           <a:p>
             <a:r>
@@ -25295,35 +25236,18 @@
           <a:p>
             <a:pPr lvl="1"/>
             <a:r>
+              <a:rPr lang="en-CA" dirty="0" err="1" smtClean="0">
+                <a:hlinkClick r:id="rId3"/>
+              </a:rPr>
+              <a:t>HitCounter</a:t>
+            </a:r>
+            <a:endParaRPr lang="en-CA" dirty="0" smtClean="0"/>
+          </a:p>
+          <a:p>
+            <a:pPr lvl="1"/>
+            <a:r>
               <a:rPr lang="en-CA" dirty="0" smtClean="0">
-                <a:hlinkClick r:id="rId3"/>
-              </a:rPr>
-              <a:t>Start up demo site on Azure</a:t>
-            </a:r>
-            <a:endParaRPr lang="en-CA" dirty="0" smtClean="0"/>
-          </a:p>
-          <a:p>
-            <a:pPr lvl="1"/>
-            <a:r>
-              <a:rPr lang="en-CA" dirty="0" smtClean="0"/>
-              <a:t>2 different demos here:</a:t>
-            </a:r>
-          </a:p>
-          <a:p>
-            <a:pPr lvl="2"/>
-            <a:r>
-              <a:rPr lang="en-CA" dirty="0" err="1" smtClean="0">
                 <a:hlinkClick r:id="rId4"/>
-              </a:rPr>
-              <a:t>HitCounter</a:t>
-            </a:r>
-            <a:endParaRPr lang="en-CA" dirty="0" smtClean="0"/>
-          </a:p>
-          <a:p>
-            <a:pPr lvl="2"/>
-            <a:r>
-              <a:rPr lang="en-CA" dirty="0" smtClean="0">
-                <a:hlinkClick r:id="rId5"/>
               </a:rPr>
               <a:t>Chat</a:t>
             </a:r>

</xml_diff>

<commit_message>
added some pages to make presentation flow smoother
</commit_message>
<xml_diff>
--- a/Docs/2012 - Live360 Event Review (NEWER).pptx
+++ b/Docs/2012 - Live360 Event Review (NEWER).pptx
@@ -5,10 +5,10 @@
     <p:sldMasterId id="2147483887" r:id="rId1"/>
   </p:sldMasterIdLst>
   <p:notesMasterIdLst>
-    <p:notesMasterId r:id="rId27"/>
+    <p:notesMasterId r:id="rId26"/>
   </p:notesMasterIdLst>
   <p:handoutMasterIdLst>
-    <p:handoutMasterId r:id="rId28"/>
+    <p:handoutMasterId r:id="rId27"/>
   </p:handoutMasterIdLst>
   <p:sldIdLst>
     <p:sldId id="260" r:id="rId2"/>
@@ -24,18 +24,17 @@
     <p:sldId id="281" r:id="rId12"/>
     <p:sldId id="289" r:id="rId13"/>
     <p:sldId id="273" r:id="rId14"/>
-    <p:sldId id="282" r:id="rId15"/>
-    <p:sldId id="265" r:id="rId16"/>
-    <p:sldId id="283" r:id="rId17"/>
-    <p:sldId id="274" r:id="rId18"/>
-    <p:sldId id="284" r:id="rId19"/>
-    <p:sldId id="266" r:id="rId20"/>
-    <p:sldId id="285" r:id="rId21"/>
-    <p:sldId id="268" r:id="rId22"/>
-    <p:sldId id="286" r:id="rId23"/>
-    <p:sldId id="269" r:id="rId24"/>
-    <p:sldId id="288" r:id="rId25"/>
-    <p:sldId id="270" r:id="rId26"/>
+    <p:sldId id="290" r:id="rId15"/>
+    <p:sldId id="282" r:id="rId16"/>
+    <p:sldId id="265" r:id="rId17"/>
+    <p:sldId id="283" r:id="rId18"/>
+    <p:sldId id="274" r:id="rId19"/>
+    <p:sldId id="284" r:id="rId20"/>
+    <p:sldId id="266" r:id="rId21"/>
+    <p:sldId id="286" r:id="rId22"/>
+    <p:sldId id="269" r:id="rId23"/>
+    <p:sldId id="288" r:id="rId24"/>
+    <p:sldId id="270" r:id="rId25"/>
   </p:sldIdLst>
   <p:sldSz cx="9144000" cy="6858000" type="screen4x3"/>
   <p:notesSz cx="7315200" cy="9601200"/>
@@ -219,7 +218,7 @@
           <a:p>
             <a:fld id="{6D05735F-B05D-4640-A99E-EDFA21E90228}" type="datetimeFigureOut">
               <a:rPr lang="en-US" smtClean="0"/>
-              <a:t>3/14/2013</a:t>
+              <a:t>3/16/2013</a:t>
             </a:fld>
             <a:endParaRPr lang="en-US"/>
           </a:p>
@@ -385,7 +384,7 @@
           <a:p>
             <a:fld id="{EB5D2808-713F-1C4D-AF0B-AEC7B1F49BC4}" type="datetimeFigureOut">
               <a:rPr lang="en-US" smtClean="0"/>
-              <a:t>3/14/2013</a:t>
+              <a:t>3/16/2013</a:t>
             </a:fld>
             <a:endParaRPr lang="en-US"/>
           </a:p>
@@ -707,8 +706,13 @@
             </a:r>
             <a:r>
               <a:rPr lang="en-CA" baseline="0" dirty="0" smtClean="0"/>
-              <a:t> allowed the opportunity of attending a conference in December called Live360. </a:t>
-            </a:r>
+              <a:t> allowed the opportunity of attending a conference in December called </a:t>
+            </a:r>
+            <a:r>
+              <a:rPr lang="en-CA" baseline="0" dirty="0" smtClean="0"/>
+              <a:t>Live! 360 Events. </a:t>
+            </a:r>
+            <a:endParaRPr lang="en-CA" baseline="0" dirty="0" smtClean="0"/>
           </a:p>
           <a:p>
             <a:pPr defTabSz="483306">
@@ -912,17 +916,8 @@
             </a:pPr>
             <a:r>
               <a:rPr lang="en-CA" baseline="0" dirty="0" smtClean="0"/>
-              <a:t>The main </a:t>
-            </a:r>
-            <a:r>
-              <a:rPr lang="en-CA" baseline="0" dirty="0" smtClean="0"/>
-              <a:t>meta </a:t>
-            </a:r>
-            <a:r>
-              <a:rPr lang="en-CA" baseline="0" dirty="0" smtClean="0"/>
-              <a:t>tag for character encoding</a:t>
-            </a:r>
-            <a:endParaRPr lang="en-CA" baseline="0" dirty="0" smtClean="0"/>
+              <a:t>The main meta tag for character encoding</a:t>
+            </a:r>
           </a:p>
           <a:p>
             <a:r>
@@ -933,15 +928,7 @@
           <a:p>
             <a:r>
               <a:rPr lang="en-CA" baseline="0" dirty="0" smtClean="0"/>
-              <a:t>Certainly the self-closing tags not needed a closing character is an interesting one and shows how different this spec is from XHTML’s XML </a:t>
-            </a:r>
-            <a:r>
-              <a:rPr lang="en-CA" baseline="0" dirty="0" smtClean="0"/>
-              <a:t>focused style</a:t>
-            </a:r>
-            <a:r>
-              <a:rPr lang="en-CA" baseline="0" dirty="0" smtClean="0"/>
-              <a:t>.</a:t>
+              <a:t>Certainly the self-closing tags not needed a closing character is an interesting one and shows how different this spec is from XHTML’s XML focused style.</a:t>
             </a:r>
             <a:endParaRPr lang="en-CA" dirty="0"/>
           </a:p>
@@ -1127,7 +1114,15 @@
           <a:p>
             <a:r>
               <a:rPr lang="en-CA" dirty="0" smtClean="0"/>
-              <a:t>Next up… let’s talk about browser support</a:t>
+              <a:t>Next up… </a:t>
+            </a:r>
+            <a:r>
+              <a:rPr lang="en-CA" dirty="0" smtClean="0"/>
+              <a:t>browser </a:t>
+            </a:r>
+            <a:r>
+              <a:rPr lang="en-CA" dirty="0" smtClean="0"/>
+              <a:t>support</a:t>
             </a:r>
             <a:endParaRPr lang="en-CA" dirty="0"/>
           </a:p>
@@ -1215,7 +1210,15 @@
           <a:p>
             <a:r>
               <a:rPr lang="en-US" sz="1000" dirty="0" smtClean="0"/>
-              <a:t>What about browser support? First, it is important to understand a bit about how features</a:t>
+              <a:t>What about browser </a:t>
+            </a:r>
+            <a:r>
+              <a:rPr lang="en-US" sz="1000" dirty="0" smtClean="0"/>
+              <a:t>support, in particular for Internet Explorer? </a:t>
+            </a:r>
+            <a:r>
+              <a:rPr lang="en-US" sz="1000" dirty="0" smtClean="0"/>
+              <a:t>First, it is important to understand a bit about how features</a:t>
             </a:r>
             <a:r>
               <a:rPr lang="en-US" sz="1000" baseline="0" dirty="0" smtClean="0"/>
@@ -1231,41 +1234,15 @@
           <a:p>
             <a:r>
               <a:rPr lang="en-US" sz="1000" baseline="0" dirty="0" smtClean="0"/>
-              <a:t>Note that the absolute easy way regarding this in IE is to use something called “Google Chrome Frame” which brings the “goodness” of Chrome into IE… however, this is a plugin. I will show this in a demo.</a:t>
-            </a:r>
-          </a:p>
-          <a:p>
+              <a:t>Note that the absolute </a:t>
+            </a:r>
             <a:r>
               <a:rPr lang="en-US" sz="1000" baseline="0" dirty="0" smtClean="0"/>
-              <a:t>To backup for a second… when I say “score” and mentioning how IE doesn’t score very well, what do I really mean by this? Well, on this slide are a couple of sites where you can see how the browsers “stack up” against one another.</a:t>
-            </a:r>
-          </a:p>
-          <a:p>
+              <a:t>easiest </a:t>
+            </a:r>
             <a:r>
               <a:rPr lang="en-US" sz="1000" baseline="0" dirty="0" smtClean="0"/>
-              <a:t>So, how to deal with? One way is to determine what the lowest common denominator might be… that is, what browsers are being used to access your site and then only use features that are common across those browsers. The next is to use something called “</a:t>
-            </a:r>
-            <a:r>
-              <a:rPr lang="en-US" sz="1000" baseline="0" dirty="0" err="1" smtClean="0"/>
-              <a:t>polyfills</a:t>
-            </a:r>
-            <a:r>
-              <a:rPr lang="en-US" sz="1000" baseline="0" dirty="0" smtClean="0"/>
-              <a:t>” to give a browser more HTML5 features. I wasn’t intending to show “</a:t>
-            </a:r>
-            <a:r>
-              <a:rPr lang="en-US" sz="1000" baseline="0" dirty="0" err="1" smtClean="0"/>
-              <a:t>polyfills</a:t>
-            </a:r>
-            <a:r>
-              <a:rPr lang="en-US" sz="1000" baseline="0" dirty="0" smtClean="0"/>
-              <a:t>” in this presentation, but it is a big topic that basically involves using JavaScript to implant HTML5 functionality into a browser that does not offer native support.</a:t>
-            </a:r>
-          </a:p>
-          <a:p>
-            <a:r>
-              <a:rPr lang="en-US" sz="1000" baseline="0" dirty="0" smtClean="0"/>
-              <a:t>The next 2 demos hopefully demonstrate this a bit.</a:t>
+              <a:t>way regarding this in IE is to use something called “Google Chrome Frame” which brings the “goodness” of Chrome into IE… however, this is a plugin. I will show this in a demo.</a:t>
             </a:r>
           </a:p>
           <a:p>
@@ -1308,45 +1285,6 @@
               </a:rPr>
               <a:t>chrome=IE8 - Active for IE major version 8 or lower</a:t>
             </a:r>
-          </a:p>
-          <a:p>
-            <a:r>
-              <a:rPr lang="en-CA" sz="1000" baseline="30000" dirty="0" smtClean="0"/>
-              <a:t>2</a:t>
-            </a:r>
-            <a:r>
-              <a:rPr lang="en-CA" sz="1000" dirty="0" smtClean="0"/>
-              <a:t> </a:t>
-            </a:r>
-            <a:r>
-              <a:rPr lang="en-CA" sz="1000" dirty="0" smtClean="0"/>
-              <a:t>Recommended</a:t>
-            </a:r>
-            <a:r>
-              <a:rPr lang="en-CA" sz="1000" baseline="0" dirty="0" smtClean="0"/>
-              <a:t> resources</a:t>
-            </a:r>
-            <a:r>
-              <a:rPr lang="en-CA" sz="1000" dirty="0" smtClean="0"/>
-              <a:t>: </a:t>
-            </a:r>
-            <a:r>
-              <a:rPr lang="en-US" sz="1000" dirty="0" smtClean="0">
-                <a:hlinkClick r:id="rId3"/>
-              </a:rPr>
-              <a:t>http://remysharp.com/2010/10/08/what-is-a-polyfill/</a:t>
-            </a:r>
-            <a:r>
-              <a:rPr lang="en-US" sz="1000" dirty="0" smtClean="0"/>
-              <a:t> or </a:t>
-            </a:r>
-            <a:r>
-              <a:rPr lang="en-US" sz="1000" dirty="0" smtClean="0">
-                <a:hlinkClick r:id="rId4"/>
-              </a:rPr>
-              <a:t>https://github.com/Modernizr/Modernizr/wiki/HTML5-Cross-browser-Polyfills</a:t>
-            </a:r>
-            <a:endParaRPr lang="en-US" sz="1000" dirty="0" smtClean="0"/>
           </a:p>
           <a:p>
             <a:endParaRPr lang="en-CA" sz="1000" dirty="0" smtClean="0"/>
@@ -1434,13 +1372,98 @@
           <a:lstStyle/>
           <a:p>
             <a:r>
-              <a:rPr lang="en-CA" dirty="0" smtClean="0"/>
-              <a:t>Next… “form enhancements”…</a:t>
-            </a:r>
-            <a:r>
-              <a:rPr lang="en-CA" baseline="0" dirty="0" smtClean="0"/>
-              <a:t> this is an area that is important for developers creating pages that are meant to capture data</a:t>
-            </a:r>
+              <a:rPr lang="en-US" sz="1200" baseline="0" dirty="0" smtClean="0"/>
+              <a:t>To backup for a second… when I say “score” and mentioning how IE doesn’t score very well, what do I really mean by this? Well, on this slide are a couple of sites where you can see how the browsers “stack up” against one another.</a:t>
+            </a:r>
+          </a:p>
+          <a:p>
+            <a:r>
+              <a:rPr lang="en-US" sz="1200" baseline="0" dirty="0" smtClean="0"/>
+              <a:t>So, how to deal with? One way is to determine what the lowest common denominator might be… that is, what browsers are being used to access your site and then only use features that are common across those browsers. The next is to use something called “</a:t>
+            </a:r>
+            <a:r>
+              <a:rPr lang="en-US" sz="1200" baseline="0" dirty="0" err="1" smtClean="0"/>
+              <a:t>polyfills</a:t>
+            </a:r>
+            <a:r>
+              <a:rPr lang="en-US" sz="1200" baseline="0" dirty="0" smtClean="0"/>
+              <a:t>” to give a browser more HTML5 features. I wasn’t intending to show “</a:t>
+            </a:r>
+            <a:r>
+              <a:rPr lang="en-US" sz="1200" baseline="0" dirty="0" err="1" smtClean="0"/>
+              <a:t>polyfills</a:t>
+            </a:r>
+            <a:r>
+              <a:rPr lang="en-US" sz="1200" baseline="0" dirty="0" smtClean="0"/>
+              <a:t>” in this presentation, but it is a big topic that basically involves using JavaScript to implant HTML5 functionality into a browser that does not offer native support.</a:t>
+            </a:r>
+          </a:p>
+          <a:p>
+            <a:r>
+              <a:rPr lang="en-US" sz="1200" baseline="0" dirty="0" smtClean="0"/>
+              <a:t>The next 2 demos are meant to demonstrate some of the concepts discussed so far.</a:t>
+            </a:r>
+          </a:p>
+          <a:p>
+            <a:endParaRPr lang="en-CA" dirty="0" smtClean="0"/>
+          </a:p>
+          <a:p>
+            <a:pPr marL="0" marR="0" indent="0" algn="l" defTabSz="457200" rtl="0" eaLnBrk="1" fontAlgn="auto" latinLnBrk="0" hangingPunct="1">
+              <a:lnSpc>
+                <a:spcPct val="100000"/>
+              </a:lnSpc>
+              <a:spcBef>
+                <a:spcPts val="0"/>
+              </a:spcBef>
+              <a:spcAft>
+                <a:spcPts val="0"/>
+              </a:spcAft>
+              <a:buClrTx/>
+              <a:buSzTx/>
+              <a:buFontTx/>
+              <a:buNone/>
+              <a:tabLst/>
+              <a:defRPr/>
+            </a:pPr>
+            <a:r>
+              <a:rPr lang="en-CA" sz="1200" baseline="30000" dirty="0" smtClean="0"/>
+              <a:t>1</a:t>
+            </a:r>
+            <a:r>
+              <a:rPr lang="en-CA" sz="1200" dirty="0" smtClean="0"/>
+              <a:t> Recommended</a:t>
+            </a:r>
+            <a:r>
+              <a:rPr lang="en-CA" sz="1200" baseline="0" dirty="0" smtClean="0"/>
+              <a:t> resources regarding </a:t>
+            </a:r>
+            <a:r>
+              <a:rPr lang="en-CA" sz="1200" baseline="0" dirty="0" err="1" smtClean="0"/>
+              <a:t>polyfills</a:t>
+            </a:r>
+            <a:r>
+              <a:rPr lang="en-CA" sz="1200" dirty="0" smtClean="0"/>
+              <a:t>: </a:t>
+            </a:r>
+            <a:r>
+              <a:rPr lang="en-US" sz="1200" dirty="0" smtClean="0">
+                <a:hlinkClick r:id="rId3"/>
+              </a:rPr>
+              <a:t>http://remysharp.com/2010/10/08/what-is-a-polyfill/</a:t>
+            </a:r>
+            <a:r>
+              <a:rPr lang="en-US" sz="1200" dirty="0" smtClean="0"/>
+              <a:t> or </a:t>
+            </a:r>
+            <a:r>
+              <a:rPr lang="en-US" sz="1200" dirty="0" smtClean="0">
+                <a:hlinkClick r:id="rId4"/>
+              </a:rPr>
+              <a:t>https://github.com/Modernizr/Modernizr/wiki/HTML5-Cross-browser-Polyfills</a:t>
+            </a:r>
+            <a:endParaRPr lang="en-US" sz="1200" dirty="0" smtClean="0"/>
+          </a:p>
+          <a:p>
             <a:endParaRPr lang="en-CA" dirty="0"/>
           </a:p>
         </p:txBody>
@@ -1471,7 +1494,7 @@
     </p:spTree>
     <p:extLst>
       <p:ext uri="{BB962C8B-B14F-4D97-AF65-F5344CB8AC3E}">
-        <p14:creationId xmlns:p14="http://schemas.microsoft.com/office/powerpoint/2010/main" val="1633675551"/>
+        <p14:creationId xmlns:p14="http://schemas.microsoft.com/office/powerpoint/2010/main" val="388692450"/>
       </p:ext>
     </p:extLst>
   </p:cSld>
@@ -1527,21 +1550,11 @@
           <a:p>
             <a:r>
               <a:rPr lang="en-CA" dirty="0" smtClean="0"/>
-              <a:t>HTML5 introduced a number of new input</a:t>
+              <a:t>Next… “form enhancements”…</a:t>
             </a:r>
             <a:r>
               <a:rPr lang="en-CA" baseline="0" dirty="0" smtClean="0"/>
-              <a:t> </a:t>
-            </a:r>
-            <a:r>
-              <a:rPr lang="en-CA" dirty="0" smtClean="0"/>
-              <a:t>“types” as listed here along with a few new attributes</a:t>
-            </a:r>
-          </a:p>
-          <a:p>
-            <a:r>
-              <a:rPr lang="en-US" dirty="0" smtClean="0"/>
-              <a:t>Instead of talking about these features off of the slide, I will demonstrate these using various browsers at the link that is shown on the slide.</a:t>
+              <a:t> this is an area that is important for developers creating pages that are meant to capture data</a:t>
             </a:r>
             <a:endParaRPr lang="en-CA" dirty="0"/>
           </a:p>
@@ -1573,7 +1586,7 @@
     </p:spTree>
     <p:extLst>
       <p:ext uri="{BB962C8B-B14F-4D97-AF65-F5344CB8AC3E}">
-        <p14:creationId xmlns:p14="http://schemas.microsoft.com/office/powerpoint/2010/main" val="1427865545"/>
+        <p14:creationId xmlns:p14="http://schemas.microsoft.com/office/powerpoint/2010/main" val="1633675551"/>
       </p:ext>
     </p:extLst>
   </p:cSld>
@@ -1628,12 +1641,22 @@
           <a:lstStyle/>
           <a:p>
             <a:r>
+              <a:rPr lang="en-CA" dirty="0" smtClean="0"/>
+              <a:t>HTML5 introduced a number of new input</a:t>
+            </a:r>
+            <a:r>
+              <a:rPr lang="en-CA" baseline="0" dirty="0" smtClean="0"/>
+              <a:t> </a:t>
+            </a:r>
+            <a:r>
+              <a:rPr lang="en-CA" dirty="0" smtClean="0"/>
+              <a:t>“types” as listed here along with a few new attributes</a:t>
+            </a:r>
+          </a:p>
+          <a:p>
+            <a:r>
               <a:rPr lang="en-US" dirty="0" smtClean="0"/>
-              <a:t>Next up, multimedia enhancements such</a:t>
-            </a:r>
-            <a:r>
-              <a:rPr lang="en-US" baseline="0" dirty="0" smtClean="0"/>
-              <a:t> as the new video tag…</a:t>
+              <a:t>Instead of talking about these features off of the slide, I will demonstrate these using various browsers at the link that is shown on the slide.</a:t>
             </a:r>
             <a:endParaRPr lang="en-CA" dirty="0"/>
           </a:p>
@@ -1665,7 +1688,7 @@
     </p:spTree>
     <p:extLst>
       <p:ext uri="{BB962C8B-B14F-4D97-AF65-F5344CB8AC3E}">
-        <p14:creationId xmlns:p14="http://schemas.microsoft.com/office/powerpoint/2010/main" val="1466779627"/>
+        <p14:creationId xmlns:p14="http://schemas.microsoft.com/office/powerpoint/2010/main" val="1427865545"/>
       </p:ext>
     </p:extLst>
   </p:cSld>
@@ -1721,11 +1744,11 @@
           <a:p>
             <a:r>
               <a:rPr lang="en-US" dirty="0" smtClean="0"/>
-              <a:t>As</a:t>
+              <a:t>Next up, multimedia enhancements such</a:t>
             </a:r>
             <a:r>
               <a:rPr lang="en-US" baseline="0" dirty="0" smtClean="0"/>
-              <a:t> with the form enhancements, I am going to go straight into a quick demo for this one by clicking the link on the slide</a:t>
+              <a:t> as the new video tag…</a:t>
             </a:r>
             <a:endParaRPr lang="en-CA" dirty="0"/>
           </a:p>
@@ -1757,7 +1780,7 @@
     </p:spTree>
     <p:extLst>
       <p:ext uri="{BB962C8B-B14F-4D97-AF65-F5344CB8AC3E}">
-        <p14:creationId xmlns:p14="http://schemas.microsoft.com/office/powerpoint/2010/main" val="880603435"/>
+        <p14:creationId xmlns:p14="http://schemas.microsoft.com/office/powerpoint/2010/main" val="1466779627"/>
       </p:ext>
     </p:extLst>
   </p:cSld>
@@ -1813,23 +1836,11 @@
           <a:p>
             <a:r>
               <a:rPr lang="en-US" dirty="0" smtClean="0"/>
-              <a:t>Next up… everyone’s </a:t>
-            </a:r>
-            <a:r>
-              <a:rPr lang="en-US" dirty="0" smtClean="0"/>
-              <a:t>“</a:t>
-            </a:r>
-            <a:r>
-              <a:rPr lang="en-US" dirty="0" err="1" smtClean="0"/>
-              <a:t>favourite</a:t>
-            </a:r>
-            <a:r>
-              <a:rPr lang="en-US" dirty="0" smtClean="0"/>
-              <a:t>”, </a:t>
-            </a:r>
-            <a:r>
-              <a:rPr lang="en-US" dirty="0" smtClean="0"/>
-              <a:t>cloud computing...</a:t>
+              <a:t>As</a:t>
+            </a:r>
+            <a:r>
+              <a:rPr lang="en-US" baseline="0" dirty="0" smtClean="0"/>
+              <a:t> with the form enhancements, I am going to go straight into a quick demo for this one by clicking the link on the slide</a:t>
             </a:r>
             <a:endParaRPr lang="en-CA" dirty="0"/>
           </a:p>
@@ -1861,7 +1872,7 @@
     </p:spTree>
     <p:extLst>
       <p:ext uri="{BB962C8B-B14F-4D97-AF65-F5344CB8AC3E}">
-        <p14:creationId xmlns:p14="http://schemas.microsoft.com/office/powerpoint/2010/main" val="678711144"/>
+        <p14:creationId xmlns:p14="http://schemas.microsoft.com/office/powerpoint/2010/main" val="880603435"/>
       </p:ext>
     </p:extLst>
   </p:cSld>
@@ -1917,11 +1928,15 @@
           <a:p>
             <a:r>
               <a:rPr lang="en-US" dirty="0" smtClean="0"/>
-              <a:t>For those that don’t know, Windows</a:t>
-            </a:r>
-            <a:r>
-              <a:rPr lang="en-US" baseline="0" dirty="0" smtClean="0"/>
-              <a:t> Azure is Microsoft’s cloud computing platform… there is a lot that can be shown here so I am going to jump into my next demo by logging into my Azure account</a:t>
+              <a:t>Next up… everyone’s “</a:t>
+            </a:r>
+            <a:r>
+              <a:rPr lang="en-US" dirty="0" err="1" smtClean="0"/>
+              <a:t>favourite</a:t>
+            </a:r>
+            <a:r>
+              <a:rPr lang="en-US" dirty="0" smtClean="0"/>
+              <a:t>”, cloud computing...</a:t>
             </a:r>
             <a:endParaRPr lang="en-CA" dirty="0"/>
           </a:p>
@@ -1953,7 +1968,7 @@
     </p:spTree>
     <p:extLst>
       <p:ext uri="{BB962C8B-B14F-4D97-AF65-F5344CB8AC3E}">
-        <p14:creationId xmlns:p14="http://schemas.microsoft.com/office/powerpoint/2010/main" val="1833744411"/>
+        <p14:creationId xmlns:p14="http://schemas.microsoft.com/office/powerpoint/2010/main" val="678711144"/>
       </p:ext>
     </p:extLst>
   </p:cSld>
@@ -2049,7 +2064,11 @@
           <a:p>
             <a:r>
               <a:rPr lang="en-CA" baseline="0" dirty="0" smtClean="0"/>
-              <a:t>Having the ability to choose from up to 16 different sessions at once was quite ideal and overall it was a great conference to attend… being in Orlando next to Universal Studios was definitely nice as well, although the days were quite full and Universal Studios is not open late.</a:t>
+              <a:t>Having the ability to choose from up to 16 different sessions at once was quite ideal and overall it was a great conference to </a:t>
+            </a:r>
+            <a:r>
+              <a:rPr lang="en-CA" baseline="0" dirty="0" smtClean="0"/>
+              <a:t>attend.</a:t>
             </a:r>
             <a:endParaRPr lang="en-CA" dirty="0"/>
           </a:p>
@@ -2137,11 +2156,11 @@
           <a:p>
             <a:r>
               <a:rPr lang="en-US" dirty="0" smtClean="0"/>
-              <a:t>Next</a:t>
+              <a:t>For those that don’t know, Windows</a:t>
             </a:r>
             <a:r>
               <a:rPr lang="en-US" baseline="0" dirty="0" smtClean="0"/>
-              <a:t> up, mobile…</a:t>
+              <a:t> Azure is Microsoft’s cloud computing platform… there is a lot that can be shown here so I am going to jump into my next demo by logging into my Azure account</a:t>
             </a:r>
             <a:endParaRPr lang="en-CA" dirty="0"/>
           </a:p>
@@ -2173,7 +2192,7 @@
     </p:spTree>
     <p:extLst>
       <p:ext uri="{BB962C8B-B14F-4D97-AF65-F5344CB8AC3E}">
-        <p14:creationId xmlns:p14="http://schemas.microsoft.com/office/powerpoint/2010/main" val="939408278"/>
+        <p14:creationId xmlns:p14="http://schemas.microsoft.com/office/powerpoint/2010/main" val="1833744411"/>
       </p:ext>
     </p:extLst>
   </p:cSld>
@@ -2229,64 +2248,17 @@
           <a:p>
             <a:r>
               <a:rPr lang="en-US" dirty="0" smtClean="0"/>
-              <a:t>Although</a:t>
+              <a:t>Now to</a:t>
             </a:r>
             <a:r>
               <a:rPr lang="en-US" baseline="0" dirty="0" smtClean="0"/>
-              <a:t> the conference did not have a lot of mobile specific content, there were a few good nuggets of information… </a:t>
-            </a:r>
-          </a:p>
-          <a:p>
-            <a:r>
-              <a:rPr lang="en-US" baseline="0" dirty="0" smtClean="0"/>
-              <a:t>First of all, as I hopefully remembered to demonstrate earlier, with CSS 3 and media queries you can much more easily have the same web page look good on a lot of different form factors</a:t>
-            </a:r>
-          </a:p>
-          <a:p>
-            <a:r>
-              <a:rPr lang="en-US" dirty="0" smtClean="0"/>
-              <a:t>A few other takeaways</a:t>
-            </a:r>
-            <a:r>
-              <a:rPr lang="en-US" baseline="0" dirty="0" smtClean="0"/>
-              <a:t> I got from the conference are listed on the slide:</a:t>
-            </a:r>
-          </a:p>
-          <a:p>
-            <a:pPr marL="171450" indent="-171450">
-              <a:buFontTx/>
-              <a:buChar char="-"/>
-            </a:pPr>
-            <a:r>
-              <a:rPr lang="en-US" baseline="0" dirty="0" smtClean="0"/>
-              <a:t>When passing data back and forth, use JSON not XML or some other serialized format</a:t>
-            </a:r>
-            <a:r>
-              <a:rPr lang="en-CA" baseline="0" dirty="0" smtClean="0"/>
-              <a:t>. The size is much smaller and easily consumable</a:t>
-            </a:r>
-            <a:endParaRPr lang="en-US" baseline="0" dirty="0" smtClean="0"/>
-          </a:p>
-          <a:p>
-            <a:pPr marL="171450" indent="-171450">
-              <a:buFontTx/>
-              <a:buChar char="-"/>
-            </a:pPr>
-            <a:r>
-              <a:rPr lang="en-US" baseline="0" dirty="0" smtClean="0"/>
-              <a:t>Opera has a wonderful mobile emulator that I previously was not aware of that can be used to test a number of different form factors</a:t>
-            </a:r>
-          </a:p>
-          <a:p>
-            <a:pPr marL="171450" indent="-171450">
-              <a:buFontTx/>
-              <a:buChar char="-"/>
-            </a:pPr>
-            <a:r>
-              <a:rPr lang="en-US" baseline="0" dirty="0" smtClean="0"/>
-              <a:t>And lastly a quick “win” is to always add the meta tag to all of your web pages, even today as it will ensure they are sized much more properly</a:t>
-            </a:r>
-            <a:endParaRPr lang="en-CA" baseline="0" dirty="0" smtClean="0"/>
+              <a:t> a trend that I had not heard about until the conference… Microsoft’s </a:t>
+            </a:r>
+            <a:r>
+              <a:rPr lang="en-US" baseline="0" dirty="0" err="1" smtClean="0"/>
+              <a:t>SignalR</a:t>
+            </a:r>
+            <a:endParaRPr lang="en-CA" dirty="0"/>
           </a:p>
         </p:txBody>
       </p:sp>
@@ -2316,7 +2288,7 @@
     </p:spTree>
     <p:extLst>
       <p:ext uri="{BB962C8B-B14F-4D97-AF65-F5344CB8AC3E}">
-        <p14:creationId xmlns:p14="http://schemas.microsoft.com/office/powerpoint/2010/main" val="4067875361"/>
+        <p14:creationId xmlns:p14="http://schemas.microsoft.com/office/powerpoint/2010/main" val="4242786929"/>
       </p:ext>
     </p:extLst>
   </p:cSld>
@@ -2370,18 +2342,154 @@
           <a:bodyPr/>
           <a:lstStyle/>
           <a:p>
-            <a:r>
-              <a:rPr lang="en-US" dirty="0" smtClean="0"/>
-              <a:t>Now to</a:t>
-            </a:r>
+            <a:pPr marL="0" marR="0" indent="0" algn="l" defTabSz="457200" rtl="0" eaLnBrk="1" fontAlgn="auto" latinLnBrk="0" hangingPunct="1">
+              <a:lnSpc>
+                <a:spcPct val="100000"/>
+              </a:lnSpc>
+              <a:spcBef>
+                <a:spcPts val="0"/>
+              </a:spcBef>
+              <a:spcAft>
+                <a:spcPts val="0"/>
+              </a:spcAft>
+              <a:buClrTx/>
+              <a:buSzTx/>
+              <a:buFontTx/>
+              <a:buNone/>
+              <a:tabLst/>
+              <a:defRPr/>
+            </a:pPr>
+            <a:r>
+              <a:rPr lang="en-CA" dirty="0" smtClean="0"/>
+              <a:t>Microsoft</a:t>
+            </a:r>
+            <a:r>
+              <a:rPr lang="en-CA" baseline="0" dirty="0" smtClean="0"/>
+              <a:t> has come up with a wrapper that can be incredibly easy to use to provide real-time HTTP communication.</a:t>
+            </a:r>
+          </a:p>
+          <a:p>
+            <a:pPr marL="0" marR="0" indent="0" algn="l" defTabSz="457200" rtl="0" eaLnBrk="1" fontAlgn="auto" latinLnBrk="0" hangingPunct="1">
+              <a:lnSpc>
+                <a:spcPct val="100000"/>
+              </a:lnSpc>
+              <a:spcBef>
+                <a:spcPts val="0"/>
+              </a:spcBef>
+              <a:spcAft>
+                <a:spcPts val="0"/>
+              </a:spcAft>
+              <a:buClrTx/>
+              <a:buSzTx/>
+              <a:buFontTx/>
+              <a:buNone/>
+              <a:tabLst/>
+              <a:defRPr/>
+            </a:pPr>
             <a:r>
               <a:rPr lang="en-US" baseline="0" dirty="0" smtClean="0"/>
-              <a:t> a trend that I had not heard about until the conference… Microsoft’s </a:t>
-            </a:r>
-            <a:r>
-              <a:rPr lang="en-US" baseline="0" dirty="0" err="1" smtClean="0"/>
-              <a:t>SignalR</a:t>
-            </a:r>
+              <a:t>To demonstrate, I am going to jump right into another demo</a:t>
+            </a:r>
+            <a:endParaRPr lang="en-CA" dirty="0" smtClean="0"/>
+          </a:p>
+          <a:p>
+            <a:pPr marL="0" marR="0" indent="0" algn="l" defTabSz="457200" rtl="0" eaLnBrk="1" fontAlgn="auto" latinLnBrk="0" hangingPunct="1">
+              <a:lnSpc>
+                <a:spcPct val="100000"/>
+              </a:lnSpc>
+              <a:spcBef>
+                <a:spcPts val="0"/>
+              </a:spcBef>
+              <a:spcAft>
+                <a:spcPts val="0"/>
+              </a:spcAft>
+              <a:buClrTx/>
+              <a:buSzTx/>
+              <a:buFontTx/>
+              <a:buNone/>
+              <a:tabLst/>
+              <a:defRPr/>
+            </a:pPr>
+            <a:endParaRPr lang="en-CA" baseline="30000" dirty="0" smtClean="0"/>
+          </a:p>
+          <a:p>
+            <a:pPr marL="0" marR="0" indent="0" algn="l" defTabSz="457200" rtl="0" eaLnBrk="1" fontAlgn="auto" latinLnBrk="0" hangingPunct="1">
+              <a:lnSpc>
+                <a:spcPct val="100000"/>
+              </a:lnSpc>
+              <a:spcBef>
+                <a:spcPts val="0"/>
+              </a:spcBef>
+              <a:spcAft>
+                <a:spcPts val="0"/>
+              </a:spcAft>
+              <a:buClrTx/>
+              <a:buSzTx/>
+              <a:buFontTx/>
+              <a:buNone/>
+              <a:tabLst/>
+              <a:defRPr/>
+            </a:pPr>
+            <a:r>
+              <a:rPr lang="en-CA" baseline="30000" dirty="0" smtClean="0"/>
+              <a:t>1 </a:t>
+            </a:r>
+            <a:r>
+              <a:rPr lang="en-CA" dirty="0" smtClean="0"/>
+              <a:t>“Any sufficiently advanced technology is indistinguishable from magic” – Arthur C. Clarke</a:t>
+            </a:r>
+          </a:p>
+          <a:p>
+            <a:pPr marL="0" marR="0" indent="0" algn="l" defTabSz="457200" rtl="0" eaLnBrk="1" fontAlgn="auto" latinLnBrk="0" hangingPunct="1">
+              <a:lnSpc>
+                <a:spcPct val="100000"/>
+              </a:lnSpc>
+              <a:spcBef>
+                <a:spcPts val="0"/>
+              </a:spcBef>
+              <a:spcAft>
+                <a:spcPts val="0"/>
+              </a:spcAft>
+              <a:buClrTx/>
+              <a:buSzTx/>
+              <a:buFontTx/>
+              <a:buNone/>
+              <a:tabLst/>
+              <a:defRPr/>
+            </a:pPr>
+            <a:r>
+              <a:rPr lang="en-CA" baseline="30000" dirty="0" smtClean="0"/>
+              <a:t>2 </a:t>
+            </a:r>
+            <a:r>
+              <a:rPr lang="en-CA" dirty="0" smtClean="0">
+                <a:hlinkClick r:id="rId3"/>
+              </a:rPr>
+              <a:t>http://www.asp.net/signalr/</a:t>
+            </a:r>
+            <a:endParaRPr lang="en-CA" dirty="0" smtClean="0"/>
+          </a:p>
+          <a:p>
+            <a:pPr marL="0" marR="0" indent="0" algn="l" defTabSz="457200" rtl="0" eaLnBrk="1" fontAlgn="auto" latinLnBrk="0" hangingPunct="1">
+              <a:lnSpc>
+                <a:spcPct val="100000"/>
+              </a:lnSpc>
+              <a:spcBef>
+                <a:spcPts val="0"/>
+              </a:spcBef>
+              <a:spcAft>
+                <a:spcPts val="0"/>
+              </a:spcAft>
+              <a:buClrTx/>
+              <a:buSzTx/>
+              <a:buFontTx/>
+              <a:buNone/>
+              <a:tabLst/>
+              <a:defRPr/>
+            </a:pPr>
+            <a:endParaRPr lang="en-CA" dirty="0" smtClean="0"/>
+          </a:p>
+          <a:p>
             <a:endParaRPr lang="en-CA" dirty="0"/>
           </a:p>
         </p:txBody>
@@ -2412,7 +2520,7 @@
     </p:spTree>
     <p:extLst>
       <p:ext uri="{BB962C8B-B14F-4D97-AF65-F5344CB8AC3E}">
-        <p14:creationId xmlns:p14="http://schemas.microsoft.com/office/powerpoint/2010/main" val="4242786929"/>
+        <p14:creationId xmlns:p14="http://schemas.microsoft.com/office/powerpoint/2010/main" val="692383145"/>
       </p:ext>
     </p:extLst>
   </p:cSld>
@@ -2466,154 +2574,14 @@
           <a:bodyPr/>
           <a:lstStyle/>
           <a:p>
-            <a:pPr marL="0" marR="0" indent="0" algn="l" defTabSz="457200" rtl="0" eaLnBrk="1" fontAlgn="auto" latinLnBrk="0" hangingPunct="1">
-              <a:lnSpc>
-                <a:spcPct val="100000"/>
-              </a:lnSpc>
-              <a:spcBef>
-                <a:spcPts val="0"/>
-              </a:spcBef>
-              <a:spcAft>
-                <a:spcPts val="0"/>
-              </a:spcAft>
-              <a:buClrTx/>
-              <a:buSzTx/>
-              <a:buFontTx/>
-              <a:buNone/>
-              <a:tabLst/>
-              <a:defRPr/>
-            </a:pPr>
-            <a:r>
-              <a:rPr lang="en-CA" dirty="0" smtClean="0"/>
-              <a:t>Microsoft</a:t>
-            </a:r>
-            <a:r>
-              <a:rPr lang="en-CA" baseline="0" dirty="0" smtClean="0"/>
-              <a:t> has come up with a wrapper that can be incredibly easy to use to provide real-time HTTP communication.</a:t>
-            </a:r>
-          </a:p>
-          <a:p>
-            <a:pPr marL="0" marR="0" indent="0" algn="l" defTabSz="457200" rtl="0" eaLnBrk="1" fontAlgn="auto" latinLnBrk="0" hangingPunct="1">
-              <a:lnSpc>
-                <a:spcPct val="100000"/>
-              </a:lnSpc>
-              <a:spcBef>
-                <a:spcPts val="0"/>
-              </a:spcBef>
-              <a:spcAft>
-                <a:spcPts val="0"/>
-              </a:spcAft>
-              <a:buClrTx/>
-              <a:buSzTx/>
-              <a:buFontTx/>
-              <a:buNone/>
-              <a:tabLst/>
-              <a:defRPr/>
-            </a:pPr>
+            <a:r>
+              <a:rPr lang="en-US" dirty="0" smtClean="0"/>
+              <a:t>Lastly,</a:t>
+            </a:r>
             <a:r>
               <a:rPr lang="en-US" baseline="0" dirty="0" smtClean="0"/>
-              <a:t>To demonstrate, I am going to jump right into another demo</a:t>
-            </a:r>
-            <a:endParaRPr lang="en-CA" dirty="0" smtClean="0"/>
-          </a:p>
-          <a:p>
-            <a:pPr marL="0" marR="0" indent="0" algn="l" defTabSz="457200" rtl="0" eaLnBrk="1" fontAlgn="auto" latinLnBrk="0" hangingPunct="1">
-              <a:lnSpc>
-                <a:spcPct val="100000"/>
-              </a:lnSpc>
-              <a:spcBef>
-                <a:spcPts val="0"/>
-              </a:spcBef>
-              <a:spcAft>
-                <a:spcPts val="0"/>
-              </a:spcAft>
-              <a:buClrTx/>
-              <a:buSzTx/>
-              <a:buFontTx/>
-              <a:buNone/>
-              <a:tabLst/>
-              <a:defRPr/>
-            </a:pPr>
-            <a:endParaRPr lang="en-CA" baseline="30000" dirty="0" smtClean="0"/>
-          </a:p>
-          <a:p>
-            <a:pPr marL="0" marR="0" indent="0" algn="l" defTabSz="457200" rtl="0" eaLnBrk="1" fontAlgn="auto" latinLnBrk="0" hangingPunct="1">
-              <a:lnSpc>
-                <a:spcPct val="100000"/>
-              </a:lnSpc>
-              <a:spcBef>
-                <a:spcPts val="0"/>
-              </a:spcBef>
-              <a:spcAft>
-                <a:spcPts val="0"/>
-              </a:spcAft>
-              <a:buClrTx/>
-              <a:buSzTx/>
-              <a:buFontTx/>
-              <a:buNone/>
-              <a:tabLst/>
-              <a:defRPr/>
-            </a:pPr>
-            <a:r>
-              <a:rPr lang="en-CA" baseline="30000" dirty="0" smtClean="0"/>
-              <a:t>1 </a:t>
-            </a:r>
-            <a:r>
-              <a:rPr lang="en-CA" dirty="0" smtClean="0"/>
-              <a:t>“Any sufficiently advanced technology is indistinguishable from magic” – Arthur C. Clarke</a:t>
-            </a:r>
-          </a:p>
-          <a:p>
-            <a:pPr marL="0" marR="0" indent="0" algn="l" defTabSz="457200" rtl="0" eaLnBrk="1" fontAlgn="auto" latinLnBrk="0" hangingPunct="1">
-              <a:lnSpc>
-                <a:spcPct val="100000"/>
-              </a:lnSpc>
-              <a:spcBef>
-                <a:spcPts val="0"/>
-              </a:spcBef>
-              <a:spcAft>
-                <a:spcPts val="0"/>
-              </a:spcAft>
-              <a:buClrTx/>
-              <a:buSzTx/>
-              <a:buFontTx/>
-              <a:buNone/>
-              <a:tabLst/>
-              <a:defRPr/>
-            </a:pPr>
-            <a:r>
-              <a:rPr lang="en-CA" baseline="30000" dirty="0" smtClean="0"/>
-              <a:t>2 </a:t>
-            </a:r>
-            <a:r>
-              <a:rPr lang="en-CA" dirty="0" smtClean="0">
-                <a:hlinkClick r:id="rId3"/>
-              </a:rPr>
-              <a:t>http://www.asp.net/signalr/</a:t>
-            </a:r>
-            <a:endParaRPr lang="en-CA" dirty="0" smtClean="0"/>
-          </a:p>
-          <a:p>
-            <a:pPr marL="0" marR="0" indent="0" algn="l" defTabSz="457200" rtl="0" eaLnBrk="1" fontAlgn="auto" latinLnBrk="0" hangingPunct="1">
-              <a:lnSpc>
-                <a:spcPct val="100000"/>
-              </a:lnSpc>
-              <a:spcBef>
-                <a:spcPts val="0"/>
-              </a:spcBef>
-              <a:spcAft>
-                <a:spcPts val="0"/>
-              </a:spcAft>
-              <a:buClrTx/>
-              <a:buSzTx/>
-              <a:buFontTx/>
-              <a:buNone/>
-              <a:tabLst/>
-              <a:defRPr/>
-            </a:pPr>
-            <a:endParaRPr lang="en-CA" dirty="0" smtClean="0"/>
-          </a:p>
-          <a:p>
+              <a:t> a couple of other comments regarding some of the circles on the bottom right of my graphic that I created</a:t>
+            </a:r>
             <a:endParaRPr lang="en-CA" dirty="0"/>
           </a:p>
         </p:txBody>
@@ -2644,7 +2612,7 @@
     </p:spTree>
     <p:extLst>
       <p:ext uri="{BB962C8B-B14F-4D97-AF65-F5344CB8AC3E}">
-        <p14:creationId xmlns:p14="http://schemas.microsoft.com/office/powerpoint/2010/main" val="692383145"/>
+        <p14:creationId xmlns:p14="http://schemas.microsoft.com/office/powerpoint/2010/main" val="4242786929"/>
       </p:ext>
     </p:extLst>
   </p:cSld>
@@ -2700,11 +2668,94 @@
           <a:p>
             <a:r>
               <a:rPr lang="en-US" dirty="0" smtClean="0"/>
-              <a:t>Lastly,</a:t>
+              <a:t>Almost</a:t>
             </a:r>
             <a:r>
               <a:rPr lang="en-US" baseline="0" dirty="0" smtClean="0"/>
-              <a:t> a couple of other comments regarding some of the circles on the bottom right of my graphic that I created</a:t>
+              <a:t> every demonstration that involved Visual Studio meant the use of </a:t>
+            </a:r>
+            <a:r>
+              <a:rPr lang="en-US" baseline="0" dirty="0" err="1" smtClean="0"/>
+              <a:t>Nuget</a:t>
+            </a:r>
+            <a:r>
+              <a:rPr lang="en-US" baseline="0" dirty="0" smtClean="0"/>
+              <a:t>. As a Microsoft developer, if you are not aware of </a:t>
+            </a:r>
+            <a:r>
+              <a:rPr lang="en-US" baseline="0" dirty="0" err="1" smtClean="0"/>
+              <a:t>Nuget</a:t>
+            </a:r>
+            <a:r>
+              <a:rPr lang="en-US" baseline="0" dirty="0" smtClean="0"/>
+              <a:t> you will be soon as it has become a key way to import in external resources easily. Even for a client site that is building internal projects, I can see this being something that we start doing more of… for example, want to create a new project? Open up Visual Studio and use </a:t>
+            </a:r>
+            <a:r>
+              <a:rPr lang="en-US" baseline="0" dirty="0" err="1" smtClean="0"/>
+              <a:t>Nuget</a:t>
+            </a:r>
+            <a:r>
+              <a:rPr lang="en-US" baseline="0" dirty="0" smtClean="0"/>
+              <a:t> to get you started / all setup.</a:t>
+            </a:r>
+          </a:p>
+          <a:p>
+            <a:endParaRPr lang="en-US" baseline="0" dirty="0" smtClean="0"/>
+          </a:p>
+          <a:p>
+            <a:r>
+              <a:rPr lang="en-US" dirty="0" err="1" smtClean="0"/>
+              <a:t>Git</a:t>
+            </a:r>
+            <a:r>
+              <a:rPr lang="en-US" dirty="0" smtClean="0"/>
+              <a:t>… I heard something about </a:t>
+            </a:r>
+            <a:r>
+              <a:rPr lang="en-US" dirty="0" err="1" smtClean="0"/>
+              <a:t>Git</a:t>
+            </a:r>
+            <a:r>
+              <a:rPr lang="en-US" baseline="0" dirty="0" smtClean="0"/>
+              <a:t> before this conference, but did not realize the extent to which people are embracing it. All indications are it is the current standard for source management and, for example, is what I used while creating this presentation as I was able to easily develop across multiple machines, checking in and out, regardless of it I was connected to the internet or not. And it is FAST!</a:t>
+            </a:r>
+          </a:p>
+          <a:p>
+            <a:endParaRPr lang="en-US" baseline="0" dirty="0" smtClean="0"/>
+          </a:p>
+          <a:p>
+            <a:r>
+              <a:rPr lang="en-US" baseline="0" dirty="0" smtClean="0"/>
+              <a:t>Bit.ly… although not really “developer related”, I was just surprised as to how much this is used to shorten URLs. The last time I did a lot of this I was using </a:t>
+            </a:r>
+            <a:r>
+              <a:rPr lang="en-US" baseline="0" dirty="0" err="1" smtClean="0"/>
+              <a:t>shrinkster</a:t>
+            </a:r>
+            <a:r>
+              <a:rPr lang="en-US" baseline="0" dirty="0" smtClean="0"/>
+              <a:t> and </a:t>
+            </a:r>
+            <a:r>
+              <a:rPr lang="en-US" baseline="0" dirty="0" err="1" smtClean="0"/>
+              <a:t>tinyurl</a:t>
+            </a:r>
+            <a:r>
+              <a:rPr lang="en-US" baseline="0" dirty="0" smtClean="0"/>
+              <a:t>… an example of how over the course of just 5 years technology can change so much.</a:t>
+            </a:r>
+          </a:p>
+          <a:p>
+            <a:endParaRPr lang="en-US" baseline="0" dirty="0" smtClean="0"/>
+          </a:p>
+          <a:p>
+            <a:r>
+              <a:rPr lang="en-US" baseline="0" dirty="0" smtClean="0"/>
+              <a:t>Big data… I attended one presentation on this, but it sure feels as though this is just in its infancy. I would like it though if someone could present a compelling presentation regarding it though that would be relevant </a:t>
+            </a:r>
+            <a:r>
+              <a:rPr lang="en-US" baseline="0" smtClean="0"/>
+              <a:t>for our clients.</a:t>
             </a:r>
             <a:endParaRPr lang="en-CA" dirty="0"/>
           </a:p>
@@ -2728,181 +2779,6 @@
             <a:fld id="{4FCB2955-686B-EC42-828C-18431921459F}" type="slidenum">
               <a:rPr lang="en-US" smtClean="0"/>
               <a:t>23</a:t>
-            </a:fld>
-            <a:endParaRPr lang="en-US"/>
-          </a:p>
-        </p:txBody>
-      </p:sp>
-    </p:spTree>
-    <p:extLst>
-      <p:ext uri="{BB962C8B-B14F-4D97-AF65-F5344CB8AC3E}">
-        <p14:creationId xmlns:p14="http://schemas.microsoft.com/office/powerpoint/2010/main" val="4242786929"/>
-      </p:ext>
-    </p:extLst>
-  </p:cSld>
-  <p:clrMapOvr>
-    <a:masterClrMapping/>
-  </p:clrMapOvr>
-</p:notes>
-</file>
-
-<file path=ppt/notesSlides/notesSlide25.xml><?xml version="1.0" encoding="utf-8"?>
-<p:notes xmlns:a="http://schemas.openxmlformats.org/drawingml/2006/main" xmlns:r="http://schemas.openxmlformats.org/officeDocument/2006/relationships" xmlns:p="http://schemas.openxmlformats.org/presentationml/2006/main">
-  <p:cSld>
-    <p:spTree>
-      <p:nvGrpSpPr>
-        <p:cNvPr id="1" name=""/>
-        <p:cNvGrpSpPr/>
-        <p:nvPr/>
-      </p:nvGrpSpPr>
-      <p:grpSpPr>
-        <a:xfrm>
-          <a:off x="0" y="0"/>
-          <a:ext cx="0" cy="0"/>
-          <a:chOff x="0" y="0"/>
-          <a:chExt cx="0" cy="0"/>
-        </a:xfrm>
-      </p:grpSpPr>
-      <p:sp>
-        <p:nvSpPr>
-          <p:cNvPr id="2" name="Slide Image Placeholder 1"/>
-          <p:cNvSpPr>
-            <a:spLocks noGrp="1" noRot="1" noChangeAspect="1"/>
-          </p:cNvSpPr>
-          <p:nvPr>
-            <p:ph type="sldImg"/>
-          </p:nvPr>
-        </p:nvSpPr>
-        <p:spPr/>
-      </p:sp>
-      <p:sp>
-        <p:nvSpPr>
-          <p:cNvPr id="3" name="Notes Placeholder 2"/>
-          <p:cNvSpPr>
-            <a:spLocks noGrp="1"/>
-          </p:cNvSpPr>
-          <p:nvPr>
-            <p:ph type="body" idx="1"/>
-          </p:nvPr>
-        </p:nvSpPr>
-        <p:spPr/>
-        <p:txBody>
-          <a:bodyPr/>
-          <a:lstStyle/>
-          <a:p>
-            <a:r>
-              <a:rPr lang="en-US" dirty="0" smtClean="0"/>
-              <a:t>Almost</a:t>
-            </a:r>
-            <a:r>
-              <a:rPr lang="en-US" baseline="0" dirty="0" smtClean="0"/>
-              <a:t> every demonstration that involved Visual Studio meant the use of </a:t>
-            </a:r>
-            <a:r>
-              <a:rPr lang="en-US" baseline="0" dirty="0" err="1" smtClean="0"/>
-              <a:t>Nuget</a:t>
-            </a:r>
-            <a:r>
-              <a:rPr lang="en-US" baseline="0" dirty="0" smtClean="0"/>
-              <a:t>. As a Microsoft developer, if you are not aware of </a:t>
-            </a:r>
-            <a:r>
-              <a:rPr lang="en-US" baseline="0" dirty="0" err="1" smtClean="0"/>
-              <a:t>Nuget</a:t>
-            </a:r>
-            <a:r>
-              <a:rPr lang="en-US" baseline="0" dirty="0" smtClean="0"/>
-              <a:t> you will be soon as it has become a key way to import in external resources easily. Even for a client site that is building internal projects, I can see this being something that we start doing more of… for example, want to create a new project? Open up Visual Studio and use </a:t>
-            </a:r>
-            <a:r>
-              <a:rPr lang="en-US" baseline="0" dirty="0" err="1" smtClean="0"/>
-              <a:t>Nuget</a:t>
-            </a:r>
-            <a:r>
-              <a:rPr lang="en-US" baseline="0" dirty="0" smtClean="0"/>
-              <a:t> to get you started / all setup.</a:t>
-            </a:r>
-          </a:p>
-          <a:p>
-            <a:endParaRPr lang="en-US" baseline="0" dirty="0" smtClean="0"/>
-          </a:p>
-          <a:p>
-            <a:r>
-              <a:rPr lang="en-US" dirty="0" err="1" smtClean="0"/>
-              <a:t>Git</a:t>
-            </a:r>
-            <a:r>
-              <a:rPr lang="en-US" dirty="0" smtClean="0"/>
-              <a:t>… I heard something about </a:t>
-            </a:r>
-            <a:r>
-              <a:rPr lang="en-US" dirty="0" err="1" smtClean="0"/>
-              <a:t>Git</a:t>
-            </a:r>
-            <a:r>
-              <a:rPr lang="en-US" baseline="0" dirty="0" smtClean="0"/>
-              <a:t> before this conference, but did not realize the extent to which people are embracing it. All indications are it is the current standard for source management and, for example, is what I used while creating this presentation as I was able to easily develop across multiple machines, checking in and out, regardless of it I was connected to the internet or not. And it is FAST!</a:t>
-            </a:r>
-          </a:p>
-          <a:p>
-            <a:endParaRPr lang="en-US" baseline="0" dirty="0" smtClean="0"/>
-          </a:p>
-          <a:p>
-            <a:r>
-              <a:rPr lang="en-US" baseline="0" dirty="0" smtClean="0"/>
-              <a:t>Bit.ly… although not really “developer related”, I was just surprised as to how much this is used to shorten URLs. The last time I did a lot of this I was using </a:t>
-            </a:r>
-            <a:r>
-              <a:rPr lang="en-US" baseline="0" dirty="0" err="1" smtClean="0"/>
-              <a:t>shrinkster</a:t>
-            </a:r>
-            <a:r>
-              <a:rPr lang="en-US" baseline="0" dirty="0" smtClean="0"/>
-              <a:t> and </a:t>
-            </a:r>
-            <a:r>
-              <a:rPr lang="en-US" baseline="0" dirty="0" err="1" smtClean="0"/>
-              <a:t>tinyurl</a:t>
-            </a:r>
-            <a:r>
-              <a:rPr lang="en-US" baseline="0" dirty="0" smtClean="0"/>
-              <a:t>… an example of how over the course of just 5 years technology can change so much.</a:t>
-            </a:r>
-          </a:p>
-          <a:p>
-            <a:endParaRPr lang="en-US" baseline="0" dirty="0" smtClean="0"/>
-          </a:p>
-          <a:p>
-            <a:r>
-              <a:rPr lang="en-US" baseline="0" dirty="0" smtClean="0"/>
-              <a:t>Big data… I attended one presentation on this, but it sure feels as though this is just in its infancy. I would like it though if someone could present a compelling presentation regarding it though that would be relevant </a:t>
-            </a:r>
-            <a:r>
-              <a:rPr lang="en-US" baseline="0" smtClean="0"/>
-              <a:t>for our clients.</a:t>
-            </a:r>
-            <a:endParaRPr lang="en-CA" dirty="0"/>
-          </a:p>
-        </p:txBody>
-      </p:sp>
-      <p:sp>
-        <p:nvSpPr>
-          <p:cNvPr id="4" name="Slide Number Placeholder 3"/>
-          <p:cNvSpPr>
-            <a:spLocks noGrp="1"/>
-          </p:cNvSpPr>
-          <p:nvPr>
-            <p:ph type="sldNum" sz="quarter" idx="10"/>
-          </p:nvPr>
-        </p:nvSpPr>
-        <p:spPr/>
-        <p:txBody>
-          <a:bodyPr/>
-          <a:lstStyle/>
-          <a:p>
-            <a:fld id="{4FCB2955-686B-EC42-828C-18431921459F}" type="slidenum">
-              <a:rPr lang="en-US" smtClean="0"/>
-              <a:t>24</a:t>
             </a:fld>
             <a:endParaRPr lang="en-US"/>
           </a:p>
@@ -2994,16 +2870,13 @@
           <a:p>
             <a:r>
               <a:rPr lang="en-US" baseline="0" dirty="0" smtClean="0"/>
-              <a:t>- For mobile, I was open to hearing anything that I could </a:t>
+              <a:t>- For mobile, I was open to hearing anything that I could related to mobile, and although this was not a conference that was big on mobile, there was some knowledge I gained in this </a:t>
             </a:r>
             <a:r>
               <a:rPr lang="en-US" baseline="0" dirty="0" smtClean="0"/>
-              <a:t>related </a:t>
-            </a:r>
-            <a:r>
-              <a:rPr lang="en-US" baseline="0" dirty="0" smtClean="0"/>
-              <a:t>to mobile, and although this was not a conference that was big on mobile, there was some knowledge I gained in this area.</a:t>
-            </a:r>
+              <a:t>area that I will share a bit later</a:t>
+            </a:r>
+            <a:endParaRPr lang="en-US" baseline="0" dirty="0" smtClean="0"/>
           </a:p>
           <a:p>
             <a:r>
@@ -3096,15 +2969,7 @@
           <a:p>
             <a:r>
               <a:rPr lang="en-CA" dirty="0" smtClean="0"/>
-              <a:t>What *did* I </a:t>
-            </a:r>
-            <a:r>
-              <a:rPr lang="en-CA" dirty="0" smtClean="0"/>
-              <a:t>learn?… </a:t>
-            </a:r>
-            <a:r>
-              <a:rPr lang="en-CA" dirty="0" smtClean="0"/>
-              <a:t>well… quite</a:t>
+              <a:t>What *did* I learn?… well… quite</a:t>
             </a:r>
             <a:r>
               <a:rPr lang="en-CA" baseline="0" dirty="0" smtClean="0"/>
@@ -3208,11 +3073,7 @@
           <a:p>
             <a:r>
               <a:rPr lang="en-CA" dirty="0" smtClean="0"/>
-              <a:t>First up, a </a:t>
-            </a:r>
-            <a:r>
-              <a:rPr lang="en-CA" dirty="0" smtClean="0"/>
-              <a:t>little bit about the history of HTML5…</a:t>
+              <a:t>First up, a little bit about the history of HTML5…</a:t>
             </a:r>
             <a:endParaRPr lang="en-CA" dirty="0"/>
           </a:p>
@@ -3696,27 +3557,7 @@
             </a:r>
             <a:r>
               <a:rPr lang="en-CA" baseline="0" dirty="0" smtClean="0"/>
-              <a:t> on from history to talking about HTML tags… </a:t>
-            </a:r>
-            <a:r>
-              <a:rPr lang="en-CA" baseline="0" dirty="0" smtClean="0"/>
-              <a:t>the simplification of some of </a:t>
-            </a:r>
-            <a:r>
-              <a:rPr lang="en-CA" baseline="0" dirty="0" smtClean="0"/>
-              <a:t>them and the creation of more </a:t>
-            </a:r>
-            <a:r>
-              <a:rPr lang="en-CA" baseline="0" dirty="0" smtClean="0"/>
-              <a:t>“semantic” </a:t>
-            </a:r>
-            <a:r>
-              <a:rPr lang="en-CA" baseline="0" dirty="0" smtClean="0"/>
-              <a:t>tags</a:t>
-            </a:r>
-            <a:r>
-              <a:rPr lang="en-CA" baseline="0" dirty="0" smtClean="0"/>
-              <a:t>… that is, the creation of more tags that have some more meaning to them</a:t>
+              <a:t> on from history to talking about HTML tags… the simplification of some of them and the creation of more “semantic” tags… that is, the creation of more tags that have some more meaning to them</a:t>
             </a:r>
             <a:endParaRPr lang="en-CA" dirty="0"/>
           </a:p>
@@ -4016,7 +3857,7 @@
           <a:p>
             <a:fld id="{EB6F4DCC-4F1E-F54C-AA63-5E9B8139A2C7}" type="datetime4">
               <a:rPr lang="en-CA" smtClean="0"/>
-              <a:t>March-14-13</a:t>
+              <a:t>March-16-13</a:t>
             </a:fld>
             <a:endParaRPr lang="en-US" dirty="0"/>
           </a:p>
@@ -4262,7 +4103,7 @@
           <a:p>
             <a:fld id="{E89AD498-328C-DE45-9033-626F46332D12}" type="datetime4">
               <a:rPr lang="en-CA" smtClean="0"/>
-              <a:t>March-14-13</a:t>
+              <a:t>March-16-13</a:t>
             </a:fld>
             <a:endParaRPr lang="en-US"/>
           </a:p>
@@ -4583,7 +4424,7 @@
           <a:p>
             <a:fld id="{205C405F-71DA-D945-AC37-528E00489EC0}" type="datetime4">
               <a:rPr lang="en-CA" smtClean="0"/>
-              <a:t>March-14-13</a:t>
+              <a:t>March-16-13</a:t>
             </a:fld>
             <a:endParaRPr lang="en-US"/>
           </a:p>
@@ -5115,7 +4956,7 @@
           <a:p>
             <a:fld id="{A706A332-CB54-F44D-AAB8-905B7A2134BC}" type="datetime4">
               <a:rPr lang="en-CA" smtClean="0"/>
-              <a:t>March-14-13</a:t>
+              <a:t>March-16-13</a:t>
             </a:fld>
             <a:endParaRPr lang="en-US" dirty="0"/>
           </a:p>
@@ -5492,7 +5333,7 @@
           <a:p>
             <a:fld id="{C8774548-0BB4-5443-9210-BF9E4921324F}" type="datetime4">
               <a:rPr lang="en-CA" smtClean="0"/>
-              <a:t>March-14-13</a:t>
+              <a:t>March-16-13</a:t>
             </a:fld>
             <a:endParaRPr lang="en-US"/>
           </a:p>
@@ -5869,7 +5710,7 @@
           <a:p>
             <a:fld id="{DA5AA9F5-8C84-A342-A63E-20B4B9965A72}" type="datetime4">
               <a:rPr lang="en-CA" smtClean="0"/>
-              <a:t>March-14-13</a:t>
+              <a:t>March-16-13</a:t>
             </a:fld>
             <a:endParaRPr lang="en-US"/>
           </a:p>
@@ -6276,7 +6117,7 @@
           <a:p>
             <a:fld id="{B75CC70B-AAA2-1A4B-980F-5795C4FC07F0}" type="datetime4">
               <a:rPr lang="en-CA" smtClean="0"/>
-              <a:t>March-14-13</a:t>
+              <a:t>March-16-13</a:t>
             </a:fld>
             <a:endParaRPr lang="en-US"/>
           </a:p>
@@ -6540,7 +6381,7 @@
           <a:p>
             <a:fld id="{634933C9-6163-F741-B0D7-A3D45CDF27BE}" type="datetime4">
               <a:rPr lang="en-CA" smtClean="0"/>
-              <a:t>March-14-13</a:t>
+              <a:t>March-16-13</a:t>
             </a:fld>
             <a:endParaRPr lang="en-US"/>
           </a:p>
@@ -7044,7 +6885,7 @@
           <a:p>
             <a:fld id="{952FD3B8-8B26-5944-8B2D-223A1203AFC1}" type="datetime4">
               <a:rPr lang="en-CA" smtClean="0"/>
-              <a:t>March-14-13</a:t>
+              <a:t>March-16-13</a:t>
             </a:fld>
             <a:endParaRPr lang="en-US" dirty="0" err="1"/>
           </a:p>
@@ -7622,6 +7463,15 @@
               <a:rPr lang="en-US" dirty="0" smtClean="0"/>
               <a:t>Conference Review </a:t>
             </a:r>
+            <a:r>
+              <a:rPr lang="en-US" dirty="0"/>
+              <a:t>/</a:t>
+            </a:r>
+            <a:r>
+              <a:rPr lang="en-US" dirty="0" smtClean="0"/>
+              <a:t> Mini HTML 5 Overview</a:t>
+            </a:r>
+            <a:endParaRPr lang="en-US" dirty="0" smtClean="0"/>
           </a:p>
           <a:p>
             <a:endParaRPr lang="en-US" dirty="0" smtClean="0"/>
@@ -7635,40 +7485,40 @@
           </a:p>
           <a:p>
             <a:r>
-              <a:rPr lang="en-US" smtClean="0">
+              <a:rPr lang="en-US" dirty="0" smtClean="0">
                 <a:hlinkClick r:id="rId4"/>
               </a:rPr>
               <a:t>http</a:t>
             </a:r>
             <a:r>
-              <a:rPr lang="en-US">
+              <a:rPr lang="en-US" dirty="0">
                 <a:hlinkClick r:id="rId4"/>
               </a:rPr>
               <a:t>://</a:t>
             </a:r>
             <a:r>
-              <a:rPr lang="en-US" smtClean="0">
+              <a:rPr lang="en-US" dirty="0" smtClean="0">
                 <a:hlinkClick r:id="rId4"/>
               </a:rPr>
               <a:t>bit.ly/15u1FQ8</a:t>
             </a:r>
             <a:r>
-              <a:rPr lang="en-US"/>
+              <a:rPr lang="en-US" dirty="0"/>
               <a:t> or </a:t>
             </a:r>
             <a:r>
-              <a:rPr lang="en-US">
+              <a:rPr lang="en-US" dirty="0">
                 <a:hlinkClick r:id="rId5"/>
               </a:rPr>
               <a:t>http://html5demo1.azurewebsites.net</a:t>
             </a:r>
             <a:r>
-              <a:rPr lang="en-US" smtClean="0">
+              <a:rPr lang="en-US" dirty="0" smtClean="0">
                 <a:hlinkClick r:id="rId5"/>
               </a:rPr>
               <a:t>/</a:t>
             </a:r>
-            <a:endParaRPr lang="en-US" smtClean="0"/>
+            <a:endParaRPr lang="en-US" dirty="0" smtClean="0"/>
           </a:p>
           <a:p>
             <a:endParaRPr lang="en-US" dirty="0"/>
@@ -13022,7 +12872,7 @@
         </p:spPr>
         <p:txBody>
           <a:bodyPr>
-            <a:normAutofit fontScale="92500" lnSpcReduction="10000"/>
+            <a:normAutofit/>
           </a:bodyPr>
           <a:lstStyle/>
           <a:p>
@@ -13112,80 +12962,17 @@
             </a:r>
             <a:r>
               <a:rPr lang="en-CA" dirty="0"/>
-              <a:t> for &lt;=8</a:t>
-            </a:r>
-            <a:r>
-              <a:rPr lang="en-CA" baseline="30000" dirty="0"/>
+              <a:t> for &lt;=</a:t>
+            </a:r>
+            <a:r>
+              <a:rPr lang="en-CA" dirty="0" smtClean="0"/>
+              <a:t>8</a:t>
+            </a:r>
+            <a:r>
+              <a:rPr lang="en-CA" baseline="30000" dirty="0" smtClean="0"/>
               <a:t>1</a:t>
             </a:r>
             <a:endParaRPr lang="en-CA" dirty="0"/>
-          </a:p>
-          <a:p>
-            <a:r>
-              <a:rPr lang="en-CA" dirty="0" smtClean="0">
-                <a:hlinkClick r:id="rId4"/>
-              </a:rPr>
-              <a:t>Html5test.com</a:t>
-            </a:r>
-            <a:r>
-              <a:rPr lang="en-CA" dirty="0"/>
-              <a:t>, </a:t>
-            </a:r>
-            <a:r>
-              <a:rPr lang="en-CA" dirty="0" smtClean="0">
-                <a:hlinkClick r:id="rId5"/>
-              </a:rPr>
-              <a:t>CanIuse.com</a:t>
-            </a:r>
-            <a:r>
-              <a:rPr lang="en-CA" dirty="0" smtClean="0"/>
-              <a:t>, and lots of others</a:t>
-            </a:r>
-            <a:endParaRPr lang="en-CA" dirty="0"/>
-          </a:p>
-          <a:p>
-            <a:r>
-              <a:rPr lang="en-CA" dirty="0" smtClean="0"/>
-              <a:t>Adoption </a:t>
-            </a:r>
-            <a:r>
-              <a:rPr lang="en-CA" dirty="0"/>
-              <a:t>strategies: lowest common </a:t>
-            </a:r>
-            <a:r>
-              <a:rPr lang="en-CA" dirty="0" smtClean="0"/>
-              <a:t>denominator, polyfill</a:t>
-            </a:r>
-            <a:r>
-              <a:rPr lang="en-CA" baseline="30000" dirty="0"/>
-              <a:t>2</a:t>
-            </a:r>
-            <a:r>
-              <a:rPr lang="en-CA" dirty="0" smtClean="0"/>
-              <a:t> enriched</a:t>
-            </a:r>
-          </a:p>
-          <a:p>
-            <a:r>
-              <a:rPr lang="en-CA" dirty="0" smtClean="0"/>
-              <a:t>DEMO 1 – 2</a:t>
-            </a:r>
-          </a:p>
-          <a:p>
-            <a:pPr lvl="1"/>
-            <a:r>
-              <a:rPr lang="en-CA" dirty="0">
-                <a:hlinkClick r:id="rId6"/>
-              </a:rPr>
-              <a:t>http://</a:t>
-            </a:r>
-            <a:r>
-              <a:rPr lang="en-CA" dirty="0" smtClean="0">
-                <a:hlinkClick r:id="rId6"/>
-              </a:rPr>
-              <a:t>html5demo1.azurewebsites.net/Index.html</a:t>
-            </a:r>
-            <a:endParaRPr lang="en-CA" dirty="0" smtClean="0"/>
           </a:p>
         </p:txBody>
       </p:sp>
@@ -13886,109 +13673,6 @@
                       </p:childTnLst>
                     </p:cTn>
                   </p:par>
-                  <p:par>
-                    <p:cTn id="44" fill="hold">
-                      <p:stCondLst>
-                        <p:cond delay="indefinite"/>
-                      </p:stCondLst>
-                      <p:childTnLst>
-                        <p:par>
-                          <p:cTn id="45" fill="hold">
-                            <p:stCondLst>
-                              <p:cond delay="0"/>
-                            </p:stCondLst>
-                            <p:childTnLst>
-                              <p:par>
-                                <p:cTn id="46" presetID="2" presetClass="entr" presetSubtype="4" fill="hold" nodeType="clickEffect">
-                                  <p:stCondLst>
-                                    <p:cond delay="0"/>
-                                  </p:stCondLst>
-                                  <p:childTnLst>
-                                    <p:set>
-                                      <p:cBhvr>
-                                        <p:cTn id="47" dur="1" fill="hold">
-                                          <p:stCondLst>
-                                            <p:cond delay="0"/>
-                                          </p:stCondLst>
-                                        </p:cTn>
-                                        <p:tgtEl>
-                                          <p:spTgt spid="4">
-                                            <p:txEl>
-                                              <p:pRg st="8" end="8"/>
-                                            </p:txEl>
-                                          </p:spTgt>
-                                        </p:tgtEl>
-                                        <p:attrNameLst>
-                                          <p:attrName>style.visibility</p:attrName>
-                                        </p:attrNameLst>
-                                      </p:cBhvr>
-                                      <p:to>
-                                        <p:strVal val="visible"/>
-                                      </p:to>
-                                    </p:set>
-                                    <p:anim calcmode="lin" valueType="num">
-                                      <p:cBhvr additive="base">
-                                        <p:cTn id="48" dur="500" fill="hold"/>
-                                        <p:tgtEl>
-                                          <p:spTgt spid="4">
-                                            <p:txEl>
-                                              <p:pRg st="8" end="8"/>
-                                            </p:txEl>
-                                          </p:spTgt>
-                                        </p:tgtEl>
-                                        <p:attrNameLst>
-                                          <p:attrName>ppt_x</p:attrName>
-                                        </p:attrNameLst>
-                                      </p:cBhvr>
-                                      <p:tavLst>
-                                        <p:tav tm="0">
-                                          <p:val>
-                                            <p:strVal val="#ppt_x"/>
-                                          </p:val>
-                                        </p:tav>
-                                        <p:tav tm="100000">
-                                          <p:val>
-                                            <p:strVal val="#ppt_x"/>
-                                          </p:val>
-                                        </p:tav>
-                                      </p:tavLst>
-                                    </p:anim>
-                                    <p:anim calcmode="lin" valueType="num">
-                                      <p:cBhvr additive="base">
-                                        <p:cTn id="49" dur="500" fill="hold"/>
-                                        <p:tgtEl>
-                                          <p:spTgt spid="4">
-                                            <p:txEl>
-                                              <p:pRg st="8" end="8"/>
-                                            </p:txEl>
-                                          </p:spTgt>
-                                        </p:tgtEl>
-                                        <p:attrNameLst>
-                                          <p:attrName>ppt_y</p:attrName>
-                                        </p:attrNameLst>
-                                      </p:cBhvr>
-                                      <p:tavLst>
-                                        <p:tav tm="0">
-                                          <p:val>
-                                            <p:strVal val="1+#ppt_h/2"/>
-                                          </p:val>
-                                        </p:tav>
-                                        <p:tav tm="100000">
-                                          <p:val>
-                                            <p:strVal val="#ppt_y"/>
-                                          </p:val>
-                                        </p:tav>
-                                      </p:tavLst>
-                                    </p:anim>
-                                  </p:childTnLst>
-                                </p:cTn>
-                              </p:par>
-                            </p:childTnLst>
-                          </p:cTn>
-                        </p:par>
-                      </p:childTnLst>
-                    </p:cTn>
-                  </p:par>
                 </p:childTnLst>
               </p:cTn>
               <p:prevCondLst>
@@ -14071,6 +13755,167 @@
           <a:lstStyle/>
           <a:p>
             <a:r>
+              <a:rPr lang="en-CA" dirty="0" smtClean="0"/>
+              <a:t>HTML 5 – Browser Support (cont’d)</a:t>
+            </a:r>
+            <a:endParaRPr lang="en-CA" dirty="0"/>
+          </a:p>
+        </p:txBody>
+      </p:sp>
+      <p:sp>
+        <p:nvSpPr>
+          <p:cNvPr id="4" name="Content Placeholder 3"/>
+          <p:cNvSpPr>
+            <a:spLocks noGrp="1"/>
+          </p:cNvSpPr>
+          <p:nvPr>
+            <p:ph sz="quarter" idx="13"/>
+          </p:nvPr>
+        </p:nvSpPr>
+        <p:spPr/>
+        <p:txBody>
+          <a:bodyPr/>
+          <a:lstStyle/>
+          <a:p>
+            <a:r>
+              <a:rPr lang="en-CA" dirty="0">
+                <a:hlinkClick r:id="rId3"/>
+              </a:rPr>
+              <a:t>Html5test.com</a:t>
+            </a:r>
+            <a:r>
+              <a:rPr lang="en-CA" dirty="0"/>
+              <a:t>, </a:t>
+            </a:r>
+            <a:r>
+              <a:rPr lang="en-CA" dirty="0">
+                <a:hlinkClick r:id="rId4"/>
+              </a:rPr>
+              <a:t>CanIuse.com</a:t>
+            </a:r>
+            <a:r>
+              <a:rPr lang="en-CA" dirty="0"/>
+              <a:t>, and lots of others</a:t>
+            </a:r>
+          </a:p>
+          <a:p>
+            <a:r>
+              <a:rPr lang="en-CA" dirty="0"/>
+              <a:t>Adoption strategies: lowest common denominator, </a:t>
+            </a:r>
+            <a:r>
+              <a:rPr lang="en-CA" dirty="0" smtClean="0"/>
+              <a:t>polyfill</a:t>
+            </a:r>
+            <a:r>
+              <a:rPr lang="en-CA" baseline="30000" dirty="0" smtClean="0"/>
+              <a:t>1</a:t>
+            </a:r>
+            <a:r>
+              <a:rPr lang="en-CA" dirty="0" smtClean="0"/>
+              <a:t> </a:t>
+            </a:r>
+            <a:r>
+              <a:rPr lang="en-CA" dirty="0"/>
+              <a:t>enriched</a:t>
+            </a:r>
+          </a:p>
+          <a:p>
+            <a:r>
+              <a:rPr lang="en-CA" dirty="0"/>
+              <a:t>DEMO 1 – </a:t>
+            </a:r>
+            <a:r>
+              <a:rPr lang="en-CA" dirty="0" smtClean="0"/>
+              <a:t>2 from</a:t>
+            </a:r>
+            <a:endParaRPr lang="en-CA" dirty="0"/>
+          </a:p>
+          <a:p>
+            <a:pPr lvl="1"/>
+            <a:r>
+              <a:rPr lang="en-CA" dirty="0">
+                <a:hlinkClick r:id="rId5"/>
+              </a:rPr>
+              <a:t>http://html5demo1.azurewebsites.net/Index.html</a:t>
+            </a:r>
+            <a:endParaRPr lang="en-CA" dirty="0"/>
+          </a:p>
+          <a:p>
+            <a:endParaRPr lang="en-CA" dirty="0"/>
+          </a:p>
+        </p:txBody>
+      </p:sp>
+    </p:spTree>
+    <p:extLst>
+      <p:ext uri="{BB962C8B-B14F-4D97-AF65-F5344CB8AC3E}">
+        <p14:creationId xmlns:p14="http://schemas.microsoft.com/office/powerpoint/2010/main" val="135150861"/>
+      </p:ext>
+    </p:extLst>
+  </p:cSld>
+  <p:clrMapOvr>
+    <a:masterClrMapping/>
+  </p:clrMapOvr>
+</p:sld>
+</file>
+
+<file path=ppt/slides/slide15.xml><?xml version="1.0" encoding="utf-8"?>
+<p:sld xmlns:a="http://schemas.openxmlformats.org/drawingml/2006/main" xmlns:r="http://schemas.openxmlformats.org/officeDocument/2006/relationships" xmlns:p="http://schemas.openxmlformats.org/presentationml/2006/main">
+  <p:cSld>
+    <p:spTree>
+      <p:nvGrpSpPr>
+        <p:cNvPr id="1" name=""/>
+        <p:cNvGrpSpPr/>
+        <p:nvPr/>
+      </p:nvGrpSpPr>
+      <p:grpSpPr>
+        <a:xfrm>
+          <a:off x="0" y="0"/>
+          <a:ext cx="0" cy="0"/>
+          <a:chOff x="0" y="0"/>
+          <a:chExt cx="0" cy="0"/>
+        </a:xfrm>
+      </p:grpSpPr>
+      <p:sp>
+        <p:nvSpPr>
+          <p:cNvPr id="2" name="Slide Number Placeholder 1"/>
+          <p:cNvSpPr>
+            <a:spLocks noGrp="1"/>
+          </p:cNvSpPr>
+          <p:nvPr>
+            <p:ph type="sldNum" sz="quarter" idx="12"/>
+          </p:nvPr>
+        </p:nvSpPr>
+        <p:spPr/>
+        <p:txBody>
+          <a:bodyPr/>
+          <a:lstStyle/>
+          <a:p>
+            <a:fld id="{1D72EBF8-7CF5-44B7-B2BF-E22DE4D0703D}" type="slidenum">
+              <a:rPr lang="en-US" smtClean="0"/>
+              <a:pPr/>
+              <a:t>14</a:t>
+            </a:fld>
+            <a:endParaRPr lang="en-US"/>
+          </a:p>
+        </p:txBody>
+      </p:sp>
+      <p:sp>
+        <p:nvSpPr>
+          <p:cNvPr id="3" name="Title 2"/>
+          <p:cNvSpPr>
+            <a:spLocks noGrp="1"/>
+          </p:cNvSpPr>
+          <p:nvPr>
+            <p:ph type="title"/>
+          </p:nvPr>
+        </p:nvSpPr>
+        <p:spPr/>
+        <p:txBody>
+          <a:bodyPr/>
+          <a:lstStyle/>
+          <a:p>
+            <a:r>
               <a:rPr lang="en-US" dirty="0" smtClean="0"/>
               <a:t>What I learnt</a:t>
             </a:r>
@@ -15765,6 +15610,46 @@
               <a:solidFill>
                 <a:schemeClr val="tx1"/>
               </a:solidFill>
+            </a:endParaRPr>
+          </a:p>
+        </p:txBody>
+      </p:sp>
+      <p:sp>
+        <p:nvSpPr>
+          <p:cNvPr id="43" name="TextBox 42"/>
+          <p:cNvSpPr txBox="1"/>
+          <p:nvPr/>
+        </p:nvSpPr>
+        <p:spPr>
+          <a:xfrm>
+            <a:off x="4099673" y="3164470"/>
+            <a:ext cx="278478" cy="369332"/>
+          </a:xfrm>
+          <a:prstGeom prst="rect">
+            <a:avLst/>
+          </a:prstGeom>
+          <a:noFill/>
+        </p:spPr>
+        <p:txBody>
+          <a:bodyPr wrap="square" rtlCol="0">
+            <a:spAutoFit/>
+          </a:bodyPr>
+          <a:lstStyle/>
+          <a:p>
+            <a:r>
+              <a:rPr lang="en-US" dirty="0" smtClean="0">
+                <a:solidFill>
+                  <a:schemeClr val="bg2"/>
+                </a:solidFill>
+                <a:latin typeface="Wingdings" pitchFamily="2" charset="2"/>
+              </a:rPr>
+              <a:t>ü</a:t>
+            </a:r>
+            <a:endParaRPr lang="en-CA" dirty="0">
+              <a:solidFill>
+                <a:schemeClr val="bg2"/>
+              </a:solidFill>
+              <a:latin typeface="Wingdings" pitchFamily="2" charset="2"/>
             </a:endParaRPr>
           </a:p>
         </p:txBody>
@@ -15914,7 +15799,7 @@
 </p:sld>
 </file>
 
-<file path=ppt/slides/slide15.xml><?xml version="1.0" encoding="utf-8"?>
+<file path=ppt/slides/slide16.xml><?xml version="1.0" encoding="utf-8"?>
 <p:sld xmlns:a="http://schemas.openxmlformats.org/drawingml/2006/main" xmlns:r="http://schemas.openxmlformats.org/officeDocument/2006/relationships" xmlns:p="http://schemas.openxmlformats.org/presentationml/2006/main">
   <p:cSld>
     <p:spTree>
@@ -15949,7 +15834,7 @@
             <a:fld id="{1D72EBF8-7CF5-44B7-B2BF-E22DE4D0703D}" type="slidenum">
               <a:rPr lang="en-US" smtClean="0"/>
               <a:pPr/>
-              <a:t>14</a:t>
+              <a:t>15</a:t>
             </a:fld>
             <a:endParaRPr lang="en-US"/>
           </a:p>
@@ -16093,8 +15978,13 @@
           <a:p>
             <a:r>
               <a:rPr lang="en-CA" dirty="0" smtClean="0"/>
-              <a:t>Demo 3</a:t>
-            </a:r>
+              <a:t>Demo </a:t>
+            </a:r>
+            <a:r>
+              <a:rPr lang="en-CA" dirty="0" smtClean="0"/>
+              <a:t>3 from</a:t>
+            </a:r>
+            <a:endParaRPr lang="en-CA" dirty="0" smtClean="0"/>
           </a:p>
           <a:p>
             <a:pPr lvl="1"/>
@@ -16102,13 +15992,7 @@
               <a:rPr lang="en-CA" dirty="0">
                 <a:hlinkClick r:id="rId3"/>
               </a:rPr>
-              <a:t>http://</a:t>
-            </a:r>
-            <a:r>
-              <a:rPr lang="en-CA" dirty="0" smtClean="0">
-                <a:hlinkClick r:id="rId3"/>
-              </a:rPr>
-              <a:t>html5demo1.azurewebsites.net/Demo03-NewInputTypes.html</a:t>
+              <a:t>http://html5demo1.azurewebsites.net/Index.html</a:t>
             </a:r>
             <a:endParaRPr lang="en-CA" dirty="0" smtClean="0"/>
           </a:p>
@@ -16141,7 +16025,7 @@
 </p:sld>
 </file>
 
-<file path=ppt/slides/slide16.xml><?xml version="1.0" encoding="utf-8"?>
+<file path=ppt/slides/slide17.xml><?xml version="1.0" encoding="utf-8"?>
 <p:sld xmlns:a="http://schemas.openxmlformats.org/drawingml/2006/main" xmlns:r="http://schemas.openxmlformats.org/officeDocument/2006/relationships" xmlns:p="http://schemas.openxmlformats.org/presentationml/2006/main">
   <p:cSld>
     <p:spTree>
@@ -16176,7 +16060,7 @@
             <a:fld id="{1D72EBF8-7CF5-44B7-B2BF-E22DE4D0703D}" type="slidenum">
               <a:rPr lang="en-US" smtClean="0"/>
               <a:pPr/>
-              <a:t>15</a:t>
+              <a:t>16</a:t>
             </a:fld>
             <a:endParaRPr lang="en-US"/>
           </a:p>
@@ -17939,6 +17823,46 @@
         <p:spPr>
           <a:xfrm>
             <a:off x="5684885" y="3401070"/>
+            <a:ext cx="278478" cy="369332"/>
+          </a:xfrm>
+          <a:prstGeom prst="rect">
+            <a:avLst/>
+          </a:prstGeom>
+          <a:noFill/>
+        </p:spPr>
+        <p:txBody>
+          <a:bodyPr wrap="square" rtlCol="0">
+            <a:spAutoFit/>
+          </a:bodyPr>
+          <a:lstStyle/>
+          <a:p>
+            <a:r>
+              <a:rPr lang="en-US" dirty="0" smtClean="0">
+                <a:solidFill>
+                  <a:schemeClr val="bg2"/>
+                </a:solidFill>
+                <a:latin typeface="Wingdings" pitchFamily="2" charset="2"/>
+              </a:rPr>
+              <a:t>ü</a:t>
+            </a:r>
+            <a:endParaRPr lang="en-CA" dirty="0">
+              <a:solidFill>
+                <a:schemeClr val="bg2"/>
+              </a:solidFill>
+              <a:latin typeface="Wingdings" pitchFamily="2" charset="2"/>
+            </a:endParaRPr>
+          </a:p>
+        </p:txBody>
+      </p:sp>
+      <p:sp>
+        <p:nvSpPr>
+          <p:cNvPr id="45" name="TextBox 44"/>
+          <p:cNvSpPr txBox="1"/>
+          <p:nvPr/>
+        </p:nvSpPr>
+        <p:spPr>
+          <a:xfrm>
+            <a:off x="4099673" y="3164470"/>
             <a:ext cx="278478" cy="369332"/>
           </a:xfrm>
           <a:prstGeom prst="rect">
@@ -18115,7 +18039,7 @@
 </p:sld>
 </file>
 
-<file path=ppt/slides/slide17.xml><?xml version="1.0" encoding="utf-8"?>
+<file path=ppt/slides/slide18.xml><?xml version="1.0" encoding="utf-8"?>
 <p:sld xmlns:a="http://schemas.openxmlformats.org/drawingml/2006/main" xmlns:r="http://schemas.openxmlformats.org/officeDocument/2006/relationships" xmlns:p="http://schemas.openxmlformats.org/presentationml/2006/main">
   <p:cSld>
     <p:spTree>
@@ -18150,7 +18074,7 @@
             <a:fld id="{1D72EBF8-7CF5-44B7-B2BF-E22DE4D0703D}" type="slidenum">
               <a:rPr lang="en-US" smtClean="0"/>
               <a:pPr/>
-              <a:t>16</a:t>
+              <a:t>17</a:t>
             </a:fld>
             <a:endParaRPr lang="en-US"/>
           </a:p>
@@ -18215,8 +18139,13 @@
           <a:p>
             <a:r>
               <a:rPr lang="en-CA" dirty="0" smtClean="0"/>
-              <a:t>Demo 4</a:t>
-            </a:r>
+              <a:t>Demo </a:t>
+            </a:r>
+            <a:r>
+              <a:rPr lang="en-CA" dirty="0" smtClean="0"/>
+              <a:t>4 from</a:t>
+            </a:r>
+            <a:endParaRPr lang="en-CA" dirty="0" smtClean="0"/>
           </a:p>
           <a:p>
             <a:pPr lvl="1"/>
@@ -18224,13 +18153,7 @@
               <a:rPr lang="en-CA" dirty="0">
                 <a:hlinkClick r:id="rId3"/>
               </a:rPr>
-              <a:t>http://</a:t>
-            </a:r>
-            <a:r>
-              <a:rPr lang="en-CA" dirty="0" smtClean="0">
-                <a:hlinkClick r:id="rId3"/>
-              </a:rPr>
-              <a:t>html5demo1.azurewebsites.net/Demo04-Multimedia.html</a:t>
+              <a:t>http://html5demo1.azurewebsites.net/Index.html</a:t>
             </a:r>
             <a:endParaRPr lang="en-CA" dirty="0" smtClean="0"/>
           </a:p>
@@ -18270,7 +18193,7 @@
 </p:sld>
 </file>
 
-<file path=ppt/slides/slide18.xml><?xml version="1.0" encoding="utf-8"?>
+<file path=ppt/slides/slide19.xml><?xml version="1.0" encoding="utf-8"?>
 <p:sld xmlns:a="http://schemas.openxmlformats.org/drawingml/2006/main" xmlns:r="http://schemas.openxmlformats.org/officeDocument/2006/relationships" xmlns:p="http://schemas.openxmlformats.org/presentationml/2006/main">
   <p:cSld>
     <p:spTree>
@@ -18305,7 +18228,7 @@
             <a:fld id="{1D72EBF8-7CF5-44B7-B2BF-E22DE4D0703D}" type="slidenum">
               <a:rPr lang="en-US" smtClean="0"/>
               <a:pPr/>
-              <a:t>17</a:t>
+              <a:t>18</a:t>
             </a:fld>
             <a:endParaRPr lang="en-US"/>
           </a:p>
@@ -20102,6 +20025,46 @@
         <p:spPr>
           <a:xfrm>
             <a:off x="5684885" y="3401070"/>
+            <a:ext cx="278478" cy="369332"/>
+          </a:xfrm>
+          <a:prstGeom prst="rect">
+            <a:avLst/>
+          </a:prstGeom>
+          <a:noFill/>
+        </p:spPr>
+        <p:txBody>
+          <a:bodyPr wrap="square" rtlCol="0">
+            <a:spAutoFit/>
+          </a:bodyPr>
+          <a:lstStyle/>
+          <a:p>
+            <a:r>
+              <a:rPr lang="en-US" dirty="0" smtClean="0">
+                <a:solidFill>
+                  <a:schemeClr val="bg2"/>
+                </a:solidFill>
+                <a:latin typeface="Wingdings" pitchFamily="2" charset="2"/>
+              </a:rPr>
+              <a:t>ü</a:t>
+            </a:r>
+            <a:endParaRPr lang="en-CA" dirty="0">
+              <a:solidFill>
+                <a:schemeClr val="bg2"/>
+              </a:solidFill>
+              <a:latin typeface="Wingdings" pitchFamily="2" charset="2"/>
+            </a:endParaRPr>
+          </a:p>
+        </p:txBody>
+      </p:sp>
+      <p:sp>
+        <p:nvSpPr>
+          <p:cNvPr id="46" name="TextBox 45"/>
+          <p:cNvSpPr txBox="1"/>
+          <p:nvPr/>
+        </p:nvSpPr>
+        <p:spPr>
+          <a:xfrm>
+            <a:off x="4099673" y="3164470"/>
             <a:ext cx="278478" cy="369332"/>
           </a:xfrm>
           <a:prstGeom prst="rect">
@@ -20278,197 +20241,6 @@
 </p:sld>
 </file>
 
-<file path=ppt/slides/slide19.xml><?xml version="1.0" encoding="utf-8"?>
-<p:sld xmlns:a="http://schemas.openxmlformats.org/drawingml/2006/main" xmlns:r="http://schemas.openxmlformats.org/officeDocument/2006/relationships" xmlns:p="http://schemas.openxmlformats.org/presentationml/2006/main">
-  <p:cSld>
-    <p:spTree>
-      <p:nvGrpSpPr>
-        <p:cNvPr id="1" name=""/>
-        <p:cNvGrpSpPr/>
-        <p:nvPr/>
-      </p:nvGrpSpPr>
-      <p:grpSpPr>
-        <a:xfrm>
-          <a:off x="0" y="0"/>
-          <a:ext cx="0" cy="0"/>
-          <a:chOff x="0" y="0"/>
-          <a:chExt cx="0" cy="0"/>
-        </a:xfrm>
-      </p:grpSpPr>
-      <p:sp>
-        <p:nvSpPr>
-          <p:cNvPr id="2" name="Slide Number Placeholder 1"/>
-          <p:cNvSpPr>
-            <a:spLocks noGrp="1"/>
-          </p:cNvSpPr>
-          <p:nvPr>
-            <p:ph type="sldNum" sz="quarter" idx="12"/>
-          </p:nvPr>
-        </p:nvSpPr>
-        <p:spPr/>
-        <p:txBody>
-          <a:bodyPr/>
-          <a:lstStyle/>
-          <a:p>
-            <a:fld id="{1D72EBF8-7CF5-44B7-B2BF-E22DE4D0703D}" type="slidenum">
-              <a:rPr lang="en-US" smtClean="0"/>
-              <a:pPr/>
-              <a:t>18</a:t>
-            </a:fld>
-            <a:endParaRPr lang="en-US"/>
-          </a:p>
-        </p:txBody>
-      </p:sp>
-      <p:sp>
-        <p:nvSpPr>
-          <p:cNvPr id="3" name="Title 2"/>
-          <p:cNvSpPr>
-            <a:spLocks noGrp="1"/>
-          </p:cNvSpPr>
-          <p:nvPr>
-            <p:ph type="title"/>
-          </p:nvPr>
-        </p:nvSpPr>
-        <p:spPr/>
-        <p:txBody>
-          <a:bodyPr/>
-          <a:lstStyle/>
-          <a:p>
-            <a:r>
-              <a:rPr lang="en-CA" dirty="0"/>
-              <a:t>Azure</a:t>
-            </a:r>
-          </a:p>
-        </p:txBody>
-      </p:sp>
-      <p:sp>
-        <p:nvSpPr>
-          <p:cNvPr id="4" name="Content Placeholder 3"/>
-          <p:cNvSpPr>
-            <a:spLocks noGrp="1"/>
-          </p:cNvSpPr>
-          <p:nvPr>
-            <p:ph sz="quarter" idx="13"/>
-          </p:nvPr>
-        </p:nvSpPr>
-        <p:spPr>
-          <a:xfrm>
-            <a:off x="979488" y="1630362"/>
-            <a:ext cx="6697663" cy="4246909"/>
-          </a:xfrm>
-        </p:spPr>
-        <p:txBody>
-          <a:bodyPr>
-            <a:normAutofit/>
-          </a:bodyPr>
-          <a:lstStyle/>
-          <a:p>
-            <a:r>
-              <a:rPr lang="en-CA" dirty="0" smtClean="0"/>
-              <a:t>What </a:t>
-            </a:r>
-            <a:r>
-              <a:rPr lang="en-CA" dirty="0"/>
-              <a:t>is it?</a:t>
-            </a:r>
-          </a:p>
-          <a:p>
-            <a:pPr lvl="1"/>
-            <a:r>
-              <a:rPr lang="en-US" dirty="0" smtClean="0"/>
-              <a:t>From Wikipedia: “is a Microsoft cloud computing platform for building, deploying and managing application and services through a global network of Microsoft-managed datacenters”</a:t>
-            </a:r>
-            <a:endParaRPr lang="en-CA" dirty="0" smtClean="0"/>
-          </a:p>
-          <a:p>
-            <a:pPr lvl="1"/>
-            <a:r>
-              <a:rPr lang="en-US" dirty="0" smtClean="0"/>
-              <a:t>Some interesting aspects of this are:</a:t>
-            </a:r>
-          </a:p>
-          <a:p>
-            <a:pPr lvl="2"/>
-            <a:r>
-              <a:rPr lang="en-US" dirty="0" smtClean="0"/>
-              <a:t>Easy on demand </a:t>
-            </a:r>
-            <a:r>
-              <a:rPr lang="en-CA" dirty="0" smtClean="0"/>
-              <a:t>provisioning</a:t>
-            </a:r>
-          </a:p>
-          <a:p>
-            <a:pPr lvl="2"/>
-            <a:r>
-              <a:rPr lang="en-CA" dirty="0" smtClean="0"/>
-              <a:t>Easy scaling of resources… for example “tonight </a:t>
-            </a:r>
-            <a:r>
-              <a:rPr lang="en-CA" dirty="0"/>
-              <a:t>I need 10,000 nodes for an hour until batch is </a:t>
-            </a:r>
-            <a:r>
-              <a:rPr lang="en-CA" dirty="0" smtClean="0"/>
-              <a:t>done”</a:t>
-            </a:r>
-          </a:p>
-          <a:p>
-            <a:r>
-              <a:rPr lang="en-CA" dirty="0"/>
-              <a:t>Demo 5</a:t>
-            </a:r>
-          </a:p>
-          <a:p>
-            <a:pPr lvl="1"/>
-            <a:r>
-              <a:rPr lang="en-CA" dirty="0" smtClean="0">
-                <a:hlinkClick r:id="rId3"/>
-              </a:rPr>
-              <a:t>https</a:t>
-            </a:r>
-            <a:r>
-              <a:rPr lang="en-CA" dirty="0">
-                <a:hlinkClick r:id="rId3"/>
-              </a:rPr>
-              <a:t>://</a:t>
-            </a:r>
-            <a:r>
-              <a:rPr lang="en-CA" dirty="0" smtClean="0">
-                <a:hlinkClick r:id="rId3"/>
-              </a:rPr>
-              <a:t>manage.windowsazure.com</a:t>
-            </a:r>
-            <a:endParaRPr lang="en-CA" dirty="0" smtClean="0"/>
-          </a:p>
-          <a:p>
-            <a:endParaRPr lang="en-CA" dirty="0"/>
-          </a:p>
-          <a:p>
-            <a:endParaRPr lang="en-CA" dirty="0"/>
-          </a:p>
-        </p:txBody>
-      </p:sp>
-    </p:spTree>
-    <p:extLst>
-      <p:ext uri="{BB962C8B-B14F-4D97-AF65-F5344CB8AC3E}">
-        <p14:creationId xmlns:p14="http://schemas.microsoft.com/office/powerpoint/2010/main" val="1419882203"/>
-      </p:ext>
-    </p:extLst>
-  </p:cSld>
-  <p:clrMapOvr>
-    <a:masterClrMapping/>
-  </p:clrMapOvr>
-  <p:timing>
-    <p:tnLst>
-      <p:par>
-        <p:cTn id="1" dur="indefinite" restart="never" nodeType="tmRoot"/>
-      </p:par>
-    </p:tnLst>
-  </p:timing>
-</p:sld>
-</file>
-
 <file path=ppt/slides/slide2.xml><?xml version="1.0" encoding="utf-8"?>
 <p:sld xmlns:a="http://schemas.openxmlformats.org/drawingml/2006/main" xmlns:r="http://schemas.openxmlformats.org/officeDocument/2006/relationships" xmlns:p="http://schemas.openxmlformats.org/presentationml/2006/main">
   <p:cSld>
@@ -20743,1898 +20515,133 @@
           <a:lstStyle/>
           <a:p>
             <a:r>
+              <a:rPr lang="en-CA" dirty="0" smtClean="0"/>
+              <a:t>Windows Azure</a:t>
+            </a:r>
+            <a:endParaRPr lang="en-CA" dirty="0"/>
+          </a:p>
+        </p:txBody>
+      </p:sp>
+      <p:sp>
+        <p:nvSpPr>
+          <p:cNvPr id="4" name="Content Placeholder 3"/>
+          <p:cNvSpPr>
+            <a:spLocks noGrp="1"/>
+          </p:cNvSpPr>
+          <p:nvPr>
+            <p:ph sz="quarter" idx="13"/>
+          </p:nvPr>
+        </p:nvSpPr>
+        <p:spPr>
+          <a:xfrm>
+            <a:off x="979488" y="1630362"/>
+            <a:ext cx="6697663" cy="4246909"/>
+          </a:xfrm>
+        </p:spPr>
+        <p:txBody>
+          <a:bodyPr>
+            <a:normAutofit/>
+          </a:bodyPr>
+          <a:lstStyle/>
+          <a:p>
+            <a:r>
+              <a:rPr lang="en-CA" dirty="0" smtClean="0"/>
+              <a:t>What </a:t>
+            </a:r>
+            <a:r>
+              <a:rPr lang="en-CA" dirty="0"/>
+              <a:t>is it?</a:t>
+            </a:r>
+          </a:p>
+          <a:p>
+            <a:pPr lvl="1"/>
+            <a:r>
               <a:rPr lang="en-US" dirty="0" smtClean="0"/>
-              <a:t>What I learnt</a:t>
-            </a:r>
+              <a:t>From Wikipedia: “is a Microsoft cloud computing platform for building, deploying and managing </a:t>
+            </a:r>
+            <a:r>
+              <a:rPr lang="en-US" dirty="0" smtClean="0"/>
+              <a:t>applications </a:t>
+            </a:r>
+            <a:r>
+              <a:rPr lang="en-US" dirty="0" smtClean="0"/>
+              <a:t>and services through a global network of Microsoft-managed datacenters”</a:t>
+            </a:r>
+            <a:endParaRPr lang="en-CA" dirty="0" smtClean="0"/>
+          </a:p>
+          <a:p>
+            <a:pPr lvl="1"/>
+            <a:r>
+              <a:rPr lang="en-US" dirty="0" smtClean="0"/>
+              <a:t>Some interesting aspects of this are:</a:t>
+            </a:r>
+          </a:p>
+          <a:p>
+            <a:pPr lvl="2"/>
+            <a:r>
+              <a:rPr lang="en-US" dirty="0" smtClean="0"/>
+              <a:t>Easy on demand </a:t>
+            </a:r>
+            <a:r>
+              <a:rPr lang="en-CA" dirty="0" smtClean="0"/>
+              <a:t>provisioning</a:t>
+            </a:r>
+          </a:p>
+          <a:p>
+            <a:pPr lvl="2"/>
+            <a:r>
+              <a:rPr lang="en-CA" dirty="0" smtClean="0"/>
+              <a:t>Easy scaling of resources… for example “tonight </a:t>
+            </a:r>
+            <a:r>
+              <a:rPr lang="en-CA" dirty="0"/>
+              <a:t>I need 10,000 nodes for an hour until batch is </a:t>
+            </a:r>
+            <a:r>
+              <a:rPr lang="en-CA" dirty="0" smtClean="0"/>
+              <a:t>done”</a:t>
+            </a:r>
+          </a:p>
+          <a:p>
+            <a:r>
+              <a:rPr lang="en-CA" dirty="0"/>
+              <a:t>Demo 5</a:t>
+            </a:r>
+          </a:p>
+          <a:p>
+            <a:pPr lvl="1"/>
+            <a:r>
+              <a:rPr lang="en-CA" dirty="0" smtClean="0">
+                <a:hlinkClick r:id="rId3"/>
+              </a:rPr>
+              <a:t>https</a:t>
+            </a:r>
+            <a:r>
+              <a:rPr lang="en-CA" dirty="0">
+                <a:hlinkClick r:id="rId3"/>
+              </a:rPr>
+              <a:t>://</a:t>
+            </a:r>
+            <a:r>
+              <a:rPr lang="en-CA" dirty="0" smtClean="0">
+                <a:hlinkClick r:id="rId3"/>
+              </a:rPr>
+              <a:t>manage.windowsazure.com</a:t>
+            </a:r>
+            <a:endParaRPr lang="en-CA" dirty="0" smtClean="0"/>
+          </a:p>
+          <a:p>
             <a:endParaRPr lang="en-CA" dirty="0"/>
           </a:p>
-        </p:txBody>
-      </p:sp>
-      <p:sp>
-        <p:nvSpPr>
-          <p:cNvPr id="5" name="Oval 4"/>
-          <p:cNvSpPr/>
-          <p:nvPr/>
-        </p:nvSpPr>
-        <p:spPr>
-          <a:xfrm>
-            <a:off x="2699792" y="2204864"/>
-            <a:ext cx="3672408" cy="2736304"/>
-          </a:xfrm>
-          <a:prstGeom prst="ellipse">
-            <a:avLst/>
-          </a:prstGeom>
-          <a:solidFill>
-            <a:schemeClr val="accent1">
-              <a:lumMod val="20000"/>
-              <a:lumOff val="80000"/>
-            </a:schemeClr>
-          </a:solidFill>
-          <a:ln>
-            <a:solidFill>
-              <a:schemeClr val="tx2">
-                <a:lumMod val="10000"/>
-                <a:lumOff val="90000"/>
-              </a:schemeClr>
-            </a:solidFill>
-          </a:ln>
-        </p:spPr>
-        <p:style>
-          <a:lnRef idx="2">
-            <a:schemeClr val="accent1">
-              <a:shade val="50000"/>
-            </a:schemeClr>
-          </a:lnRef>
-          <a:fillRef idx="1">
-            <a:schemeClr val="accent1"/>
-          </a:fillRef>
-          <a:effectRef idx="0">
-            <a:schemeClr val="accent1"/>
-          </a:effectRef>
-          <a:fontRef idx="minor">
-            <a:schemeClr val="lt1"/>
-          </a:fontRef>
-        </p:style>
-        <p:txBody>
-          <a:bodyPr rtlCol="0" anchor="ctr"/>
-          <a:lstStyle/>
-          <a:p>
-            <a:pPr algn="ctr"/>
-            <a:endParaRPr lang="en-CA"/>
-          </a:p>
-        </p:txBody>
-      </p:sp>
-      <p:sp>
-        <p:nvSpPr>
-          <p:cNvPr id="6" name="TextBox 5"/>
-          <p:cNvSpPr txBox="1"/>
-          <p:nvPr/>
-        </p:nvSpPr>
-        <p:spPr>
-          <a:xfrm>
-            <a:off x="4031940" y="2312903"/>
-            <a:ext cx="1008112" cy="369332"/>
-          </a:xfrm>
-          <a:prstGeom prst="rect">
-            <a:avLst/>
-          </a:prstGeom>
-          <a:noFill/>
-        </p:spPr>
-        <p:txBody>
-          <a:bodyPr wrap="square" rtlCol="0">
-            <a:spAutoFit/>
-          </a:bodyPr>
-          <a:lstStyle/>
-          <a:p>
-            <a:r>
-              <a:rPr lang="en-US" dirty="0" smtClean="0"/>
-              <a:t>HTML5</a:t>
-            </a:r>
+          <a:p>
             <a:endParaRPr lang="en-CA" dirty="0"/>
-          </a:p>
-        </p:txBody>
-      </p:sp>
-      <p:sp>
-        <p:nvSpPr>
-          <p:cNvPr id="7" name="Oval 6"/>
-          <p:cNvSpPr/>
-          <p:nvPr/>
-        </p:nvSpPr>
-        <p:spPr>
-          <a:xfrm>
-            <a:off x="3752356" y="3192765"/>
-            <a:ext cx="648072" cy="360040"/>
-          </a:xfrm>
-          <a:prstGeom prst="ellipse">
-            <a:avLst/>
-          </a:prstGeom>
-        </p:spPr>
-        <p:style>
-          <a:lnRef idx="2">
-            <a:schemeClr val="accent1">
-              <a:shade val="50000"/>
-            </a:schemeClr>
-          </a:lnRef>
-          <a:fillRef idx="1">
-            <a:schemeClr val="accent1"/>
-          </a:fillRef>
-          <a:effectRef idx="0">
-            <a:schemeClr val="accent1"/>
-          </a:effectRef>
-          <a:fontRef idx="minor">
-            <a:schemeClr val="lt1"/>
-          </a:fontRef>
-        </p:style>
-        <p:txBody>
-          <a:bodyPr rtlCol="0" anchor="ctr"/>
-          <a:lstStyle/>
-          <a:p>
-            <a:pPr algn="ctr"/>
-            <a:r>
-              <a:rPr lang="en-US" sz="800" dirty="0" smtClean="0">
-                <a:solidFill>
-                  <a:schemeClr val="tx1"/>
-                </a:solidFill>
-              </a:rPr>
-              <a:t>CSS3</a:t>
-            </a:r>
-            <a:endParaRPr lang="en-CA" sz="800" dirty="0">
-              <a:solidFill>
-                <a:schemeClr val="tx1"/>
-              </a:solidFill>
-            </a:endParaRPr>
-          </a:p>
-        </p:txBody>
-      </p:sp>
-      <p:sp>
-        <p:nvSpPr>
-          <p:cNvPr id="8" name="Oval 7"/>
-          <p:cNvSpPr/>
-          <p:nvPr/>
-        </p:nvSpPr>
-        <p:spPr>
-          <a:xfrm>
-            <a:off x="4211960" y="2754996"/>
-            <a:ext cx="828092" cy="360040"/>
-          </a:xfrm>
-          <a:prstGeom prst="ellipse">
-            <a:avLst/>
-          </a:prstGeom>
-        </p:spPr>
-        <p:style>
-          <a:lnRef idx="2">
-            <a:schemeClr val="accent1">
-              <a:shade val="50000"/>
-            </a:schemeClr>
-          </a:lnRef>
-          <a:fillRef idx="1">
-            <a:schemeClr val="accent1"/>
-          </a:fillRef>
-          <a:effectRef idx="0">
-            <a:schemeClr val="accent1"/>
-          </a:effectRef>
-          <a:fontRef idx="minor">
-            <a:schemeClr val="lt1"/>
-          </a:fontRef>
-        </p:style>
-        <p:txBody>
-          <a:bodyPr rtlCol="0" anchor="ctr"/>
-          <a:lstStyle/>
-          <a:p>
-            <a:pPr algn="ctr"/>
-            <a:r>
-              <a:rPr lang="en-US" sz="800" dirty="0" smtClean="0">
-                <a:solidFill>
-                  <a:schemeClr val="tx1"/>
-                </a:solidFill>
-              </a:rPr>
-              <a:t>&lt;audio&gt;</a:t>
-            </a:r>
-            <a:endParaRPr lang="en-CA" sz="800" dirty="0">
-              <a:solidFill>
-                <a:schemeClr val="tx1"/>
-              </a:solidFill>
-            </a:endParaRPr>
-          </a:p>
-        </p:txBody>
-      </p:sp>
-      <p:sp>
-        <p:nvSpPr>
-          <p:cNvPr id="9" name="Oval 8"/>
-          <p:cNvSpPr/>
-          <p:nvPr/>
-        </p:nvSpPr>
-        <p:spPr>
-          <a:xfrm>
-            <a:off x="5194512" y="2769723"/>
-            <a:ext cx="828092" cy="360040"/>
-          </a:xfrm>
-          <a:prstGeom prst="ellipse">
-            <a:avLst/>
-          </a:prstGeom>
-        </p:spPr>
-        <p:style>
-          <a:lnRef idx="2">
-            <a:schemeClr val="accent1">
-              <a:shade val="50000"/>
-            </a:schemeClr>
-          </a:lnRef>
-          <a:fillRef idx="1">
-            <a:schemeClr val="accent1"/>
-          </a:fillRef>
-          <a:effectRef idx="0">
-            <a:schemeClr val="accent1"/>
-          </a:effectRef>
-          <a:fontRef idx="minor">
-            <a:schemeClr val="lt1"/>
-          </a:fontRef>
-        </p:style>
-        <p:txBody>
-          <a:bodyPr rtlCol="0" anchor="ctr"/>
-          <a:lstStyle/>
-          <a:p>
-            <a:pPr algn="ctr"/>
-            <a:r>
-              <a:rPr lang="en-US" sz="800" dirty="0" smtClean="0">
-                <a:solidFill>
-                  <a:schemeClr val="tx1"/>
-                </a:solidFill>
-              </a:rPr>
-              <a:t>&lt;video&gt;</a:t>
-            </a:r>
-            <a:endParaRPr lang="en-CA" sz="800" dirty="0">
-              <a:solidFill>
-                <a:schemeClr val="tx1"/>
-              </a:solidFill>
-            </a:endParaRPr>
-          </a:p>
-        </p:txBody>
-      </p:sp>
-      <p:sp>
-        <p:nvSpPr>
-          <p:cNvPr id="10" name="Oval 9"/>
-          <p:cNvSpPr/>
-          <p:nvPr/>
-        </p:nvSpPr>
-        <p:spPr>
-          <a:xfrm>
-            <a:off x="2843808" y="3519964"/>
-            <a:ext cx="828092" cy="360040"/>
-          </a:xfrm>
-          <a:prstGeom prst="ellipse">
-            <a:avLst/>
-          </a:prstGeom>
-        </p:spPr>
-        <p:style>
-          <a:lnRef idx="2">
-            <a:schemeClr val="accent1">
-              <a:shade val="50000"/>
-            </a:schemeClr>
-          </a:lnRef>
-          <a:fillRef idx="1">
-            <a:schemeClr val="accent1"/>
-          </a:fillRef>
-          <a:effectRef idx="0">
-            <a:schemeClr val="accent1"/>
-          </a:effectRef>
-          <a:fontRef idx="minor">
-            <a:schemeClr val="lt1"/>
-          </a:fontRef>
-        </p:style>
-        <p:txBody>
-          <a:bodyPr rtlCol="0" anchor="ctr"/>
-          <a:lstStyle/>
-          <a:p>
-            <a:pPr algn="ctr"/>
-            <a:r>
-              <a:rPr lang="en-US" sz="800" dirty="0" smtClean="0">
-                <a:solidFill>
-                  <a:schemeClr val="tx1"/>
-                </a:solidFill>
-              </a:rPr>
-              <a:t>&lt;canvas&gt;</a:t>
-            </a:r>
-            <a:endParaRPr lang="en-CA" sz="800" dirty="0">
-              <a:solidFill>
-                <a:schemeClr val="tx1"/>
-              </a:solidFill>
-            </a:endParaRPr>
-          </a:p>
-        </p:txBody>
-      </p:sp>
-      <p:sp>
-        <p:nvSpPr>
-          <p:cNvPr id="11" name="Oval 10"/>
-          <p:cNvSpPr/>
-          <p:nvPr/>
-        </p:nvSpPr>
-        <p:spPr>
-          <a:xfrm>
-            <a:off x="4788023" y="3861048"/>
-            <a:ext cx="1080121" cy="648072"/>
-          </a:xfrm>
-          <a:prstGeom prst="ellipse">
-            <a:avLst/>
-          </a:prstGeom>
-        </p:spPr>
-        <p:style>
-          <a:lnRef idx="2">
-            <a:schemeClr val="accent1">
-              <a:shade val="50000"/>
-            </a:schemeClr>
-          </a:lnRef>
-          <a:fillRef idx="1">
-            <a:schemeClr val="accent1"/>
-          </a:fillRef>
-          <a:effectRef idx="0">
-            <a:schemeClr val="accent1"/>
-          </a:effectRef>
-          <a:fontRef idx="minor">
-            <a:schemeClr val="lt1"/>
-          </a:fontRef>
-        </p:style>
-        <p:txBody>
-          <a:bodyPr rtlCol="0" anchor="ctr"/>
-          <a:lstStyle/>
-          <a:p>
-            <a:pPr algn="ctr"/>
-            <a:r>
-              <a:rPr lang="en-US" sz="800" dirty="0" smtClean="0">
-                <a:solidFill>
-                  <a:schemeClr val="tx1"/>
-                </a:solidFill>
-              </a:rPr>
-              <a:t>Tags: Simplification and Semantic</a:t>
-            </a:r>
-            <a:endParaRPr lang="en-CA" sz="800" dirty="0">
-              <a:solidFill>
-                <a:schemeClr val="tx1"/>
-              </a:solidFill>
-            </a:endParaRPr>
-          </a:p>
-        </p:txBody>
-      </p:sp>
-      <p:sp>
-        <p:nvSpPr>
-          <p:cNvPr id="12" name="Oval 11"/>
-          <p:cNvSpPr/>
-          <p:nvPr/>
-        </p:nvSpPr>
-        <p:spPr>
-          <a:xfrm>
-            <a:off x="5076056" y="3432041"/>
-            <a:ext cx="946548" cy="288032"/>
-          </a:xfrm>
-          <a:prstGeom prst="ellipse">
-            <a:avLst/>
-          </a:prstGeom>
-        </p:spPr>
-        <p:style>
-          <a:lnRef idx="2">
-            <a:schemeClr val="accent1">
-              <a:shade val="50000"/>
-            </a:schemeClr>
-          </a:lnRef>
-          <a:fillRef idx="1">
-            <a:schemeClr val="accent1"/>
-          </a:fillRef>
-          <a:effectRef idx="0">
-            <a:schemeClr val="accent1"/>
-          </a:effectRef>
-          <a:fontRef idx="minor">
-            <a:schemeClr val="lt1"/>
-          </a:fontRef>
-        </p:style>
-        <p:txBody>
-          <a:bodyPr rtlCol="0" anchor="ctr"/>
-          <a:lstStyle/>
-          <a:p>
-            <a:pPr algn="ctr"/>
-            <a:r>
-              <a:rPr lang="en-US" sz="800" dirty="0" err="1" smtClean="0">
-                <a:solidFill>
-                  <a:schemeClr val="tx1"/>
-                </a:solidFill>
-              </a:rPr>
-              <a:t>Modernizr</a:t>
-            </a:r>
-            <a:endParaRPr lang="en-CA" sz="800" dirty="0">
-              <a:solidFill>
-                <a:schemeClr val="tx1"/>
-              </a:solidFill>
-            </a:endParaRPr>
-          </a:p>
-        </p:txBody>
-      </p:sp>
-      <p:sp>
-        <p:nvSpPr>
-          <p:cNvPr id="14" name="Oval 13"/>
-          <p:cNvSpPr/>
-          <p:nvPr/>
-        </p:nvSpPr>
-        <p:spPr>
-          <a:xfrm>
-            <a:off x="3347864" y="4005064"/>
-            <a:ext cx="1278142" cy="720080"/>
-          </a:xfrm>
-          <a:prstGeom prst="ellipse">
-            <a:avLst/>
-          </a:prstGeom>
-        </p:spPr>
-        <p:style>
-          <a:lnRef idx="2">
-            <a:schemeClr val="accent1">
-              <a:shade val="50000"/>
-            </a:schemeClr>
-          </a:lnRef>
-          <a:fillRef idx="1">
-            <a:schemeClr val="accent1"/>
-          </a:fillRef>
-          <a:effectRef idx="0">
-            <a:schemeClr val="accent1"/>
-          </a:effectRef>
-          <a:fontRef idx="minor">
-            <a:schemeClr val="lt1"/>
-          </a:fontRef>
-        </p:style>
-        <p:txBody>
-          <a:bodyPr rtlCol="0" anchor="ctr"/>
-          <a:lstStyle/>
-          <a:p>
-            <a:pPr algn="ctr"/>
-            <a:r>
-              <a:rPr lang="en-US" sz="800" dirty="0" smtClean="0">
-                <a:solidFill>
-                  <a:schemeClr val="tx1"/>
-                </a:solidFill>
-              </a:rPr>
-              <a:t>&lt;form&gt; enhancements</a:t>
-            </a:r>
-            <a:endParaRPr lang="en-CA" sz="800" dirty="0">
-              <a:solidFill>
-                <a:schemeClr val="tx1"/>
-              </a:solidFill>
-            </a:endParaRPr>
-          </a:p>
-        </p:txBody>
-      </p:sp>
-      <p:sp>
-        <p:nvSpPr>
-          <p:cNvPr id="15" name="Oval 14"/>
-          <p:cNvSpPr/>
-          <p:nvPr/>
-        </p:nvSpPr>
-        <p:spPr>
-          <a:xfrm>
-            <a:off x="4378151" y="3500193"/>
-            <a:ext cx="504056" cy="360040"/>
-          </a:xfrm>
-          <a:prstGeom prst="ellipse">
-            <a:avLst/>
-          </a:prstGeom>
-        </p:spPr>
-        <p:style>
-          <a:lnRef idx="2">
-            <a:schemeClr val="accent1">
-              <a:shade val="50000"/>
-            </a:schemeClr>
-          </a:lnRef>
-          <a:fillRef idx="1">
-            <a:schemeClr val="accent1"/>
-          </a:fillRef>
-          <a:effectRef idx="0">
-            <a:schemeClr val="accent1"/>
-          </a:effectRef>
-          <a:fontRef idx="minor">
-            <a:schemeClr val="lt1"/>
-          </a:fontRef>
-        </p:style>
-        <p:txBody>
-          <a:bodyPr rtlCol="0" anchor="ctr"/>
-          <a:lstStyle/>
-          <a:p>
-            <a:pPr algn="ctr"/>
-            <a:r>
-              <a:rPr lang="en-US" sz="800" dirty="0" err="1" smtClean="0">
-                <a:solidFill>
-                  <a:schemeClr val="tx1"/>
-                </a:solidFill>
-              </a:rPr>
-              <a:t>svg</a:t>
-            </a:r>
-            <a:endParaRPr lang="en-CA" sz="800" dirty="0">
-              <a:solidFill>
-                <a:schemeClr val="tx1"/>
-              </a:solidFill>
-            </a:endParaRPr>
-          </a:p>
-        </p:txBody>
-      </p:sp>
-      <p:sp>
-        <p:nvSpPr>
-          <p:cNvPr id="16" name="Oval 15"/>
-          <p:cNvSpPr/>
-          <p:nvPr/>
-        </p:nvSpPr>
-        <p:spPr>
-          <a:xfrm>
-            <a:off x="6372200" y="1916832"/>
-            <a:ext cx="936104" cy="580737"/>
-          </a:xfrm>
-          <a:prstGeom prst="ellipse">
-            <a:avLst/>
-          </a:prstGeom>
-        </p:spPr>
-        <p:style>
-          <a:lnRef idx="2">
-            <a:schemeClr val="accent1">
-              <a:shade val="50000"/>
-            </a:schemeClr>
-          </a:lnRef>
-          <a:fillRef idx="1">
-            <a:schemeClr val="accent1"/>
-          </a:fillRef>
-          <a:effectRef idx="0">
-            <a:schemeClr val="accent1"/>
-          </a:effectRef>
-          <a:fontRef idx="minor">
-            <a:schemeClr val="lt1"/>
-          </a:fontRef>
-        </p:style>
-        <p:txBody>
-          <a:bodyPr rtlCol="0" anchor="ctr"/>
-          <a:lstStyle/>
-          <a:p>
-            <a:pPr algn="ctr"/>
-            <a:r>
-              <a:rPr lang="en-US" sz="1000" dirty="0" smtClean="0">
-                <a:solidFill>
-                  <a:schemeClr val="tx1"/>
-                </a:solidFill>
-              </a:rPr>
-              <a:t>Big Data</a:t>
-            </a:r>
-            <a:endParaRPr lang="en-CA" sz="1000" dirty="0">
-              <a:solidFill>
-                <a:schemeClr val="tx1"/>
-              </a:solidFill>
-            </a:endParaRPr>
-          </a:p>
-        </p:txBody>
-      </p:sp>
-      <p:sp>
-        <p:nvSpPr>
-          <p:cNvPr id="19" name="Oval 18"/>
-          <p:cNvSpPr/>
-          <p:nvPr/>
-        </p:nvSpPr>
-        <p:spPr>
-          <a:xfrm>
-            <a:off x="6571328" y="3045586"/>
-            <a:ext cx="1097016" cy="654398"/>
-          </a:xfrm>
-          <a:prstGeom prst="ellipse">
-            <a:avLst/>
-          </a:prstGeom>
-        </p:spPr>
-        <p:style>
-          <a:lnRef idx="2">
-            <a:schemeClr val="accent1">
-              <a:shade val="50000"/>
-            </a:schemeClr>
-          </a:lnRef>
-          <a:fillRef idx="1">
-            <a:schemeClr val="accent1"/>
-          </a:fillRef>
-          <a:effectRef idx="0">
-            <a:schemeClr val="accent1"/>
-          </a:effectRef>
-          <a:fontRef idx="minor">
-            <a:schemeClr val="lt1"/>
-          </a:fontRef>
-        </p:style>
-        <p:txBody>
-          <a:bodyPr rtlCol="0" anchor="ctr"/>
-          <a:lstStyle/>
-          <a:p>
-            <a:pPr algn="ctr"/>
-            <a:r>
-              <a:rPr lang="en-US" sz="1000" dirty="0" smtClean="0">
-                <a:solidFill>
-                  <a:schemeClr val="tx1"/>
-                </a:solidFill>
-              </a:rPr>
-              <a:t>SharePoint</a:t>
-            </a:r>
-            <a:endParaRPr lang="en-CA" sz="1000" dirty="0">
-              <a:solidFill>
-                <a:schemeClr val="tx1"/>
-              </a:solidFill>
-            </a:endParaRPr>
-          </a:p>
-        </p:txBody>
-      </p:sp>
-      <p:sp>
-        <p:nvSpPr>
-          <p:cNvPr id="21" name="Oval 20"/>
-          <p:cNvSpPr/>
-          <p:nvPr/>
-        </p:nvSpPr>
-        <p:spPr>
-          <a:xfrm>
-            <a:off x="6558771" y="4221089"/>
-            <a:ext cx="677525" cy="360039"/>
-          </a:xfrm>
-          <a:prstGeom prst="ellipse">
-            <a:avLst/>
-          </a:prstGeom>
-        </p:spPr>
-        <p:style>
-          <a:lnRef idx="2">
-            <a:schemeClr val="accent1">
-              <a:shade val="50000"/>
-            </a:schemeClr>
-          </a:lnRef>
-          <a:fillRef idx="1">
-            <a:schemeClr val="accent1"/>
-          </a:fillRef>
-          <a:effectRef idx="0">
-            <a:schemeClr val="accent1"/>
-          </a:effectRef>
-          <a:fontRef idx="minor">
-            <a:schemeClr val="lt1"/>
-          </a:fontRef>
-        </p:style>
-        <p:txBody>
-          <a:bodyPr rtlCol="0" anchor="ctr"/>
-          <a:lstStyle/>
-          <a:p>
-            <a:pPr algn="ctr"/>
-            <a:r>
-              <a:rPr lang="en-US" sz="800" dirty="0" err="1" smtClean="0">
-                <a:solidFill>
-                  <a:schemeClr val="tx1"/>
-                </a:solidFill>
-              </a:rPr>
-              <a:t>OAuth</a:t>
-            </a:r>
-            <a:endParaRPr lang="en-CA" sz="800" dirty="0">
-              <a:solidFill>
-                <a:schemeClr val="tx1"/>
-              </a:solidFill>
-            </a:endParaRPr>
-          </a:p>
-        </p:txBody>
-      </p:sp>
-      <p:sp>
-        <p:nvSpPr>
-          <p:cNvPr id="22" name="Oval 21"/>
-          <p:cNvSpPr/>
-          <p:nvPr/>
-        </p:nvSpPr>
-        <p:spPr>
-          <a:xfrm>
-            <a:off x="5346086" y="5085184"/>
-            <a:ext cx="882098" cy="360040"/>
-          </a:xfrm>
-          <a:prstGeom prst="ellipse">
-            <a:avLst/>
-          </a:prstGeom>
-        </p:spPr>
-        <p:style>
-          <a:lnRef idx="2">
-            <a:schemeClr val="accent1">
-              <a:shade val="50000"/>
-            </a:schemeClr>
-          </a:lnRef>
-          <a:fillRef idx="1">
-            <a:schemeClr val="accent1"/>
-          </a:fillRef>
-          <a:effectRef idx="0">
-            <a:schemeClr val="accent1"/>
-          </a:effectRef>
-          <a:fontRef idx="minor">
-            <a:schemeClr val="lt1"/>
-          </a:fontRef>
-        </p:style>
-        <p:txBody>
-          <a:bodyPr rtlCol="0" anchor="ctr"/>
-          <a:lstStyle/>
-          <a:p>
-            <a:pPr algn="ctr"/>
-            <a:r>
-              <a:rPr lang="en-US" sz="800" dirty="0" err="1" smtClean="0">
-                <a:solidFill>
-                  <a:schemeClr val="tx1"/>
-                </a:solidFill>
-              </a:rPr>
-              <a:t>jQuery</a:t>
-            </a:r>
-            <a:r>
-              <a:rPr lang="en-US" sz="800" dirty="0" smtClean="0">
-                <a:solidFill>
-                  <a:schemeClr val="tx1"/>
-                </a:solidFill>
-              </a:rPr>
-              <a:t> mobile</a:t>
-            </a:r>
-            <a:endParaRPr lang="en-CA" sz="800" dirty="0">
-              <a:solidFill>
-                <a:schemeClr val="tx1"/>
-              </a:solidFill>
-            </a:endParaRPr>
-          </a:p>
-        </p:txBody>
-      </p:sp>
-      <p:sp>
-        <p:nvSpPr>
-          <p:cNvPr id="23" name="Oval 22"/>
-          <p:cNvSpPr/>
-          <p:nvPr/>
-        </p:nvSpPr>
-        <p:spPr>
-          <a:xfrm>
-            <a:off x="2979376" y="5085184"/>
-            <a:ext cx="1097016" cy="654398"/>
-          </a:xfrm>
-          <a:prstGeom prst="ellipse">
-            <a:avLst/>
-          </a:prstGeom>
-        </p:spPr>
-        <p:style>
-          <a:lnRef idx="2">
-            <a:schemeClr val="accent1">
-              <a:shade val="50000"/>
-            </a:schemeClr>
-          </a:lnRef>
-          <a:fillRef idx="1">
-            <a:schemeClr val="accent1"/>
-          </a:fillRef>
-          <a:effectRef idx="0">
-            <a:schemeClr val="accent1"/>
-          </a:effectRef>
-          <a:fontRef idx="minor">
-            <a:schemeClr val="lt1"/>
-          </a:fontRef>
-        </p:style>
-        <p:txBody>
-          <a:bodyPr rtlCol="0" anchor="ctr"/>
-          <a:lstStyle/>
-          <a:p>
-            <a:pPr algn="ctr"/>
-            <a:r>
-              <a:rPr lang="en-US" sz="1000" dirty="0" smtClean="0">
-                <a:solidFill>
-                  <a:schemeClr val="tx1"/>
-                </a:solidFill>
-              </a:rPr>
-              <a:t>SQL Server 2012 New Features</a:t>
-            </a:r>
-            <a:endParaRPr lang="en-CA" sz="1000" dirty="0">
-              <a:solidFill>
-                <a:schemeClr val="tx1"/>
-              </a:solidFill>
-            </a:endParaRPr>
-          </a:p>
-        </p:txBody>
-      </p:sp>
-      <p:sp>
-        <p:nvSpPr>
-          <p:cNvPr id="25" name="Oval 24"/>
-          <p:cNvSpPr/>
-          <p:nvPr/>
-        </p:nvSpPr>
-        <p:spPr>
-          <a:xfrm>
-            <a:off x="1691680" y="4361941"/>
-            <a:ext cx="799444" cy="582390"/>
-          </a:xfrm>
-          <a:prstGeom prst="ellipse">
-            <a:avLst/>
-          </a:prstGeom>
-        </p:spPr>
-        <p:style>
-          <a:lnRef idx="2">
-            <a:schemeClr val="accent1">
-              <a:shade val="50000"/>
-            </a:schemeClr>
-          </a:lnRef>
-          <a:fillRef idx="1">
-            <a:schemeClr val="accent1"/>
-          </a:fillRef>
-          <a:effectRef idx="0">
-            <a:schemeClr val="accent1"/>
-          </a:effectRef>
-          <a:fontRef idx="minor">
-            <a:schemeClr val="lt1"/>
-          </a:fontRef>
-        </p:style>
-        <p:txBody>
-          <a:bodyPr rtlCol="0" anchor="ctr"/>
-          <a:lstStyle/>
-          <a:p>
-            <a:pPr algn="ctr"/>
-            <a:r>
-              <a:rPr lang="en-US" sz="1000" dirty="0" err="1" smtClean="0">
-                <a:solidFill>
-                  <a:schemeClr val="tx1"/>
-                </a:solidFill>
-              </a:rPr>
-              <a:t>SignalR</a:t>
-            </a:r>
-            <a:endParaRPr lang="en-CA" sz="1000" dirty="0">
-              <a:solidFill>
-                <a:schemeClr val="tx1"/>
-              </a:solidFill>
-            </a:endParaRPr>
-          </a:p>
-        </p:txBody>
-      </p:sp>
-      <p:sp>
-        <p:nvSpPr>
-          <p:cNvPr id="27" name="Oval 26"/>
-          <p:cNvSpPr/>
-          <p:nvPr/>
-        </p:nvSpPr>
-        <p:spPr>
-          <a:xfrm>
-            <a:off x="549700" y="1936622"/>
-            <a:ext cx="1952104" cy="1666202"/>
-          </a:xfrm>
-          <a:prstGeom prst="ellipse">
-            <a:avLst/>
-          </a:prstGeom>
-          <a:solidFill>
-            <a:schemeClr val="accent1">
-              <a:lumMod val="20000"/>
-              <a:lumOff val="80000"/>
-            </a:schemeClr>
-          </a:solidFill>
-          <a:ln>
-            <a:solidFill>
-              <a:schemeClr val="tx2">
-                <a:lumMod val="10000"/>
-                <a:lumOff val="90000"/>
-              </a:schemeClr>
-            </a:solidFill>
-          </a:ln>
-        </p:spPr>
-        <p:style>
-          <a:lnRef idx="2">
-            <a:schemeClr val="accent1">
-              <a:shade val="50000"/>
-            </a:schemeClr>
-          </a:lnRef>
-          <a:fillRef idx="1">
-            <a:schemeClr val="accent1"/>
-          </a:fillRef>
-          <a:effectRef idx="0">
-            <a:schemeClr val="accent1"/>
-          </a:effectRef>
-          <a:fontRef idx="minor">
-            <a:schemeClr val="lt1"/>
-          </a:fontRef>
-        </p:style>
-        <p:txBody>
-          <a:bodyPr rtlCol="0" anchor="ctr"/>
-          <a:lstStyle/>
-          <a:p>
-            <a:pPr algn="ctr"/>
-            <a:endParaRPr lang="en-CA" dirty="0"/>
-          </a:p>
-        </p:txBody>
-      </p:sp>
-      <p:sp>
-        <p:nvSpPr>
-          <p:cNvPr id="28" name="TextBox 27"/>
-          <p:cNvSpPr txBox="1"/>
-          <p:nvPr/>
-        </p:nvSpPr>
-        <p:spPr>
-          <a:xfrm>
-            <a:off x="1134782" y="2112875"/>
-            <a:ext cx="781940" cy="369332"/>
-          </a:xfrm>
-          <a:prstGeom prst="rect">
-            <a:avLst/>
-          </a:prstGeom>
-          <a:noFill/>
-        </p:spPr>
-        <p:txBody>
-          <a:bodyPr wrap="square" rtlCol="0">
-            <a:spAutoFit/>
-          </a:bodyPr>
-          <a:lstStyle/>
-          <a:p>
-            <a:r>
-              <a:rPr lang="en-US" dirty="0" smtClean="0"/>
-              <a:t>Azure</a:t>
-            </a:r>
-            <a:endParaRPr lang="en-CA" dirty="0"/>
-          </a:p>
-        </p:txBody>
-      </p:sp>
-      <p:sp>
-        <p:nvSpPr>
-          <p:cNvPr id="29" name="Oval 28"/>
-          <p:cNvSpPr/>
-          <p:nvPr/>
-        </p:nvSpPr>
-        <p:spPr>
-          <a:xfrm>
-            <a:off x="683568" y="2502833"/>
-            <a:ext cx="1097016" cy="654398"/>
-          </a:xfrm>
-          <a:prstGeom prst="ellipse">
-            <a:avLst/>
-          </a:prstGeom>
-        </p:spPr>
-        <p:style>
-          <a:lnRef idx="2">
-            <a:schemeClr val="accent1">
-              <a:shade val="50000"/>
-            </a:schemeClr>
-          </a:lnRef>
-          <a:fillRef idx="1">
-            <a:schemeClr val="accent1"/>
-          </a:fillRef>
-          <a:effectRef idx="0">
-            <a:schemeClr val="accent1"/>
-          </a:effectRef>
-          <a:fontRef idx="minor">
-            <a:schemeClr val="lt1"/>
-          </a:fontRef>
-        </p:style>
-        <p:txBody>
-          <a:bodyPr rtlCol="0" anchor="ctr"/>
-          <a:lstStyle/>
-          <a:p>
-            <a:pPr algn="ctr"/>
-            <a:r>
-              <a:rPr lang="en-US" sz="1000" dirty="0" smtClean="0">
-                <a:solidFill>
-                  <a:schemeClr val="tx1"/>
-                </a:solidFill>
-              </a:rPr>
-              <a:t>Websites</a:t>
-            </a:r>
-            <a:endParaRPr lang="en-CA" sz="1000" dirty="0">
-              <a:solidFill>
-                <a:schemeClr val="tx1"/>
-              </a:solidFill>
-            </a:endParaRPr>
-          </a:p>
-        </p:txBody>
-      </p:sp>
-      <p:sp>
-        <p:nvSpPr>
-          <p:cNvPr id="31" name="Oval 30"/>
-          <p:cNvSpPr/>
-          <p:nvPr/>
-        </p:nvSpPr>
-        <p:spPr>
-          <a:xfrm>
-            <a:off x="1725897" y="2394957"/>
-            <a:ext cx="677525" cy="360039"/>
-          </a:xfrm>
-          <a:prstGeom prst="ellipse">
-            <a:avLst/>
-          </a:prstGeom>
-        </p:spPr>
-        <p:style>
-          <a:lnRef idx="2">
-            <a:schemeClr val="accent1">
-              <a:shade val="50000"/>
-            </a:schemeClr>
-          </a:lnRef>
-          <a:fillRef idx="1">
-            <a:schemeClr val="accent1"/>
-          </a:fillRef>
-          <a:effectRef idx="0">
-            <a:schemeClr val="accent1"/>
-          </a:effectRef>
-          <a:fontRef idx="minor">
-            <a:schemeClr val="lt1"/>
-          </a:fontRef>
-        </p:style>
-        <p:txBody>
-          <a:bodyPr rtlCol="0" anchor="ctr"/>
-          <a:lstStyle/>
-          <a:p>
-            <a:pPr algn="ctr"/>
-            <a:r>
-              <a:rPr lang="en-US" sz="800" dirty="0" smtClean="0">
-                <a:solidFill>
-                  <a:schemeClr val="tx1"/>
-                </a:solidFill>
-              </a:rPr>
-              <a:t>Other…</a:t>
-            </a:r>
-            <a:endParaRPr lang="en-CA" sz="800" dirty="0">
-              <a:solidFill>
-                <a:schemeClr val="tx1"/>
-              </a:solidFill>
-            </a:endParaRPr>
-          </a:p>
-        </p:txBody>
-      </p:sp>
-      <p:sp>
-        <p:nvSpPr>
-          <p:cNvPr id="24" name="Oval 23"/>
-          <p:cNvSpPr/>
-          <p:nvPr/>
-        </p:nvSpPr>
-        <p:spPr>
-          <a:xfrm>
-            <a:off x="6882716" y="5052344"/>
-            <a:ext cx="677525" cy="248863"/>
-          </a:xfrm>
-          <a:prstGeom prst="ellipse">
-            <a:avLst/>
-          </a:prstGeom>
-        </p:spPr>
-        <p:style>
-          <a:lnRef idx="2">
-            <a:schemeClr val="accent1">
-              <a:shade val="50000"/>
-            </a:schemeClr>
-          </a:lnRef>
-          <a:fillRef idx="1">
-            <a:schemeClr val="accent1"/>
-          </a:fillRef>
-          <a:effectRef idx="0">
-            <a:schemeClr val="accent1"/>
-          </a:effectRef>
-          <a:fontRef idx="minor">
-            <a:schemeClr val="lt1"/>
-          </a:fontRef>
-        </p:style>
-        <p:txBody>
-          <a:bodyPr rtlCol="0" anchor="ctr"/>
-          <a:lstStyle/>
-          <a:p>
-            <a:pPr algn="ctr"/>
-            <a:r>
-              <a:rPr lang="en-US" sz="800" dirty="0" smtClean="0">
-                <a:solidFill>
-                  <a:schemeClr val="tx1"/>
-                </a:solidFill>
-              </a:rPr>
-              <a:t>VS ALM</a:t>
-            </a:r>
-            <a:endParaRPr lang="en-CA" sz="800" dirty="0">
-              <a:solidFill>
-                <a:schemeClr val="tx1"/>
-              </a:solidFill>
-            </a:endParaRPr>
-          </a:p>
-        </p:txBody>
-      </p:sp>
-      <p:sp>
-        <p:nvSpPr>
-          <p:cNvPr id="26" name="Oval 25"/>
-          <p:cNvSpPr/>
-          <p:nvPr/>
-        </p:nvSpPr>
-        <p:spPr>
-          <a:xfrm>
-            <a:off x="7308212" y="3760921"/>
-            <a:ext cx="720172" cy="244143"/>
-          </a:xfrm>
-          <a:prstGeom prst="ellipse">
-            <a:avLst/>
-          </a:prstGeom>
-        </p:spPr>
-        <p:style>
-          <a:lnRef idx="2">
-            <a:schemeClr val="accent1">
-              <a:shade val="50000"/>
-            </a:schemeClr>
-          </a:lnRef>
-          <a:fillRef idx="1">
-            <a:schemeClr val="accent1"/>
-          </a:fillRef>
-          <a:effectRef idx="0">
-            <a:schemeClr val="accent1"/>
-          </a:effectRef>
-          <a:fontRef idx="minor">
-            <a:schemeClr val="lt1"/>
-          </a:fontRef>
-        </p:style>
-        <p:txBody>
-          <a:bodyPr rtlCol="0" anchor="ctr"/>
-          <a:lstStyle/>
-          <a:p>
-            <a:pPr algn="ctr"/>
-            <a:r>
-              <a:rPr lang="en-US" sz="800" dirty="0" smtClean="0">
-                <a:solidFill>
-                  <a:schemeClr val="tx1"/>
-                </a:solidFill>
-              </a:rPr>
-              <a:t>MVC 4</a:t>
-            </a:r>
-            <a:endParaRPr lang="en-CA" sz="800" dirty="0">
-              <a:solidFill>
-                <a:schemeClr val="tx1"/>
-              </a:solidFill>
-            </a:endParaRPr>
-          </a:p>
-        </p:txBody>
-      </p:sp>
-      <p:sp>
-        <p:nvSpPr>
-          <p:cNvPr id="30" name="Oval 29"/>
-          <p:cNvSpPr/>
-          <p:nvPr/>
-        </p:nvSpPr>
-        <p:spPr>
-          <a:xfrm>
-            <a:off x="3256684" y="2773856"/>
-            <a:ext cx="648072" cy="271730"/>
-          </a:xfrm>
-          <a:prstGeom prst="ellipse">
-            <a:avLst/>
-          </a:prstGeom>
-        </p:spPr>
-        <p:style>
-          <a:lnRef idx="2">
-            <a:schemeClr val="accent1">
-              <a:shade val="50000"/>
-            </a:schemeClr>
-          </a:lnRef>
-          <a:fillRef idx="1">
-            <a:schemeClr val="accent1"/>
-          </a:fillRef>
-          <a:effectRef idx="0">
-            <a:schemeClr val="accent1"/>
-          </a:effectRef>
-          <a:fontRef idx="minor">
-            <a:schemeClr val="lt1"/>
-          </a:fontRef>
-        </p:style>
-        <p:txBody>
-          <a:bodyPr rtlCol="0" anchor="ctr"/>
-          <a:lstStyle/>
-          <a:p>
-            <a:pPr algn="ctr"/>
-            <a:r>
-              <a:rPr lang="en-US" sz="700" dirty="0" smtClean="0">
-                <a:solidFill>
-                  <a:schemeClr val="tx1"/>
-                </a:solidFill>
-              </a:rPr>
-              <a:t>History</a:t>
-            </a:r>
-            <a:endParaRPr lang="en-CA" sz="700" dirty="0">
-              <a:solidFill>
-                <a:schemeClr val="tx1"/>
-              </a:solidFill>
-            </a:endParaRPr>
-          </a:p>
-        </p:txBody>
-      </p:sp>
-      <p:sp>
-        <p:nvSpPr>
-          <p:cNvPr id="32" name="Rectangle 31"/>
-          <p:cNvSpPr/>
-          <p:nvPr/>
-        </p:nvSpPr>
-        <p:spPr>
-          <a:xfrm>
-            <a:off x="7092019" y="4486191"/>
-            <a:ext cx="1008374" cy="454977"/>
-          </a:xfrm>
-          <a:prstGeom prst="rect">
-            <a:avLst/>
-          </a:prstGeom>
-          <a:solidFill>
-            <a:schemeClr val="accent1">
-              <a:alpha val="0"/>
-            </a:schemeClr>
-          </a:solidFill>
-          <a:ln w="38100">
-            <a:solidFill>
-              <a:srgbClr val="002060"/>
-            </a:solidFill>
-          </a:ln>
-        </p:spPr>
-        <p:style>
-          <a:lnRef idx="2">
-            <a:schemeClr val="accent1">
-              <a:shade val="50000"/>
-            </a:schemeClr>
-          </a:lnRef>
-          <a:fillRef idx="1">
-            <a:schemeClr val="accent1"/>
-          </a:fillRef>
-          <a:effectRef idx="0">
-            <a:schemeClr val="accent1"/>
-          </a:effectRef>
-          <a:fontRef idx="minor">
-            <a:schemeClr val="lt1"/>
-          </a:fontRef>
-        </p:style>
-        <p:txBody>
-          <a:bodyPr rtlCol="0" anchor="ctr"/>
-          <a:lstStyle/>
-          <a:p>
-            <a:pPr algn="ctr"/>
-            <a:endParaRPr lang="en-CA"/>
-          </a:p>
-        </p:txBody>
-      </p:sp>
-      <p:sp>
-        <p:nvSpPr>
-          <p:cNvPr id="33" name="TextBox 32"/>
-          <p:cNvSpPr txBox="1"/>
-          <p:nvPr/>
-        </p:nvSpPr>
-        <p:spPr>
-          <a:xfrm>
-            <a:off x="3638320" y="2745704"/>
-            <a:ext cx="278478" cy="369332"/>
-          </a:xfrm>
-          <a:prstGeom prst="rect">
-            <a:avLst/>
-          </a:prstGeom>
-          <a:noFill/>
-        </p:spPr>
-        <p:txBody>
-          <a:bodyPr wrap="square" rtlCol="0">
-            <a:spAutoFit/>
-          </a:bodyPr>
-          <a:lstStyle/>
-          <a:p>
-            <a:r>
-              <a:rPr lang="en-US" dirty="0" smtClean="0">
-                <a:latin typeface="Wingdings" pitchFamily="2" charset="2"/>
-              </a:rPr>
-              <a:t>ü</a:t>
-            </a:r>
-            <a:endParaRPr lang="en-CA" dirty="0">
-              <a:latin typeface="Wingdings" pitchFamily="2" charset="2"/>
-            </a:endParaRPr>
-          </a:p>
-        </p:txBody>
-      </p:sp>
-      <p:sp>
-        <p:nvSpPr>
-          <p:cNvPr id="34" name="TextBox 33"/>
-          <p:cNvSpPr txBox="1"/>
-          <p:nvPr/>
-        </p:nvSpPr>
-        <p:spPr>
-          <a:xfrm>
-            <a:off x="5434653" y="3871624"/>
-            <a:ext cx="278478" cy="369332"/>
-          </a:xfrm>
-          <a:prstGeom prst="rect">
-            <a:avLst/>
-          </a:prstGeom>
-          <a:noFill/>
-        </p:spPr>
-        <p:txBody>
-          <a:bodyPr wrap="square" rtlCol="0">
-            <a:spAutoFit/>
-          </a:bodyPr>
-          <a:lstStyle/>
-          <a:p>
-            <a:r>
-              <a:rPr lang="en-US" dirty="0" smtClean="0">
-                <a:latin typeface="Wingdings" pitchFamily="2" charset="2"/>
-              </a:rPr>
-              <a:t>ü</a:t>
-            </a:r>
-            <a:endParaRPr lang="en-CA" dirty="0">
-              <a:latin typeface="Wingdings" pitchFamily="2" charset="2"/>
-            </a:endParaRPr>
-          </a:p>
-        </p:txBody>
-      </p:sp>
-      <p:sp>
-        <p:nvSpPr>
-          <p:cNvPr id="35" name="TextBox 34"/>
-          <p:cNvSpPr txBox="1"/>
-          <p:nvPr/>
-        </p:nvSpPr>
-        <p:spPr>
-          <a:xfrm>
-            <a:off x="4099673" y="4056290"/>
-            <a:ext cx="278478" cy="369332"/>
-          </a:xfrm>
-          <a:prstGeom prst="rect">
-            <a:avLst/>
-          </a:prstGeom>
-          <a:noFill/>
-        </p:spPr>
-        <p:txBody>
-          <a:bodyPr wrap="square" rtlCol="0">
-            <a:spAutoFit/>
-          </a:bodyPr>
-          <a:lstStyle/>
-          <a:p>
-            <a:r>
-              <a:rPr lang="en-US" dirty="0" smtClean="0">
-                <a:latin typeface="Wingdings" pitchFamily="2" charset="2"/>
-              </a:rPr>
-              <a:t>ü</a:t>
-            </a:r>
-            <a:endParaRPr lang="en-CA" dirty="0">
-              <a:latin typeface="Wingdings" pitchFamily="2" charset="2"/>
-            </a:endParaRPr>
-          </a:p>
-        </p:txBody>
-      </p:sp>
-      <p:sp>
-        <p:nvSpPr>
-          <p:cNvPr id="36" name="TextBox 35"/>
-          <p:cNvSpPr txBox="1"/>
-          <p:nvPr/>
-        </p:nvSpPr>
-        <p:spPr>
-          <a:xfrm>
-            <a:off x="5713131" y="2766370"/>
-            <a:ext cx="278478" cy="369332"/>
-          </a:xfrm>
-          <a:prstGeom prst="rect">
-            <a:avLst/>
-          </a:prstGeom>
-          <a:noFill/>
-        </p:spPr>
-        <p:txBody>
-          <a:bodyPr wrap="square" rtlCol="0">
-            <a:spAutoFit/>
-          </a:bodyPr>
-          <a:lstStyle/>
-          <a:p>
-            <a:r>
-              <a:rPr lang="en-US" dirty="0" smtClean="0">
-                <a:latin typeface="Wingdings" pitchFamily="2" charset="2"/>
-              </a:rPr>
-              <a:t>ü</a:t>
-            </a:r>
-            <a:endParaRPr lang="en-CA" dirty="0">
-              <a:latin typeface="Wingdings" pitchFamily="2" charset="2"/>
-            </a:endParaRPr>
-          </a:p>
-        </p:txBody>
-      </p:sp>
-      <p:sp>
-        <p:nvSpPr>
-          <p:cNvPr id="37" name="Oval 36"/>
-          <p:cNvSpPr/>
-          <p:nvPr/>
-        </p:nvSpPr>
-        <p:spPr>
-          <a:xfrm>
-            <a:off x="7146286" y="4509120"/>
-            <a:ext cx="882098" cy="360040"/>
-          </a:xfrm>
-          <a:prstGeom prst="ellipse">
-            <a:avLst/>
-          </a:prstGeom>
-        </p:spPr>
-        <p:style>
-          <a:lnRef idx="2">
-            <a:schemeClr val="accent1">
-              <a:shade val="50000"/>
-            </a:schemeClr>
-          </a:lnRef>
-          <a:fillRef idx="1">
-            <a:schemeClr val="accent1"/>
-          </a:fillRef>
-          <a:effectRef idx="0">
-            <a:schemeClr val="accent1"/>
-          </a:effectRef>
-          <a:fontRef idx="minor">
-            <a:schemeClr val="lt1"/>
-          </a:fontRef>
-        </p:style>
-        <p:txBody>
-          <a:bodyPr rtlCol="0" anchor="ctr"/>
-          <a:lstStyle/>
-          <a:p>
-            <a:pPr algn="ctr"/>
-            <a:r>
-              <a:rPr lang="en-US" sz="800" dirty="0" smtClean="0">
-                <a:solidFill>
-                  <a:schemeClr val="tx1"/>
-                </a:solidFill>
-              </a:rPr>
-              <a:t>Mobile general</a:t>
-            </a:r>
-            <a:endParaRPr lang="en-CA" sz="800" dirty="0">
-              <a:solidFill>
-                <a:schemeClr val="tx1"/>
-              </a:solidFill>
-            </a:endParaRPr>
-          </a:p>
-        </p:txBody>
-      </p:sp>
-      <p:sp>
-        <p:nvSpPr>
-          <p:cNvPr id="38" name="TextBox 37"/>
-          <p:cNvSpPr txBox="1"/>
-          <p:nvPr/>
-        </p:nvSpPr>
-        <p:spPr>
-          <a:xfrm>
-            <a:off x="1413202" y="2645366"/>
-            <a:ext cx="278478" cy="369332"/>
-          </a:xfrm>
-          <a:prstGeom prst="rect">
-            <a:avLst/>
-          </a:prstGeom>
-          <a:noFill/>
-        </p:spPr>
-        <p:txBody>
-          <a:bodyPr wrap="square" rtlCol="0">
-            <a:spAutoFit/>
-          </a:bodyPr>
-          <a:lstStyle/>
-          <a:p>
-            <a:r>
-              <a:rPr lang="en-US" dirty="0" smtClean="0">
-                <a:latin typeface="Wingdings" pitchFamily="2" charset="2"/>
-              </a:rPr>
-              <a:t>ü</a:t>
-            </a:r>
-            <a:endParaRPr lang="en-CA" dirty="0">
-              <a:latin typeface="Wingdings" pitchFamily="2" charset="2"/>
-            </a:endParaRPr>
-          </a:p>
-        </p:txBody>
-      </p:sp>
-      <p:sp>
-        <p:nvSpPr>
-          <p:cNvPr id="39" name="TextBox 38"/>
-          <p:cNvSpPr txBox="1"/>
-          <p:nvPr/>
-        </p:nvSpPr>
-        <p:spPr>
-          <a:xfrm>
-            <a:off x="2091402" y="2472351"/>
-            <a:ext cx="278478" cy="369332"/>
-          </a:xfrm>
-          <a:prstGeom prst="rect">
-            <a:avLst/>
-          </a:prstGeom>
-          <a:noFill/>
-        </p:spPr>
-        <p:txBody>
-          <a:bodyPr wrap="square" rtlCol="0">
-            <a:spAutoFit/>
-          </a:bodyPr>
-          <a:lstStyle/>
-          <a:p>
-            <a:r>
-              <a:rPr lang="en-US" dirty="0" smtClean="0">
-                <a:effectLst>
-                  <a:glow rad="127000">
-                    <a:schemeClr val="accent1">
-                      <a:alpha val="43000"/>
-                    </a:schemeClr>
-                  </a:glow>
-                </a:effectLst>
-                <a:latin typeface="Wingdings" pitchFamily="2" charset="2"/>
-              </a:rPr>
-              <a:t>ü</a:t>
-            </a:r>
-            <a:endParaRPr lang="en-CA" dirty="0">
-              <a:effectLst>
-                <a:glow rad="127000">
-                  <a:schemeClr val="accent1">
-                    <a:alpha val="43000"/>
-                  </a:schemeClr>
-                </a:glow>
-              </a:effectLst>
-              <a:latin typeface="Wingdings" pitchFamily="2" charset="2"/>
-            </a:endParaRPr>
-          </a:p>
-        </p:txBody>
-      </p:sp>
-      <p:sp>
-        <p:nvSpPr>
-          <p:cNvPr id="40" name="Oval 39"/>
-          <p:cNvSpPr/>
-          <p:nvPr/>
-        </p:nvSpPr>
-        <p:spPr>
-          <a:xfrm>
-            <a:off x="5578700" y="5615150"/>
-            <a:ext cx="649484" cy="248863"/>
-          </a:xfrm>
-          <a:prstGeom prst="ellipse">
-            <a:avLst/>
-          </a:prstGeom>
-        </p:spPr>
-        <p:style>
-          <a:lnRef idx="2">
-            <a:schemeClr val="accent1">
-              <a:shade val="50000"/>
-            </a:schemeClr>
-          </a:lnRef>
-          <a:fillRef idx="1">
-            <a:schemeClr val="accent1"/>
-          </a:fillRef>
-          <a:effectRef idx="0">
-            <a:schemeClr val="accent1"/>
-          </a:effectRef>
-          <a:fontRef idx="minor">
-            <a:schemeClr val="lt1"/>
-          </a:fontRef>
-        </p:style>
-        <p:txBody>
-          <a:bodyPr rtlCol="0" anchor="ctr"/>
-          <a:lstStyle/>
-          <a:p>
-            <a:pPr algn="ctr"/>
-            <a:r>
-              <a:rPr lang="en-US" sz="800" dirty="0" err="1" smtClean="0">
-                <a:solidFill>
-                  <a:schemeClr val="tx1"/>
-                </a:solidFill>
-              </a:rPr>
-              <a:t>Nuget</a:t>
-            </a:r>
-            <a:endParaRPr lang="en-CA" sz="800" dirty="0">
-              <a:solidFill>
-                <a:schemeClr val="tx1"/>
-              </a:solidFill>
-            </a:endParaRPr>
-          </a:p>
-        </p:txBody>
-      </p:sp>
-      <p:sp>
-        <p:nvSpPr>
-          <p:cNvPr id="41" name="Oval 40"/>
-          <p:cNvSpPr/>
-          <p:nvPr/>
-        </p:nvSpPr>
-        <p:spPr>
-          <a:xfrm>
-            <a:off x="6347211" y="5615150"/>
-            <a:ext cx="649484" cy="248863"/>
-          </a:xfrm>
-          <a:prstGeom prst="ellipse">
-            <a:avLst/>
-          </a:prstGeom>
-        </p:spPr>
-        <p:style>
-          <a:lnRef idx="2">
-            <a:schemeClr val="accent1">
-              <a:shade val="50000"/>
-            </a:schemeClr>
-          </a:lnRef>
-          <a:fillRef idx="1">
-            <a:schemeClr val="accent1"/>
-          </a:fillRef>
-          <a:effectRef idx="0">
-            <a:schemeClr val="accent1"/>
-          </a:effectRef>
-          <a:fontRef idx="minor">
-            <a:schemeClr val="lt1"/>
-          </a:fontRef>
-        </p:style>
-        <p:txBody>
-          <a:bodyPr rtlCol="0" anchor="ctr"/>
-          <a:lstStyle/>
-          <a:p>
-            <a:pPr algn="ctr"/>
-            <a:r>
-              <a:rPr lang="en-US" sz="800" dirty="0" err="1" smtClean="0">
-                <a:solidFill>
-                  <a:schemeClr val="tx1"/>
-                </a:solidFill>
-              </a:rPr>
-              <a:t>Git</a:t>
-            </a:r>
-            <a:endParaRPr lang="en-CA" sz="800" dirty="0">
-              <a:solidFill>
-                <a:schemeClr val="tx1"/>
-              </a:solidFill>
-            </a:endParaRPr>
-          </a:p>
-        </p:txBody>
-      </p:sp>
-      <p:sp>
-        <p:nvSpPr>
-          <p:cNvPr id="42" name="Oval 41"/>
-          <p:cNvSpPr/>
-          <p:nvPr/>
-        </p:nvSpPr>
-        <p:spPr>
-          <a:xfrm>
-            <a:off x="7086563" y="5615149"/>
-            <a:ext cx="649484" cy="248863"/>
-          </a:xfrm>
-          <a:prstGeom prst="ellipse">
-            <a:avLst/>
-          </a:prstGeom>
-        </p:spPr>
-        <p:style>
-          <a:lnRef idx="2">
-            <a:schemeClr val="accent1">
-              <a:shade val="50000"/>
-            </a:schemeClr>
-          </a:lnRef>
-          <a:fillRef idx="1">
-            <a:schemeClr val="accent1"/>
-          </a:fillRef>
-          <a:effectRef idx="0">
-            <a:schemeClr val="accent1"/>
-          </a:effectRef>
-          <a:fontRef idx="minor">
-            <a:schemeClr val="lt1"/>
-          </a:fontRef>
-        </p:style>
-        <p:txBody>
-          <a:bodyPr rtlCol="0" anchor="ctr"/>
-          <a:lstStyle/>
-          <a:p>
-            <a:pPr algn="ctr"/>
-            <a:r>
-              <a:rPr lang="en-US" sz="800" dirty="0" err="1" smtClean="0">
-                <a:solidFill>
-                  <a:schemeClr val="tx1"/>
-                </a:solidFill>
-              </a:rPr>
-              <a:t>Bitly</a:t>
-            </a:r>
-            <a:endParaRPr lang="en-CA" sz="800" dirty="0">
-              <a:solidFill>
-                <a:schemeClr val="tx1"/>
-              </a:solidFill>
-            </a:endParaRPr>
-          </a:p>
-        </p:txBody>
-      </p:sp>
-      <p:sp>
-        <p:nvSpPr>
-          <p:cNvPr id="43" name="Oval 42"/>
-          <p:cNvSpPr/>
-          <p:nvPr/>
-        </p:nvSpPr>
-        <p:spPr>
-          <a:xfrm>
-            <a:off x="4499991" y="4509120"/>
-            <a:ext cx="828092" cy="360040"/>
-          </a:xfrm>
-          <a:prstGeom prst="ellipse">
-            <a:avLst/>
-          </a:prstGeom>
-        </p:spPr>
-        <p:style>
-          <a:lnRef idx="2">
-            <a:schemeClr val="accent1">
-              <a:shade val="50000"/>
-            </a:schemeClr>
-          </a:lnRef>
-          <a:fillRef idx="1">
-            <a:schemeClr val="accent1"/>
-          </a:fillRef>
-          <a:effectRef idx="0">
-            <a:schemeClr val="accent1"/>
-          </a:effectRef>
-          <a:fontRef idx="minor">
-            <a:schemeClr val="lt1"/>
-          </a:fontRef>
-        </p:style>
-        <p:txBody>
-          <a:bodyPr rtlCol="0" anchor="ctr"/>
-          <a:lstStyle/>
-          <a:p>
-            <a:pPr algn="ctr"/>
-            <a:r>
-              <a:rPr lang="en-US" sz="800" dirty="0" smtClean="0">
-                <a:solidFill>
-                  <a:schemeClr val="tx1"/>
-                </a:solidFill>
-              </a:rPr>
-              <a:t>Browser</a:t>
-            </a:r>
-          </a:p>
-          <a:p>
-            <a:pPr algn="ctr"/>
-            <a:r>
-              <a:rPr lang="en-US" sz="800" dirty="0" smtClean="0">
-                <a:solidFill>
-                  <a:schemeClr val="tx1"/>
-                </a:solidFill>
-              </a:rPr>
-              <a:t>Support</a:t>
-            </a:r>
-            <a:endParaRPr lang="en-CA" sz="800" dirty="0">
-              <a:solidFill>
-                <a:schemeClr val="tx1"/>
-              </a:solidFill>
-            </a:endParaRPr>
-          </a:p>
-        </p:txBody>
-      </p:sp>
-      <p:sp>
-        <p:nvSpPr>
-          <p:cNvPr id="44" name="TextBox 43"/>
-          <p:cNvSpPr txBox="1"/>
-          <p:nvPr/>
-        </p:nvSpPr>
-        <p:spPr>
-          <a:xfrm>
-            <a:off x="5040052" y="4520449"/>
-            <a:ext cx="278478" cy="369332"/>
-          </a:xfrm>
-          <a:prstGeom prst="rect">
-            <a:avLst/>
-          </a:prstGeom>
-          <a:noFill/>
-        </p:spPr>
-        <p:txBody>
-          <a:bodyPr wrap="square" rtlCol="0">
-            <a:spAutoFit/>
-          </a:bodyPr>
-          <a:lstStyle/>
-          <a:p>
-            <a:r>
-              <a:rPr lang="en-US" dirty="0" smtClean="0">
-                <a:latin typeface="Wingdings" pitchFamily="2" charset="2"/>
-              </a:rPr>
-              <a:t>ü</a:t>
-            </a:r>
-            <a:endParaRPr lang="en-CA" dirty="0">
-              <a:latin typeface="Wingdings" pitchFamily="2" charset="2"/>
-            </a:endParaRPr>
-          </a:p>
-        </p:txBody>
-      </p:sp>
-      <p:sp>
-        <p:nvSpPr>
-          <p:cNvPr id="45" name="Oval 44"/>
-          <p:cNvSpPr/>
-          <p:nvPr/>
-        </p:nvSpPr>
-        <p:spPr>
-          <a:xfrm>
-            <a:off x="4614053" y="3198482"/>
-            <a:ext cx="762999" cy="208339"/>
-          </a:xfrm>
-          <a:prstGeom prst="ellipse">
-            <a:avLst/>
-          </a:prstGeom>
-        </p:spPr>
-        <p:style>
-          <a:lnRef idx="2">
-            <a:schemeClr val="accent1">
-              <a:shade val="50000"/>
-            </a:schemeClr>
-          </a:lnRef>
-          <a:fillRef idx="1">
-            <a:schemeClr val="accent1"/>
-          </a:fillRef>
-          <a:effectRef idx="0">
-            <a:schemeClr val="accent1"/>
-          </a:effectRef>
-          <a:fontRef idx="minor">
-            <a:schemeClr val="lt1"/>
-          </a:fontRef>
-        </p:style>
-        <p:txBody>
-          <a:bodyPr rtlCol="0" anchor="ctr"/>
-          <a:lstStyle/>
-          <a:p>
-            <a:pPr algn="ctr"/>
-            <a:r>
-              <a:rPr lang="en-US" sz="800" dirty="0" smtClean="0">
-                <a:solidFill>
-                  <a:schemeClr val="tx1"/>
-                </a:solidFill>
-              </a:rPr>
-              <a:t>storage</a:t>
-            </a:r>
-            <a:endParaRPr lang="en-CA" sz="800" dirty="0">
-              <a:solidFill>
-                <a:schemeClr val="tx1"/>
-              </a:solidFill>
-            </a:endParaRPr>
-          </a:p>
-        </p:txBody>
-      </p:sp>
-      <p:sp>
-        <p:nvSpPr>
-          <p:cNvPr id="46" name="Oval 45"/>
-          <p:cNvSpPr/>
-          <p:nvPr/>
-        </p:nvSpPr>
-        <p:spPr>
-          <a:xfrm>
-            <a:off x="2879812" y="3192765"/>
-            <a:ext cx="700908" cy="180020"/>
-          </a:xfrm>
-          <a:prstGeom prst="ellipse">
-            <a:avLst/>
-          </a:prstGeom>
-        </p:spPr>
-        <p:style>
-          <a:lnRef idx="2">
-            <a:schemeClr val="accent1">
-              <a:shade val="50000"/>
-            </a:schemeClr>
-          </a:lnRef>
-          <a:fillRef idx="1">
-            <a:schemeClr val="accent1"/>
-          </a:fillRef>
-          <a:effectRef idx="0">
-            <a:schemeClr val="accent1"/>
-          </a:effectRef>
-          <a:fontRef idx="minor">
-            <a:schemeClr val="lt1"/>
-          </a:fontRef>
-        </p:style>
-        <p:txBody>
-          <a:bodyPr rtlCol="0" anchor="ctr"/>
-          <a:lstStyle/>
-          <a:p>
-            <a:pPr algn="ctr"/>
-            <a:r>
-              <a:rPr lang="en-US" sz="800" dirty="0" smtClean="0">
-                <a:solidFill>
-                  <a:schemeClr val="tx1"/>
-                </a:solidFill>
-              </a:rPr>
-              <a:t>offline</a:t>
-            </a:r>
-            <a:endParaRPr lang="en-CA" sz="800" dirty="0">
-              <a:solidFill>
-                <a:schemeClr val="tx1"/>
-              </a:solidFill>
-            </a:endParaRPr>
-          </a:p>
-        </p:txBody>
-      </p:sp>
-      <p:sp>
-        <p:nvSpPr>
-          <p:cNvPr id="47" name="TextBox 46"/>
-          <p:cNvSpPr txBox="1"/>
-          <p:nvPr/>
-        </p:nvSpPr>
-        <p:spPr>
-          <a:xfrm>
-            <a:off x="5684885" y="3401070"/>
-            <a:ext cx="278478" cy="369332"/>
-          </a:xfrm>
-          <a:prstGeom prst="rect">
-            <a:avLst/>
-          </a:prstGeom>
-          <a:noFill/>
-        </p:spPr>
-        <p:txBody>
-          <a:bodyPr wrap="square" rtlCol="0">
-            <a:spAutoFit/>
-          </a:bodyPr>
-          <a:lstStyle/>
-          <a:p>
-            <a:r>
-              <a:rPr lang="en-US" dirty="0" smtClean="0">
-                <a:solidFill>
-                  <a:schemeClr val="bg2"/>
-                </a:solidFill>
-                <a:latin typeface="Wingdings" pitchFamily="2" charset="2"/>
-              </a:rPr>
-              <a:t>ü</a:t>
-            </a:r>
-            <a:endParaRPr lang="en-CA" dirty="0">
-              <a:solidFill>
-                <a:schemeClr val="bg2"/>
-              </a:solidFill>
-              <a:latin typeface="Wingdings" pitchFamily="2" charset="2"/>
-            </a:endParaRPr>
           </a:p>
         </p:txBody>
       </p:sp>
     </p:spTree>
     <p:extLst>
       <p:ext uri="{BB962C8B-B14F-4D97-AF65-F5344CB8AC3E}">
-        <p14:creationId xmlns:p14="http://schemas.microsoft.com/office/powerpoint/2010/main" val="3016743377"/>
+        <p14:creationId xmlns:p14="http://schemas.microsoft.com/office/powerpoint/2010/main" val="1419882203"/>
       </p:ext>
     </p:extLst>
   </p:cSld>
@@ -22644,134 +20651,9 @@
   <p:timing>
     <p:tnLst>
       <p:par>
-        <p:cTn id="1" dur="indefinite" restart="never" nodeType="tmRoot">
-          <p:childTnLst>
-            <p:seq concurrent="1" nextAc="seek">
-              <p:cTn id="2" dur="indefinite" nodeType="mainSeq">
-                <p:childTnLst>
-                  <p:par>
-                    <p:cTn id="3" fill="hold">
-                      <p:stCondLst>
-                        <p:cond delay="indefinite"/>
-                      </p:stCondLst>
-                      <p:childTnLst>
-                        <p:par>
-                          <p:cTn id="4" fill="hold">
-                            <p:stCondLst>
-                              <p:cond delay="0"/>
-                            </p:stCondLst>
-                            <p:childTnLst>
-                              <p:par>
-                                <p:cTn id="5" presetID="42" presetClass="entr" presetSubtype="0" fill="hold" grpId="0" nodeType="clickEffect">
-                                  <p:stCondLst>
-                                    <p:cond delay="0"/>
-                                  </p:stCondLst>
-                                  <p:childTnLst>
-                                    <p:set>
-                                      <p:cBhvr>
-                                        <p:cTn id="6" dur="1" fill="hold">
-                                          <p:stCondLst>
-                                            <p:cond delay="0"/>
-                                          </p:stCondLst>
-                                        </p:cTn>
-                                        <p:tgtEl>
-                                          <p:spTgt spid="32"/>
-                                        </p:tgtEl>
-                                        <p:attrNameLst>
-                                          <p:attrName>style.visibility</p:attrName>
-                                        </p:attrNameLst>
-                                      </p:cBhvr>
-                                      <p:to>
-                                        <p:strVal val="visible"/>
-                                      </p:to>
-                                    </p:set>
-                                    <p:animEffect transition="in" filter="fade">
-                                      <p:cBhvr>
-                                        <p:cTn id="7" dur="1000"/>
-                                        <p:tgtEl>
-                                          <p:spTgt spid="32"/>
-                                        </p:tgtEl>
-                                      </p:cBhvr>
-                                    </p:animEffect>
-                                    <p:anim calcmode="lin" valueType="num">
-                                      <p:cBhvr>
-                                        <p:cTn id="8" dur="1000" fill="hold"/>
-                                        <p:tgtEl>
-                                          <p:spTgt spid="32"/>
-                                        </p:tgtEl>
-                                        <p:attrNameLst>
-                                          <p:attrName>ppt_x</p:attrName>
-                                        </p:attrNameLst>
-                                      </p:cBhvr>
-                                      <p:tavLst>
-                                        <p:tav tm="0">
-                                          <p:val>
-                                            <p:strVal val="#ppt_x"/>
-                                          </p:val>
-                                        </p:tav>
-                                        <p:tav tm="100000">
-                                          <p:val>
-                                            <p:strVal val="#ppt_x"/>
-                                          </p:val>
-                                        </p:tav>
-                                      </p:tavLst>
-                                    </p:anim>
-                                    <p:anim calcmode="lin" valueType="num">
-                                      <p:cBhvr>
-                                        <p:cTn id="9" dur="1000" fill="hold"/>
-                                        <p:tgtEl>
-                                          <p:spTgt spid="32"/>
-                                        </p:tgtEl>
-                                        <p:attrNameLst>
-                                          <p:attrName>ppt_y</p:attrName>
-                                        </p:attrNameLst>
-                                      </p:cBhvr>
-                                      <p:tavLst>
-                                        <p:tav tm="0">
-                                          <p:val>
-                                            <p:strVal val="#ppt_y+.1"/>
-                                          </p:val>
-                                        </p:tav>
-                                        <p:tav tm="100000">
-                                          <p:val>
-                                            <p:strVal val="#ppt_y"/>
-                                          </p:val>
-                                        </p:tav>
-                                      </p:tavLst>
-                                    </p:anim>
-                                  </p:childTnLst>
-                                </p:cTn>
-                              </p:par>
-                            </p:childTnLst>
-                          </p:cTn>
-                        </p:par>
-                      </p:childTnLst>
-                    </p:cTn>
-                  </p:par>
-                </p:childTnLst>
-              </p:cTn>
-              <p:prevCondLst>
-                <p:cond evt="onPrev" delay="0">
-                  <p:tgtEl>
-                    <p:sldTgt/>
-                  </p:tgtEl>
-                </p:cond>
-              </p:prevCondLst>
-              <p:nextCondLst>
-                <p:cond evt="onNext" delay="0">
-                  <p:tgtEl>
-                    <p:sldTgt/>
-                  </p:tgtEl>
-                </p:cond>
-              </p:nextCondLst>
-            </p:seq>
-          </p:childTnLst>
-        </p:cTn>
+        <p:cTn id="1" dur="indefinite" restart="never" nodeType="tmRoot"/>
       </p:par>
     </p:tnLst>
-    <p:bldLst>
-      <p:bldP spid="32" grpId="0" animBg="1"/>
-    </p:bldLst>
   </p:timing>
 </p:sld>
 </file>
@@ -22833,202 +20715,6 @@
           <a:lstStyle/>
           <a:p>
             <a:r>
-              <a:rPr lang="en-CA" dirty="0"/>
-              <a:t>Mobile</a:t>
-            </a:r>
-          </a:p>
-        </p:txBody>
-      </p:sp>
-      <p:sp>
-        <p:nvSpPr>
-          <p:cNvPr id="4" name="Content Placeholder 3"/>
-          <p:cNvSpPr>
-            <a:spLocks noGrp="1"/>
-          </p:cNvSpPr>
-          <p:nvPr>
-            <p:ph sz="quarter" idx="13"/>
-          </p:nvPr>
-        </p:nvSpPr>
-        <p:spPr>
-          <a:xfrm>
-            <a:off x="979488" y="1630362"/>
-            <a:ext cx="6697663" cy="4534941"/>
-          </a:xfrm>
-        </p:spPr>
-        <p:txBody>
-          <a:bodyPr>
-            <a:normAutofit/>
-          </a:bodyPr>
-          <a:lstStyle/>
-          <a:p>
-            <a:r>
-              <a:rPr lang="en-CA" dirty="0" smtClean="0"/>
-              <a:t>Concentration </a:t>
-            </a:r>
-            <a:r>
-              <a:rPr lang="en-CA" dirty="0"/>
-              <a:t>on HTML5 including CSS3 for formatting with mobile in mind</a:t>
-            </a:r>
-          </a:p>
-          <a:p>
-            <a:r>
-              <a:rPr lang="en-CA" dirty="0" smtClean="0"/>
-              <a:t>3 good takeaways</a:t>
-            </a:r>
-          </a:p>
-          <a:p>
-            <a:pPr lvl="1"/>
-            <a:r>
-              <a:rPr lang="en-CA" dirty="0" smtClean="0"/>
-              <a:t>JSON for serialized data for smaller payload</a:t>
-            </a:r>
-          </a:p>
-          <a:p>
-            <a:pPr lvl="1"/>
-            <a:r>
-              <a:rPr lang="en-CA" dirty="0" smtClean="0">
-                <a:hlinkClick r:id="rId3"/>
-              </a:rPr>
-              <a:t>Opera mobile emulator</a:t>
-            </a:r>
-            <a:endParaRPr lang="en-CA" dirty="0" smtClean="0"/>
-          </a:p>
-          <a:p>
-            <a:pPr lvl="1"/>
-            <a:r>
-              <a:rPr lang="en-CA" dirty="0" smtClean="0"/>
-              <a:t>By default, add the below “</a:t>
-            </a:r>
-            <a:r>
-              <a:rPr lang="en-CA" dirty="0" smtClean="0">
-                <a:hlinkClick r:id="rId4"/>
-              </a:rPr>
-              <a:t>viewport</a:t>
-            </a:r>
-            <a:r>
-              <a:rPr lang="en-CA" dirty="0" smtClean="0"/>
-              <a:t>” to all web pages:</a:t>
-            </a:r>
-          </a:p>
-          <a:p>
-            <a:pPr lvl="2"/>
-            <a:r>
-              <a:rPr lang="en-CA" dirty="0" smtClean="0"/>
-              <a:t>&lt;</a:t>
-            </a:r>
-            <a:r>
-              <a:rPr lang="en-CA" dirty="0"/>
-              <a:t>meta name="viewport" content="</a:t>
-            </a:r>
-            <a:r>
-              <a:rPr lang="en-CA" dirty="0" smtClean="0"/>
-              <a:t>width=device-width"&gt;</a:t>
-            </a:r>
-            <a:endParaRPr lang="en-CA" dirty="0"/>
-          </a:p>
-          <a:p>
-            <a:r>
-              <a:rPr lang="en-CA" dirty="0" smtClean="0"/>
-              <a:t>Demo 6</a:t>
-            </a:r>
-          </a:p>
-          <a:p>
-            <a:pPr lvl="1"/>
-            <a:r>
-              <a:rPr lang="en-CA" dirty="0" smtClean="0">
-                <a:hlinkClick r:id="rId5" action="ppaction://hlinkfile"/>
-              </a:rPr>
-              <a:t>Opera mobile emulator</a:t>
-            </a:r>
-            <a:endParaRPr lang="en-CA" dirty="0" smtClean="0"/>
-          </a:p>
-          <a:p>
-            <a:pPr lvl="1"/>
-            <a:r>
-              <a:rPr lang="en-CA" dirty="0" smtClean="0"/>
-              <a:t>Page with and without meta tag</a:t>
-            </a:r>
-            <a:endParaRPr lang="en-CA" dirty="0"/>
-          </a:p>
-        </p:txBody>
-      </p:sp>
-    </p:spTree>
-    <p:extLst>
-      <p:ext uri="{BB962C8B-B14F-4D97-AF65-F5344CB8AC3E}">
-        <p14:creationId xmlns:p14="http://schemas.microsoft.com/office/powerpoint/2010/main" val="3103964138"/>
-      </p:ext>
-    </p:extLst>
-  </p:cSld>
-  <p:clrMapOvr>
-    <a:masterClrMapping/>
-  </p:clrMapOvr>
-  <p:timing>
-    <p:tnLst>
-      <p:par>
-        <p:cTn id="1" dur="indefinite" restart="never" nodeType="tmRoot"/>
-      </p:par>
-    </p:tnLst>
-  </p:timing>
-</p:sld>
-</file>
-
-<file path=ppt/slides/slide22.xml><?xml version="1.0" encoding="utf-8"?>
-<p:sld xmlns:a="http://schemas.openxmlformats.org/drawingml/2006/main" xmlns:r="http://schemas.openxmlformats.org/officeDocument/2006/relationships" xmlns:p="http://schemas.openxmlformats.org/presentationml/2006/main">
-  <p:cSld>
-    <p:spTree>
-      <p:nvGrpSpPr>
-        <p:cNvPr id="1" name=""/>
-        <p:cNvGrpSpPr/>
-        <p:nvPr/>
-      </p:nvGrpSpPr>
-      <p:grpSpPr>
-        <a:xfrm>
-          <a:off x="0" y="0"/>
-          <a:ext cx="0" cy="0"/>
-          <a:chOff x="0" y="0"/>
-          <a:chExt cx="0" cy="0"/>
-        </a:xfrm>
-      </p:grpSpPr>
-      <p:sp>
-        <p:nvSpPr>
-          <p:cNvPr id="2" name="Slide Number Placeholder 1"/>
-          <p:cNvSpPr>
-            <a:spLocks noGrp="1"/>
-          </p:cNvSpPr>
-          <p:nvPr>
-            <p:ph type="sldNum" sz="quarter" idx="12"/>
-          </p:nvPr>
-        </p:nvSpPr>
-        <p:spPr/>
-        <p:txBody>
-          <a:bodyPr/>
-          <a:lstStyle/>
-          <a:p>
-            <a:fld id="{1D72EBF8-7CF5-44B7-B2BF-E22DE4D0703D}" type="slidenum">
-              <a:rPr lang="en-US" smtClean="0"/>
-              <a:pPr/>
-              <a:t>21</a:t>
-            </a:fld>
-            <a:endParaRPr lang="en-US"/>
-          </a:p>
-        </p:txBody>
-      </p:sp>
-      <p:sp>
-        <p:nvSpPr>
-          <p:cNvPr id="3" name="Title 2"/>
-          <p:cNvSpPr>
-            <a:spLocks noGrp="1"/>
-          </p:cNvSpPr>
-          <p:nvPr>
-            <p:ph type="title"/>
-          </p:nvPr>
-        </p:nvSpPr>
-        <p:spPr/>
-        <p:txBody>
-          <a:bodyPr/>
-          <a:lstStyle/>
-          <a:p>
-            <a:r>
               <a:rPr lang="en-US" dirty="0" smtClean="0"/>
               <a:t>What I learnt</a:t>
             </a:r>
@@ -24522,40 +22208,6 @@
       </p:sp>
       <p:sp>
         <p:nvSpPr>
-          <p:cNvPr id="40" name="TextBox 39"/>
-          <p:cNvSpPr txBox="1"/>
-          <p:nvPr/>
-        </p:nvSpPr>
-        <p:spPr>
-          <a:xfrm>
-            <a:off x="7668344" y="4517748"/>
-            <a:ext cx="278478" cy="369332"/>
-          </a:xfrm>
-          <a:prstGeom prst="rect">
-            <a:avLst/>
-          </a:prstGeom>
-          <a:noFill/>
-        </p:spPr>
-        <p:txBody>
-          <a:bodyPr wrap="square" rtlCol="0">
-            <a:spAutoFit/>
-          </a:bodyPr>
-          <a:lstStyle/>
-          <a:p>
-            <a:r>
-              <a:rPr lang="en-US" dirty="0" smtClean="0">
-                <a:latin typeface="Wingdings" pitchFamily="2" charset="2"/>
-              </a:rPr>
-              <a:t>ü</a:t>
-            </a:r>
-            <a:endParaRPr lang="en-CA" dirty="0">
-              <a:latin typeface="Wingdings" pitchFamily="2" charset="2"/>
-            </a:endParaRPr>
-          </a:p>
-        </p:txBody>
-      </p:sp>
-      <p:sp>
-        <p:nvSpPr>
           <p:cNvPr id="41" name="Oval 40"/>
           <p:cNvSpPr/>
           <p:nvPr/>
@@ -24920,6 +22572,46 @@
         <p:spPr>
           <a:xfrm>
             <a:off x="5684885" y="3401070"/>
+            <a:ext cx="278478" cy="369332"/>
+          </a:xfrm>
+          <a:prstGeom prst="rect">
+            <a:avLst/>
+          </a:prstGeom>
+          <a:noFill/>
+        </p:spPr>
+        <p:txBody>
+          <a:bodyPr wrap="square" rtlCol="0">
+            <a:spAutoFit/>
+          </a:bodyPr>
+          <a:lstStyle/>
+          <a:p>
+            <a:r>
+              <a:rPr lang="en-US" dirty="0" smtClean="0">
+                <a:solidFill>
+                  <a:schemeClr val="bg2"/>
+                </a:solidFill>
+                <a:latin typeface="Wingdings" pitchFamily="2" charset="2"/>
+              </a:rPr>
+              <a:t>ü</a:t>
+            </a:r>
+            <a:endParaRPr lang="en-CA" dirty="0">
+              <a:solidFill>
+                <a:schemeClr val="bg2"/>
+              </a:solidFill>
+              <a:latin typeface="Wingdings" pitchFamily="2" charset="2"/>
+            </a:endParaRPr>
+          </a:p>
+        </p:txBody>
+      </p:sp>
+      <p:sp>
+        <p:nvSpPr>
+          <p:cNvPr id="49" name="TextBox 48"/>
+          <p:cNvSpPr txBox="1"/>
+          <p:nvPr/>
+        </p:nvSpPr>
+        <p:spPr>
+          <a:xfrm>
+            <a:off x="4099673" y="3164470"/>
             <a:ext cx="278478" cy="369332"/>
           </a:xfrm>
           <a:prstGeom prst="rect">
@@ -25096,7 +22788,7 @@
 </p:sld>
 </file>
 
-<file path=ppt/slides/slide23.xml><?xml version="1.0" encoding="utf-8"?>
+<file path=ppt/slides/slide22.xml><?xml version="1.0" encoding="utf-8"?>
 <p:sld xmlns:a="http://schemas.openxmlformats.org/drawingml/2006/main" xmlns:r="http://schemas.openxmlformats.org/officeDocument/2006/relationships" xmlns:p="http://schemas.openxmlformats.org/presentationml/2006/main">
   <p:cSld>
     <p:spTree>
@@ -25131,7 +22823,7 @@
             <a:fld id="{1D72EBF8-7CF5-44B7-B2BF-E22DE4D0703D}" type="slidenum">
               <a:rPr lang="en-US" smtClean="0"/>
               <a:pPr/>
-              <a:t>22</a:t>
+              <a:t>21</a:t>
             </a:fld>
             <a:endParaRPr lang="en-US"/>
           </a:p>
@@ -25229,9 +22921,14 @@
           </a:p>
           <a:p>
             <a:r>
-              <a:rPr lang="en-CA" dirty="0" smtClean="0"/>
-              <a:t>Demo 7</a:t>
-            </a:r>
+              <a:rPr lang="en-CA" smtClean="0"/>
+              <a:t>Demo </a:t>
+            </a:r>
+            <a:r>
+              <a:rPr lang="en-CA" smtClean="0"/>
+              <a:t>6</a:t>
+            </a:r>
+            <a:endParaRPr lang="en-CA" dirty="0" smtClean="0"/>
           </a:p>
           <a:p>
             <a:pPr lvl="1"/>
@@ -25279,7 +22976,7 @@
 </p:sld>
 </file>
 
-<file path=ppt/slides/slide24.xml><?xml version="1.0" encoding="utf-8"?>
+<file path=ppt/slides/slide23.xml><?xml version="1.0" encoding="utf-8"?>
 <p:sld xmlns:a="http://schemas.openxmlformats.org/drawingml/2006/main" xmlns:r="http://schemas.openxmlformats.org/officeDocument/2006/relationships" xmlns:p="http://schemas.openxmlformats.org/presentationml/2006/main">
   <p:cSld>
     <p:spTree>
@@ -25314,7 +23011,7 @@
             <a:fld id="{1D72EBF8-7CF5-44B7-B2BF-E22DE4D0703D}" type="slidenum">
               <a:rPr lang="en-US" smtClean="0"/>
               <a:pPr/>
-              <a:t>23</a:t>
+              <a:t>22</a:t>
             </a:fld>
             <a:endParaRPr lang="en-US"/>
           </a:p>
@@ -26779,40 +24476,6 @@
       </p:sp>
       <p:sp>
         <p:nvSpPr>
-          <p:cNvPr id="40" name="TextBox 39"/>
-          <p:cNvSpPr txBox="1"/>
-          <p:nvPr/>
-        </p:nvSpPr>
-        <p:spPr>
-          <a:xfrm>
-            <a:off x="7668344" y="4517748"/>
-            <a:ext cx="278478" cy="369332"/>
-          </a:xfrm>
-          <a:prstGeom prst="rect">
-            <a:avLst/>
-          </a:prstGeom>
-          <a:noFill/>
-        </p:spPr>
-        <p:txBody>
-          <a:bodyPr wrap="square" rtlCol="0">
-            <a:spAutoFit/>
-          </a:bodyPr>
-          <a:lstStyle/>
-          <a:p>
-            <a:r>
-              <a:rPr lang="en-US" dirty="0" smtClean="0">
-                <a:latin typeface="Wingdings" pitchFamily="2" charset="2"/>
-              </a:rPr>
-              <a:t>ü</a:t>
-            </a:r>
-            <a:endParaRPr lang="en-CA" dirty="0">
-              <a:latin typeface="Wingdings" pitchFamily="2" charset="2"/>
-            </a:endParaRPr>
-          </a:p>
-        </p:txBody>
-      </p:sp>
-      <p:sp>
-        <p:nvSpPr>
           <p:cNvPr id="41" name="TextBox 40"/>
           <p:cNvSpPr txBox="1"/>
           <p:nvPr/>
@@ -27261,6 +24924,46 @@
         <p:spPr>
           <a:xfrm>
             <a:off x="5684885" y="3401070"/>
+            <a:ext cx="278478" cy="369332"/>
+          </a:xfrm>
+          <a:prstGeom prst="rect">
+            <a:avLst/>
+          </a:prstGeom>
+          <a:noFill/>
+        </p:spPr>
+        <p:txBody>
+          <a:bodyPr wrap="square" rtlCol="0">
+            <a:spAutoFit/>
+          </a:bodyPr>
+          <a:lstStyle/>
+          <a:p>
+            <a:r>
+              <a:rPr lang="en-US" dirty="0" smtClean="0">
+                <a:solidFill>
+                  <a:schemeClr val="bg2"/>
+                </a:solidFill>
+                <a:latin typeface="Wingdings" pitchFamily="2" charset="2"/>
+              </a:rPr>
+              <a:t>ü</a:t>
+            </a:r>
+            <a:endParaRPr lang="en-CA" dirty="0">
+              <a:solidFill>
+                <a:schemeClr val="bg2"/>
+              </a:solidFill>
+              <a:latin typeface="Wingdings" pitchFamily="2" charset="2"/>
+            </a:endParaRPr>
+          </a:p>
+        </p:txBody>
+      </p:sp>
+      <p:sp>
+        <p:nvSpPr>
+          <p:cNvPr id="51" name="TextBox 50"/>
+          <p:cNvSpPr txBox="1"/>
+          <p:nvPr/>
+        </p:nvSpPr>
+        <p:spPr>
+          <a:xfrm>
+            <a:off x="4099673" y="3164470"/>
             <a:ext cx="278478" cy="369332"/>
           </a:xfrm>
           <a:prstGeom prst="rect">
@@ -27437,7 +25140,7 @@
 </p:sld>
 </file>
 
-<file path=ppt/slides/slide25.xml><?xml version="1.0" encoding="utf-8"?>
+<file path=ppt/slides/slide24.xml><?xml version="1.0" encoding="utf-8"?>
 <p:sld xmlns:a="http://schemas.openxmlformats.org/drawingml/2006/main" xmlns:r="http://schemas.openxmlformats.org/officeDocument/2006/relationships" xmlns:p="http://schemas.openxmlformats.org/presentationml/2006/main">
   <p:cSld>
     <p:spTree>
@@ -27472,7 +25175,7 @@
             <a:fld id="{1D72EBF8-7CF5-44B7-B2BF-E22DE4D0703D}" type="slidenum">
               <a:rPr lang="en-US" smtClean="0"/>
               <a:pPr/>
-              <a:t>24</a:t>
+              <a:t>23</a:t>
             </a:fld>
             <a:endParaRPr lang="en-US"/>
           </a:p>

</xml_diff>

<commit_message>
updates to 4 vs 5 web page
</commit_message>
<xml_diff>
--- a/Docs/2012 - Live360 Event Review (NEWER).pptx
+++ b/Docs/2012 - Live360 Event Review (NEWER).pptx
@@ -723,11 +723,11 @@
             </a:pPr>
             <a:r>
               <a:rPr lang="en-CA" baseline="0" dirty="0" smtClean="0"/>
-              <a:t>This presentation had its genesis from attending this</a:t>
+              <a:t>This presentation had its genesis from attending </a:t>
             </a:r>
             <a:r>
               <a:rPr lang="en-CA" baseline="0" dirty="0" smtClean="0"/>
-              <a:t>.</a:t>
+              <a:t>that conference.</a:t>
             </a:r>
           </a:p>
           <a:p>
@@ -783,7 +783,7 @@
             </a:r>
             <a:r>
               <a:rPr lang="en-CA" baseline="0" dirty="0" smtClean="0"/>
-              <a:t>title and then authenticating using information contained within this PowerPoint</a:t>
+              <a:t>title and then authenticating using information contained within this PowerPoint that will be provided</a:t>
             </a:r>
           </a:p>
           <a:p>
@@ -873,7 +873,15 @@
             </a:r>
             <a:r>
               <a:rPr lang="en-CA" baseline="0" dirty="0" smtClean="0"/>
-              <a:t>that I will be attempting to show a bit later in the </a:t>
+              <a:t>that I will be </a:t>
+            </a:r>
+            <a:r>
+              <a:rPr lang="en-CA" baseline="0" dirty="0" smtClean="0"/>
+              <a:t>showing a </a:t>
+            </a:r>
+            <a:r>
+              <a:rPr lang="en-CA" baseline="0" dirty="0" smtClean="0"/>
+              <a:t>bit later in the </a:t>
             </a:r>
             <a:r>
               <a:rPr lang="en-CA" baseline="0" dirty="0" smtClean="0"/>
@@ -908,7 +916,7 @@
             </a:r>
             <a:r>
               <a:rPr lang="en-CA" baseline="0" dirty="0" smtClean="0"/>
-              <a:t> too.</a:t>
+              <a:t> as well.</a:t>
             </a:r>
             <a:endParaRPr lang="en-CA" dirty="0" smtClean="0"/>
           </a:p>
@@ -1182,7 +1190,17 @@
           <a:p>
             <a:r>
               <a:rPr lang="en-CA" baseline="0" dirty="0" smtClean="0"/>
-              <a:t>There is actually quite a bit to be said in this area including the theory behind a section vs. an article; however, I am not going to focus on this in this presentation.</a:t>
+              <a:t>There is actually quite a bit to be said in this area including the theory behind a section vs. an article; however, I am not going to focus on this in this presentation</a:t>
+            </a:r>
+            <a:r>
+              <a:rPr lang="en-CA" baseline="0" dirty="0" smtClean="0"/>
+              <a:t>.</a:t>
+            </a:r>
+          </a:p>
+          <a:p>
+            <a:r>
+              <a:rPr lang="en-CA" baseline="0" dirty="0" smtClean="0"/>
+              <a:t>To summarize then this saves the developers time and is a standardized wording.</a:t>
             </a:r>
             <a:endParaRPr lang="en-CA" dirty="0"/>
           </a:p>
@@ -1370,11 +1388,16 @@
               <a:rPr lang="en-US" sz="1000" baseline="0" dirty="0" smtClean="0"/>
               <a:t>What Microsoft’s IE team decided on originally was only to support “Candidate Recommendation” and up… as a result, they “score” much lower… so as a developer you need to keep this in mind and come up with solutions to this problem. </a:t>
             </a:r>
+            <a:endParaRPr lang="en-US" sz="1000" baseline="0" dirty="0" smtClean="0"/>
           </a:p>
           <a:p>
             <a:r>
               <a:rPr lang="en-US" sz="1000" baseline="0" dirty="0" smtClean="0"/>
-              <a:t>Note that the absolute easiest way regarding this in IE is to use something called “Google Chrome Frame” which brings the “goodness” of Chrome into IE… however, this is a plugin. I will show this in a demo.</a:t>
+              <a:t>Note </a:t>
+            </a:r>
+            <a:r>
+              <a:rPr lang="en-US" sz="1000" baseline="0" dirty="0" smtClean="0"/>
+              <a:t>that the absolute easiest way regarding this in IE is to use something called “Google Chrome Frame” which brings the “goodness” of Chrome into IE… however, this is a plugin. I will show this in a demo.</a:t>
             </a:r>
           </a:p>
           <a:p>
@@ -1505,8 +1528,21 @@
           <a:p>
             <a:r>
               <a:rPr lang="en-US" sz="1200" baseline="0" dirty="0" smtClean="0"/>
-              <a:t>To backup for a second… when I say “score” and mentioning how IE doesn’t score very well, what do I really mean by this? Well, on this slide are a couple of sites where you can see how the browsers “stack up” against one another.</a:t>
-            </a:r>
+              <a:t>To backup for a second… when I say “score” and mentioning how IE doesn’t score very well, what do I really mean by this? Well, on this slide are a couple of sites where you can see how the browsers “stack up” against one </a:t>
+            </a:r>
+            <a:r>
+              <a:rPr lang="en-US" sz="1200" baseline="0" dirty="0" smtClean="0"/>
+              <a:t>another along with an excerpt from a table from Html5test.com that has scored the various browsers out there out of 500 for what features they have implemented. Notice how far behind Internet Explorer 9 is compared to other browsers such as Chrome. Also, interestingly enough, the browser with the highest score is one called </a:t>
+            </a:r>
+            <a:r>
+              <a:rPr lang="en-US" sz="1200" baseline="0" dirty="0" err="1" smtClean="0"/>
+              <a:t>Maxthon</a:t>
+            </a:r>
+            <a:r>
+              <a:rPr lang="en-US" sz="1200" baseline="0" dirty="0" smtClean="0"/>
+              <a:t> which is not a mainstream browser at all.</a:t>
+            </a:r>
+            <a:endParaRPr lang="en-US" sz="1200" baseline="0" dirty="0" smtClean="0"/>
           </a:p>
           <a:p>
             <a:r>
@@ -3006,13 +3042,11 @@
           <a:p>
             <a:r>
               <a:rPr lang="en-US" baseline="0" dirty="0" smtClean="0"/>
-              <a:t>- For mobile, I was open to hearing anything that I could related to mobile, and although this was not a conference that was big on mobile, there was some knowledge I gained in this area that I will share a bit later</a:t>
-            </a:r>
-          </a:p>
-          <a:p>
+              <a:t>- </a:t>
+            </a:r>
             <a:r>
               <a:rPr lang="en-US" baseline="0" dirty="0" smtClean="0"/>
-              <a:t>- Finally, for trends, I was conscious of looking for anything that people were talking a lot about</a:t>
+              <a:t>Finally, for trends, I was conscious of looking for anything that people were talking a lot about</a:t>
             </a:r>
             <a:endParaRPr lang="en-US" dirty="0"/>
           </a:p>
@@ -3597,8 +3631,13 @@
           <a:p>
             <a:r>
               <a:rPr lang="en-CA" baseline="0" dirty="0" smtClean="0"/>
-              <a:t>Well, it is really an umbrella term that contains things such as improvements with HTML, CSS and JavaScript APIs as shown on this slide as was presented to me a number of times during the conference.</a:t>
-            </a:r>
+              <a:t>Well, it is really an umbrella term that contains things such as improvements with HTML, CSS and JavaScript APIs as shown on this </a:t>
+            </a:r>
+            <a:r>
+              <a:rPr lang="en-CA" baseline="0" dirty="0" smtClean="0"/>
+              <a:t>slide</a:t>
+            </a:r>
+            <a:endParaRPr lang="en-CA" baseline="0" dirty="0" smtClean="0"/>
           </a:p>
         </p:txBody>
       </p:sp>
@@ -26571,22 +26610,7 @@
           </a:p>
           <a:p>
             <a:r>
-              <a:rPr lang="en-CA" dirty="0"/>
-              <a:t>Mobile… </a:t>
-            </a:r>
-            <a:endParaRPr lang="en-CA" dirty="0" smtClean="0"/>
-          </a:p>
-          <a:p>
-            <a:pPr lvl="1"/>
-            <a:r>
               <a:rPr lang="en-CA" dirty="0" smtClean="0"/>
-              <a:t>Pretty much anything</a:t>
-            </a:r>
-            <a:endParaRPr lang="en-CA" dirty="0"/>
-          </a:p>
-          <a:p>
-            <a:r>
-              <a:rPr lang="en-CA" dirty="0"/>
               <a:t>Any </a:t>
             </a:r>
             <a:r>
@@ -27089,194 +27113,6 @@
                                           <p:spTgt spid="3">
                                             <p:txEl>
                                               <p:pRg st="4" end="4"/>
-                                            </p:txEl>
-                                          </p:spTgt>
-                                        </p:tgtEl>
-                                        <p:attrNameLst>
-                                          <p:attrName>ppt_y</p:attrName>
-                                        </p:attrNameLst>
-                                      </p:cBhvr>
-                                      <p:tavLst>
-                                        <p:tav tm="0">
-                                          <p:val>
-                                            <p:strVal val="1+#ppt_h/2"/>
-                                          </p:val>
-                                        </p:tav>
-                                        <p:tav tm="100000">
-                                          <p:val>
-                                            <p:strVal val="#ppt_y"/>
-                                          </p:val>
-                                        </p:tav>
-                                      </p:tavLst>
-                                    </p:anim>
-                                  </p:childTnLst>
-                                </p:cTn>
-                              </p:par>
-                              <p:par>
-                                <p:cTn id="29" presetID="2" presetClass="entr" presetSubtype="4" fill="hold" nodeType="withEffect">
-                                  <p:stCondLst>
-                                    <p:cond delay="0"/>
-                                  </p:stCondLst>
-                                  <p:childTnLst>
-                                    <p:set>
-                                      <p:cBhvr>
-                                        <p:cTn id="30" dur="1" fill="hold">
-                                          <p:stCondLst>
-                                            <p:cond delay="0"/>
-                                          </p:stCondLst>
-                                        </p:cTn>
-                                        <p:tgtEl>
-                                          <p:spTgt spid="3">
-                                            <p:txEl>
-                                              <p:pRg st="5" end="5"/>
-                                            </p:txEl>
-                                          </p:spTgt>
-                                        </p:tgtEl>
-                                        <p:attrNameLst>
-                                          <p:attrName>style.visibility</p:attrName>
-                                        </p:attrNameLst>
-                                      </p:cBhvr>
-                                      <p:to>
-                                        <p:strVal val="visible"/>
-                                      </p:to>
-                                    </p:set>
-                                    <p:anim calcmode="lin" valueType="num">
-                                      <p:cBhvr additive="base">
-                                        <p:cTn id="31" dur="500" fill="hold"/>
-                                        <p:tgtEl>
-                                          <p:spTgt spid="3">
-                                            <p:txEl>
-                                              <p:pRg st="5" end="5"/>
-                                            </p:txEl>
-                                          </p:spTgt>
-                                        </p:tgtEl>
-                                        <p:attrNameLst>
-                                          <p:attrName>ppt_x</p:attrName>
-                                        </p:attrNameLst>
-                                      </p:cBhvr>
-                                      <p:tavLst>
-                                        <p:tav tm="0">
-                                          <p:val>
-                                            <p:strVal val="#ppt_x"/>
-                                          </p:val>
-                                        </p:tav>
-                                        <p:tav tm="100000">
-                                          <p:val>
-                                            <p:strVal val="#ppt_x"/>
-                                          </p:val>
-                                        </p:tav>
-                                      </p:tavLst>
-                                    </p:anim>
-                                    <p:anim calcmode="lin" valueType="num">
-                                      <p:cBhvr additive="base">
-                                        <p:cTn id="32" dur="500" fill="hold"/>
-                                        <p:tgtEl>
-                                          <p:spTgt spid="3">
-                                            <p:txEl>
-                                              <p:pRg st="5" end="5"/>
-                                            </p:txEl>
-                                          </p:spTgt>
-                                        </p:tgtEl>
-                                        <p:attrNameLst>
-                                          <p:attrName>ppt_y</p:attrName>
-                                        </p:attrNameLst>
-                                      </p:cBhvr>
-                                      <p:tavLst>
-                                        <p:tav tm="0">
-                                          <p:val>
-                                            <p:strVal val="1+#ppt_h/2"/>
-                                          </p:val>
-                                        </p:tav>
-                                        <p:tav tm="100000">
-                                          <p:val>
-                                            <p:strVal val="#ppt_y"/>
-                                          </p:val>
-                                        </p:tav>
-                                      </p:tavLst>
-                                    </p:anim>
-                                  </p:childTnLst>
-                                </p:cTn>
-                              </p:par>
-                            </p:childTnLst>
-                          </p:cTn>
-                        </p:par>
-                      </p:childTnLst>
-                    </p:cTn>
-                  </p:par>
-                  <p:par>
-                    <p:cTn id="33" fill="hold">
-                      <p:stCondLst>
-                        <p:cond delay="indefinite"/>
-                      </p:stCondLst>
-                      <p:childTnLst>
-                        <p:par>
-                          <p:cTn id="34" fill="hold">
-                            <p:stCondLst>
-                              <p:cond delay="0"/>
-                            </p:stCondLst>
-                            <p:childTnLst>
-                              <p:par>
-                                <p:cTn id="35" presetID="2" presetClass="entr" presetSubtype="4" fill="hold" nodeType="clickEffect">
-                                  <p:stCondLst>
-                                    <p:cond delay="0"/>
-                                  </p:stCondLst>
-                                  <p:childTnLst>
-                                    <p:set>
-                                      <p:cBhvr>
-                                        <p:cTn id="36" dur="1" fill="hold">
-                                          <p:stCondLst>
-                                            <p:cond delay="0"/>
-                                          </p:stCondLst>
-                                        </p:cTn>
-                                        <p:tgtEl>
-                                          <p:spTgt spid="3">
-                                            <p:txEl>
-                                              <p:pRg st="6" end="6"/>
-                                            </p:txEl>
-                                          </p:spTgt>
-                                        </p:tgtEl>
-                                        <p:attrNameLst>
-                                          <p:attrName>style.visibility</p:attrName>
-                                        </p:attrNameLst>
-                                      </p:cBhvr>
-                                      <p:to>
-                                        <p:strVal val="visible"/>
-                                      </p:to>
-                                    </p:set>
-                                    <p:anim calcmode="lin" valueType="num">
-                                      <p:cBhvr additive="base">
-                                        <p:cTn id="37" dur="500" fill="hold"/>
-                                        <p:tgtEl>
-                                          <p:spTgt spid="3">
-                                            <p:txEl>
-                                              <p:pRg st="6" end="6"/>
-                                            </p:txEl>
-                                          </p:spTgt>
-                                        </p:tgtEl>
-                                        <p:attrNameLst>
-                                          <p:attrName>ppt_x</p:attrName>
-                                        </p:attrNameLst>
-                                      </p:cBhvr>
-                                      <p:tavLst>
-                                        <p:tav tm="0">
-                                          <p:val>
-                                            <p:strVal val="#ppt_x"/>
-                                          </p:val>
-                                        </p:tav>
-                                        <p:tav tm="100000">
-                                          <p:val>
-                                            <p:strVal val="#ppt_x"/>
-                                          </p:val>
-                                        </p:tav>
-                                      </p:tavLst>
-                                    </p:anim>
-                                    <p:anim calcmode="lin" valueType="num">
-                                      <p:cBhvr additive="base">
-                                        <p:cTn id="38" dur="500" fill="hold"/>
-                                        <p:tgtEl>
-                                          <p:spTgt spid="3">
-                                            <p:txEl>
-                                              <p:pRg st="6" end="6"/>
                                             </p:txEl>
                                           </p:spTgt>
                                         </p:tgtEl>

</xml_diff>

<commit_message>
removed JavaScript from video page that was causing some issues (so just removed it)
</commit_message>
<xml_diff>
--- a/Docs/2012 - Live360 Event Review (NEWER).pptx
+++ b/Docs/2012 - Live360 Event Review (NEWER).pptx
@@ -36,7 +36,7 @@
     <p:sldId id="270" r:id="rId24"/>
   </p:sldIdLst>
   <p:sldSz cx="9144000" cy="6858000" type="screen4x3"/>
-  <p:notesSz cx="7315200" cy="9601200"/>
+  <p:notesSz cx="7086600" cy="9372600"/>
   <p:defaultTextStyle>
     <a:defPPr>
       <a:defRPr lang="en-US"/>
@@ -170,14 +170,14 @@
         <p:spPr>
           <a:xfrm>
             <a:off x="0" y="0"/>
-            <a:ext cx="3169920" cy="480060"/>
+            <a:ext cx="3070860" cy="468630"/>
           </a:xfrm>
           <a:prstGeom prst="rect">
             <a:avLst/>
           </a:prstGeom>
         </p:spPr>
         <p:txBody>
-          <a:bodyPr vert="horz" lIns="96661" tIns="48331" rIns="96661" bIns="48331" rtlCol="0"/>
+          <a:bodyPr vert="horz" lIns="94041" tIns="47021" rIns="94041" bIns="47021" rtlCol="0"/>
           <a:lstStyle>
             <a:lvl1pPr algn="l">
               <a:defRPr sz="1300"/>
@@ -200,15 +200,15 @@
         </p:nvSpPr>
         <p:spPr>
           <a:xfrm>
-            <a:off x="4143587" y="0"/>
-            <a:ext cx="3169920" cy="480060"/>
+            <a:off x="4014100" y="0"/>
+            <a:ext cx="3070860" cy="468630"/>
           </a:xfrm>
           <a:prstGeom prst="rect">
             <a:avLst/>
           </a:prstGeom>
         </p:spPr>
         <p:txBody>
-          <a:bodyPr vert="horz" lIns="96661" tIns="48331" rIns="96661" bIns="48331" rtlCol="0"/>
+          <a:bodyPr vert="horz" lIns="94041" tIns="47021" rIns="94041" bIns="47021" rtlCol="0"/>
           <a:lstStyle>
             <a:lvl1pPr algn="r">
               <a:defRPr sz="1300"/>
@@ -235,15 +235,15 @@
         </p:nvSpPr>
         <p:spPr>
           <a:xfrm>
-            <a:off x="0" y="9119474"/>
-            <a:ext cx="3169920" cy="480060"/>
+            <a:off x="0" y="8902344"/>
+            <a:ext cx="3070860" cy="468630"/>
           </a:xfrm>
           <a:prstGeom prst="rect">
             <a:avLst/>
           </a:prstGeom>
         </p:spPr>
         <p:txBody>
-          <a:bodyPr vert="horz" lIns="96661" tIns="48331" rIns="96661" bIns="48331" rtlCol="0" anchor="b"/>
+          <a:bodyPr vert="horz" lIns="94041" tIns="47021" rIns="94041" bIns="47021" rtlCol="0" anchor="b"/>
           <a:lstStyle>
             <a:lvl1pPr algn="l">
               <a:defRPr sz="1300"/>
@@ -266,15 +266,15 @@
         </p:nvSpPr>
         <p:spPr>
           <a:xfrm>
-            <a:off x="4143587" y="9119474"/>
-            <a:ext cx="3169920" cy="480060"/>
+            <a:off x="4014100" y="8902344"/>
+            <a:ext cx="3070860" cy="468630"/>
           </a:xfrm>
           <a:prstGeom prst="rect">
             <a:avLst/>
           </a:prstGeom>
         </p:spPr>
         <p:txBody>
-          <a:bodyPr vert="horz" lIns="96661" tIns="48331" rIns="96661" bIns="48331" rtlCol="0" anchor="b"/>
+          <a:bodyPr vert="horz" lIns="94041" tIns="47021" rIns="94041" bIns="47021" rtlCol="0" anchor="b"/>
           <a:lstStyle>
             <a:lvl1pPr algn="r">
               <a:defRPr sz="1300"/>
@@ -299,62 +299,6 @@
   <p:clrMap bg1="lt1" tx1="dk1" bg2="lt2" tx2="dk2" accent1="accent1" accent2="accent2" accent3="accent3" accent4="accent4" accent5="accent5" accent6="accent6" hlink="hlink" folHlink="folHlink"/>
   <p:hf hdr="0" ftr="0" dt="0"/>
 </p:handoutMaster>
-</file>
-
-<file path=ppt/ink/ink1.xml><?xml version="1.0" encoding="utf-8"?>
-<inkml:ink xmlns:inkml="http://www.w3.org/2003/InkML">
-  <inkml:definitions>
-    <inkml:context xml:id="ctx0">
-      <inkml:inkSource xml:id="inkSrc0">
-        <inkml:traceFormat>
-          <inkml:channel name="X" type="integer" min="-1920" max="1920" units="cm"/>
-          <inkml:channel name="Y" type="integer" min="-82" max="1200" units="cm"/>
-        </inkml:traceFormat>
-        <inkml:channelProperties>
-          <inkml:channelProperty channel="X" name="resolution" value="56.72083" units="1/cm"/>
-          <inkml:channelProperty channel="Y" name="resolution" value="30.30733" units="1/cm"/>
-        </inkml:channelProperties>
-      </inkml:inkSource>
-      <inkml:timestamp xml:id="ts0" timeString="2013-03-18T00:04:31.598"/>
-    </inkml:context>
-    <inkml:brush xml:id="br0">
-      <inkml:brushProperty name="width" value="0.08819" units="cm"/>
-      <inkml:brushProperty name="height" value="0.35278" units="cm"/>
-      <inkml:brushProperty name="color" value="#FFFF00"/>
-      <inkml:brushProperty name="tip" value="rectangle"/>
-      <inkml:brushProperty name="rasterOp" value="maskPen"/>
-    </inkml:brush>
-  </inkml:definitions>
-  <inkml:trace contextRef="#ctx0" brushRef="#br0">4905 10030,'0'0,"0"0,27 0,-27 0,28 0,26 0,-27 0,28 0,-1 0,1 0,-1 0,1 0,-1 0,28 0,163 27,-163-27,27 0,-27 0,27 0,-27 0,-28 0,28 0,-55 0,-27 0,55 0,-55 0,54 0,-27 0,137 0,-82 0,0-27,27-1,-28 28,-26-27,-28 0,28 0,-28 27,0-28,-190 219</inkml:trace>
-</inkml:ink>
-</file>
-
-<file path=ppt/ink/ink2.xml><?xml version="1.0" encoding="utf-8"?>
-<inkml:ink xmlns:inkml="http://www.w3.org/2003/InkML">
-  <inkml:definitions>
-    <inkml:context xml:id="ctx0">
-      <inkml:inkSource xml:id="inkSrc0">
-        <inkml:traceFormat>
-          <inkml:channel name="X" type="integer" min="-1920" max="1920" units="cm"/>
-          <inkml:channel name="Y" type="integer" min="-82" max="1200" units="cm"/>
-        </inkml:traceFormat>
-        <inkml:channelProperties>
-          <inkml:channelProperty channel="X" name="resolution" value="56.72083" units="1/cm"/>
-          <inkml:channelProperty channel="Y" name="resolution" value="30.30733" units="1/cm"/>
-        </inkml:channelProperties>
-      </inkml:inkSource>
-      <inkml:timestamp xml:id="ts0" timeString="2013-03-18T00:04:55.245"/>
-    </inkml:context>
-    <inkml:brush xml:id="br0">
-      <inkml:brushProperty name="width" value="0.08819" units="cm"/>
-      <inkml:brushProperty name="height" value="0.35278" units="cm"/>
-      <inkml:brushProperty name="color" value="#FFFF00"/>
-      <inkml:brushProperty name="tip" value="rectangle"/>
-      <inkml:brushProperty name="rasterOp" value="maskPen"/>
-    </inkml:brush>
-  </inkml:definitions>
-  <inkml:trace contextRef="#ctx0" brushRef="#br0">4905 10738,'0'0,"55"0,-1 0,-54 0,55 0,-1 0,-27 0,1 0,26 0,-27 0,28 0,54 0,-55 0,-26 27,-1-27,27 0,1 0,-28 0,28 0,-1 0,-27 0,1 0,-28 0,27 0,-27 0,27 0,0 0,-27 0,28 0,-28 0,54 28,-54-28,55 0,-28 0,-27 0,27 0,-27 0,27 0,1 0,-28 0,27 0,-27 0,27 0,0 0,1 0,-28 0,27 0,0 0,-27 0,27 0,-27 0,28 0,-28 0,27 0</inkml:trace>
-</inkml:ink>
 </file>
 
 <file path=ppt/notesMasters/notesMaster1.xml><?xml version="1.0" encoding="utf-8"?>
@@ -392,14 +336,14 @@
         <p:spPr>
           <a:xfrm>
             <a:off x="0" y="0"/>
-            <a:ext cx="3169920" cy="480060"/>
+            <a:ext cx="3070860" cy="468630"/>
           </a:xfrm>
           <a:prstGeom prst="rect">
             <a:avLst/>
           </a:prstGeom>
         </p:spPr>
         <p:txBody>
-          <a:bodyPr vert="horz" lIns="96661" tIns="48331" rIns="96661" bIns="48331" rtlCol="0"/>
+          <a:bodyPr vert="horz" lIns="94041" tIns="47021" rIns="94041" bIns="47021" rtlCol="0"/>
           <a:lstStyle>
             <a:lvl1pPr algn="l">
               <a:defRPr sz="1300"/>
@@ -422,15 +366,15 @@
         </p:nvSpPr>
         <p:spPr>
           <a:xfrm>
-            <a:off x="4143587" y="0"/>
-            <a:ext cx="3169920" cy="480060"/>
+            <a:off x="4014100" y="0"/>
+            <a:ext cx="3070860" cy="468630"/>
           </a:xfrm>
           <a:prstGeom prst="rect">
             <a:avLst/>
           </a:prstGeom>
         </p:spPr>
         <p:txBody>
-          <a:bodyPr vert="horz" lIns="96661" tIns="48331" rIns="96661" bIns="48331" rtlCol="0"/>
+          <a:bodyPr vert="horz" lIns="94041" tIns="47021" rIns="94041" bIns="47021" rtlCol="0"/>
           <a:lstStyle>
             <a:lvl1pPr algn="r">
               <a:defRPr sz="1300"/>
@@ -457,8 +401,8 @@
         </p:nvSpPr>
         <p:spPr>
           <a:xfrm>
-            <a:off x="1257300" y="720725"/>
-            <a:ext cx="4800600" cy="3600450"/>
+            <a:off x="1200150" y="703263"/>
+            <a:ext cx="4686300" cy="3514725"/>
           </a:xfrm>
           <a:prstGeom prst="rect">
             <a:avLst/>
@@ -471,7 +415,7 @@
           </a:ln>
         </p:spPr>
         <p:txBody>
-          <a:bodyPr vert="horz" lIns="96661" tIns="48331" rIns="96661" bIns="48331" rtlCol="0" anchor="ctr"/>
+          <a:bodyPr vert="horz" lIns="94041" tIns="47021" rIns="94041" bIns="47021" rtlCol="0" anchor="ctr"/>
           <a:lstStyle/>
           <a:p>
             <a:endParaRPr lang="en-US"/>
@@ -490,15 +434,15 @@
         </p:nvSpPr>
         <p:spPr>
           <a:xfrm>
-            <a:off x="731520" y="4560570"/>
-            <a:ext cx="5852160" cy="4320540"/>
+            <a:off x="708660" y="4451985"/>
+            <a:ext cx="5669280" cy="4217670"/>
           </a:xfrm>
           <a:prstGeom prst="rect">
             <a:avLst/>
           </a:prstGeom>
         </p:spPr>
         <p:txBody>
-          <a:bodyPr vert="horz" lIns="96661" tIns="48331" rIns="96661" bIns="48331" rtlCol="0"/>
+          <a:bodyPr vert="horz" lIns="94041" tIns="47021" rIns="94041" bIns="47021" rtlCol="0"/>
           <a:lstStyle/>
           <a:p>
             <a:pPr lvl="0"/>
@@ -550,15 +494,15 @@
         </p:nvSpPr>
         <p:spPr>
           <a:xfrm>
-            <a:off x="0" y="9119474"/>
-            <a:ext cx="3169920" cy="480060"/>
+            <a:off x="0" y="8902344"/>
+            <a:ext cx="3070860" cy="468630"/>
           </a:xfrm>
           <a:prstGeom prst="rect">
             <a:avLst/>
           </a:prstGeom>
         </p:spPr>
         <p:txBody>
-          <a:bodyPr vert="horz" lIns="96661" tIns="48331" rIns="96661" bIns="48331" rtlCol="0" anchor="b"/>
+          <a:bodyPr vert="horz" lIns="94041" tIns="47021" rIns="94041" bIns="47021" rtlCol="0" anchor="b"/>
           <a:lstStyle>
             <a:lvl1pPr algn="l">
               <a:defRPr sz="1300"/>
@@ -581,15 +525,15 @@
         </p:nvSpPr>
         <p:spPr>
           <a:xfrm>
-            <a:off x="4143587" y="9119474"/>
-            <a:ext cx="3169920" cy="480060"/>
+            <a:off x="4014100" y="8902344"/>
+            <a:ext cx="3070860" cy="468630"/>
           </a:xfrm>
           <a:prstGeom prst="rect">
             <a:avLst/>
           </a:prstGeom>
         </p:spPr>
         <p:txBody>
-          <a:bodyPr vert="horz" lIns="96661" tIns="48331" rIns="96661" bIns="48331" rtlCol="0" anchor="b"/>
+          <a:bodyPr vert="horz" lIns="94041" tIns="47021" rIns="94041" bIns="47021" rtlCol="0" anchor="b"/>
           <a:lstStyle>
             <a:lvl1pPr algn="r">
               <a:defRPr sz="1300"/>
@@ -752,7 +696,7 @@
           <a:bodyPr/>
           <a:lstStyle/>
           <a:p>
-            <a:pPr defTabSz="483306">
+            <a:pPr defTabSz="470208">
               <a:defRPr/>
             </a:pPr>
             <a:r>
@@ -773,7 +717,7 @@
             </a:r>
           </a:p>
           <a:p>
-            <a:pPr defTabSz="483306">
+            <a:pPr defTabSz="470208">
               <a:defRPr/>
             </a:pPr>
             <a:r>
@@ -870,21 +814,7 @@
             </a:r>
           </a:p>
           <a:p>
-            <a:pPr marL="0" marR="0" indent="0" algn="l" defTabSz="457200" rtl="0" eaLnBrk="1" fontAlgn="auto" latinLnBrk="0" hangingPunct="1">
-              <a:lnSpc>
-                <a:spcPct val="100000"/>
-              </a:lnSpc>
-              <a:spcBef>
-                <a:spcPts val="0"/>
-              </a:spcBef>
-              <a:spcAft>
-                <a:spcPts val="0"/>
-              </a:spcAft>
-              <a:buClrTx/>
-              <a:buSzTx/>
-              <a:buFontTx/>
-              <a:buNone/>
-              <a:tabLst/>
+            <a:pPr defTabSz="444810">
               <a:defRPr/>
             </a:pPr>
             <a:r>
@@ -1189,40 +1119,36 @@
           <a:lstStyle/>
           <a:p>
             <a:r>
-              <a:rPr lang="en-US" sz="1000" dirty="0" smtClean="0"/>
-              <a:t>What about browser support, in particular for Internet Explorer? First, it is important to understand a bit about how features</a:t>
-            </a:r>
-            <a:r>
-              <a:rPr lang="en-US" sz="1000" baseline="0" dirty="0" smtClean="0"/>
-              <a:t> come about… a 5 stage process. </a:t>
-            </a:r>
-          </a:p>
-          <a:p>
-            <a:r>
-              <a:rPr lang="en-US" sz="1000" baseline="0" dirty="0" smtClean="0"/>
+              <a:rPr lang="en-US" sz="1000" dirty="0"/>
+              <a:t>What about browser support, in particular for Internet Explorer? First, it is important to understand a bit about how features come about… a 5 stage process. </a:t>
+            </a:r>
+          </a:p>
+          <a:p>
+            <a:r>
+              <a:rPr lang="en-US" sz="1000" dirty="0"/>
               <a:t>What Microsoft’s IE team decided on originally was only to support “Candidate Recommendation” and up… as a result, they “score” much lower… so as a developer you need to keep this in mind and come up with solutions to this problem. </a:t>
             </a:r>
           </a:p>
           <a:p>
             <a:r>
-              <a:rPr lang="en-US" sz="1000" baseline="0" dirty="0" smtClean="0"/>
+              <a:rPr lang="en-US" sz="1000" dirty="0"/>
               <a:t>Note that the absolute easiest way regarding this in IE is to use something called “Google Chrome Frame” which brings the “goodness” of Chrome into IE… however, this is a plugin. I will show this in a demo.</a:t>
             </a:r>
           </a:p>
           <a:p>
-            <a:endParaRPr lang="en-CA" sz="1000" baseline="30000" dirty="0" smtClean="0"/>
-          </a:p>
-          <a:p>
-            <a:r>
-              <a:rPr lang="en-CA" sz="1000" baseline="30000" dirty="0" smtClean="0"/>
+            <a:endParaRPr lang="en-CA" sz="1000" baseline="30000" dirty="0"/>
+          </a:p>
+          <a:p>
+            <a:r>
+              <a:rPr lang="en-CA" sz="1000" baseline="30000" dirty="0"/>
               <a:t>1</a:t>
             </a:r>
             <a:r>
-              <a:rPr lang="en-CA" sz="1000" dirty="0" smtClean="0"/>
+              <a:rPr lang="en-CA" sz="1000" dirty="0"/>
               <a:t> </a:t>
             </a:r>
             <a:r>
-              <a:rPr lang="en-US" sz="1000" dirty="0" smtClean="0"/>
+              <a:rPr lang="en-US" sz="1000" dirty="0"/>
               <a:t>Chrome browser engine in IE 6/7/8/9</a:t>
             </a:r>
           </a:p>
@@ -1251,7 +1177,7 @@
             </a:r>
           </a:p>
           <a:p>
-            <a:endParaRPr lang="en-CA" sz="1000" dirty="0" smtClean="0"/>
+            <a:endParaRPr lang="en-CA" sz="1000" dirty="0"/>
           </a:p>
         </p:txBody>
       </p:sp>
@@ -1336,43 +1262,43 @@
           <a:lstStyle/>
           <a:p>
             <a:r>
-              <a:rPr lang="en-US" sz="1200" baseline="0" dirty="0" smtClean="0"/>
+              <a:rPr lang="en-US" dirty="0"/>
               <a:t>To backup for a second… when I say “score” and mentioning how IE doesn’t score very well, what do I really mean by this? Well, on this slide are a couple of sites where you can see how the browsers “stack up” against one another along with an excerpt from a table from Html5test.com that has scored the various browsers out there out of 500 for what features they have implemented. Notice how far behind Internet Explorer 9 is compared to other browsers such as Chrome. Also, interestingly enough, the browser with the highest score is one called </a:t>
             </a:r>
             <a:r>
-              <a:rPr lang="en-US" sz="1200" baseline="0" dirty="0" err="1" smtClean="0"/>
+              <a:rPr lang="en-US" dirty="0" err="1"/>
               <a:t>Maxthon</a:t>
             </a:r>
             <a:r>
-              <a:rPr lang="en-US" sz="1200" baseline="0" dirty="0" smtClean="0"/>
+              <a:rPr lang="en-US" dirty="0"/>
               <a:t> which is not a mainstream browser at all.</a:t>
             </a:r>
           </a:p>
           <a:p>
             <a:r>
-              <a:rPr lang="en-US" sz="1200" baseline="0" dirty="0" smtClean="0"/>
+              <a:rPr lang="en-US" dirty="0"/>
               <a:t>So, how to deal with? One way is to determine what the lowest common denominator might be… that is, what browsers are being used to access your site and then only use features that are common across those browsers. The next is to use something called “</a:t>
             </a:r>
             <a:r>
-              <a:rPr lang="en-US" sz="1200" baseline="0" dirty="0" err="1" smtClean="0"/>
+              <a:rPr lang="en-US" dirty="0" err="1"/>
               <a:t>polyfills</a:t>
             </a:r>
             <a:r>
-              <a:rPr lang="en-US" sz="1200" baseline="0" dirty="0" smtClean="0"/>
+              <a:rPr lang="en-US" dirty="0"/>
               <a:t>” to give a browser more HTML5 features. I wasn’t intending to show “</a:t>
             </a:r>
             <a:r>
-              <a:rPr lang="en-US" sz="1200" baseline="0" dirty="0" err="1" smtClean="0"/>
+              <a:rPr lang="en-US" dirty="0" err="1"/>
               <a:t>polyfills</a:t>
             </a:r>
             <a:r>
-              <a:rPr lang="en-US" sz="1200" baseline="0" dirty="0" smtClean="0"/>
+              <a:rPr lang="en-US" dirty="0"/>
               <a:t>” in this presentation, but it is a big topic that basically involves using JavaScript to implant HTML5 functionality into a browser that does not offer native support.</a:t>
             </a:r>
           </a:p>
           <a:p>
             <a:r>
-              <a:rPr lang="en-US" sz="1200" baseline="0" dirty="0" smtClean="0"/>
+              <a:rPr lang="en-US" dirty="0"/>
               <a:t>The next 2 demos are meant to demonstrate some of the concepts discussed so far.</a:t>
             </a:r>
           </a:p>
@@ -1380,60 +1306,42 @@
             <a:endParaRPr lang="en-CA" dirty="0" smtClean="0"/>
           </a:p>
           <a:p>
-            <a:pPr marL="0" marR="0" indent="0" algn="l" defTabSz="457200" rtl="0" eaLnBrk="1" fontAlgn="auto" latinLnBrk="0" hangingPunct="1">
-              <a:lnSpc>
-                <a:spcPct val="100000"/>
-              </a:lnSpc>
-              <a:spcBef>
-                <a:spcPts val="0"/>
-              </a:spcBef>
-              <a:spcAft>
-                <a:spcPts val="0"/>
-              </a:spcAft>
-              <a:buClrTx/>
-              <a:buSzTx/>
-              <a:buFontTx/>
-              <a:buNone/>
-              <a:tabLst/>
+            <a:pPr defTabSz="444810">
               <a:defRPr/>
             </a:pPr>
             <a:r>
-              <a:rPr lang="en-CA" sz="1200" baseline="30000" dirty="0" smtClean="0"/>
+              <a:rPr lang="en-CA" baseline="30000" dirty="0"/>
               <a:t>1</a:t>
             </a:r>
             <a:r>
-              <a:rPr lang="en-CA" sz="1200" dirty="0" smtClean="0"/>
-              <a:t> Recommended</a:t>
-            </a:r>
-            <a:r>
-              <a:rPr lang="en-CA" sz="1200" baseline="0" dirty="0" smtClean="0"/>
-              <a:t> resources regarding </a:t>
-            </a:r>
-            <a:r>
-              <a:rPr lang="en-CA" sz="1200" baseline="0" dirty="0" err="1" smtClean="0"/>
+              <a:rPr lang="en-CA" dirty="0"/>
+              <a:t> Recommended resources regarding </a:t>
+            </a:r>
+            <a:r>
+              <a:rPr lang="en-CA" dirty="0" err="1"/>
               <a:t>polyfills</a:t>
             </a:r>
             <a:r>
-              <a:rPr lang="en-CA" sz="1200" dirty="0" smtClean="0"/>
+              <a:rPr lang="en-CA" dirty="0"/>
               <a:t>: </a:t>
             </a:r>
             <a:r>
-              <a:rPr lang="en-US" sz="1200" dirty="0" smtClean="0">
+              <a:rPr lang="en-US" dirty="0">
                 <a:hlinkClick r:id="rId3"/>
               </a:rPr>
               <a:t>http://remysharp.com/2010/10/08/what-is-a-polyfill/</a:t>
             </a:r>
             <a:r>
-              <a:rPr lang="en-US" sz="1200" dirty="0" smtClean="0"/>
+              <a:rPr lang="en-US" dirty="0"/>
               <a:t> or </a:t>
             </a:r>
             <a:r>
-              <a:rPr lang="en-US" sz="1200" dirty="0" smtClean="0">
+              <a:rPr lang="en-US" dirty="0">
                 <a:hlinkClick r:id="rId4"/>
               </a:rPr>
               <a:t>https://github.com/Modernizr/Modernizr/wiki/HTML5-Cross-browser-Polyfills</a:t>
             </a:r>
-            <a:endParaRPr lang="en-US" sz="1200" dirty="0" smtClean="0"/>
+            <a:endParaRPr lang="en-US" dirty="0"/>
           </a:p>
           <a:p>
             <a:endParaRPr lang="en-CA" dirty="0"/>
@@ -2318,21 +2226,7 @@
           <a:bodyPr/>
           <a:lstStyle/>
           <a:p>
-            <a:pPr marL="0" marR="0" indent="0" algn="l" defTabSz="457200" rtl="0" eaLnBrk="1" fontAlgn="auto" latinLnBrk="0" hangingPunct="1">
-              <a:lnSpc>
-                <a:spcPct val="100000"/>
-              </a:lnSpc>
-              <a:spcBef>
-                <a:spcPts val="0"/>
-              </a:spcBef>
-              <a:spcAft>
-                <a:spcPts val="0"/>
-              </a:spcAft>
-              <a:buClrTx/>
-              <a:buSzTx/>
-              <a:buFontTx/>
-              <a:buNone/>
-              <a:tabLst/>
+            <a:pPr defTabSz="444810">
               <a:defRPr/>
             </a:pPr>
             <a:r>
@@ -2345,21 +2239,7 @@
             </a:r>
           </a:p>
           <a:p>
-            <a:pPr marL="0" marR="0" indent="0" algn="l" defTabSz="457200" rtl="0" eaLnBrk="1" fontAlgn="auto" latinLnBrk="0" hangingPunct="1">
-              <a:lnSpc>
-                <a:spcPct val="100000"/>
-              </a:lnSpc>
-              <a:spcBef>
-                <a:spcPts val="0"/>
-              </a:spcBef>
-              <a:spcAft>
-                <a:spcPts val="0"/>
-              </a:spcAft>
-              <a:buClrTx/>
-              <a:buSzTx/>
-              <a:buFontTx/>
-              <a:buNone/>
-              <a:tabLst/>
+            <a:pPr defTabSz="444810">
               <a:defRPr/>
             </a:pPr>
             <a:r>
@@ -2369,41 +2249,13 @@
             <a:endParaRPr lang="en-CA" dirty="0" smtClean="0"/>
           </a:p>
           <a:p>
-            <a:pPr marL="0" marR="0" indent="0" algn="l" defTabSz="457200" rtl="0" eaLnBrk="1" fontAlgn="auto" latinLnBrk="0" hangingPunct="1">
-              <a:lnSpc>
-                <a:spcPct val="100000"/>
-              </a:lnSpc>
-              <a:spcBef>
-                <a:spcPts val="0"/>
-              </a:spcBef>
-              <a:spcAft>
-                <a:spcPts val="0"/>
-              </a:spcAft>
-              <a:buClrTx/>
-              <a:buSzTx/>
-              <a:buFontTx/>
-              <a:buNone/>
-              <a:tabLst/>
+            <a:pPr defTabSz="444810">
               <a:defRPr/>
             </a:pPr>
             <a:endParaRPr lang="en-CA" baseline="30000" dirty="0" smtClean="0"/>
           </a:p>
           <a:p>
-            <a:pPr marL="0" marR="0" indent="0" algn="l" defTabSz="457200" rtl="0" eaLnBrk="1" fontAlgn="auto" latinLnBrk="0" hangingPunct="1">
-              <a:lnSpc>
-                <a:spcPct val="100000"/>
-              </a:lnSpc>
-              <a:spcBef>
-                <a:spcPts val="0"/>
-              </a:spcBef>
-              <a:spcAft>
-                <a:spcPts val="0"/>
-              </a:spcAft>
-              <a:buClrTx/>
-              <a:buSzTx/>
-              <a:buFontTx/>
-              <a:buNone/>
-              <a:tabLst/>
+            <a:pPr defTabSz="444810">
               <a:defRPr/>
             </a:pPr>
             <a:r>
@@ -2416,21 +2268,7 @@
             </a:r>
           </a:p>
           <a:p>
-            <a:pPr marL="0" marR="0" indent="0" algn="l" defTabSz="457200" rtl="0" eaLnBrk="1" fontAlgn="auto" latinLnBrk="0" hangingPunct="1">
-              <a:lnSpc>
-                <a:spcPct val="100000"/>
-              </a:lnSpc>
-              <a:spcBef>
-                <a:spcPts val="0"/>
-              </a:spcBef>
-              <a:spcAft>
-                <a:spcPts val="0"/>
-              </a:spcAft>
-              <a:buClrTx/>
-              <a:buSzTx/>
-              <a:buFontTx/>
-              <a:buNone/>
-              <a:tabLst/>
+            <a:pPr defTabSz="444810">
               <a:defRPr/>
             </a:pPr>
             <a:r>
@@ -2446,21 +2284,7 @@
             <a:endParaRPr lang="en-CA" dirty="0" smtClean="0"/>
           </a:p>
           <a:p>
-            <a:pPr marL="0" marR="0" indent="0" algn="l" defTabSz="457200" rtl="0" eaLnBrk="1" fontAlgn="auto" latinLnBrk="0" hangingPunct="1">
-              <a:lnSpc>
-                <a:spcPct val="100000"/>
-              </a:lnSpc>
-              <a:spcBef>
-                <a:spcPts val="0"/>
-              </a:spcBef>
-              <a:spcAft>
-                <a:spcPts val="0"/>
-              </a:spcAft>
-              <a:buClrTx/>
-              <a:buSzTx/>
-              <a:buFontTx/>
-              <a:buNone/>
-              <a:tabLst/>
+            <a:pPr defTabSz="444810">
               <a:defRPr/>
             </a:pPr>
             <a:endParaRPr lang="en-CA" dirty="0" smtClean="0"/>
@@ -3096,21 +2920,7 @@
             <a:endParaRPr lang="en-CA" baseline="0" dirty="0" smtClean="0"/>
           </a:p>
           <a:p>
-            <a:pPr marL="0" marR="0" indent="0" algn="l" defTabSz="457200" rtl="0" eaLnBrk="1" fontAlgn="auto" latinLnBrk="0" hangingPunct="1">
-              <a:lnSpc>
-                <a:spcPct val="100000"/>
-              </a:lnSpc>
-              <a:spcBef>
-                <a:spcPts val="0"/>
-              </a:spcBef>
-              <a:spcAft>
-                <a:spcPts val="0"/>
-              </a:spcAft>
-              <a:buClrTx/>
-              <a:buSzTx/>
-              <a:buFontTx/>
-              <a:buNone/>
-              <a:tabLst/>
+            <a:pPr defTabSz="444810">
               <a:defRPr/>
             </a:pPr>
             <a:r>
@@ -3529,7 +3339,7 @@
             </a:r>
           </a:p>
           <a:p>
-            <a:pPr marL="171450" indent="-171450">
+            <a:pPr marL="166804" indent="-166804">
               <a:buFontTx/>
               <a:buChar char="-"/>
             </a:pPr>
@@ -3539,7 +3349,7 @@
             </a:r>
           </a:p>
           <a:p>
-            <a:pPr marL="171450" indent="-171450">
+            <a:pPr marL="166804" indent="-166804">
               <a:buFontTx/>
               <a:buChar char="-"/>
             </a:pPr>
@@ -3549,10 +3359,6 @@
             </a:r>
           </a:p>
           <a:p>
-            <a:pPr marL="0" indent="0">
-              <a:buFontTx/>
-              <a:buNone/>
-            </a:pPr>
             <a:r>
               <a:rPr lang="en-US" baseline="0" dirty="0" smtClean="0"/>
               <a:t>and</a:t>
@@ -3560,7 +3366,7 @@
             <a:endParaRPr lang="en-CA" baseline="0" dirty="0" smtClean="0"/>
           </a:p>
           <a:p>
-            <a:pPr marL="171450" indent="-171450">
+            <a:pPr marL="166804" indent="-166804">
               <a:buFontTx/>
               <a:buChar char="-"/>
             </a:pPr>
@@ -12348,84 +12154,6 @@
           </a:extLst>
         </p:spPr>
       </p:pic>
-      <mc:AlternateContent xmlns:mc="http://schemas.openxmlformats.org/markup-compatibility/2006">
-        <mc:Choice xmlns:p14="http://schemas.microsoft.com/office/powerpoint/2010/main" Requires="p14">
-          <p:contentPart p14:bwMode="auto" r:id="rId7">
-            <p14:nvContentPartPr>
-              <p14:cNvPr id="5" name="Ink 4"/>
-              <p14:cNvContentPartPr/>
-              <p14:nvPr/>
-            </p14:nvContentPartPr>
-            <p14:xfrm>
-              <a:off x="1765800" y="3561480"/>
-              <a:ext cx="814680" cy="69120"/>
-            </p14:xfrm>
-          </p:contentPart>
-        </mc:Choice>
-        <mc:Fallback>
-          <p:pic>
-            <p:nvPicPr>
-              <p:cNvPr id="5" name="Ink 4"/>
-              <p:cNvPicPr/>
-              <p:nvPr/>
-            </p:nvPicPr>
-            <p:blipFill>
-              <a:blip r:embed="rId8"/>
-              <a:stretch>
-                <a:fillRect/>
-              </a:stretch>
-            </p:blipFill>
-            <p:spPr>
-              <a:xfrm>
-                <a:off x="1749960" y="3498120"/>
-                <a:ext cx="846360" cy="196200"/>
-              </a:xfrm>
-              <a:prstGeom prst="rect">
-                <a:avLst/>
-              </a:prstGeom>
-            </p:spPr>
-          </p:pic>
-        </mc:Fallback>
-      </mc:AlternateContent>
-      <mc:AlternateContent xmlns:mc="http://schemas.openxmlformats.org/markup-compatibility/2006">
-        <mc:Choice xmlns:p14="http://schemas.microsoft.com/office/powerpoint/2010/main" Requires="p14">
-          <p:contentPart p14:bwMode="auto" r:id="rId9">
-            <p14:nvContentPartPr>
-              <p14:cNvPr id="6" name="Ink 5"/>
-              <p14:cNvContentPartPr/>
-              <p14:nvPr/>
-            </p14:nvContentPartPr>
-            <p14:xfrm>
-              <a:off x="1765800" y="3865680"/>
-              <a:ext cx="540000" cy="20160"/>
-            </p14:xfrm>
-          </p:contentPart>
-        </mc:Choice>
-        <mc:Fallback>
-          <p:pic>
-            <p:nvPicPr>
-              <p:cNvPr id="6" name="Ink 5"/>
-              <p:cNvPicPr/>
-              <p:nvPr/>
-            </p:nvPicPr>
-            <p:blipFill>
-              <a:blip r:embed="rId10"/>
-              <a:stretch>
-                <a:fillRect/>
-              </a:stretch>
-            </p:blipFill>
-            <p:spPr>
-              <a:xfrm>
-                <a:off x="1749960" y="3802320"/>
-                <a:ext cx="571680" cy="146880"/>
-              </a:xfrm>
-              <a:prstGeom prst="rect">
-                <a:avLst/>
-              </a:prstGeom>
-            </p:spPr>
-          </p:pic>
-        </mc:Fallback>
-      </mc:AlternateContent>
     </p:spTree>
     <p:extLst>
       <p:ext uri="{BB962C8B-B14F-4D97-AF65-F5344CB8AC3E}">
@@ -14521,7 +14249,11 @@
             </a:r>
             <a:r>
               <a:rPr lang="en-CA" dirty="0" smtClean="0"/>
-              <a:t>autofocus, </a:t>
+              <a:t>autofocus</a:t>
+            </a:r>
+            <a:r>
+              <a:rPr lang="en-CA" dirty="0" smtClean="0"/>
+              <a:t>, required, pattern, </a:t>
             </a:r>
             <a:r>
               <a:rPr lang="en-CA" dirty="0" err="1" smtClean="0"/>

</xml_diff>